<commit_message>
replicate Huang et al. 2014 without DA
</commit_message>
<xml_diff>
--- a/output/Figures.pptx
+++ b/output/Figures.pptx
@@ -7,8 +7,9 @@
   <p:sldIdLst>
     <p:sldId id="258" r:id="rId2"/>
     <p:sldId id="256" r:id="rId3"/>
-    <p:sldId id="259" r:id="rId4"/>
-    <p:sldId id="257" r:id="rId5"/>
+    <p:sldId id="260" r:id="rId4"/>
+    <p:sldId id="259" r:id="rId5"/>
+    <p:sldId id="257" r:id="rId6"/>
   </p:sldIdLst>
   <p:sldSz cx="12192000" cy="6858000"/>
   <p:notesSz cx="6858000" cy="9144000"/>
@@ -262,7 +263,7 @@
           <a:p>
             <a:fld id="{F6465CF2-20FA-4A27-B5DD-24B9293428AE}" type="datetimeFigureOut">
               <a:rPr lang="en-US" smtClean="0"/>
-              <a:t>4/19/2020</a:t>
+              <a:t>4/20/2020</a:t>
             </a:fld>
             <a:endParaRPr lang="en-US"/>
           </a:p>
@@ -460,7 +461,7 @@
           <a:p>
             <a:fld id="{F6465CF2-20FA-4A27-B5DD-24B9293428AE}" type="datetimeFigureOut">
               <a:rPr lang="en-US" smtClean="0"/>
-              <a:t>4/19/2020</a:t>
+              <a:t>4/20/2020</a:t>
             </a:fld>
             <a:endParaRPr lang="en-US"/>
           </a:p>
@@ -668,7 +669,7 @@
           <a:p>
             <a:fld id="{F6465CF2-20FA-4A27-B5DD-24B9293428AE}" type="datetimeFigureOut">
               <a:rPr lang="en-US" smtClean="0"/>
-              <a:t>4/19/2020</a:t>
+              <a:t>4/20/2020</a:t>
             </a:fld>
             <a:endParaRPr lang="en-US"/>
           </a:p>
@@ -866,7 +867,7 @@
           <a:p>
             <a:fld id="{F6465CF2-20FA-4A27-B5DD-24B9293428AE}" type="datetimeFigureOut">
               <a:rPr lang="en-US" smtClean="0"/>
-              <a:t>4/19/2020</a:t>
+              <a:t>4/20/2020</a:t>
             </a:fld>
             <a:endParaRPr lang="en-US"/>
           </a:p>
@@ -1141,7 +1142,7 @@
           <a:p>
             <a:fld id="{F6465CF2-20FA-4A27-B5DD-24B9293428AE}" type="datetimeFigureOut">
               <a:rPr lang="en-US" smtClean="0"/>
-              <a:t>4/19/2020</a:t>
+              <a:t>4/20/2020</a:t>
             </a:fld>
             <a:endParaRPr lang="en-US"/>
           </a:p>
@@ -1406,7 +1407,7 @@
           <a:p>
             <a:fld id="{F6465CF2-20FA-4A27-B5DD-24B9293428AE}" type="datetimeFigureOut">
               <a:rPr lang="en-US" smtClean="0"/>
-              <a:t>4/19/2020</a:t>
+              <a:t>4/20/2020</a:t>
             </a:fld>
             <a:endParaRPr lang="en-US"/>
           </a:p>
@@ -1818,7 +1819,7 @@
           <a:p>
             <a:fld id="{F6465CF2-20FA-4A27-B5DD-24B9293428AE}" type="datetimeFigureOut">
               <a:rPr lang="en-US" smtClean="0"/>
-              <a:t>4/19/2020</a:t>
+              <a:t>4/20/2020</a:t>
             </a:fld>
             <a:endParaRPr lang="en-US"/>
           </a:p>
@@ -1959,7 +1960,7 @@
           <a:p>
             <a:fld id="{F6465CF2-20FA-4A27-B5DD-24B9293428AE}" type="datetimeFigureOut">
               <a:rPr lang="en-US" smtClean="0"/>
-              <a:t>4/19/2020</a:t>
+              <a:t>4/20/2020</a:t>
             </a:fld>
             <a:endParaRPr lang="en-US"/>
           </a:p>
@@ -2072,7 +2073,7 @@
           <a:p>
             <a:fld id="{F6465CF2-20FA-4A27-B5DD-24B9293428AE}" type="datetimeFigureOut">
               <a:rPr lang="en-US" smtClean="0"/>
-              <a:t>4/19/2020</a:t>
+              <a:t>4/20/2020</a:t>
             </a:fld>
             <a:endParaRPr lang="en-US"/>
           </a:p>
@@ -2383,7 +2384,7 @@
           <a:p>
             <a:fld id="{F6465CF2-20FA-4A27-B5DD-24B9293428AE}" type="datetimeFigureOut">
               <a:rPr lang="en-US" smtClean="0"/>
-              <a:t>4/19/2020</a:t>
+              <a:t>4/20/2020</a:t>
             </a:fld>
             <a:endParaRPr lang="en-US"/>
           </a:p>
@@ -2671,7 +2672,7 @@
           <a:p>
             <a:fld id="{F6465CF2-20FA-4A27-B5DD-24B9293428AE}" type="datetimeFigureOut">
               <a:rPr lang="en-US" smtClean="0"/>
-              <a:t>4/19/2020</a:t>
+              <a:t>4/20/2020</a:t>
             </a:fld>
             <a:endParaRPr lang="en-US"/>
           </a:p>
@@ -2912,7 +2913,7 @@
           <a:p>
             <a:fld id="{F6465CF2-20FA-4A27-B5DD-24B9293428AE}" type="datetimeFigureOut">
               <a:rPr lang="en-US" smtClean="0"/>
-              <a:t>4/19/2020</a:t>
+              <a:t>4/20/2020</a:t>
             </a:fld>
             <a:endParaRPr lang="en-US"/>
           </a:p>
@@ -6505,8 +6506,8 @@
         </p:nvSpPr>
         <p:spPr>
           <a:xfrm>
-            <a:off x="1907590" y="6405255"/>
-            <a:ext cx="9815742" cy="326538"/>
+            <a:off x="1907590" y="6405254"/>
+            <a:ext cx="9815742" cy="452745"/>
           </a:xfrm>
           <a:prstGeom prst="rect">
             <a:avLst/>
@@ -6514,7 +6515,7 @@
         </p:spPr>
         <p:txBody>
           <a:bodyPr vert="horz" lIns="91440" tIns="45720" rIns="91440" bIns="45720" rtlCol="0">
-            <a:normAutofit lnSpcReduction="10000"/>
+            <a:normAutofit fontScale="55000" lnSpcReduction="20000"/>
           </a:bodyPr>
           <a:lstStyle>
             <a:lvl1pPr marL="228600" indent="-228600" algn="l" defTabSz="914400" rtl="0" eaLnBrk="1" latinLnBrk="0" hangingPunct="1">
@@ -6684,6 +6685,12 @@
             <a:r>
               <a:rPr lang="en-US" sz="1800" dirty="0"/>
               <a:t>Other news proxy: tariff / oil price (case study for specific industries)</a:t>
+            </a:r>
+          </a:p>
+          <a:p>
+            <a:r>
+              <a:rPr lang="en-US" sz="1800" dirty="0"/>
+              <a:t>ABTONE – Huang et al. 2014</a:t>
             </a:r>
           </a:p>
         </p:txBody>
@@ -8240,7 +8247,7 @@
                   <a:srgbClr val="808000"/>
                 </a:highlight>
               </a:rPr>
-              <a:t>1,321,088</a:t>
+              <a:t>1,321,336</a:t>
             </a:r>
           </a:p>
           <a:p>
@@ -8274,7 +8281,7 @@
                   <a:srgbClr val="FFFF00"/>
                 </a:highlight>
               </a:rPr>
-              <a:t>1,320,577</a:t>
+              <a:t>1,320,825</a:t>
             </a:r>
           </a:p>
         </p:txBody>
@@ -8779,8 +8786,8 @@
         </p:nvSpPr>
         <p:spPr>
           <a:xfrm>
-            <a:off x="137513" y="5210377"/>
-            <a:ext cx="3826368" cy="1496703"/>
+            <a:off x="137514" y="5511752"/>
+            <a:ext cx="3550946" cy="1277568"/>
           </a:xfrm>
           <a:prstGeom prst="rect">
             <a:avLst/>
@@ -8788,7 +8795,7 @@
         </p:spPr>
         <p:txBody>
           <a:bodyPr vert="horz" lIns="91440" tIns="45720" rIns="91440" bIns="45720" rtlCol="0">
-            <a:normAutofit lnSpcReduction="10000"/>
+            <a:normAutofit/>
           </a:bodyPr>
           <a:lstStyle>
             <a:lvl1pPr marL="0" indent="0" algn="ctr" defTabSz="914400" rtl="0" eaLnBrk="1" latinLnBrk="0" hangingPunct="1">
@@ -8999,28 +9006,6 @@
                 </a:highlight>
               </a:rPr>
               <a:t>: 1991 Jan. – 2020 Apr.</a:t>
-            </a:r>
-          </a:p>
-          <a:p>
-            <a:pPr marL="342900" indent="-342900" algn="l">
-              <a:buFont typeface="Arial" panose="020B0604020202020204" pitchFamily="34" charset="0"/>
-              <a:buChar char="•"/>
-            </a:pPr>
-            <a:r>
-              <a:rPr lang="en-US" sz="1400" dirty="0" err="1">
-                <a:highlight>
-                  <a:srgbClr val="C0C0C0"/>
-                </a:highlight>
-              </a:rPr>
-              <a:t>Compustat</a:t>
-            </a:r>
-            <a:r>
-              <a:rPr lang="en-US" sz="1400" dirty="0">
-                <a:highlight>
-                  <a:srgbClr val="C0C0C0"/>
-                </a:highlight>
-              </a:rPr>
-              <a:t> Segment: 2007 – 2020</a:t>
             </a:r>
           </a:p>
           <a:p>
@@ -9244,7 +9229,7 @@
           <a:p>
             <a:r>
               <a:rPr lang="en-US" sz="1800" dirty="0"/>
-              <a:t>CRSP_COMPUSTAT</a:t>
+              <a:t>CRSP_COMP</a:t>
             </a:r>
           </a:p>
           <a:p>
@@ -9298,7 +9283,7 @@
                   <a:srgbClr val="FFFF00"/>
                 </a:highlight>
               </a:rPr>
-              <a:t>750,753</a:t>
+              <a:t>750,795</a:t>
             </a:r>
           </a:p>
         </p:txBody>
@@ -10043,7 +10028,7 @@
           <a:p>
             <a:r>
               <a:rPr lang="en-US" sz="1800" dirty="0"/>
-              <a:t>CRSP_COMPUSTAT_EDGAR</a:t>
+              <a:t>CRSP_COMP_EDGAR</a:t>
             </a:r>
           </a:p>
           <a:p>
@@ -10079,7 +10064,7 @@
                   <a:srgbClr val="FFFF00"/>
                 </a:highlight>
               </a:rPr>
-              <a:t>303,294</a:t>
+              <a:t>303,284</a:t>
             </a:r>
           </a:p>
           <a:p>
@@ -10097,7 +10082,7 @@
                   <a:srgbClr val="FF0000"/>
                 </a:highlight>
               </a:rPr>
-              <a:t>190,546</a:t>
+              <a:t>190,547</a:t>
             </a:r>
           </a:p>
           <a:p>
@@ -11471,7 +11456,2537 @@
           <a:p>
             <a:r>
               <a:rPr lang="en-US" sz="1800" dirty="0"/>
-              <a:t>CRSP_COMPUSTAT_EDGAR_IBES</a:t>
+              <a:t>CRSP_COMP_EDGAR_IBES</a:t>
+            </a:r>
+          </a:p>
+          <a:p>
+            <a:pPr marL="342900" indent="-342900" algn="l">
+              <a:buFont typeface="Arial" panose="020B0604020202020204" pitchFamily="34" charset="0"/>
+              <a:buChar char="•"/>
+            </a:pPr>
+            <a:r>
+              <a:rPr lang="en-US" sz="1400" dirty="0"/>
+              <a:t>Number of </a:t>
+            </a:r>
+            <a:r>
+              <a:rPr lang="en-US" sz="1400" dirty="0" err="1"/>
+              <a:t>cusip</a:t>
+            </a:r>
+            <a:r>
+              <a:rPr lang="en-US" sz="1400" dirty="0"/>
+              <a:t>-quarter observations after merging: </a:t>
+            </a:r>
+            <a:r>
+              <a:rPr lang="en-US" sz="1400" dirty="0">
+                <a:highlight>
+                  <a:srgbClr val="FFFF00"/>
+                </a:highlight>
+              </a:rPr>
+              <a:t>110,111 </a:t>
+            </a:r>
+          </a:p>
+        </p:txBody>
+      </p:sp>
+      <p:grpSp>
+        <p:nvGrpSpPr>
+          <p:cNvPr id="26" name="Group 25">
+            <a:extLst>
+              <a:ext uri="{FF2B5EF4-FFF2-40B4-BE49-F238E27FC236}">
+                <a16:creationId xmlns:a16="http://schemas.microsoft.com/office/drawing/2014/main" id="{AE1AD52E-AE06-4275-882C-227E03483BF6}"/>
+              </a:ext>
+            </a:extLst>
+          </p:cNvPr>
+          <p:cNvGrpSpPr/>
+          <p:nvPr/>
+        </p:nvGrpSpPr>
+        <p:grpSpPr>
+          <a:xfrm>
+            <a:off x="1331651" y="1649461"/>
+            <a:ext cx="5264459" cy="1045346"/>
+            <a:chOff x="1038687" y="3429000"/>
+            <a:chExt cx="5264459" cy="1045346"/>
+          </a:xfrm>
+        </p:grpSpPr>
+        <p:cxnSp>
+          <p:nvCxnSpPr>
+            <p:cNvPr id="20" name="Straight Connector 19">
+              <a:extLst>
+                <a:ext uri="{FF2B5EF4-FFF2-40B4-BE49-F238E27FC236}">
+                  <a16:creationId xmlns:a16="http://schemas.microsoft.com/office/drawing/2014/main" id="{97DDD179-9792-41FF-BB80-0685609B9A7C}"/>
+                </a:ext>
+              </a:extLst>
+            </p:cNvPr>
+            <p:cNvCxnSpPr/>
+            <p:nvPr/>
+          </p:nvCxnSpPr>
+          <p:spPr>
+            <a:xfrm>
+              <a:off x="1038687" y="3429000"/>
+              <a:ext cx="0" cy="494930"/>
+            </a:xfrm>
+            <a:prstGeom prst="line">
+              <a:avLst/>
+            </a:prstGeom>
+            <a:ln w="25400"/>
+          </p:spPr>
+          <p:style>
+            <a:lnRef idx="1">
+              <a:schemeClr val="accent1"/>
+            </a:lnRef>
+            <a:fillRef idx="0">
+              <a:schemeClr val="accent1"/>
+            </a:fillRef>
+            <a:effectRef idx="0">
+              <a:schemeClr val="accent1"/>
+            </a:effectRef>
+            <a:fontRef idx="minor">
+              <a:schemeClr val="tx1"/>
+            </a:fontRef>
+          </p:style>
+        </p:cxnSp>
+        <p:cxnSp>
+          <p:nvCxnSpPr>
+            <p:cNvPr id="22" name="Straight Connector 21">
+              <a:extLst>
+                <a:ext uri="{FF2B5EF4-FFF2-40B4-BE49-F238E27FC236}">
+                  <a16:creationId xmlns:a16="http://schemas.microsoft.com/office/drawing/2014/main" id="{FA8AB022-380D-4470-95B7-D93641C73FAB}"/>
+                </a:ext>
+              </a:extLst>
+            </p:cNvPr>
+            <p:cNvCxnSpPr/>
+            <p:nvPr/>
+          </p:nvCxnSpPr>
+          <p:spPr>
+            <a:xfrm>
+              <a:off x="1038687" y="3932808"/>
+              <a:ext cx="5264459" cy="0"/>
+            </a:xfrm>
+            <a:prstGeom prst="line">
+              <a:avLst/>
+            </a:prstGeom>
+            <a:ln w="25400"/>
+          </p:spPr>
+          <p:style>
+            <a:lnRef idx="1">
+              <a:schemeClr val="accent1"/>
+            </a:lnRef>
+            <a:fillRef idx="0">
+              <a:schemeClr val="accent1"/>
+            </a:fillRef>
+            <a:effectRef idx="0">
+              <a:schemeClr val="accent1"/>
+            </a:effectRef>
+            <a:fontRef idx="minor">
+              <a:schemeClr val="tx1"/>
+            </a:fontRef>
+          </p:style>
+        </p:cxnSp>
+        <p:cxnSp>
+          <p:nvCxnSpPr>
+            <p:cNvPr id="23" name="Straight Connector 22">
+              <a:extLst>
+                <a:ext uri="{FF2B5EF4-FFF2-40B4-BE49-F238E27FC236}">
+                  <a16:creationId xmlns:a16="http://schemas.microsoft.com/office/drawing/2014/main" id="{FF78DD7D-F922-4A22-8970-0F5037394061}"/>
+                </a:ext>
+              </a:extLst>
+            </p:cNvPr>
+            <p:cNvCxnSpPr/>
+            <p:nvPr/>
+          </p:nvCxnSpPr>
+          <p:spPr>
+            <a:xfrm>
+              <a:off x="6303146" y="3437878"/>
+              <a:ext cx="0" cy="494930"/>
+            </a:xfrm>
+            <a:prstGeom prst="line">
+              <a:avLst/>
+            </a:prstGeom>
+            <a:ln w="25400"/>
+          </p:spPr>
+          <p:style>
+            <a:lnRef idx="1">
+              <a:schemeClr val="accent1"/>
+            </a:lnRef>
+            <a:fillRef idx="0">
+              <a:schemeClr val="accent1"/>
+            </a:fillRef>
+            <a:effectRef idx="0">
+              <a:schemeClr val="accent1"/>
+            </a:effectRef>
+            <a:fontRef idx="minor">
+              <a:schemeClr val="tx1"/>
+            </a:fontRef>
+          </p:style>
+        </p:cxnSp>
+        <p:cxnSp>
+          <p:nvCxnSpPr>
+            <p:cNvPr id="25" name="Straight Arrow Connector 24">
+              <a:extLst>
+                <a:ext uri="{FF2B5EF4-FFF2-40B4-BE49-F238E27FC236}">
+                  <a16:creationId xmlns:a16="http://schemas.microsoft.com/office/drawing/2014/main" id="{EC3F3BD9-4F91-4AA9-A2CE-AD7A689DA801}"/>
+                </a:ext>
+              </a:extLst>
+            </p:cNvPr>
+            <p:cNvCxnSpPr/>
+            <p:nvPr/>
+          </p:nvCxnSpPr>
+          <p:spPr>
+            <a:xfrm>
+              <a:off x="3370926" y="3932808"/>
+              <a:ext cx="0" cy="541538"/>
+            </a:xfrm>
+            <a:prstGeom prst="straightConnector1">
+              <a:avLst/>
+            </a:prstGeom>
+            <a:ln w="25400">
+              <a:tailEnd type="triangle"/>
+            </a:ln>
+          </p:spPr>
+          <p:style>
+            <a:lnRef idx="1">
+              <a:schemeClr val="accent1"/>
+            </a:lnRef>
+            <a:fillRef idx="0">
+              <a:schemeClr val="accent1"/>
+            </a:fillRef>
+            <a:effectRef idx="0">
+              <a:schemeClr val="accent1"/>
+            </a:effectRef>
+            <a:fontRef idx="minor">
+              <a:schemeClr val="tx1"/>
+            </a:fontRef>
+          </p:style>
+        </p:cxnSp>
+      </p:grpSp>
+      <p:sp>
+        <p:nvSpPr>
+          <p:cNvPr id="27" name="Subtitle 2">
+            <a:extLst>
+              <a:ext uri="{FF2B5EF4-FFF2-40B4-BE49-F238E27FC236}">
+                <a16:creationId xmlns:a16="http://schemas.microsoft.com/office/drawing/2014/main" id="{4FD9611F-45F7-4965-B148-D2684E5C0CFE}"/>
+              </a:ext>
+            </a:extLst>
+          </p:cNvPr>
+          <p:cNvSpPr txBox="1">
+            <a:spLocks/>
+          </p:cNvSpPr>
+          <p:nvPr/>
+        </p:nvSpPr>
+        <p:spPr>
+          <a:xfrm>
+            <a:off x="1476289" y="1843611"/>
+            <a:ext cx="5024747" cy="385164"/>
+          </a:xfrm>
+          <a:prstGeom prst="rect">
+            <a:avLst/>
+          </a:prstGeom>
+        </p:spPr>
+        <p:txBody>
+          <a:bodyPr vert="horz" lIns="91440" tIns="45720" rIns="91440" bIns="45720" rtlCol="0">
+            <a:noAutofit/>
+          </a:bodyPr>
+          <a:lstStyle>
+            <a:lvl1pPr marL="0" indent="0" algn="ctr" defTabSz="914400" rtl="0" eaLnBrk="1" latinLnBrk="0" hangingPunct="1">
+              <a:lnSpc>
+                <a:spcPct val="90000"/>
+              </a:lnSpc>
+              <a:spcBef>
+                <a:spcPts val="1000"/>
+              </a:spcBef>
+              <a:buFont typeface="Arial" panose="020B0604020202020204" pitchFamily="34" charset="0"/>
+              <a:buNone/>
+              <a:defRPr sz="2400" kern="1200">
+                <a:solidFill>
+                  <a:schemeClr val="tx1"/>
+                </a:solidFill>
+                <a:latin typeface="+mn-lt"/>
+                <a:ea typeface="+mn-ea"/>
+                <a:cs typeface="+mn-cs"/>
+              </a:defRPr>
+            </a:lvl1pPr>
+            <a:lvl2pPr marL="457200" indent="0" algn="ctr" defTabSz="914400" rtl="0" eaLnBrk="1" latinLnBrk="0" hangingPunct="1">
+              <a:lnSpc>
+                <a:spcPct val="90000"/>
+              </a:lnSpc>
+              <a:spcBef>
+                <a:spcPts val="500"/>
+              </a:spcBef>
+              <a:buFont typeface="Arial" panose="020B0604020202020204" pitchFamily="34" charset="0"/>
+              <a:buNone/>
+              <a:defRPr sz="2000" kern="1200">
+                <a:solidFill>
+                  <a:schemeClr val="tx1"/>
+                </a:solidFill>
+                <a:latin typeface="+mn-lt"/>
+                <a:ea typeface="+mn-ea"/>
+                <a:cs typeface="+mn-cs"/>
+              </a:defRPr>
+            </a:lvl2pPr>
+            <a:lvl3pPr marL="914400" indent="0" algn="ctr" defTabSz="914400" rtl="0" eaLnBrk="1" latinLnBrk="0" hangingPunct="1">
+              <a:lnSpc>
+                <a:spcPct val="90000"/>
+              </a:lnSpc>
+              <a:spcBef>
+                <a:spcPts val="500"/>
+              </a:spcBef>
+              <a:buFont typeface="Arial" panose="020B0604020202020204" pitchFamily="34" charset="0"/>
+              <a:buNone/>
+              <a:defRPr sz="1800" kern="1200">
+                <a:solidFill>
+                  <a:schemeClr val="tx1"/>
+                </a:solidFill>
+                <a:latin typeface="+mn-lt"/>
+                <a:ea typeface="+mn-ea"/>
+                <a:cs typeface="+mn-cs"/>
+              </a:defRPr>
+            </a:lvl3pPr>
+            <a:lvl4pPr marL="1371600" indent="0" algn="ctr" defTabSz="914400" rtl="0" eaLnBrk="1" latinLnBrk="0" hangingPunct="1">
+              <a:lnSpc>
+                <a:spcPct val="90000"/>
+              </a:lnSpc>
+              <a:spcBef>
+                <a:spcPts val="500"/>
+              </a:spcBef>
+              <a:buFont typeface="Arial" panose="020B0604020202020204" pitchFamily="34" charset="0"/>
+              <a:buNone/>
+              <a:defRPr sz="1600" kern="1200">
+                <a:solidFill>
+                  <a:schemeClr val="tx1"/>
+                </a:solidFill>
+                <a:latin typeface="+mn-lt"/>
+                <a:ea typeface="+mn-ea"/>
+                <a:cs typeface="+mn-cs"/>
+              </a:defRPr>
+            </a:lvl4pPr>
+            <a:lvl5pPr marL="1828800" indent="0" algn="ctr" defTabSz="914400" rtl="0" eaLnBrk="1" latinLnBrk="0" hangingPunct="1">
+              <a:lnSpc>
+                <a:spcPct val="90000"/>
+              </a:lnSpc>
+              <a:spcBef>
+                <a:spcPts val="500"/>
+              </a:spcBef>
+              <a:buFont typeface="Arial" panose="020B0604020202020204" pitchFamily="34" charset="0"/>
+              <a:buNone/>
+              <a:defRPr sz="1600" kern="1200">
+                <a:solidFill>
+                  <a:schemeClr val="tx1"/>
+                </a:solidFill>
+                <a:latin typeface="+mn-lt"/>
+                <a:ea typeface="+mn-ea"/>
+                <a:cs typeface="+mn-cs"/>
+              </a:defRPr>
+            </a:lvl5pPr>
+            <a:lvl6pPr marL="2286000" indent="0" algn="ctr" defTabSz="914400" rtl="0" eaLnBrk="1" latinLnBrk="0" hangingPunct="1">
+              <a:lnSpc>
+                <a:spcPct val="90000"/>
+              </a:lnSpc>
+              <a:spcBef>
+                <a:spcPts val="500"/>
+              </a:spcBef>
+              <a:buFont typeface="Arial" panose="020B0604020202020204" pitchFamily="34" charset="0"/>
+              <a:buNone/>
+              <a:defRPr sz="1600" kern="1200">
+                <a:solidFill>
+                  <a:schemeClr val="tx1"/>
+                </a:solidFill>
+                <a:latin typeface="+mn-lt"/>
+                <a:ea typeface="+mn-ea"/>
+                <a:cs typeface="+mn-cs"/>
+              </a:defRPr>
+            </a:lvl6pPr>
+            <a:lvl7pPr marL="2743200" indent="0" algn="ctr" defTabSz="914400" rtl="0" eaLnBrk="1" latinLnBrk="0" hangingPunct="1">
+              <a:lnSpc>
+                <a:spcPct val="90000"/>
+              </a:lnSpc>
+              <a:spcBef>
+                <a:spcPts val="500"/>
+              </a:spcBef>
+              <a:buFont typeface="Arial" panose="020B0604020202020204" pitchFamily="34" charset="0"/>
+              <a:buNone/>
+              <a:defRPr sz="1600" kern="1200">
+                <a:solidFill>
+                  <a:schemeClr val="tx1"/>
+                </a:solidFill>
+                <a:latin typeface="+mn-lt"/>
+                <a:ea typeface="+mn-ea"/>
+                <a:cs typeface="+mn-cs"/>
+              </a:defRPr>
+            </a:lvl7pPr>
+            <a:lvl8pPr marL="3200400" indent="0" algn="ctr" defTabSz="914400" rtl="0" eaLnBrk="1" latinLnBrk="0" hangingPunct="1">
+              <a:lnSpc>
+                <a:spcPct val="90000"/>
+              </a:lnSpc>
+              <a:spcBef>
+                <a:spcPts val="500"/>
+              </a:spcBef>
+              <a:buFont typeface="Arial" panose="020B0604020202020204" pitchFamily="34" charset="0"/>
+              <a:buNone/>
+              <a:defRPr sz="1600" kern="1200">
+                <a:solidFill>
+                  <a:schemeClr val="tx1"/>
+                </a:solidFill>
+                <a:latin typeface="+mn-lt"/>
+                <a:ea typeface="+mn-ea"/>
+                <a:cs typeface="+mn-cs"/>
+              </a:defRPr>
+            </a:lvl8pPr>
+            <a:lvl9pPr marL="3657600" indent="0" algn="ctr" defTabSz="914400" rtl="0" eaLnBrk="1" latinLnBrk="0" hangingPunct="1">
+              <a:lnSpc>
+                <a:spcPct val="90000"/>
+              </a:lnSpc>
+              <a:spcBef>
+                <a:spcPts val="500"/>
+              </a:spcBef>
+              <a:buFont typeface="Arial" panose="020B0604020202020204" pitchFamily="34" charset="0"/>
+              <a:buNone/>
+              <a:defRPr sz="1600" kern="1200">
+                <a:solidFill>
+                  <a:schemeClr val="tx1"/>
+                </a:solidFill>
+                <a:latin typeface="+mn-lt"/>
+                <a:ea typeface="+mn-ea"/>
+                <a:cs typeface="+mn-cs"/>
+              </a:defRPr>
+            </a:lvl9pPr>
+          </a:lstStyle>
+          <a:p>
+            <a:pPr algn="l"/>
+            <a:r>
+              <a:rPr lang="en-US" sz="1400" dirty="0">
+                <a:highlight>
+                  <a:srgbClr val="C0C0C0"/>
+                </a:highlight>
+              </a:rPr>
+              <a:t>Merge and assign IBES annual forecast variables to quarterly filings</a:t>
+            </a:r>
+          </a:p>
+        </p:txBody>
+      </p:sp>
+      <p:sp>
+        <p:nvSpPr>
+          <p:cNvPr id="41" name="Subtitle 2">
+            <a:extLst>
+              <a:ext uri="{FF2B5EF4-FFF2-40B4-BE49-F238E27FC236}">
+                <a16:creationId xmlns:a16="http://schemas.microsoft.com/office/drawing/2014/main" id="{545ECAD0-952F-4611-BCFD-23FD2C6790F1}"/>
+              </a:ext>
+            </a:extLst>
+          </p:cNvPr>
+          <p:cNvSpPr txBox="1">
+            <a:spLocks/>
+          </p:cNvSpPr>
+          <p:nvPr/>
+        </p:nvSpPr>
+        <p:spPr>
+          <a:xfrm>
+            <a:off x="122810" y="667084"/>
+            <a:ext cx="3541080" cy="995150"/>
+          </a:xfrm>
+          <a:prstGeom prst="rect">
+            <a:avLst/>
+          </a:prstGeom>
+        </p:spPr>
+        <p:txBody>
+          <a:bodyPr vert="horz" lIns="91440" tIns="45720" rIns="91440" bIns="45720" rtlCol="0">
+            <a:normAutofit/>
+          </a:bodyPr>
+          <a:lstStyle>
+            <a:lvl1pPr marL="0" indent="0" algn="ctr" defTabSz="914400" rtl="0" eaLnBrk="1" latinLnBrk="0" hangingPunct="1">
+              <a:lnSpc>
+                <a:spcPct val="90000"/>
+              </a:lnSpc>
+              <a:spcBef>
+                <a:spcPts val="1000"/>
+              </a:spcBef>
+              <a:buFont typeface="Arial" panose="020B0604020202020204" pitchFamily="34" charset="0"/>
+              <a:buNone/>
+              <a:defRPr sz="2400" kern="1200">
+                <a:solidFill>
+                  <a:schemeClr val="tx1"/>
+                </a:solidFill>
+                <a:latin typeface="+mn-lt"/>
+                <a:ea typeface="+mn-ea"/>
+                <a:cs typeface="+mn-cs"/>
+              </a:defRPr>
+            </a:lvl1pPr>
+            <a:lvl2pPr marL="457200" indent="0" algn="ctr" defTabSz="914400" rtl="0" eaLnBrk="1" latinLnBrk="0" hangingPunct="1">
+              <a:lnSpc>
+                <a:spcPct val="90000"/>
+              </a:lnSpc>
+              <a:spcBef>
+                <a:spcPts val="500"/>
+              </a:spcBef>
+              <a:buFont typeface="Arial" panose="020B0604020202020204" pitchFamily="34" charset="0"/>
+              <a:buNone/>
+              <a:defRPr sz="2000" kern="1200">
+                <a:solidFill>
+                  <a:schemeClr val="tx1"/>
+                </a:solidFill>
+                <a:latin typeface="+mn-lt"/>
+                <a:ea typeface="+mn-ea"/>
+                <a:cs typeface="+mn-cs"/>
+              </a:defRPr>
+            </a:lvl2pPr>
+            <a:lvl3pPr marL="914400" indent="0" algn="ctr" defTabSz="914400" rtl="0" eaLnBrk="1" latinLnBrk="0" hangingPunct="1">
+              <a:lnSpc>
+                <a:spcPct val="90000"/>
+              </a:lnSpc>
+              <a:spcBef>
+                <a:spcPts val="500"/>
+              </a:spcBef>
+              <a:buFont typeface="Arial" panose="020B0604020202020204" pitchFamily="34" charset="0"/>
+              <a:buNone/>
+              <a:defRPr sz="1800" kern="1200">
+                <a:solidFill>
+                  <a:schemeClr val="tx1"/>
+                </a:solidFill>
+                <a:latin typeface="+mn-lt"/>
+                <a:ea typeface="+mn-ea"/>
+                <a:cs typeface="+mn-cs"/>
+              </a:defRPr>
+            </a:lvl3pPr>
+            <a:lvl4pPr marL="1371600" indent="0" algn="ctr" defTabSz="914400" rtl="0" eaLnBrk="1" latinLnBrk="0" hangingPunct="1">
+              <a:lnSpc>
+                <a:spcPct val="90000"/>
+              </a:lnSpc>
+              <a:spcBef>
+                <a:spcPts val="500"/>
+              </a:spcBef>
+              <a:buFont typeface="Arial" panose="020B0604020202020204" pitchFamily="34" charset="0"/>
+              <a:buNone/>
+              <a:defRPr sz="1600" kern="1200">
+                <a:solidFill>
+                  <a:schemeClr val="tx1"/>
+                </a:solidFill>
+                <a:latin typeface="+mn-lt"/>
+                <a:ea typeface="+mn-ea"/>
+                <a:cs typeface="+mn-cs"/>
+              </a:defRPr>
+            </a:lvl4pPr>
+            <a:lvl5pPr marL="1828800" indent="0" algn="ctr" defTabSz="914400" rtl="0" eaLnBrk="1" latinLnBrk="0" hangingPunct="1">
+              <a:lnSpc>
+                <a:spcPct val="90000"/>
+              </a:lnSpc>
+              <a:spcBef>
+                <a:spcPts val="500"/>
+              </a:spcBef>
+              <a:buFont typeface="Arial" panose="020B0604020202020204" pitchFamily="34" charset="0"/>
+              <a:buNone/>
+              <a:defRPr sz="1600" kern="1200">
+                <a:solidFill>
+                  <a:schemeClr val="tx1"/>
+                </a:solidFill>
+                <a:latin typeface="+mn-lt"/>
+                <a:ea typeface="+mn-ea"/>
+                <a:cs typeface="+mn-cs"/>
+              </a:defRPr>
+            </a:lvl5pPr>
+            <a:lvl6pPr marL="2286000" indent="0" algn="ctr" defTabSz="914400" rtl="0" eaLnBrk="1" latinLnBrk="0" hangingPunct="1">
+              <a:lnSpc>
+                <a:spcPct val="90000"/>
+              </a:lnSpc>
+              <a:spcBef>
+                <a:spcPts val="500"/>
+              </a:spcBef>
+              <a:buFont typeface="Arial" panose="020B0604020202020204" pitchFamily="34" charset="0"/>
+              <a:buNone/>
+              <a:defRPr sz="1600" kern="1200">
+                <a:solidFill>
+                  <a:schemeClr val="tx1"/>
+                </a:solidFill>
+                <a:latin typeface="+mn-lt"/>
+                <a:ea typeface="+mn-ea"/>
+                <a:cs typeface="+mn-cs"/>
+              </a:defRPr>
+            </a:lvl6pPr>
+            <a:lvl7pPr marL="2743200" indent="0" algn="ctr" defTabSz="914400" rtl="0" eaLnBrk="1" latinLnBrk="0" hangingPunct="1">
+              <a:lnSpc>
+                <a:spcPct val="90000"/>
+              </a:lnSpc>
+              <a:spcBef>
+                <a:spcPts val="500"/>
+              </a:spcBef>
+              <a:buFont typeface="Arial" panose="020B0604020202020204" pitchFamily="34" charset="0"/>
+              <a:buNone/>
+              <a:defRPr sz="1600" kern="1200">
+                <a:solidFill>
+                  <a:schemeClr val="tx1"/>
+                </a:solidFill>
+                <a:latin typeface="+mn-lt"/>
+                <a:ea typeface="+mn-ea"/>
+                <a:cs typeface="+mn-cs"/>
+              </a:defRPr>
+            </a:lvl7pPr>
+            <a:lvl8pPr marL="3200400" indent="0" algn="ctr" defTabSz="914400" rtl="0" eaLnBrk="1" latinLnBrk="0" hangingPunct="1">
+              <a:lnSpc>
+                <a:spcPct val="90000"/>
+              </a:lnSpc>
+              <a:spcBef>
+                <a:spcPts val="500"/>
+              </a:spcBef>
+              <a:buFont typeface="Arial" panose="020B0604020202020204" pitchFamily="34" charset="0"/>
+              <a:buNone/>
+              <a:defRPr sz="1600" kern="1200">
+                <a:solidFill>
+                  <a:schemeClr val="tx1"/>
+                </a:solidFill>
+                <a:latin typeface="+mn-lt"/>
+                <a:ea typeface="+mn-ea"/>
+                <a:cs typeface="+mn-cs"/>
+              </a:defRPr>
+            </a:lvl8pPr>
+            <a:lvl9pPr marL="3657600" indent="0" algn="ctr" defTabSz="914400" rtl="0" eaLnBrk="1" latinLnBrk="0" hangingPunct="1">
+              <a:lnSpc>
+                <a:spcPct val="90000"/>
+              </a:lnSpc>
+              <a:spcBef>
+                <a:spcPts val="500"/>
+              </a:spcBef>
+              <a:buFont typeface="Arial" panose="020B0604020202020204" pitchFamily="34" charset="0"/>
+              <a:buNone/>
+              <a:defRPr sz="1600" kern="1200">
+                <a:solidFill>
+                  <a:schemeClr val="tx1"/>
+                </a:solidFill>
+                <a:latin typeface="+mn-lt"/>
+                <a:ea typeface="+mn-ea"/>
+                <a:cs typeface="+mn-cs"/>
+              </a:defRPr>
+            </a:lvl9pPr>
+          </a:lstStyle>
+          <a:p>
+            <a:r>
+              <a:rPr lang="en-US" sz="2000" dirty="0"/>
+              <a:t>CRSP_COMP_EDGAR</a:t>
+            </a:r>
+          </a:p>
+          <a:p>
+            <a:pPr marL="285750" indent="-285750" algn="l">
+              <a:buFont typeface="Arial" panose="020B0604020202020204" pitchFamily="34" charset="0"/>
+              <a:buChar char="•"/>
+            </a:pPr>
+            <a:r>
+              <a:rPr lang="en-US" sz="1600" dirty="0"/>
+              <a:t>Number of </a:t>
+            </a:r>
+            <a:r>
+              <a:rPr lang="en-US" sz="1600" dirty="0" err="1"/>
+              <a:t>cik</a:t>
+            </a:r>
+            <a:r>
+              <a:rPr lang="en-US" sz="1600" dirty="0"/>
+              <a:t>-quarter observations </a:t>
+            </a:r>
+            <a:r>
+              <a:rPr lang="en-US" sz="1600" dirty="0">
+                <a:highlight>
+                  <a:srgbClr val="808000"/>
+                </a:highlight>
+              </a:rPr>
+              <a:t>190,547</a:t>
+            </a:r>
+          </a:p>
+          <a:p>
+            <a:pPr marL="742950" lvl="1" indent="-285750" algn="l">
+              <a:buFont typeface="Arial" panose="020B0604020202020204" pitchFamily="34" charset="0"/>
+              <a:buChar char="•"/>
+            </a:pPr>
+            <a:endParaRPr lang="en-US" sz="1400" dirty="0"/>
+          </a:p>
+        </p:txBody>
+      </p:sp>
+      <p:sp>
+        <p:nvSpPr>
+          <p:cNvPr id="44" name="Subtitle 2">
+            <a:extLst>
+              <a:ext uri="{FF2B5EF4-FFF2-40B4-BE49-F238E27FC236}">
+                <a16:creationId xmlns:a16="http://schemas.microsoft.com/office/drawing/2014/main" id="{B3C71EC0-10F5-4FA0-BB60-D254B8181E43}"/>
+              </a:ext>
+            </a:extLst>
+          </p:cNvPr>
+          <p:cNvSpPr txBox="1">
+            <a:spLocks/>
+          </p:cNvSpPr>
+          <p:nvPr/>
+        </p:nvSpPr>
+        <p:spPr>
+          <a:xfrm>
+            <a:off x="5045076" y="3584665"/>
+            <a:ext cx="3630307" cy="319241"/>
+          </a:xfrm>
+          <a:prstGeom prst="rect">
+            <a:avLst/>
+          </a:prstGeom>
+        </p:spPr>
+        <p:txBody>
+          <a:bodyPr vert="horz" lIns="91440" tIns="45720" rIns="91440" bIns="45720" rtlCol="0">
+            <a:noAutofit/>
+          </a:bodyPr>
+          <a:lstStyle>
+            <a:lvl1pPr marL="0" indent="0" algn="ctr" defTabSz="914400" rtl="0" eaLnBrk="1" latinLnBrk="0" hangingPunct="1">
+              <a:lnSpc>
+                <a:spcPct val="90000"/>
+              </a:lnSpc>
+              <a:spcBef>
+                <a:spcPts val="1000"/>
+              </a:spcBef>
+              <a:buFont typeface="Arial" panose="020B0604020202020204" pitchFamily="34" charset="0"/>
+              <a:buNone/>
+              <a:defRPr sz="2400" kern="1200">
+                <a:solidFill>
+                  <a:schemeClr val="tx1"/>
+                </a:solidFill>
+                <a:latin typeface="+mn-lt"/>
+                <a:ea typeface="+mn-ea"/>
+                <a:cs typeface="+mn-cs"/>
+              </a:defRPr>
+            </a:lvl1pPr>
+            <a:lvl2pPr marL="457200" indent="0" algn="ctr" defTabSz="914400" rtl="0" eaLnBrk="1" latinLnBrk="0" hangingPunct="1">
+              <a:lnSpc>
+                <a:spcPct val="90000"/>
+              </a:lnSpc>
+              <a:spcBef>
+                <a:spcPts val="500"/>
+              </a:spcBef>
+              <a:buFont typeface="Arial" panose="020B0604020202020204" pitchFamily="34" charset="0"/>
+              <a:buNone/>
+              <a:defRPr sz="2000" kern="1200">
+                <a:solidFill>
+                  <a:schemeClr val="tx1"/>
+                </a:solidFill>
+                <a:latin typeface="+mn-lt"/>
+                <a:ea typeface="+mn-ea"/>
+                <a:cs typeface="+mn-cs"/>
+              </a:defRPr>
+            </a:lvl2pPr>
+            <a:lvl3pPr marL="914400" indent="0" algn="ctr" defTabSz="914400" rtl="0" eaLnBrk="1" latinLnBrk="0" hangingPunct="1">
+              <a:lnSpc>
+                <a:spcPct val="90000"/>
+              </a:lnSpc>
+              <a:spcBef>
+                <a:spcPts val="500"/>
+              </a:spcBef>
+              <a:buFont typeface="Arial" panose="020B0604020202020204" pitchFamily="34" charset="0"/>
+              <a:buNone/>
+              <a:defRPr sz="1800" kern="1200">
+                <a:solidFill>
+                  <a:schemeClr val="tx1"/>
+                </a:solidFill>
+                <a:latin typeface="+mn-lt"/>
+                <a:ea typeface="+mn-ea"/>
+                <a:cs typeface="+mn-cs"/>
+              </a:defRPr>
+            </a:lvl3pPr>
+            <a:lvl4pPr marL="1371600" indent="0" algn="ctr" defTabSz="914400" rtl="0" eaLnBrk="1" latinLnBrk="0" hangingPunct="1">
+              <a:lnSpc>
+                <a:spcPct val="90000"/>
+              </a:lnSpc>
+              <a:spcBef>
+                <a:spcPts val="500"/>
+              </a:spcBef>
+              <a:buFont typeface="Arial" panose="020B0604020202020204" pitchFamily="34" charset="0"/>
+              <a:buNone/>
+              <a:defRPr sz="1600" kern="1200">
+                <a:solidFill>
+                  <a:schemeClr val="tx1"/>
+                </a:solidFill>
+                <a:latin typeface="+mn-lt"/>
+                <a:ea typeface="+mn-ea"/>
+                <a:cs typeface="+mn-cs"/>
+              </a:defRPr>
+            </a:lvl4pPr>
+            <a:lvl5pPr marL="1828800" indent="0" algn="ctr" defTabSz="914400" rtl="0" eaLnBrk="1" latinLnBrk="0" hangingPunct="1">
+              <a:lnSpc>
+                <a:spcPct val="90000"/>
+              </a:lnSpc>
+              <a:spcBef>
+                <a:spcPts val="500"/>
+              </a:spcBef>
+              <a:buFont typeface="Arial" panose="020B0604020202020204" pitchFamily="34" charset="0"/>
+              <a:buNone/>
+              <a:defRPr sz="1600" kern="1200">
+                <a:solidFill>
+                  <a:schemeClr val="tx1"/>
+                </a:solidFill>
+                <a:latin typeface="+mn-lt"/>
+                <a:ea typeface="+mn-ea"/>
+                <a:cs typeface="+mn-cs"/>
+              </a:defRPr>
+            </a:lvl5pPr>
+            <a:lvl6pPr marL="2286000" indent="0" algn="ctr" defTabSz="914400" rtl="0" eaLnBrk="1" latinLnBrk="0" hangingPunct="1">
+              <a:lnSpc>
+                <a:spcPct val="90000"/>
+              </a:lnSpc>
+              <a:spcBef>
+                <a:spcPts val="500"/>
+              </a:spcBef>
+              <a:buFont typeface="Arial" panose="020B0604020202020204" pitchFamily="34" charset="0"/>
+              <a:buNone/>
+              <a:defRPr sz="1600" kern="1200">
+                <a:solidFill>
+                  <a:schemeClr val="tx1"/>
+                </a:solidFill>
+                <a:latin typeface="+mn-lt"/>
+                <a:ea typeface="+mn-ea"/>
+                <a:cs typeface="+mn-cs"/>
+              </a:defRPr>
+            </a:lvl6pPr>
+            <a:lvl7pPr marL="2743200" indent="0" algn="ctr" defTabSz="914400" rtl="0" eaLnBrk="1" latinLnBrk="0" hangingPunct="1">
+              <a:lnSpc>
+                <a:spcPct val="90000"/>
+              </a:lnSpc>
+              <a:spcBef>
+                <a:spcPts val="500"/>
+              </a:spcBef>
+              <a:buFont typeface="Arial" panose="020B0604020202020204" pitchFamily="34" charset="0"/>
+              <a:buNone/>
+              <a:defRPr sz="1600" kern="1200">
+                <a:solidFill>
+                  <a:schemeClr val="tx1"/>
+                </a:solidFill>
+                <a:latin typeface="+mn-lt"/>
+                <a:ea typeface="+mn-ea"/>
+                <a:cs typeface="+mn-cs"/>
+              </a:defRPr>
+            </a:lvl7pPr>
+            <a:lvl8pPr marL="3200400" indent="0" algn="ctr" defTabSz="914400" rtl="0" eaLnBrk="1" latinLnBrk="0" hangingPunct="1">
+              <a:lnSpc>
+                <a:spcPct val="90000"/>
+              </a:lnSpc>
+              <a:spcBef>
+                <a:spcPts val="500"/>
+              </a:spcBef>
+              <a:buFont typeface="Arial" panose="020B0604020202020204" pitchFamily="34" charset="0"/>
+              <a:buNone/>
+              <a:defRPr sz="1600" kern="1200">
+                <a:solidFill>
+                  <a:schemeClr val="tx1"/>
+                </a:solidFill>
+                <a:latin typeface="+mn-lt"/>
+                <a:ea typeface="+mn-ea"/>
+                <a:cs typeface="+mn-cs"/>
+              </a:defRPr>
+            </a:lvl8pPr>
+            <a:lvl9pPr marL="3657600" indent="0" algn="ctr" defTabSz="914400" rtl="0" eaLnBrk="1" latinLnBrk="0" hangingPunct="1">
+              <a:lnSpc>
+                <a:spcPct val="90000"/>
+              </a:lnSpc>
+              <a:spcBef>
+                <a:spcPts val="500"/>
+              </a:spcBef>
+              <a:buFont typeface="Arial" panose="020B0604020202020204" pitchFamily="34" charset="0"/>
+              <a:buNone/>
+              <a:defRPr sz="1600" kern="1200">
+                <a:solidFill>
+                  <a:schemeClr val="tx1"/>
+                </a:solidFill>
+                <a:latin typeface="+mn-lt"/>
+                <a:ea typeface="+mn-ea"/>
+                <a:cs typeface="+mn-cs"/>
+              </a:defRPr>
+            </a:lvl9pPr>
+          </a:lstStyle>
+          <a:p>
+            <a:pPr algn="l"/>
+            <a:r>
+              <a:rPr lang="en-US" sz="1400" dirty="0">
+                <a:highlight>
+                  <a:srgbClr val="C0C0C0"/>
+                </a:highlight>
+              </a:rPr>
+              <a:t>Merge (number of segment set to 1 if missing)</a:t>
+            </a:r>
+          </a:p>
+          <a:p>
+            <a:pPr algn="l"/>
+            <a:r>
+              <a:rPr lang="en-US" sz="1400" dirty="0">
+                <a:highlight>
+                  <a:srgbClr val="C0C0C0"/>
+                </a:highlight>
+              </a:rPr>
+              <a:t> </a:t>
+            </a:r>
+          </a:p>
+        </p:txBody>
+      </p:sp>
+      <p:sp>
+        <p:nvSpPr>
+          <p:cNvPr id="21" name="Subtitle 2">
+            <a:extLst>
+              <a:ext uri="{FF2B5EF4-FFF2-40B4-BE49-F238E27FC236}">
+                <a16:creationId xmlns:a16="http://schemas.microsoft.com/office/drawing/2014/main" id="{A53B6EA5-BAD0-4BED-AAC5-C875A81FFB64}"/>
+              </a:ext>
+            </a:extLst>
+          </p:cNvPr>
+          <p:cNvSpPr txBox="1">
+            <a:spLocks/>
+          </p:cNvSpPr>
+          <p:nvPr/>
+        </p:nvSpPr>
+        <p:spPr>
+          <a:xfrm>
+            <a:off x="4055135" y="94639"/>
+            <a:ext cx="4423040" cy="385164"/>
+          </a:xfrm>
+          <a:prstGeom prst="rect">
+            <a:avLst/>
+          </a:prstGeom>
+        </p:spPr>
+        <p:txBody>
+          <a:bodyPr vert="horz" lIns="91440" tIns="45720" rIns="91440" bIns="45720" rtlCol="0">
+            <a:normAutofit/>
+          </a:bodyPr>
+          <a:lstStyle>
+            <a:lvl1pPr marL="0" indent="0" algn="ctr" defTabSz="914400" rtl="0" eaLnBrk="1" latinLnBrk="0" hangingPunct="1">
+              <a:lnSpc>
+                <a:spcPct val="90000"/>
+              </a:lnSpc>
+              <a:spcBef>
+                <a:spcPts val="1000"/>
+              </a:spcBef>
+              <a:buFont typeface="Arial" panose="020B0604020202020204" pitchFamily="34" charset="0"/>
+              <a:buNone/>
+              <a:defRPr sz="2400" kern="1200">
+                <a:solidFill>
+                  <a:schemeClr val="tx1"/>
+                </a:solidFill>
+                <a:latin typeface="+mn-lt"/>
+                <a:ea typeface="+mn-ea"/>
+                <a:cs typeface="+mn-cs"/>
+              </a:defRPr>
+            </a:lvl1pPr>
+            <a:lvl2pPr marL="457200" indent="0" algn="ctr" defTabSz="914400" rtl="0" eaLnBrk="1" latinLnBrk="0" hangingPunct="1">
+              <a:lnSpc>
+                <a:spcPct val="90000"/>
+              </a:lnSpc>
+              <a:spcBef>
+                <a:spcPts val="500"/>
+              </a:spcBef>
+              <a:buFont typeface="Arial" panose="020B0604020202020204" pitchFamily="34" charset="0"/>
+              <a:buNone/>
+              <a:defRPr sz="2000" kern="1200">
+                <a:solidFill>
+                  <a:schemeClr val="tx1"/>
+                </a:solidFill>
+                <a:latin typeface="+mn-lt"/>
+                <a:ea typeface="+mn-ea"/>
+                <a:cs typeface="+mn-cs"/>
+              </a:defRPr>
+            </a:lvl2pPr>
+            <a:lvl3pPr marL="914400" indent="0" algn="ctr" defTabSz="914400" rtl="0" eaLnBrk="1" latinLnBrk="0" hangingPunct="1">
+              <a:lnSpc>
+                <a:spcPct val="90000"/>
+              </a:lnSpc>
+              <a:spcBef>
+                <a:spcPts val="500"/>
+              </a:spcBef>
+              <a:buFont typeface="Arial" panose="020B0604020202020204" pitchFamily="34" charset="0"/>
+              <a:buNone/>
+              <a:defRPr sz="1800" kern="1200">
+                <a:solidFill>
+                  <a:schemeClr val="tx1"/>
+                </a:solidFill>
+                <a:latin typeface="+mn-lt"/>
+                <a:ea typeface="+mn-ea"/>
+                <a:cs typeface="+mn-cs"/>
+              </a:defRPr>
+            </a:lvl3pPr>
+            <a:lvl4pPr marL="1371600" indent="0" algn="ctr" defTabSz="914400" rtl="0" eaLnBrk="1" latinLnBrk="0" hangingPunct="1">
+              <a:lnSpc>
+                <a:spcPct val="90000"/>
+              </a:lnSpc>
+              <a:spcBef>
+                <a:spcPts val="500"/>
+              </a:spcBef>
+              <a:buFont typeface="Arial" panose="020B0604020202020204" pitchFamily="34" charset="0"/>
+              <a:buNone/>
+              <a:defRPr sz="1600" kern="1200">
+                <a:solidFill>
+                  <a:schemeClr val="tx1"/>
+                </a:solidFill>
+                <a:latin typeface="+mn-lt"/>
+                <a:ea typeface="+mn-ea"/>
+                <a:cs typeface="+mn-cs"/>
+              </a:defRPr>
+            </a:lvl4pPr>
+            <a:lvl5pPr marL="1828800" indent="0" algn="ctr" defTabSz="914400" rtl="0" eaLnBrk="1" latinLnBrk="0" hangingPunct="1">
+              <a:lnSpc>
+                <a:spcPct val="90000"/>
+              </a:lnSpc>
+              <a:spcBef>
+                <a:spcPts val="500"/>
+              </a:spcBef>
+              <a:buFont typeface="Arial" panose="020B0604020202020204" pitchFamily="34" charset="0"/>
+              <a:buNone/>
+              <a:defRPr sz="1600" kern="1200">
+                <a:solidFill>
+                  <a:schemeClr val="tx1"/>
+                </a:solidFill>
+                <a:latin typeface="+mn-lt"/>
+                <a:ea typeface="+mn-ea"/>
+                <a:cs typeface="+mn-cs"/>
+              </a:defRPr>
+            </a:lvl5pPr>
+            <a:lvl6pPr marL="2286000" indent="0" algn="ctr" defTabSz="914400" rtl="0" eaLnBrk="1" latinLnBrk="0" hangingPunct="1">
+              <a:lnSpc>
+                <a:spcPct val="90000"/>
+              </a:lnSpc>
+              <a:spcBef>
+                <a:spcPts val="500"/>
+              </a:spcBef>
+              <a:buFont typeface="Arial" panose="020B0604020202020204" pitchFamily="34" charset="0"/>
+              <a:buNone/>
+              <a:defRPr sz="1600" kern="1200">
+                <a:solidFill>
+                  <a:schemeClr val="tx1"/>
+                </a:solidFill>
+                <a:latin typeface="+mn-lt"/>
+                <a:ea typeface="+mn-ea"/>
+                <a:cs typeface="+mn-cs"/>
+              </a:defRPr>
+            </a:lvl6pPr>
+            <a:lvl7pPr marL="2743200" indent="0" algn="ctr" defTabSz="914400" rtl="0" eaLnBrk="1" latinLnBrk="0" hangingPunct="1">
+              <a:lnSpc>
+                <a:spcPct val="90000"/>
+              </a:lnSpc>
+              <a:spcBef>
+                <a:spcPts val="500"/>
+              </a:spcBef>
+              <a:buFont typeface="Arial" panose="020B0604020202020204" pitchFamily="34" charset="0"/>
+              <a:buNone/>
+              <a:defRPr sz="1600" kern="1200">
+                <a:solidFill>
+                  <a:schemeClr val="tx1"/>
+                </a:solidFill>
+                <a:latin typeface="+mn-lt"/>
+                <a:ea typeface="+mn-ea"/>
+                <a:cs typeface="+mn-cs"/>
+              </a:defRPr>
+            </a:lvl7pPr>
+            <a:lvl8pPr marL="3200400" indent="0" algn="ctr" defTabSz="914400" rtl="0" eaLnBrk="1" latinLnBrk="0" hangingPunct="1">
+              <a:lnSpc>
+                <a:spcPct val="90000"/>
+              </a:lnSpc>
+              <a:spcBef>
+                <a:spcPts val="500"/>
+              </a:spcBef>
+              <a:buFont typeface="Arial" panose="020B0604020202020204" pitchFamily="34" charset="0"/>
+              <a:buNone/>
+              <a:defRPr sz="1600" kern="1200">
+                <a:solidFill>
+                  <a:schemeClr val="tx1"/>
+                </a:solidFill>
+                <a:latin typeface="+mn-lt"/>
+                <a:ea typeface="+mn-ea"/>
+                <a:cs typeface="+mn-cs"/>
+              </a:defRPr>
+            </a:lvl8pPr>
+            <a:lvl9pPr marL="3657600" indent="0" algn="ctr" defTabSz="914400" rtl="0" eaLnBrk="1" latinLnBrk="0" hangingPunct="1">
+              <a:lnSpc>
+                <a:spcPct val="90000"/>
+              </a:lnSpc>
+              <a:spcBef>
+                <a:spcPts val="500"/>
+              </a:spcBef>
+              <a:buFont typeface="Arial" panose="020B0604020202020204" pitchFamily="34" charset="0"/>
+              <a:buNone/>
+              <a:defRPr sz="1600" kern="1200">
+                <a:solidFill>
+                  <a:schemeClr val="tx1"/>
+                </a:solidFill>
+                <a:latin typeface="+mn-lt"/>
+                <a:ea typeface="+mn-ea"/>
+                <a:cs typeface="+mn-cs"/>
+              </a:defRPr>
+            </a:lvl9pPr>
+          </a:lstStyle>
+          <a:p>
+            <a:pPr algn="l"/>
+            <a:r>
+              <a:rPr lang="en-US" sz="2000" b="1" dirty="0">
+                <a:highlight>
+                  <a:srgbClr val="C0C0C0"/>
+                </a:highlight>
+              </a:rPr>
+              <a:t>Abnormal Tone_10-Q Merging Process</a:t>
+            </a:r>
+          </a:p>
+        </p:txBody>
+      </p:sp>
+      <p:sp>
+        <p:nvSpPr>
+          <p:cNvPr id="28" name="Subtitle 2">
+            <a:extLst>
+              <a:ext uri="{FF2B5EF4-FFF2-40B4-BE49-F238E27FC236}">
+                <a16:creationId xmlns:a16="http://schemas.microsoft.com/office/drawing/2014/main" id="{FFDC3257-7C3E-4AA0-B9FD-4E66F3A5A128}"/>
+              </a:ext>
+            </a:extLst>
+          </p:cNvPr>
+          <p:cNvSpPr txBox="1">
+            <a:spLocks/>
+          </p:cNvSpPr>
+          <p:nvPr/>
+        </p:nvSpPr>
+        <p:spPr>
+          <a:xfrm>
+            <a:off x="8211841" y="426260"/>
+            <a:ext cx="3925780" cy="1421936"/>
+          </a:xfrm>
+          <a:prstGeom prst="rect">
+            <a:avLst/>
+          </a:prstGeom>
+        </p:spPr>
+        <p:txBody>
+          <a:bodyPr vert="horz" lIns="91440" tIns="45720" rIns="91440" bIns="45720" rtlCol="0">
+            <a:normAutofit/>
+          </a:bodyPr>
+          <a:lstStyle>
+            <a:lvl1pPr marL="0" indent="0" algn="ctr" defTabSz="914400" rtl="0" eaLnBrk="1" latinLnBrk="0" hangingPunct="1">
+              <a:lnSpc>
+                <a:spcPct val="90000"/>
+              </a:lnSpc>
+              <a:spcBef>
+                <a:spcPts val="1000"/>
+              </a:spcBef>
+              <a:buFont typeface="Arial" panose="020B0604020202020204" pitchFamily="34" charset="0"/>
+              <a:buNone/>
+              <a:defRPr sz="2400" kern="1200">
+                <a:solidFill>
+                  <a:schemeClr val="tx1"/>
+                </a:solidFill>
+                <a:latin typeface="+mn-lt"/>
+                <a:ea typeface="+mn-ea"/>
+                <a:cs typeface="+mn-cs"/>
+              </a:defRPr>
+            </a:lvl1pPr>
+            <a:lvl2pPr marL="457200" indent="0" algn="ctr" defTabSz="914400" rtl="0" eaLnBrk="1" latinLnBrk="0" hangingPunct="1">
+              <a:lnSpc>
+                <a:spcPct val="90000"/>
+              </a:lnSpc>
+              <a:spcBef>
+                <a:spcPts val="500"/>
+              </a:spcBef>
+              <a:buFont typeface="Arial" panose="020B0604020202020204" pitchFamily="34" charset="0"/>
+              <a:buNone/>
+              <a:defRPr sz="2000" kern="1200">
+                <a:solidFill>
+                  <a:schemeClr val="tx1"/>
+                </a:solidFill>
+                <a:latin typeface="+mn-lt"/>
+                <a:ea typeface="+mn-ea"/>
+                <a:cs typeface="+mn-cs"/>
+              </a:defRPr>
+            </a:lvl2pPr>
+            <a:lvl3pPr marL="914400" indent="0" algn="ctr" defTabSz="914400" rtl="0" eaLnBrk="1" latinLnBrk="0" hangingPunct="1">
+              <a:lnSpc>
+                <a:spcPct val="90000"/>
+              </a:lnSpc>
+              <a:spcBef>
+                <a:spcPts val="500"/>
+              </a:spcBef>
+              <a:buFont typeface="Arial" panose="020B0604020202020204" pitchFamily="34" charset="0"/>
+              <a:buNone/>
+              <a:defRPr sz="1800" kern="1200">
+                <a:solidFill>
+                  <a:schemeClr val="tx1"/>
+                </a:solidFill>
+                <a:latin typeface="+mn-lt"/>
+                <a:ea typeface="+mn-ea"/>
+                <a:cs typeface="+mn-cs"/>
+              </a:defRPr>
+            </a:lvl3pPr>
+            <a:lvl4pPr marL="1371600" indent="0" algn="ctr" defTabSz="914400" rtl="0" eaLnBrk="1" latinLnBrk="0" hangingPunct="1">
+              <a:lnSpc>
+                <a:spcPct val="90000"/>
+              </a:lnSpc>
+              <a:spcBef>
+                <a:spcPts val="500"/>
+              </a:spcBef>
+              <a:buFont typeface="Arial" panose="020B0604020202020204" pitchFamily="34" charset="0"/>
+              <a:buNone/>
+              <a:defRPr sz="1600" kern="1200">
+                <a:solidFill>
+                  <a:schemeClr val="tx1"/>
+                </a:solidFill>
+                <a:latin typeface="+mn-lt"/>
+                <a:ea typeface="+mn-ea"/>
+                <a:cs typeface="+mn-cs"/>
+              </a:defRPr>
+            </a:lvl4pPr>
+            <a:lvl5pPr marL="1828800" indent="0" algn="ctr" defTabSz="914400" rtl="0" eaLnBrk="1" latinLnBrk="0" hangingPunct="1">
+              <a:lnSpc>
+                <a:spcPct val="90000"/>
+              </a:lnSpc>
+              <a:spcBef>
+                <a:spcPts val="500"/>
+              </a:spcBef>
+              <a:buFont typeface="Arial" panose="020B0604020202020204" pitchFamily="34" charset="0"/>
+              <a:buNone/>
+              <a:defRPr sz="1600" kern="1200">
+                <a:solidFill>
+                  <a:schemeClr val="tx1"/>
+                </a:solidFill>
+                <a:latin typeface="+mn-lt"/>
+                <a:ea typeface="+mn-ea"/>
+                <a:cs typeface="+mn-cs"/>
+              </a:defRPr>
+            </a:lvl5pPr>
+            <a:lvl6pPr marL="2286000" indent="0" algn="ctr" defTabSz="914400" rtl="0" eaLnBrk="1" latinLnBrk="0" hangingPunct="1">
+              <a:lnSpc>
+                <a:spcPct val="90000"/>
+              </a:lnSpc>
+              <a:spcBef>
+                <a:spcPts val="500"/>
+              </a:spcBef>
+              <a:buFont typeface="Arial" panose="020B0604020202020204" pitchFamily="34" charset="0"/>
+              <a:buNone/>
+              <a:defRPr sz="1600" kern="1200">
+                <a:solidFill>
+                  <a:schemeClr val="tx1"/>
+                </a:solidFill>
+                <a:latin typeface="+mn-lt"/>
+                <a:ea typeface="+mn-ea"/>
+                <a:cs typeface="+mn-cs"/>
+              </a:defRPr>
+            </a:lvl6pPr>
+            <a:lvl7pPr marL="2743200" indent="0" algn="ctr" defTabSz="914400" rtl="0" eaLnBrk="1" latinLnBrk="0" hangingPunct="1">
+              <a:lnSpc>
+                <a:spcPct val="90000"/>
+              </a:lnSpc>
+              <a:spcBef>
+                <a:spcPts val="500"/>
+              </a:spcBef>
+              <a:buFont typeface="Arial" panose="020B0604020202020204" pitchFamily="34" charset="0"/>
+              <a:buNone/>
+              <a:defRPr sz="1600" kern="1200">
+                <a:solidFill>
+                  <a:schemeClr val="tx1"/>
+                </a:solidFill>
+                <a:latin typeface="+mn-lt"/>
+                <a:ea typeface="+mn-ea"/>
+                <a:cs typeface="+mn-cs"/>
+              </a:defRPr>
+            </a:lvl7pPr>
+            <a:lvl8pPr marL="3200400" indent="0" algn="ctr" defTabSz="914400" rtl="0" eaLnBrk="1" latinLnBrk="0" hangingPunct="1">
+              <a:lnSpc>
+                <a:spcPct val="90000"/>
+              </a:lnSpc>
+              <a:spcBef>
+                <a:spcPts val="500"/>
+              </a:spcBef>
+              <a:buFont typeface="Arial" panose="020B0604020202020204" pitchFamily="34" charset="0"/>
+              <a:buNone/>
+              <a:defRPr sz="1600" kern="1200">
+                <a:solidFill>
+                  <a:schemeClr val="tx1"/>
+                </a:solidFill>
+                <a:latin typeface="+mn-lt"/>
+                <a:ea typeface="+mn-ea"/>
+                <a:cs typeface="+mn-cs"/>
+              </a:defRPr>
+            </a:lvl8pPr>
+            <a:lvl9pPr marL="3657600" indent="0" algn="ctr" defTabSz="914400" rtl="0" eaLnBrk="1" latinLnBrk="0" hangingPunct="1">
+              <a:lnSpc>
+                <a:spcPct val="90000"/>
+              </a:lnSpc>
+              <a:spcBef>
+                <a:spcPts val="500"/>
+              </a:spcBef>
+              <a:buFont typeface="Arial" panose="020B0604020202020204" pitchFamily="34" charset="0"/>
+              <a:buNone/>
+              <a:defRPr sz="1600" kern="1200">
+                <a:solidFill>
+                  <a:schemeClr val="tx1"/>
+                </a:solidFill>
+                <a:latin typeface="+mn-lt"/>
+                <a:ea typeface="+mn-ea"/>
+                <a:cs typeface="+mn-cs"/>
+              </a:defRPr>
+            </a:lvl9pPr>
+          </a:lstStyle>
+          <a:p>
+            <a:r>
+              <a:rPr lang="en-US" sz="2000" dirty="0"/>
+              <a:t>COMPUSTAT SEGMENT</a:t>
+            </a:r>
+          </a:p>
+          <a:p>
+            <a:pPr marL="285750" indent="-285750" algn="l">
+              <a:buFont typeface="Arial" panose="020B0604020202020204" pitchFamily="34" charset="0"/>
+              <a:buChar char="•"/>
+            </a:pPr>
+            <a:r>
+              <a:rPr lang="en-US" sz="1600" dirty="0"/>
+              <a:t>Total number of </a:t>
+            </a:r>
+            <a:r>
+              <a:rPr lang="en-US" sz="1600" dirty="0" err="1"/>
+              <a:t>gvkey-datadate-sid</a:t>
+            </a:r>
+            <a:r>
+              <a:rPr lang="en-US" sz="1600" dirty="0"/>
+              <a:t>: </a:t>
+            </a:r>
+            <a:r>
+              <a:rPr lang="en-US" sz="1600" dirty="0">
+                <a:highlight>
+                  <a:srgbClr val="808000"/>
+                </a:highlight>
+              </a:rPr>
+              <a:t>452,653</a:t>
+            </a:r>
+          </a:p>
+          <a:p>
+            <a:pPr marL="285750" indent="-285750" algn="l">
+              <a:buFont typeface="Arial" panose="020B0604020202020204" pitchFamily="34" charset="0"/>
+              <a:buChar char="•"/>
+            </a:pPr>
+            <a:r>
+              <a:rPr lang="en-US" sz="1600" dirty="0"/>
+              <a:t>Number of </a:t>
+            </a:r>
+            <a:r>
+              <a:rPr lang="en-US" sz="1600" dirty="0" err="1"/>
+              <a:t>gvkey-datadate</a:t>
+            </a:r>
+            <a:r>
+              <a:rPr lang="en-US" sz="1600" dirty="0"/>
+              <a:t>: </a:t>
+            </a:r>
+            <a:r>
+              <a:rPr lang="en-US" sz="1600" dirty="0">
+                <a:highlight>
+                  <a:srgbClr val="FFFF00"/>
+                </a:highlight>
+              </a:rPr>
+              <a:t>50,876</a:t>
+            </a:r>
+          </a:p>
+          <a:p>
+            <a:endParaRPr lang="en-US" dirty="0"/>
+          </a:p>
+        </p:txBody>
+      </p:sp>
+      <p:pic>
+        <p:nvPicPr>
+          <p:cNvPr id="9" name="Picture 8">
+            <a:extLst>
+              <a:ext uri="{FF2B5EF4-FFF2-40B4-BE49-F238E27FC236}">
+                <a16:creationId xmlns:a16="http://schemas.microsoft.com/office/drawing/2014/main" id="{CB82F7D6-D45F-4798-8EAD-FABEEECDD4E4}"/>
+              </a:ext>
+            </a:extLst>
+          </p:cNvPr>
+          <p:cNvPicPr>
+            <a:picLocks noChangeAspect="1"/>
+          </p:cNvPicPr>
+          <p:nvPr/>
+        </p:nvPicPr>
+        <p:blipFill>
+          <a:blip r:embed="rId2"/>
+          <a:stretch>
+            <a:fillRect/>
+          </a:stretch>
+        </p:blipFill>
+        <p:spPr>
+          <a:xfrm>
+            <a:off x="4297913" y="5956358"/>
+            <a:ext cx="6904318" cy="853514"/>
+          </a:xfrm>
+          <a:prstGeom prst="rect">
+            <a:avLst/>
+          </a:prstGeom>
+        </p:spPr>
+      </p:pic>
+      <p:sp>
+        <p:nvSpPr>
+          <p:cNvPr id="35" name="Subtitle 2">
+            <a:extLst>
+              <a:ext uri="{FF2B5EF4-FFF2-40B4-BE49-F238E27FC236}">
+                <a16:creationId xmlns:a16="http://schemas.microsoft.com/office/drawing/2014/main" id="{6EAB1935-4E20-4E2B-BC77-14F104105610}"/>
+              </a:ext>
+            </a:extLst>
+          </p:cNvPr>
+          <p:cNvSpPr txBox="1">
+            <a:spLocks/>
+          </p:cNvSpPr>
+          <p:nvPr/>
+        </p:nvSpPr>
+        <p:spPr>
+          <a:xfrm>
+            <a:off x="4139697" y="4305103"/>
+            <a:ext cx="5457059" cy="1030198"/>
+          </a:xfrm>
+          <a:prstGeom prst="rect">
+            <a:avLst/>
+          </a:prstGeom>
+        </p:spPr>
+        <p:txBody>
+          <a:bodyPr vert="horz" lIns="91440" tIns="45720" rIns="91440" bIns="45720" rtlCol="0">
+            <a:normAutofit/>
+          </a:bodyPr>
+          <a:lstStyle>
+            <a:lvl1pPr marL="0" indent="0" algn="ctr" defTabSz="914400" rtl="0" eaLnBrk="1" latinLnBrk="0" hangingPunct="1">
+              <a:lnSpc>
+                <a:spcPct val="90000"/>
+              </a:lnSpc>
+              <a:spcBef>
+                <a:spcPts val="1000"/>
+              </a:spcBef>
+              <a:buFont typeface="Arial" panose="020B0604020202020204" pitchFamily="34" charset="0"/>
+              <a:buNone/>
+              <a:defRPr sz="2400" kern="1200">
+                <a:solidFill>
+                  <a:schemeClr val="tx1"/>
+                </a:solidFill>
+                <a:latin typeface="+mn-lt"/>
+                <a:ea typeface="+mn-ea"/>
+                <a:cs typeface="+mn-cs"/>
+              </a:defRPr>
+            </a:lvl1pPr>
+            <a:lvl2pPr marL="457200" indent="0" algn="ctr" defTabSz="914400" rtl="0" eaLnBrk="1" latinLnBrk="0" hangingPunct="1">
+              <a:lnSpc>
+                <a:spcPct val="90000"/>
+              </a:lnSpc>
+              <a:spcBef>
+                <a:spcPts val="500"/>
+              </a:spcBef>
+              <a:buFont typeface="Arial" panose="020B0604020202020204" pitchFamily="34" charset="0"/>
+              <a:buNone/>
+              <a:defRPr sz="2000" kern="1200">
+                <a:solidFill>
+                  <a:schemeClr val="tx1"/>
+                </a:solidFill>
+                <a:latin typeface="+mn-lt"/>
+                <a:ea typeface="+mn-ea"/>
+                <a:cs typeface="+mn-cs"/>
+              </a:defRPr>
+            </a:lvl2pPr>
+            <a:lvl3pPr marL="914400" indent="0" algn="ctr" defTabSz="914400" rtl="0" eaLnBrk="1" latinLnBrk="0" hangingPunct="1">
+              <a:lnSpc>
+                <a:spcPct val="90000"/>
+              </a:lnSpc>
+              <a:spcBef>
+                <a:spcPts val="500"/>
+              </a:spcBef>
+              <a:buFont typeface="Arial" panose="020B0604020202020204" pitchFamily="34" charset="0"/>
+              <a:buNone/>
+              <a:defRPr sz="1800" kern="1200">
+                <a:solidFill>
+                  <a:schemeClr val="tx1"/>
+                </a:solidFill>
+                <a:latin typeface="+mn-lt"/>
+                <a:ea typeface="+mn-ea"/>
+                <a:cs typeface="+mn-cs"/>
+              </a:defRPr>
+            </a:lvl3pPr>
+            <a:lvl4pPr marL="1371600" indent="0" algn="ctr" defTabSz="914400" rtl="0" eaLnBrk="1" latinLnBrk="0" hangingPunct="1">
+              <a:lnSpc>
+                <a:spcPct val="90000"/>
+              </a:lnSpc>
+              <a:spcBef>
+                <a:spcPts val="500"/>
+              </a:spcBef>
+              <a:buFont typeface="Arial" panose="020B0604020202020204" pitchFamily="34" charset="0"/>
+              <a:buNone/>
+              <a:defRPr sz="1600" kern="1200">
+                <a:solidFill>
+                  <a:schemeClr val="tx1"/>
+                </a:solidFill>
+                <a:latin typeface="+mn-lt"/>
+                <a:ea typeface="+mn-ea"/>
+                <a:cs typeface="+mn-cs"/>
+              </a:defRPr>
+            </a:lvl4pPr>
+            <a:lvl5pPr marL="1828800" indent="0" algn="ctr" defTabSz="914400" rtl="0" eaLnBrk="1" latinLnBrk="0" hangingPunct="1">
+              <a:lnSpc>
+                <a:spcPct val="90000"/>
+              </a:lnSpc>
+              <a:spcBef>
+                <a:spcPts val="500"/>
+              </a:spcBef>
+              <a:buFont typeface="Arial" panose="020B0604020202020204" pitchFamily="34" charset="0"/>
+              <a:buNone/>
+              <a:defRPr sz="1600" kern="1200">
+                <a:solidFill>
+                  <a:schemeClr val="tx1"/>
+                </a:solidFill>
+                <a:latin typeface="+mn-lt"/>
+                <a:ea typeface="+mn-ea"/>
+                <a:cs typeface="+mn-cs"/>
+              </a:defRPr>
+            </a:lvl5pPr>
+            <a:lvl6pPr marL="2286000" indent="0" algn="ctr" defTabSz="914400" rtl="0" eaLnBrk="1" latinLnBrk="0" hangingPunct="1">
+              <a:lnSpc>
+                <a:spcPct val="90000"/>
+              </a:lnSpc>
+              <a:spcBef>
+                <a:spcPts val="500"/>
+              </a:spcBef>
+              <a:buFont typeface="Arial" panose="020B0604020202020204" pitchFamily="34" charset="0"/>
+              <a:buNone/>
+              <a:defRPr sz="1600" kern="1200">
+                <a:solidFill>
+                  <a:schemeClr val="tx1"/>
+                </a:solidFill>
+                <a:latin typeface="+mn-lt"/>
+                <a:ea typeface="+mn-ea"/>
+                <a:cs typeface="+mn-cs"/>
+              </a:defRPr>
+            </a:lvl6pPr>
+            <a:lvl7pPr marL="2743200" indent="0" algn="ctr" defTabSz="914400" rtl="0" eaLnBrk="1" latinLnBrk="0" hangingPunct="1">
+              <a:lnSpc>
+                <a:spcPct val="90000"/>
+              </a:lnSpc>
+              <a:spcBef>
+                <a:spcPts val="500"/>
+              </a:spcBef>
+              <a:buFont typeface="Arial" panose="020B0604020202020204" pitchFamily="34" charset="0"/>
+              <a:buNone/>
+              <a:defRPr sz="1600" kern="1200">
+                <a:solidFill>
+                  <a:schemeClr val="tx1"/>
+                </a:solidFill>
+                <a:latin typeface="+mn-lt"/>
+                <a:ea typeface="+mn-ea"/>
+                <a:cs typeface="+mn-cs"/>
+              </a:defRPr>
+            </a:lvl7pPr>
+            <a:lvl8pPr marL="3200400" indent="0" algn="ctr" defTabSz="914400" rtl="0" eaLnBrk="1" latinLnBrk="0" hangingPunct="1">
+              <a:lnSpc>
+                <a:spcPct val="90000"/>
+              </a:lnSpc>
+              <a:spcBef>
+                <a:spcPts val="500"/>
+              </a:spcBef>
+              <a:buFont typeface="Arial" panose="020B0604020202020204" pitchFamily="34" charset="0"/>
+              <a:buNone/>
+              <a:defRPr sz="1600" kern="1200">
+                <a:solidFill>
+                  <a:schemeClr val="tx1"/>
+                </a:solidFill>
+                <a:latin typeface="+mn-lt"/>
+                <a:ea typeface="+mn-ea"/>
+                <a:cs typeface="+mn-cs"/>
+              </a:defRPr>
+            </a:lvl8pPr>
+            <a:lvl9pPr marL="3657600" indent="0" algn="ctr" defTabSz="914400" rtl="0" eaLnBrk="1" latinLnBrk="0" hangingPunct="1">
+              <a:lnSpc>
+                <a:spcPct val="90000"/>
+              </a:lnSpc>
+              <a:spcBef>
+                <a:spcPts val="500"/>
+              </a:spcBef>
+              <a:buFont typeface="Arial" panose="020B0604020202020204" pitchFamily="34" charset="0"/>
+              <a:buNone/>
+              <a:defRPr sz="1600" kern="1200">
+                <a:solidFill>
+                  <a:schemeClr val="tx1"/>
+                </a:solidFill>
+                <a:latin typeface="+mn-lt"/>
+                <a:ea typeface="+mn-ea"/>
+                <a:cs typeface="+mn-cs"/>
+              </a:defRPr>
+            </a:lvl9pPr>
+          </a:lstStyle>
+          <a:p>
+            <a:r>
+              <a:rPr lang="en-US" sz="1800" dirty="0"/>
+              <a:t>CRSP_COMP_EDGAR_IBES_SEG</a:t>
+            </a:r>
+          </a:p>
+          <a:p>
+            <a:pPr marL="342900" indent="-342900" algn="l">
+              <a:buFont typeface="Arial" panose="020B0604020202020204" pitchFamily="34" charset="0"/>
+              <a:buChar char="•"/>
+            </a:pPr>
+            <a:r>
+              <a:rPr lang="en-US" sz="1400" dirty="0"/>
+              <a:t>Number of </a:t>
+            </a:r>
+            <a:r>
+              <a:rPr lang="en-US" sz="1400" dirty="0" err="1"/>
+              <a:t>gvkey</a:t>
+            </a:r>
+            <a:r>
+              <a:rPr lang="en-US" sz="1400" dirty="0"/>
+              <a:t>-quarter obs. after merging: </a:t>
+            </a:r>
+            <a:r>
+              <a:rPr lang="en-US" sz="1400" dirty="0">
+                <a:highlight>
+                  <a:srgbClr val="FFFF00"/>
+                </a:highlight>
+              </a:rPr>
+              <a:t>110,130</a:t>
+            </a:r>
+          </a:p>
+          <a:p>
+            <a:pPr marL="342900" indent="-342900" algn="l">
+              <a:buFont typeface="Arial" panose="020B0604020202020204" pitchFamily="34" charset="0"/>
+              <a:buChar char="•"/>
+            </a:pPr>
+            <a:r>
+              <a:rPr lang="en-US" sz="1400" dirty="0"/>
+              <a:t>Number of </a:t>
+            </a:r>
+            <a:r>
+              <a:rPr lang="en-US" sz="1400" dirty="0" err="1"/>
+              <a:t>gvkey</a:t>
+            </a:r>
+            <a:r>
+              <a:rPr lang="en-US" sz="1400" dirty="0"/>
+              <a:t>-quarter obs. after screening missing data: </a:t>
+            </a:r>
+            <a:r>
+              <a:rPr lang="en-US" sz="1400" dirty="0">
+                <a:highlight>
+                  <a:srgbClr val="FF0000"/>
+                </a:highlight>
+              </a:rPr>
+              <a:t>91,627</a:t>
+            </a:r>
+          </a:p>
+          <a:p>
+            <a:pPr marL="342900" indent="-342900" algn="l">
+              <a:buFont typeface="Arial" panose="020B0604020202020204" pitchFamily="34" charset="0"/>
+              <a:buChar char="•"/>
+            </a:pPr>
+            <a:endParaRPr lang="en-US" sz="1400" dirty="0"/>
+          </a:p>
+          <a:p>
+            <a:pPr algn="l"/>
+            <a:endParaRPr lang="en-US" sz="1400" dirty="0">
+              <a:highlight>
+                <a:srgbClr val="FFFF00"/>
+              </a:highlight>
+            </a:endParaRPr>
+          </a:p>
+        </p:txBody>
+      </p:sp>
+      <p:grpSp>
+        <p:nvGrpSpPr>
+          <p:cNvPr id="30" name="Group 29">
+            <a:extLst>
+              <a:ext uri="{FF2B5EF4-FFF2-40B4-BE49-F238E27FC236}">
+                <a16:creationId xmlns:a16="http://schemas.microsoft.com/office/drawing/2014/main" id="{1C58D278-4A0F-4631-B9C1-6F28B176406D}"/>
+              </a:ext>
+            </a:extLst>
+          </p:cNvPr>
+          <p:cNvGrpSpPr/>
+          <p:nvPr/>
+        </p:nvGrpSpPr>
+        <p:grpSpPr>
+          <a:xfrm>
+            <a:off x="3663890" y="1843611"/>
+            <a:ext cx="6367877" cy="2391038"/>
+            <a:chOff x="3663890" y="1843611"/>
+            <a:chExt cx="6367877" cy="2391038"/>
+          </a:xfrm>
+        </p:grpSpPr>
+        <p:cxnSp>
+          <p:nvCxnSpPr>
+            <p:cNvPr id="8" name="Straight Connector 7">
+              <a:extLst>
+                <a:ext uri="{FF2B5EF4-FFF2-40B4-BE49-F238E27FC236}">
+                  <a16:creationId xmlns:a16="http://schemas.microsoft.com/office/drawing/2014/main" id="{789C5AB7-18ED-4A96-B59C-1B3EDAF4E147}"/>
+                </a:ext>
+              </a:extLst>
+            </p:cNvPr>
+            <p:cNvCxnSpPr>
+              <a:cxnSpLocks/>
+            </p:cNvCxnSpPr>
+            <p:nvPr/>
+          </p:nvCxnSpPr>
+          <p:spPr>
+            <a:xfrm>
+              <a:off x="3663890" y="3429000"/>
+              <a:ext cx="0" cy="415031"/>
+            </a:xfrm>
+            <a:prstGeom prst="line">
+              <a:avLst/>
+            </a:prstGeom>
+            <a:ln w="25400"/>
+          </p:spPr>
+          <p:style>
+            <a:lnRef idx="1">
+              <a:schemeClr val="accent1"/>
+            </a:lnRef>
+            <a:fillRef idx="0">
+              <a:schemeClr val="accent1"/>
+            </a:fillRef>
+            <a:effectRef idx="0">
+              <a:schemeClr val="accent1"/>
+            </a:effectRef>
+            <a:fontRef idx="minor">
+              <a:schemeClr val="tx1"/>
+            </a:fontRef>
+          </p:style>
+        </p:cxnSp>
+        <p:cxnSp>
+          <p:nvCxnSpPr>
+            <p:cNvPr id="16" name="Straight Connector 15">
+              <a:extLst>
+                <a:ext uri="{FF2B5EF4-FFF2-40B4-BE49-F238E27FC236}">
+                  <a16:creationId xmlns:a16="http://schemas.microsoft.com/office/drawing/2014/main" id="{477E479A-F10B-4B35-BDC8-0E0B0CE95F96}"/>
+                </a:ext>
+              </a:extLst>
+            </p:cNvPr>
+            <p:cNvCxnSpPr/>
+            <p:nvPr/>
+          </p:nvCxnSpPr>
+          <p:spPr>
+            <a:xfrm>
+              <a:off x="3663890" y="3852909"/>
+              <a:ext cx="6367877" cy="0"/>
+            </a:xfrm>
+            <a:prstGeom prst="line">
+              <a:avLst/>
+            </a:prstGeom>
+            <a:ln w="25400"/>
+          </p:spPr>
+          <p:style>
+            <a:lnRef idx="1">
+              <a:schemeClr val="accent1"/>
+            </a:lnRef>
+            <a:fillRef idx="0">
+              <a:schemeClr val="accent1"/>
+            </a:fillRef>
+            <a:effectRef idx="0">
+              <a:schemeClr val="accent1"/>
+            </a:effectRef>
+            <a:fontRef idx="minor">
+              <a:schemeClr val="tx1"/>
+            </a:fontRef>
+          </p:style>
+        </p:cxnSp>
+        <p:cxnSp>
+          <p:nvCxnSpPr>
+            <p:cNvPr id="18" name="Straight Connector 17">
+              <a:extLst>
+                <a:ext uri="{FF2B5EF4-FFF2-40B4-BE49-F238E27FC236}">
+                  <a16:creationId xmlns:a16="http://schemas.microsoft.com/office/drawing/2014/main" id="{F67B885A-D2AB-4681-9D29-8B15A6CE59C2}"/>
+                </a:ext>
+              </a:extLst>
+            </p:cNvPr>
+            <p:cNvCxnSpPr/>
+            <p:nvPr/>
+          </p:nvCxnSpPr>
+          <p:spPr>
+            <a:xfrm>
+              <a:off x="9987379" y="1843611"/>
+              <a:ext cx="0" cy="2000420"/>
+            </a:xfrm>
+            <a:prstGeom prst="line">
+              <a:avLst/>
+            </a:prstGeom>
+            <a:ln w="25400"/>
+          </p:spPr>
+          <p:style>
+            <a:lnRef idx="1">
+              <a:schemeClr val="accent1"/>
+            </a:lnRef>
+            <a:fillRef idx="0">
+              <a:schemeClr val="accent1"/>
+            </a:fillRef>
+            <a:effectRef idx="0">
+              <a:schemeClr val="accent1"/>
+            </a:effectRef>
+            <a:fontRef idx="minor">
+              <a:schemeClr val="tx1"/>
+            </a:fontRef>
+          </p:style>
+        </p:cxnSp>
+        <p:cxnSp>
+          <p:nvCxnSpPr>
+            <p:cNvPr id="24" name="Straight Arrow Connector 23">
+              <a:extLst>
+                <a:ext uri="{FF2B5EF4-FFF2-40B4-BE49-F238E27FC236}">
+                  <a16:creationId xmlns:a16="http://schemas.microsoft.com/office/drawing/2014/main" id="{4CFF1410-2AFF-4EE0-A3AF-77A7CD68DEE3}"/>
+                </a:ext>
+              </a:extLst>
+            </p:cNvPr>
+            <p:cNvCxnSpPr/>
+            <p:nvPr/>
+          </p:nvCxnSpPr>
+          <p:spPr>
+            <a:xfrm>
+              <a:off x="6693763" y="3852909"/>
+              <a:ext cx="0" cy="381740"/>
+            </a:xfrm>
+            <a:prstGeom prst="straightConnector1">
+              <a:avLst/>
+            </a:prstGeom>
+            <a:ln w="25400">
+              <a:tailEnd type="triangle"/>
+            </a:ln>
+          </p:spPr>
+          <p:style>
+            <a:lnRef idx="1">
+              <a:schemeClr val="accent1"/>
+            </a:lnRef>
+            <a:fillRef idx="0">
+              <a:schemeClr val="accent1"/>
+            </a:fillRef>
+            <a:effectRef idx="0">
+              <a:schemeClr val="accent1"/>
+            </a:effectRef>
+            <a:fontRef idx="minor">
+              <a:schemeClr val="tx1"/>
+            </a:fontRef>
+          </p:style>
+        </p:cxnSp>
+      </p:grpSp>
+    </p:spTree>
+    <p:extLst>
+      <p:ext uri="{BB962C8B-B14F-4D97-AF65-F5344CB8AC3E}">
+        <p14:creationId xmlns:p14="http://schemas.microsoft.com/office/powerpoint/2010/main" val="3869236014"/>
+      </p:ext>
+    </p:extLst>
+  </p:cSld>
+  <p:clrMapOvr>
+    <a:masterClrMapping/>
+  </p:clrMapOvr>
+</p:sld>
+</file>
+
+<file path=ppt/slides/slide4.xml><?xml version="1.0" encoding="utf-8"?>
+<p:sld xmlns:a="http://schemas.openxmlformats.org/drawingml/2006/main" xmlns:r="http://schemas.openxmlformats.org/officeDocument/2006/relationships" xmlns:p="http://schemas.openxmlformats.org/presentationml/2006/main" show="0">
+  <p:cSld>
+    <p:spTree>
+      <p:nvGrpSpPr>
+        <p:cNvPr id="1" name=""/>
+        <p:cNvGrpSpPr/>
+        <p:nvPr/>
+      </p:nvGrpSpPr>
+      <p:grpSpPr>
+        <a:xfrm>
+          <a:off x="0" y="0"/>
+          <a:ext cx="0" cy="0"/>
+          <a:chOff x="0" y="0"/>
+          <a:chExt cx="0" cy="0"/>
+        </a:xfrm>
+      </p:grpSpPr>
+      <p:sp>
+        <p:nvSpPr>
+          <p:cNvPr id="5" name="Subtitle 2">
+            <a:extLst>
+              <a:ext uri="{FF2B5EF4-FFF2-40B4-BE49-F238E27FC236}">
+                <a16:creationId xmlns:a16="http://schemas.microsoft.com/office/drawing/2014/main" id="{927B255E-88EC-4D65-A207-3F3ED2F6F072}"/>
+              </a:ext>
+            </a:extLst>
+          </p:cNvPr>
+          <p:cNvSpPr txBox="1">
+            <a:spLocks/>
+          </p:cNvSpPr>
+          <p:nvPr/>
+        </p:nvSpPr>
+        <p:spPr>
+          <a:xfrm>
+            <a:off x="3663890" y="448215"/>
+            <a:ext cx="4547951" cy="1421936"/>
+          </a:xfrm>
+          <a:prstGeom prst="rect">
+            <a:avLst/>
+          </a:prstGeom>
+        </p:spPr>
+        <p:txBody>
+          <a:bodyPr vert="horz" lIns="91440" tIns="45720" rIns="91440" bIns="45720" rtlCol="0">
+            <a:normAutofit/>
+          </a:bodyPr>
+          <a:lstStyle>
+            <a:lvl1pPr marL="0" indent="0" algn="ctr" defTabSz="914400" rtl="0" eaLnBrk="1" latinLnBrk="0" hangingPunct="1">
+              <a:lnSpc>
+                <a:spcPct val="90000"/>
+              </a:lnSpc>
+              <a:spcBef>
+                <a:spcPts val="1000"/>
+              </a:spcBef>
+              <a:buFont typeface="Arial" panose="020B0604020202020204" pitchFamily="34" charset="0"/>
+              <a:buNone/>
+              <a:defRPr sz="2400" kern="1200">
+                <a:solidFill>
+                  <a:schemeClr val="tx1"/>
+                </a:solidFill>
+                <a:latin typeface="+mn-lt"/>
+                <a:ea typeface="+mn-ea"/>
+                <a:cs typeface="+mn-cs"/>
+              </a:defRPr>
+            </a:lvl1pPr>
+            <a:lvl2pPr marL="457200" indent="0" algn="ctr" defTabSz="914400" rtl="0" eaLnBrk="1" latinLnBrk="0" hangingPunct="1">
+              <a:lnSpc>
+                <a:spcPct val="90000"/>
+              </a:lnSpc>
+              <a:spcBef>
+                <a:spcPts val="500"/>
+              </a:spcBef>
+              <a:buFont typeface="Arial" panose="020B0604020202020204" pitchFamily="34" charset="0"/>
+              <a:buNone/>
+              <a:defRPr sz="2000" kern="1200">
+                <a:solidFill>
+                  <a:schemeClr val="tx1"/>
+                </a:solidFill>
+                <a:latin typeface="+mn-lt"/>
+                <a:ea typeface="+mn-ea"/>
+                <a:cs typeface="+mn-cs"/>
+              </a:defRPr>
+            </a:lvl2pPr>
+            <a:lvl3pPr marL="914400" indent="0" algn="ctr" defTabSz="914400" rtl="0" eaLnBrk="1" latinLnBrk="0" hangingPunct="1">
+              <a:lnSpc>
+                <a:spcPct val="90000"/>
+              </a:lnSpc>
+              <a:spcBef>
+                <a:spcPts val="500"/>
+              </a:spcBef>
+              <a:buFont typeface="Arial" panose="020B0604020202020204" pitchFamily="34" charset="0"/>
+              <a:buNone/>
+              <a:defRPr sz="1800" kern="1200">
+                <a:solidFill>
+                  <a:schemeClr val="tx1"/>
+                </a:solidFill>
+                <a:latin typeface="+mn-lt"/>
+                <a:ea typeface="+mn-ea"/>
+                <a:cs typeface="+mn-cs"/>
+              </a:defRPr>
+            </a:lvl3pPr>
+            <a:lvl4pPr marL="1371600" indent="0" algn="ctr" defTabSz="914400" rtl="0" eaLnBrk="1" latinLnBrk="0" hangingPunct="1">
+              <a:lnSpc>
+                <a:spcPct val="90000"/>
+              </a:lnSpc>
+              <a:spcBef>
+                <a:spcPts val="500"/>
+              </a:spcBef>
+              <a:buFont typeface="Arial" panose="020B0604020202020204" pitchFamily="34" charset="0"/>
+              <a:buNone/>
+              <a:defRPr sz="1600" kern="1200">
+                <a:solidFill>
+                  <a:schemeClr val="tx1"/>
+                </a:solidFill>
+                <a:latin typeface="+mn-lt"/>
+                <a:ea typeface="+mn-ea"/>
+                <a:cs typeface="+mn-cs"/>
+              </a:defRPr>
+            </a:lvl4pPr>
+            <a:lvl5pPr marL="1828800" indent="0" algn="ctr" defTabSz="914400" rtl="0" eaLnBrk="1" latinLnBrk="0" hangingPunct="1">
+              <a:lnSpc>
+                <a:spcPct val="90000"/>
+              </a:lnSpc>
+              <a:spcBef>
+                <a:spcPts val="500"/>
+              </a:spcBef>
+              <a:buFont typeface="Arial" panose="020B0604020202020204" pitchFamily="34" charset="0"/>
+              <a:buNone/>
+              <a:defRPr sz="1600" kern="1200">
+                <a:solidFill>
+                  <a:schemeClr val="tx1"/>
+                </a:solidFill>
+                <a:latin typeface="+mn-lt"/>
+                <a:ea typeface="+mn-ea"/>
+                <a:cs typeface="+mn-cs"/>
+              </a:defRPr>
+            </a:lvl5pPr>
+            <a:lvl6pPr marL="2286000" indent="0" algn="ctr" defTabSz="914400" rtl="0" eaLnBrk="1" latinLnBrk="0" hangingPunct="1">
+              <a:lnSpc>
+                <a:spcPct val="90000"/>
+              </a:lnSpc>
+              <a:spcBef>
+                <a:spcPts val="500"/>
+              </a:spcBef>
+              <a:buFont typeface="Arial" panose="020B0604020202020204" pitchFamily="34" charset="0"/>
+              <a:buNone/>
+              <a:defRPr sz="1600" kern="1200">
+                <a:solidFill>
+                  <a:schemeClr val="tx1"/>
+                </a:solidFill>
+                <a:latin typeface="+mn-lt"/>
+                <a:ea typeface="+mn-ea"/>
+                <a:cs typeface="+mn-cs"/>
+              </a:defRPr>
+            </a:lvl6pPr>
+            <a:lvl7pPr marL="2743200" indent="0" algn="ctr" defTabSz="914400" rtl="0" eaLnBrk="1" latinLnBrk="0" hangingPunct="1">
+              <a:lnSpc>
+                <a:spcPct val="90000"/>
+              </a:lnSpc>
+              <a:spcBef>
+                <a:spcPts val="500"/>
+              </a:spcBef>
+              <a:buFont typeface="Arial" panose="020B0604020202020204" pitchFamily="34" charset="0"/>
+              <a:buNone/>
+              <a:defRPr sz="1600" kern="1200">
+                <a:solidFill>
+                  <a:schemeClr val="tx1"/>
+                </a:solidFill>
+                <a:latin typeface="+mn-lt"/>
+                <a:ea typeface="+mn-ea"/>
+                <a:cs typeface="+mn-cs"/>
+              </a:defRPr>
+            </a:lvl7pPr>
+            <a:lvl8pPr marL="3200400" indent="0" algn="ctr" defTabSz="914400" rtl="0" eaLnBrk="1" latinLnBrk="0" hangingPunct="1">
+              <a:lnSpc>
+                <a:spcPct val="90000"/>
+              </a:lnSpc>
+              <a:spcBef>
+                <a:spcPts val="500"/>
+              </a:spcBef>
+              <a:buFont typeface="Arial" panose="020B0604020202020204" pitchFamily="34" charset="0"/>
+              <a:buNone/>
+              <a:defRPr sz="1600" kern="1200">
+                <a:solidFill>
+                  <a:schemeClr val="tx1"/>
+                </a:solidFill>
+                <a:latin typeface="+mn-lt"/>
+                <a:ea typeface="+mn-ea"/>
+                <a:cs typeface="+mn-cs"/>
+              </a:defRPr>
+            </a:lvl8pPr>
+            <a:lvl9pPr marL="3657600" indent="0" algn="ctr" defTabSz="914400" rtl="0" eaLnBrk="1" latinLnBrk="0" hangingPunct="1">
+              <a:lnSpc>
+                <a:spcPct val="90000"/>
+              </a:lnSpc>
+              <a:spcBef>
+                <a:spcPts val="500"/>
+              </a:spcBef>
+              <a:buFont typeface="Arial" panose="020B0604020202020204" pitchFamily="34" charset="0"/>
+              <a:buNone/>
+              <a:defRPr sz="1600" kern="1200">
+                <a:solidFill>
+                  <a:schemeClr val="tx1"/>
+                </a:solidFill>
+                <a:latin typeface="+mn-lt"/>
+                <a:ea typeface="+mn-ea"/>
+                <a:cs typeface="+mn-cs"/>
+              </a:defRPr>
+            </a:lvl9pPr>
+          </a:lstStyle>
+          <a:p>
+            <a:r>
+              <a:rPr lang="en-US" sz="2000" dirty="0"/>
+              <a:t>I/B/E/S</a:t>
+            </a:r>
+          </a:p>
+          <a:p>
+            <a:pPr marL="285750" indent="-285750" algn="l">
+              <a:buFont typeface="Arial" panose="020B0604020202020204" pitchFamily="34" charset="0"/>
+              <a:buChar char="•"/>
+            </a:pPr>
+            <a:r>
+              <a:rPr lang="en-US" sz="1600" dirty="0"/>
+              <a:t>Total number of </a:t>
+            </a:r>
+            <a:r>
+              <a:rPr lang="en-US" sz="1600" dirty="0" err="1"/>
+              <a:t>cusip</a:t>
+            </a:r>
+            <a:r>
+              <a:rPr lang="en-US" sz="1600" dirty="0"/>
+              <a:t>-</a:t>
+            </a:r>
+            <a:r>
+              <a:rPr lang="en-US" sz="1600" dirty="0" err="1"/>
+              <a:t>fpedats</a:t>
+            </a:r>
+            <a:r>
+              <a:rPr lang="en-US" sz="1600" dirty="0"/>
+              <a:t>-analyst: </a:t>
+            </a:r>
+            <a:r>
+              <a:rPr lang="en-US" sz="1600" dirty="0">
+                <a:highlight>
+                  <a:srgbClr val="808000"/>
+                </a:highlight>
+              </a:rPr>
+              <a:t>9,812,071</a:t>
+            </a:r>
+          </a:p>
+          <a:p>
+            <a:pPr marL="285750" indent="-285750" algn="l">
+              <a:buFont typeface="Arial" panose="020B0604020202020204" pitchFamily="34" charset="0"/>
+              <a:buChar char="•"/>
+            </a:pPr>
+            <a:r>
+              <a:rPr lang="en-US" sz="1600" dirty="0"/>
+              <a:t>Number of </a:t>
+            </a:r>
+            <a:r>
+              <a:rPr lang="en-US" sz="1600" dirty="0" err="1"/>
+              <a:t>cusip-fpedats</a:t>
+            </a:r>
+            <a:r>
+              <a:rPr lang="en-US" sz="1600" dirty="0"/>
+              <a:t>, after dropping missing </a:t>
+            </a:r>
+            <a:r>
+              <a:rPr lang="en-US" sz="1600" dirty="0" err="1"/>
+              <a:t>cusip</a:t>
+            </a:r>
+            <a:r>
+              <a:rPr lang="en-US" sz="1600" dirty="0"/>
+              <a:t> and actual: </a:t>
+            </a:r>
+            <a:r>
+              <a:rPr lang="en-US" sz="1600" dirty="0">
+                <a:highlight>
+                  <a:srgbClr val="FFFF00"/>
+                </a:highlight>
+              </a:rPr>
+              <a:t>155,539</a:t>
+            </a:r>
+            <a:endParaRPr lang="en-US" dirty="0">
+              <a:highlight>
+                <a:srgbClr val="FFFF00"/>
+              </a:highlight>
+            </a:endParaRPr>
+          </a:p>
+        </p:txBody>
+      </p:sp>
+      <p:sp>
+        <p:nvSpPr>
+          <p:cNvPr id="7" name="Subtitle 2">
+            <a:extLst>
+              <a:ext uri="{FF2B5EF4-FFF2-40B4-BE49-F238E27FC236}">
+                <a16:creationId xmlns:a16="http://schemas.microsoft.com/office/drawing/2014/main" id="{2D0ACE13-B4D8-4E29-B46B-EFDD2A689E99}"/>
+              </a:ext>
+            </a:extLst>
+          </p:cNvPr>
+          <p:cNvSpPr txBox="1">
+            <a:spLocks/>
+          </p:cNvSpPr>
+          <p:nvPr/>
+        </p:nvSpPr>
+        <p:spPr>
+          <a:xfrm>
+            <a:off x="54376" y="5541028"/>
+            <a:ext cx="4310200" cy="1496703"/>
+          </a:xfrm>
+          <a:prstGeom prst="rect">
+            <a:avLst/>
+          </a:prstGeom>
+        </p:spPr>
+        <p:txBody>
+          <a:bodyPr vert="horz" lIns="91440" tIns="45720" rIns="91440" bIns="45720" rtlCol="0">
+            <a:normAutofit/>
+          </a:bodyPr>
+          <a:lstStyle>
+            <a:lvl1pPr marL="0" indent="0" algn="ctr" defTabSz="914400" rtl="0" eaLnBrk="1" latinLnBrk="0" hangingPunct="1">
+              <a:lnSpc>
+                <a:spcPct val="90000"/>
+              </a:lnSpc>
+              <a:spcBef>
+                <a:spcPts val="1000"/>
+              </a:spcBef>
+              <a:buFont typeface="Arial" panose="020B0604020202020204" pitchFamily="34" charset="0"/>
+              <a:buNone/>
+              <a:defRPr sz="2400" kern="1200">
+                <a:solidFill>
+                  <a:schemeClr val="tx1"/>
+                </a:solidFill>
+                <a:latin typeface="+mn-lt"/>
+                <a:ea typeface="+mn-ea"/>
+                <a:cs typeface="+mn-cs"/>
+              </a:defRPr>
+            </a:lvl1pPr>
+            <a:lvl2pPr marL="457200" indent="0" algn="ctr" defTabSz="914400" rtl="0" eaLnBrk="1" latinLnBrk="0" hangingPunct="1">
+              <a:lnSpc>
+                <a:spcPct val="90000"/>
+              </a:lnSpc>
+              <a:spcBef>
+                <a:spcPts val="500"/>
+              </a:spcBef>
+              <a:buFont typeface="Arial" panose="020B0604020202020204" pitchFamily="34" charset="0"/>
+              <a:buNone/>
+              <a:defRPr sz="2000" kern="1200">
+                <a:solidFill>
+                  <a:schemeClr val="tx1"/>
+                </a:solidFill>
+                <a:latin typeface="+mn-lt"/>
+                <a:ea typeface="+mn-ea"/>
+                <a:cs typeface="+mn-cs"/>
+              </a:defRPr>
+            </a:lvl2pPr>
+            <a:lvl3pPr marL="914400" indent="0" algn="ctr" defTabSz="914400" rtl="0" eaLnBrk="1" latinLnBrk="0" hangingPunct="1">
+              <a:lnSpc>
+                <a:spcPct val="90000"/>
+              </a:lnSpc>
+              <a:spcBef>
+                <a:spcPts val="500"/>
+              </a:spcBef>
+              <a:buFont typeface="Arial" panose="020B0604020202020204" pitchFamily="34" charset="0"/>
+              <a:buNone/>
+              <a:defRPr sz="1800" kern="1200">
+                <a:solidFill>
+                  <a:schemeClr val="tx1"/>
+                </a:solidFill>
+                <a:latin typeface="+mn-lt"/>
+                <a:ea typeface="+mn-ea"/>
+                <a:cs typeface="+mn-cs"/>
+              </a:defRPr>
+            </a:lvl3pPr>
+            <a:lvl4pPr marL="1371600" indent="0" algn="ctr" defTabSz="914400" rtl="0" eaLnBrk="1" latinLnBrk="0" hangingPunct="1">
+              <a:lnSpc>
+                <a:spcPct val="90000"/>
+              </a:lnSpc>
+              <a:spcBef>
+                <a:spcPts val="500"/>
+              </a:spcBef>
+              <a:buFont typeface="Arial" panose="020B0604020202020204" pitchFamily="34" charset="0"/>
+              <a:buNone/>
+              <a:defRPr sz="1600" kern="1200">
+                <a:solidFill>
+                  <a:schemeClr val="tx1"/>
+                </a:solidFill>
+                <a:latin typeface="+mn-lt"/>
+                <a:ea typeface="+mn-ea"/>
+                <a:cs typeface="+mn-cs"/>
+              </a:defRPr>
+            </a:lvl4pPr>
+            <a:lvl5pPr marL="1828800" indent="0" algn="ctr" defTabSz="914400" rtl="0" eaLnBrk="1" latinLnBrk="0" hangingPunct="1">
+              <a:lnSpc>
+                <a:spcPct val="90000"/>
+              </a:lnSpc>
+              <a:spcBef>
+                <a:spcPts val="500"/>
+              </a:spcBef>
+              <a:buFont typeface="Arial" panose="020B0604020202020204" pitchFamily="34" charset="0"/>
+              <a:buNone/>
+              <a:defRPr sz="1600" kern="1200">
+                <a:solidFill>
+                  <a:schemeClr val="tx1"/>
+                </a:solidFill>
+                <a:latin typeface="+mn-lt"/>
+                <a:ea typeface="+mn-ea"/>
+                <a:cs typeface="+mn-cs"/>
+              </a:defRPr>
+            </a:lvl5pPr>
+            <a:lvl6pPr marL="2286000" indent="0" algn="ctr" defTabSz="914400" rtl="0" eaLnBrk="1" latinLnBrk="0" hangingPunct="1">
+              <a:lnSpc>
+                <a:spcPct val="90000"/>
+              </a:lnSpc>
+              <a:spcBef>
+                <a:spcPts val="500"/>
+              </a:spcBef>
+              <a:buFont typeface="Arial" panose="020B0604020202020204" pitchFamily="34" charset="0"/>
+              <a:buNone/>
+              <a:defRPr sz="1600" kern="1200">
+                <a:solidFill>
+                  <a:schemeClr val="tx1"/>
+                </a:solidFill>
+                <a:latin typeface="+mn-lt"/>
+                <a:ea typeface="+mn-ea"/>
+                <a:cs typeface="+mn-cs"/>
+              </a:defRPr>
+            </a:lvl6pPr>
+            <a:lvl7pPr marL="2743200" indent="0" algn="ctr" defTabSz="914400" rtl="0" eaLnBrk="1" latinLnBrk="0" hangingPunct="1">
+              <a:lnSpc>
+                <a:spcPct val="90000"/>
+              </a:lnSpc>
+              <a:spcBef>
+                <a:spcPts val="500"/>
+              </a:spcBef>
+              <a:buFont typeface="Arial" panose="020B0604020202020204" pitchFamily="34" charset="0"/>
+              <a:buNone/>
+              <a:defRPr sz="1600" kern="1200">
+                <a:solidFill>
+                  <a:schemeClr val="tx1"/>
+                </a:solidFill>
+                <a:latin typeface="+mn-lt"/>
+                <a:ea typeface="+mn-ea"/>
+                <a:cs typeface="+mn-cs"/>
+              </a:defRPr>
+            </a:lvl7pPr>
+            <a:lvl8pPr marL="3200400" indent="0" algn="ctr" defTabSz="914400" rtl="0" eaLnBrk="1" latinLnBrk="0" hangingPunct="1">
+              <a:lnSpc>
+                <a:spcPct val="90000"/>
+              </a:lnSpc>
+              <a:spcBef>
+                <a:spcPts val="500"/>
+              </a:spcBef>
+              <a:buFont typeface="Arial" panose="020B0604020202020204" pitchFamily="34" charset="0"/>
+              <a:buNone/>
+              <a:defRPr sz="1600" kern="1200">
+                <a:solidFill>
+                  <a:schemeClr val="tx1"/>
+                </a:solidFill>
+                <a:latin typeface="+mn-lt"/>
+                <a:ea typeface="+mn-ea"/>
+                <a:cs typeface="+mn-cs"/>
+              </a:defRPr>
+            </a:lvl8pPr>
+            <a:lvl9pPr marL="3657600" indent="0" algn="ctr" defTabSz="914400" rtl="0" eaLnBrk="1" latinLnBrk="0" hangingPunct="1">
+              <a:lnSpc>
+                <a:spcPct val="90000"/>
+              </a:lnSpc>
+              <a:spcBef>
+                <a:spcPts val="500"/>
+              </a:spcBef>
+              <a:buFont typeface="Arial" panose="020B0604020202020204" pitchFamily="34" charset="0"/>
+              <a:buNone/>
+              <a:defRPr sz="1600" kern="1200">
+                <a:solidFill>
+                  <a:schemeClr val="tx1"/>
+                </a:solidFill>
+                <a:latin typeface="+mn-lt"/>
+                <a:ea typeface="+mn-ea"/>
+                <a:cs typeface="+mn-cs"/>
+              </a:defRPr>
+            </a:lvl9pPr>
+          </a:lstStyle>
+          <a:p>
+            <a:pPr algn="l"/>
+            <a:r>
+              <a:rPr lang="en-US" sz="1400" dirty="0">
+                <a:highlight>
+                  <a:srgbClr val="C0C0C0"/>
+                </a:highlight>
+              </a:rPr>
+              <a:t>Time Period </a:t>
+            </a:r>
+          </a:p>
+          <a:p>
+            <a:pPr marL="342900" indent="-342900" algn="l">
+              <a:buFont typeface="Arial" panose="020B0604020202020204" pitchFamily="34" charset="0"/>
+              <a:buChar char="•"/>
+            </a:pPr>
+            <a:r>
+              <a:rPr lang="en-US" sz="1400" dirty="0">
+                <a:highlight>
+                  <a:srgbClr val="C0C0C0"/>
+                </a:highlight>
+              </a:rPr>
+              <a:t>IBES: 1981 Dec. – 2019 Jul. </a:t>
+            </a:r>
+          </a:p>
+          <a:p>
+            <a:pPr marL="342900" indent="-342900" algn="l">
+              <a:buFont typeface="Arial" panose="020B0604020202020204" pitchFamily="34" charset="0"/>
+              <a:buChar char="•"/>
+            </a:pPr>
+            <a:r>
+              <a:rPr lang="en-US" sz="1400" dirty="0">
+                <a:highlight>
+                  <a:srgbClr val="C0C0C0"/>
+                </a:highlight>
+              </a:rPr>
+              <a:t>CRSP_COMPUSTAT_EDGAR: 1993 Jan. – 2019 Dec. </a:t>
+            </a:r>
+          </a:p>
+          <a:p>
+            <a:pPr marL="342900" indent="-342900" algn="l">
+              <a:buFont typeface="Arial" panose="020B0604020202020204" pitchFamily="34" charset="0"/>
+              <a:buChar char="•"/>
+            </a:pPr>
+            <a:r>
+              <a:rPr lang="en-US" sz="1400" dirty="0" err="1">
+                <a:highlight>
+                  <a:srgbClr val="C0C0C0"/>
+                </a:highlight>
+              </a:rPr>
+              <a:t>Compustat</a:t>
+            </a:r>
+            <a:r>
+              <a:rPr lang="en-US" sz="1400" dirty="0">
+                <a:highlight>
+                  <a:srgbClr val="C0C0C0"/>
+                </a:highlight>
+              </a:rPr>
+              <a:t> Segment: 2011 Jun. – 2020 Jan.</a:t>
+            </a:r>
+          </a:p>
+        </p:txBody>
+      </p:sp>
+      <p:sp>
+        <p:nvSpPr>
+          <p:cNvPr id="14" name="Subtitle 2">
+            <a:extLst>
+              <a:ext uri="{FF2B5EF4-FFF2-40B4-BE49-F238E27FC236}">
+                <a16:creationId xmlns:a16="http://schemas.microsoft.com/office/drawing/2014/main" id="{1560E3A7-4785-4D31-BF00-5675315307A9}"/>
+              </a:ext>
+            </a:extLst>
+          </p:cNvPr>
+          <p:cNvSpPr txBox="1">
+            <a:spLocks/>
+          </p:cNvSpPr>
+          <p:nvPr/>
+        </p:nvSpPr>
+        <p:spPr>
+          <a:xfrm>
+            <a:off x="1390319" y="2790393"/>
+            <a:ext cx="5011493" cy="1193580"/>
+          </a:xfrm>
+          <a:prstGeom prst="rect">
+            <a:avLst/>
+          </a:prstGeom>
+        </p:spPr>
+        <p:txBody>
+          <a:bodyPr vert="horz" lIns="91440" tIns="45720" rIns="91440" bIns="45720" rtlCol="0">
+            <a:normAutofit/>
+          </a:bodyPr>
+          <a:lstStyle>
+            <a:lvl1pPr marL="0" indent="0" algn="ctr" defTabSz="914400" rtl="0" eaLnBrk="1" latinLnBrk="0" hangingPunct="1">
+              <a:lnSpc>
+                <a:spcPct val="90000"/>
+              </a:lnSpc>
+              <a:spcBef>
+                <a:spcPts val="1000"/>
+              </a:spcBef>
+              <a:buFont typeface="Arial" panose="020B0604020202020204" pitchFamily="34" charset="0"/>
+              <a:buNone/>
+              <a:defRPr sz="2400" kern="1200">
+                <a:solidFill>
+                  <a:schemeClr val="tx1"/>
+                </a:solidFill>
+                <a:latin typeface="+mn-lt"/>
+                <a:ea typeface="+mn-ea"/>
+                <a:cs typeface="+mn-cs"/>
+              </a:defRPr>
+            </a:lvl1pPr>
+            <a:lvl2pPr marL="457200" indent="0" algn="ctr" defTabSz="914400" rtl="0" eaLnBrk="1" latinLnBrk="0" hangingPunct="1">
+              <a:lnSpc>
+                <a:spcPct val="90000"/>
+              </a:lnSpc>
+              <a:spcBef>
+                <a:spcPts val="500"/>
+              </a:spcBef>
+              <a:buFont typeface="Arial" panose="020B0604020202020204" pitchFamily="34" charset="0"/>
+              <a:buNone/>
+              <a:defRPr sz="2000" kern="1200">
+                <a:solidFill>
+                  <a:schemeClr val="tx1"/>
+                </a:solidFill>
+                <a:latin typeface="+mn-lt"/>
+                <a:ea typeface="+mn-ea"/>
+                <a:cs typeface="+mn-cs"/>
+              </a:defRPr>
+            </a:lvl2pPr>
+            <a:lvl3pPr marL="914400" indent="0" algn="ctr" defTabSz="914400" rtl="0" eaLnBrk="1" latinLnBrk="0" hangingPunct="1">
+              <a:lnSpc>
+                <a:spcPct val="90000"/>
+              </a:lnSpc>
+              <a:spcBef>
+                <a:spcPts val="500"/>
+              </a:spcBef>
+              <a:buFont typeface="Arial" panose="020B0604020202020204" pitchFamily="34" charset="0"/>
+              <a:buNone/>
+              <a:defRPr sz="1800" kern="1200">
+                <a:solidFill>
+                  <a:schemeClr val="tx1"/>
+                </a:solidFill>
+                <a:latin typeface="+mn-lt"/>
+                <a:ea typeface="+mn-ea"/>
+                <a:cs typeface="+mn-cs"/>
+              </a:defRPr>
+            </a:lvl3pPr>
+            <a:lvl4pPr marL="1371600" indent="0" algn="ctr" defTabSz="914400" rtl="0" eaLnBrk="1" latinLnBrk="0" hangingPunct="1">
+              <a:lnSpc>
+                <a:spcPct val="90000"/>
+              </a:lnSpc>
+              <a:spcBef>
+                <a:spcPts val="500"/>
+              </a:spcBef>
+              <a:buFont typeface="Arial" panose="020B0604020202020204" pitchFamily="34" charset="0"/>
+              <a:buNone/>
+              <a:defRPr sz="1600" kern="1200">
+                <a:solidFill>
+                  <a:schemeClr val="tx1"/>
+                </a:solidFill>
+                <a:latin typeface="+mn-lt"/>
+                <a:ea typeface="+mn-ea"/>
+                <a:cs typeface="+mn-cs"/>
+              </a:defRPr>
+            </a:lvl4pPr>
+            <a:lvl5pPr marL="1828800" indent="0" algn="ctr" defTabSz="914400" rtl="0" eaLnBrk="1" latinLnBrk="0" hangingPunct="1">
+              <a:lnSpc>
+                <a:spcPct val="90000"/>
+              </a:lnSpc>
+              <a:spcBef>
+                <a:spcPts val="500"/>
+              </a:spcBef>
+              <a:buFont typeface="Arial" panose="020B0604020202020204" pitchFamily="34" charset="0"/>
+              <a:buNone/>
+              <a:defRPr sz="1600" kern="1200">
+                <a:solidFill>
+                  <a:schemeClr val="tx1"/>
+                </a:solidFill>
+                <a:latin typeface="+mn-lt"/>
+                <a:ea typeface="+mn-ea"/>
+                <a:cs typeface="+mn-cs"/>
+              </a:defRPr>
+            </a:lvl5pPr>
+            <a:lvl6pPr marL="2286000" indent="0" algn="ctr" defTabSz="914400" rtl="0" eaLnBrk="1" latinLnBrk="0" hangingPunct="1">
+              <a:lnSpc>
+                <a:spcPct val="90000"/>
+              </a:lnSpc>
+              <a:spcBef>
+                <a:spcPts val="500"/>
+              </a:spcBef>
+              <a:buFont typeface="Arial" panose="020B0604020202020204" pitchFamily="34" charset="0"/>
+              <a:buNone/>
+              <a:defRPr sz="1600" kern="1200">
+                <a:solidFill>
+                  <a:schemeClr val="tx1"/>
+                </a:solidFill>
+                <a:latin typeface="+mn-lt"/>
+                <a:ea typeface="+mn-ea"/>
+                <a:cs typeface="+mn-cs"/>
+              </a:defRPr>
+            </a:lvl6pPr>
+            <a:lvl7pPr marL="2743200" indent="0" algn="ctr" defTabSz="914400" rtl="0" eaLnBrk="1" latinLnBrk="0" hangingPunct="1">
+              <a:lnSpc>
+                <a:spcPct val="90000"/>
+              </a:lnSpc>
+              <a:spcBef>
+                <a:spcPts val="500"/>
+              </a:spcBef>
+              <a:buFont typeface="Arial" panose="020B0604020202020204" pitchFamily="34" charset="0"/>
+              <a:buNone/>
+              <a:defRPr sz="1600" kern="1200">
+                <a:solidFill>
+                  <a:schemeClr val="tx1"/>
+                </a:solidFill>
+                <a:latin typeface="+mn-lt"/>
+                <a:ea typeface="+mn-ea"/>
+                <a:cs typeface="+mn-cs"/>
+              </a:defRPr>
+            </a:lvl7pPr>
+            <a:lvl8pPr marL="3200400" indent="0" algn="ctr" defTabSz="914400" rtl="0" eaLnBrk="1" latinLnBrk="0" hangingPunct="1">
+              <a:lnSpc>
+                <a:spcPct val="90000"/>
+              </a:lnSpc>
+              <a:spcBef>
+                <a:spcPts val="500"/>
+              </a:spcBef>
+              <a:buFont typeface="Arial" panose="020B0604020202020204" pitchFamily="34" charset="0"/>
+              <a:buNone/>
+              <a:defRPr sz="1600" kern="1200">
+                <a:solidFill>
+                  <a:schemeClr val="tx1"/>
+                </a:solidFill>
+                <a:latin typeface="+mn-lt"/>
+                <a:ea typeface="+mn-ea"/>
+                <a:cs typeface="+mn-cs"/>
+              </a:defRPr>
+            </a:lvl8pPr>
+            <a:lvl9pPr marL="3657600" indent="0" algn="ctr" defTabSz="914400" rtl="0" eaLnBrk="1" latinLnBrk="0" hangingPunct="1">
+              <a:lnSpc>
+                <a:spcPct val="90000"/>
+              </a:lnSpc>
+              <a:spcBef>
+                <a:spcPts val="500"/>
+              </a:spcBef>
+              <a:buFont typeface="Arial" panose="020B0604020202020204" pitchFamily="34" charset="0"/>
+              <a:buNone/>
+              <a:defRPr sz="1600" kern="1200">
+                <a:solidFill>
+                  <a:schemeClr val="tx1"/>
+                </a:solidFill>
+                <a:latin typeface="+mn-lt"/>
+                <a:ea typeface="+mn-ea"/>
+                <a:cs typeface="+mn-cs"/>
+              </a:defRPr>
+            </a:lvl9pPr>
+          </a:lstStyle>
+          <a:p>
+            <a:r>
+              <a:rPr lang="en-US" sz="1800" dirty="0"/>
+              <a:t>CRSP_COMP_EDGAR_IBES</a:t>
             </a:r>
           </a:p>
           <a:p>
@@ -12071,7 +14586,7 @@
           <a:p>
             <a:r>
               <a:rPr lang="en-US" sz="2000" dirty="0"/>
-              <a:t>CRSP_COMPUSTAT_EDGAR</a:t>
+              <a:t>CRSP_COMP_EDGAR</a:t>
             </a:r>
           </a:p>
           <a:p>
@@ -12711,7 +15226,7 @@
           <a:p>
             <a:r>
               <a:rPr lang="en-US" sz="2000" dirty="0"/>
-              <a:t>SEGMENT</a:t>
+              <a:t>COMPUSTAT SEGMENT</a:t>
             </a:r>
           </a:p>
           <a:p>
@@ -12826,7 +15341,7 @@
         </p:spPr>
         <p:txBody>
           <a:bodyPr vert="horz" lIns="91440" tIns="45720" rIns="91440" bIns="45720" rtlCol="0">
-            <a:normAutofit/>
+            <a:normAutofit fontScale="92500" lnSpcReduction="10000"/>
           </a:bodyPr>
           <a:lstStyle>
             <a:lvl1pPr marL="0" indent="0" algn="ctr" defTabSz="914400" rtl="0" eaLnBrk="1" latinLnBrk="0" hangingPunct="1">
@@ -12995,7 +15510,7 @@
           <a:p>
             <a:r>
               <a:rPr lang="en-US" sz="1800" dirty="0" err="1"/>
-              <a:t>CRSP_COMPUSTAT_EDGAR_IBES_SEG_inner</a:t>
+              <a:t>CRSP_COMP_EDGAR_IBES_SEG_inner</a:t>
             </a:r>
             <a:endParaRPr lang="en-US" sz="1800" dirty="0"/>
           </a:p>
@@ -13048,7 +15563,32 @@
                   <a:srgbClr val="FF0000"/>
                 </a:highlight>
               </a:rPr>
-              <a:t>17,556 </a:t>
+              <a:t>17,556</a:t>
+            </a:r>
+          </a:p>
+          <a:p>
+            <a:pPr algn="l"/>
+            <a:r>
+              <a:rPr lang="en-US" sz="1400" dirty="0" err="1">
+                <a:solidFill>
+                  <a:schemeClr val="bg1"/>
+                </a:solidFill>
+                <a:highlight>
+                  <a:srgbClr val="FF0000"/>
+                </a:highlight>
+              </a:rPr>
+              <a:t>Replicatable</a:t>
+            </a:r>
+            <a:r>
+              <a:rPr lang="en-US" sz="1400" dirty="0">
+                <a:solidFill>
+                  <a:schemeClr val="bg1"/>
+                </a:solidFill>
+                <a:highlight>
+                  <a:srgbClr val="FF0000"/>
+                </a:highlight>
+              </a:rPr>
+              <a:t> (T4), but ABTONE main results not significant (T5) </a:t>
             </a:r>
           </a:p>
         </p:txBody>
@@ -13463,7 +16003,7 @@
           <a:p>
             <a:r>
               <a:rPr lang="en-US" sz="1800" dirty="0" err="1"/>
-              <a:t>CRSP_COMPUSTAT_EDGAR_IBES_SEG_left</a:t>
+              <a:t>CRSP_COMP_EDGAR_IBES_SEG_left</a:t>
             </a:r>
             <a:endParaRPr lang="en-US" sz="1800" dirty="0"/>
           </a:p>
@@ -13556,7 +16096,7 @@
 </p:sld>
 </file>
 
-<file path=ppt/slides/slide4.xml><?xml version="1.0" encoding="utf-8"?>
+<file path=ppt/slides/slide5.xml><?xml version="1.0" encoding="utf-8"?>
 <p:sld xmlns:a="http://schemas.openxmlformats.org/drawingml/2006/main" xmlns:r="http://schemas.openxmlformats.org/officeDocument/2006/relationships" xmlns:p="http://schemas.openxmlformats.org/presentationml/2006/main">
   <p:cSld>
     <p:spTree>

</xml_diff>

<commit_message>
update compustat raw data: currency USD only; Replicate Huang et al. 2014 Table 4
</commit_message>
<xml_diff>
--- a/output/Figures.pptx
+++ b/output/Figures.pptx
@@ -263,7 +263,7 @@
           <a:p>
             <a:fld id="{F6465CF2-20FA-4A27-B5DD-24B9293428AE}" type="datetimeFigureOut">
               <a:rPr lang="en-US" smtClean="0"/>
-              <a:t>4/20/2020</a:t>
+              <a:t>4/24/2020</a:t>
             </a:fld>
             <a:endParaRPr lang="en-US"/>
           </a:p>
@@ -461,7 +461,7 @@
           <a:p>
             <a:fld id="{F6465CF2-20FA-4A27-B5DD-24B9293428AE}" type="datetimeFigureOut">
               <a:rPr lang="en-US" smtClean="0"/>
-              <a:t>4/20/2020</a:t>
+              <a:t>4/24/2020</a:t>
             </a:fld>
             <a:endParaRPr lang="en-US"/>
           </a:p>
@@ -669,7 +669,7 @@
           <a:p>
             <a:fld id="{F6465CF2-20FA-4A27-B5DD-24B9293428AE}" type="datetimeFigureOut">
               <a:rPr lang="en-US" smtClean="0"/>
-              <a:t>4/20/2020</a:t>
+              <a:t>4/24/2020</a:t>
             </a:fld>
             <a:endParaRPr lang="en-US"/>
           </a:p>
@@ -867,7 +867,7 @@
           <a:p>
             <a:fld id="{F6465CF2-20FA-4A27-B5DD-24B9293428AE}" type="datetimeFigureOut">
               <a:rPr lang="en-US" smtClean="0"/>
-              <a:t>4/20/2020</a:t>
+              <a:t>4/24/2020</a:t>
             </a:fld>
             <a:endParaRPr lang="en-US"/>
           </a:p>
@@ -1142,7 +1142,7 @@
           <a:p>
             <a:fld id="{F6465CF2-20FA-4A27-B5DD-24B9293428AE}" type="datetimeFigureOut">
               <a:rPr lang="en-US" smtClean="0"/>
-              <a:t>4/20/2020</a:t>
+              <a:t>4/24/2020</a:t>
             </a:fld>
             <a:endParaRPr lang="en-US"/>
           </a:p>
@@ -1407,7 +1407,7 @@
           <a:p>
             <a:fld id="{F6465CF2-20FA-4A27-B5DD-24B9293428AE}" type="datetimeFigureOut">
               <a:rPr lang="en-US" smtClean="0"/>
-              <a:t>4/20/2020</a:t>
+              <a:t>4/24/2020</a:t>
             </a:fld>
             <a:endParaRPr lang="en-US"/>
           </a:p>
@@ -1819,7 +1819,7 @@
           <a:p>
             <a:fld id="{F6465CF2-20FA-4A27-B5DD-24B9293428AE}" type="datetimeFigureOut">
               <a:rPr lang="en-US" smtClean="0"/>
-              <a:t>4/20/2020</a:t>
+              <a:t>4/24/2020</a:t>
             </a:fld>
             <a:endParaRPr lang="en-US"/>
           </a:p>
@@ -1960,7 +1960,7 @@
           <a:p>
             <a:fld id="{F6465CF2-20FA-4A27-B5DD-24B9293428AE}" type="datetimeFigureOut">
               <a:rPr lang="en-US" smtClean="0"/>
-              <a:t>4/20/2020</a:t>
+              <a:t>4/24/2020</a:t>
             </a:fld>
             <a:endParaRPr lang="en-US"/>
           </a:p>
@@ -2073,7 +2073,7 @@
           <a:p>
             <a:fld id="{F6465CF2-20FA-4A27-B5DD-24B9293428AE}" type="datetimeFigureOut">
               <a:rPr lang="en-US" smtClean="0"/>
-              <a:t>4/20/2020</a:t>
+              <a:t>4/24/2020</a:t>
             </a:fld>
             <a:endParaRPr lang="en-US"/>
           </a:p>
@@ -2384,7 +2384,7 @@
           <a:p>
             <a:fld id="{F6465CF2-20FA-4A27-B5DD-24B9293428AE}" type="datetimeFigureOut">
               <a:rPr lang="en-US" smtClean="0"/>
-              <a:t>4/20/2020</a:t>
+              <a:t>4/24/2020</a:t>
             </a:fld>
             <a:endParaRPr lang="en-US"/>
           </a:p>
@@ -2672,7 +2672,7 @@
           <a:p>
             <a:fld id="{F6465CF2-20FA-4A27-B5DD-24B9293428AE}" type="datetimeFigureOut">
               <a:rPr lang="en-US" smtClean="0"/>
-              <a:t>4/20/2020</a:t>
+              <a:t>4/24/2020</a:t>
             </a:fld>
             <a:endParaRPr lang="en-US"/>
           </a:p>
@@ -2913,7 +2913,7 @@
           <a:p>
             <a:fld id="{F6465CF2-20FA-4A27-B5DD-24B9293428AE}" type="datetimeFigureOut">
               <a:rPr lang="en-US" smtClean="0"/>
-              <a:t>4/20/2020</a:t>
+              <a:t>4/24/2020</a:t>
             </a:fld>
             <a:endParaRPr lang="en-US"/>
           </a:p>
@@ -8247,7 +8247,7 @@
                   <a:srgbClr val="808000"/>
                 </a:highlight>
               </a:rPr>
-              <a:t>1,321,336</a:t>
+              <a:t>1,142,966</a:t>
             </a:r>
           </a:p>
           <a:p>
@@ -8281,7 +8281,7 @@
                   <a:srgbClr val="FFFF00"/>
                 </a:highlight>
               </a:rPr>
-              <a:t>1,320,825</a:t>
+              <a:t>1,142,561</a:t>
             </a:r>
           </a:p>
         </p:txBody>
@@ -9283,8 +9283,53 @@
                   <a:srgbClr val="FFFF00"/>
                 </a:highlight>
               </a:rPr>
-              <a:t>750,795</a:t>
-            </a:r>
+              <a:t>7</a:t>
+            </a:r>
+            <a:r>
+              <a:rPr lang="en-US" altLang="zh-CN" sz="1400" dirty="0">
+                <a:highlight>
+                  <a:srgbClr val="FFFF00"/>
+                </a:highlight>
+              </a:rPr>
+              <a:t>40</a:t>
+            </a:r>
+            <a:r>
+              <a:rPr lang="en-US" sz="1400" dirty="0">
+                <a:highlight>
+                  <a:srgbClr val="FFFF00"/>
+                </a:highlight>
+              </a:rPr>
+              <a:t>,</a:t>
+            </a:r>
+            <a:r>
+              <a:rPr lang="en-US" altLang="zh-CN" sz="1400" dirty="0">
+                <a:highlight>
+                  <a:srgbClr val="FFFF00"/>
+                </a:highlight>
+              </a:rPr>
+              <a:t>6</a:t>
+            </a:r>
+            <a:r>
+              <a:rPr lang="en-US" sz="1400" dirty="0">
+                <a:highlight>
+                  <a:srgbClr val="FFFF00"/>
+                </a:highlight>
+              </a:rPr>
+              <a:t>9</a:t>
+            </a:r>
+            <a:r>
+              <a:rPr lang="en-US" altLang="zh-CN" sz="1400" dirty="0">
+                <a:highlight>
+                  <a:srgbClr val="FFFF00"/>
+                </a:highlight>
+              </a:rPr>
+              <a:t>7</a:t>
+            </a:r>
+            <a:endParaRPr lang="en-US" sz="1400" dirty="0">
+              <a:highlight>
+                <a:srgbClr val="FFFF00"/>
+              </a:highlight>
+            </a:endParaRPr>
           </a:p>
         </p:txBody>
       </p:sp>
@@ -10064,8 +10109,21 @@
                   <a:srgbClr val="FFFF00"/>
                 </a:highlight>
               </a:rPr>
-              <a:t>303,284</a:t>
-            </a:r>
+              <a:t>303,</a:t>
+            </a:r>
+            <a:r>
+              <a:rPr lang="en-US" altLang="zh-CN" sz="1400" dirty="0">
+                <a:highlight>
+                  <a:srgbClr val="FFFF00"/>
+                </a:highlight>
+              </a:rPr>
+              <a:t>034</a:t>
+            </a:r>
+            <a:endParaRPr lang="en-US" sz="1400" dirty="0">
+              <a:highlight>
+                <a:srgbClr val="FFFF00"/>
+              </a:highlight>
+            </a:endParaRPr>
           </a:p>
           <a:p>
             <a:pPr marL="742950" lvl="1" indent="-285750" algn="l">
@@ -10082,8 +10140,21 @@
                   <a:srgbClr val="FF0000"/>
                 </a:highlight>
               </a:rPr>
-              <a:t>190,547</a:t>
-            </a:r>
+              <a:t>190,</a:t>
+            </a:r>
+            <a:r>
+              <a:rPr lang="en-US" altLang="zh-CN" sz="1400" dirty="0">
+                <a:highlight>
+                  <a:srgbClr val="FF0000"/>
+                </a:highlight>
+              </a:rPr>
+              <a:t>341</a:t>
+            </a:r>
+            <a:endParaRPr lang="en-US" sz="1400" dirty="0">
+              <a:highlight>
+                <a:srgbClr val="FF0000"/>
+              </a:highlight>
+            </a:endParaRPr>
           </a:p>
           <a:p>
             <a:pPr marL="742950" lvl="1" indent="-285750" algn="l">
@@ -11278,7 +11349,7 @@
         </p:nvSpPr>
         <p:spPr>
           <a:xfrm>
-            <a:off x="1390319" y="2790393"/>
+            <a:off x="1158143" y="2427837"/>
             <a:ext cx="5011493" cy="1193580"/>
           </a:xfrm>
           <a:prstGeom prst="rect">
@@ -11482,7 +11553,23 @@
                   <a:srgbClr val="FFFF00"/>
                 </a:highlight>
               </a:rPr>
-              <a:t>110,111 </a:t>
+              <a:t>110,</a:t>
+            </a:r>
+            <a:r>
+              <a:rPr lang="en-US" altLang="zh-CN" sz="1400" dirty="0">
+                <a:highlight>
+                  <a:srgbClr val="FFFF00"/>
+                </a:highlight>
+              </a:rPr>
+              <a:t>095</a:t>
+            </a:r>
+            <a:r>
+              <a:rPr lang="en-US" sz="1400" dirty="0">
+                <a:highlight>
+                  <a:srgbClr val="FFFF00"/>
+                </a:highlight>
+              </a:rPr>
+              <a:t> </a:t>
             </a:r>
           </a:p>
         </p:txBody>
@@ -11502,7 +11589,7 @@
         <p:grpSpPr>
           <a:xfrm>
             <a:off x="1331651" y="1649461"/>
-            <a:ext cx="5264459" cy="1045346"/>
+            <a:ext cx="5264459" cy="739735"/>
             <a:chOff x="1038687" y="3429000"/>
             <a:chExt cx="5264459" cy="1045346"/>
           </a:xfrm>
@@ -11674,7 +11761,7 @@
         </p:nvSpPr>
         <p:spPr>
           <a:xfrm>
-            <a:off x="1476289" y="1843611"/>
+            <a:off x="1394310" y="1753231"/>
             <a:ext cx="5024747" cy="385164"/>
           </a:xfrm>
           <a:prstGeom prst="rect">
@@ -12082,8 +12169,21 @@
                   <a:srgbClr val="808000"/>
                 </a:highlight>
               </a:rPr>
-              <a:t>190,547</a:t>
-            </a:r>
+              <a:t>190,</a:t>
+            </a:r>
+            <a:r>
+              <a:rPr lang="en-US" altLang="zh-CN" sz="1600" dirty="0">
+                <a:highlight>
+                  <a:srgbClr val="808000"/>
+                </a:highlight>
+              </a:rPr>
+              <a:t>341</a:t>
+            </a:r>
+            <a:endParaRPr lang="en-US" sz="1600" dirty="0">
+              <a:highlight>
+                <a:srgbClr val="808000"/>
+              </a:highlight>
+            </a:endParaRPr>
           </a:p>
           <a:p>
             <a:pPr marL="742950" lvl="1" indent="-285750" algn="l">
@@ -12110,7 +12210,7 @@
         </p:nvSpPr>
         <p:spPr>
           <a:xfrm>
-            <a:off x="5045076" y="3584665"/>
+            <a:off x="5010482" y="3121718"/>
             <a:ext cx="3630307" cy="319241"/>
           </a:xfrm>
           <a:prstGeom prst="rect">
@@ -12789,8 +12889,8 @@
         </p:blipFill>
         <p:spPr>
           <a:xfrm>
-            <a:off x="4297913" y="5956358"/>
-            <a:ext cx="6904318" cy="853514"/>
+            <a:off x="7302766" y="4808314"/>
+            <a:ext cx="4883854" cy="691101"/>
           </a:xfrm>
           <a:prstGeom prst="rect">
             <a:avLst/>
@@ -12813,8 +12913,8 @@
         </p:nvSpPr>
         <p:spPr>
           <a:xfrm>
-            <a:off x="4139697" y="4305103"/>
-            <a:ext cx="5457059" cy="1030198"/>
+            <a:off x="4020606" y="3754192"/>
+            <a:ext cx="5346314" cy="1030198"/>
           </a:xfrm>
           <a:prstGeom prst="rect">
             <a:avLst/>
@@ -13043,21 +13143,19 @@
                   <a:srgbClr val="FF0000"/>
                 </a:highlight>
               </a:rPr>
-              <a:t>91,627</a:t>
-            </a:r>
-          </a:p>
-          <a:p>
-            <a:pPr marL="342900" indent="-342900" algn="l">
-              <a:buFont typeface="Arial" panose="020B0604020202020204" pitchFamily="34" charset="0"/>
-              <a:buChar char="•"/>
-            </a:pPr>
-            <a:endParaRPr lang="en-US" sz="1400" dirty="0"/>
-          </a:p>
-          <a:p>
-            <a:pPr algn="l"/>
+              <a:t>91,6</a:t>
+            </a:r>
+            <a:r>
+              <a:rPr lang="en-US" altLang="zh-CN" sz="1400" dirty="0">
+                <a:highlight>
+                  <a:srgbClr val="FF0000"/>
+                </a:highlight>
+              </a:rPr>
+              <a:t>06</a:t>
+            </a:r>
             <a:endParaRPr lang="en-US" sz="1400" dirty="0">
               <a:highlight>
-                <a:srgbClr val="FFFF00"/>
+                <a:srgbClr val="FF0000"/>
               </a:highlight>
             </a:endParaRPr>
           </a:p>
@@ -13078,7 +13176,7 @@
         <p:grpSpPr>
           <a:xfrm>
             <a:off x="3663890" y="1843611"/>
-            <a:ext cx="6367877" cy="2391038"/>
+            <a:ext cx="6367877" cy="1849500"/>
             <a:chOff x="3663890" y="1843611"/>
             <a:chExt cx="6367877" cy="2391038"/>
           </a:xfrm>
@@ -13212,6 +13310,520 @@
             <a:xfrm>
               <a:off x="6693763" y="3852909"/>
               <a:ext cx="0" cy="381740"/>
+            </a:xfrm>
+            <a:prstGeom prst="straightConnector1">
+              <a:avLst/>
+            </a:prstGeom>
+            <a:ln w="25400">
+              <a:tailEnd type="triangle"/>
+            </a:ln>
+          </p:spPr>
+          <p:style>
+            <a:lnRef idx="1">
+              <a:schemeClr val="accent1"/>
+            </a:lnRef>
+            <a:fillRef idx="0">
+              <a:schemeClr val="accent1"/>
+            </a:fillRef>
+            <a:effectRef idx="0">
+              <a:schemeClr val="accent1"/>
+            </a:effectRef>
+            <a:fontRef idx="minor">
+              <a:schemeClr val="tx1"/>
+            </a:fontRef>
+          </p:style>
+        </p:cxnSp>
+      </p:grpSp>
+      <p:pic>
+        <p:nvPicPr>
+          <p:cNvPr id="3" name="Picture 2">
+            <a:extLst>
+              <a:ext uri="{FF2B5EF4-FFF2-40B4-BE49-F238E27FC236}">
+                <a16:creationId xmlns:a16="http://schemas.microsoft.com/office/drawing/2014/main" id="{58E01604-A6E1-461A-AB26-3C2EC1856058}"/>
+              </a:ext>
+            </a:extLst>
+          </p:cNvPr>
+          <p:cNvPicPr>
+            <a:picLocks noChangeAspect="1"/>
+          </p:cNvPicPr>
+          <p:nvPr/>
+        </p:nvPicPr>
+        <p:blipFill>
+          <a:blip r:embed="rId3"/>
+          <a:stretch>
+            <a:fillRect/>
+          </a:stretch>
+        </p:blipFill>
+        <p:spPr>
+          <a:xfrm>
+            <a:off x="7349554" y="5574106"/>
+            <a:ext cx="4837066" cy="1292664"/>
+          </a:xfrm>
+          <a:prstGeom prst="rect">
+            <a:avLst/>
+          </a:prstGeom>
+        </p:spPr>
+      </p:pic>
+      <p:sp>
+        <p:nvSpPr>
+          <p:cNvPr id="29" name="Subtitle 2">
+            <a:extLst>
+              <a:ext uri="{FF2B5EF4-FFF2-40B4-BE49-F238E27FC236}">
+                <a16:creationId xmlns:a16="http://schemas.microsoft.com/office/drawing/2014/main" id="{FC540626-74BD-4979-B492-0C4620E5B1FF}"/>
+              </a:ext>
+            </a:extLst>
+          </p:cNvPr>
+          <p:cNvSpPr txBox="1">
+            <a:spLocks/>
+          </p:cNvSpPr>
+          <p:nvPr/>
+        </p:nvSpPr>
+        <p:spPr>
+          <a:xfrm>
+            <a:off x="4017648" y="5202257"/>
+            <a:ext cx="2898414" cy="1030198"/>
+          </a:xfrm>
+          <a:prstGeom prst="rect">
+            <a:avLst/>
+          </a:prstGeom>
+        </p:spPr>
+        <p:txBody>
+          <a:bodyPr vert="horz" lIns="91440" tIns="45720" rIns="91440" bIns="45720" rtlCol="0">
+            <a:normAutofit/>
+          </a:bodyPr>
+          <a:lstStyle>
+            <a:lvl1pPr marL="0" indent="0" algn="ctr" defTabSz="914400" rtl="0" eaLnBrk="1" latinLnBrk="0" hangingPunct="1">
+              <a:lnSpc>
+                <a:spcPct val="90000"/>
+              </a:lnSpc>
+              <a:spcBef>
+                <a:spcPts val="1000"/>
+              </a:spcBef>
+              <a:buFont typeface="Arial" panose="020B0604020202020204" pitchFamily="34" charset="0"/>
+              <a:buNone/>
+              <a:defRPr sz="2400" kern="1200">
+                <a:solidFill>
+                  <a:schemeClr val="tx1"/>
+                </a:solidFill>
+                <a:latin typeface="+mn-lt"/>
+                <a:ea typeface="+mn-ea"/>
+                <a:cs typeface="+mn-cs"/>
+              </a:defRPr>
+            </a:lvl1pPr>
+            <a:lvl2pPr marL="457200" indent="0" algn="ctr" defTabSz="914400" rtl="0" eaLnBrk="1" latinLnBrk="0" hangingPunct="1">
+              <a:lnSpc>
+                <a:spcPct val="90000"/>
+              </a:lnSpc>
+              <a:spcBef>
+                <a:spcPts val="500"/>
+              </a:spcBef>
+              <a:buFont typeface="Arial" panose="020B0604020202020204" pitchFamily="34" charset="0"/>
+              <a:buNone/>
+              <a:defRPr sz="2000" kern="1200">
+                <a:solidFill>
+                  <a:schemeClr val="tx1"/>
+                </a:solidFill>
+                <a:latin typeface="+mn-lt"/>
+                <a:ea typeface="+mn-ea"/>
+                <a:cs typeface="+mn-cs"/>
+              </a:defRPr>
+            </a:lvl2pPr>
+            <a:lvl3pPr marL="914400" indent="0" algn="ctr" defTabSz="914400" rtl="0" eaLnBrk="1" latinLnBrk="0" hangingPunct="1">
+              <a:lnSpc>
+                <a:spcPct val="90000"/>
+              </a:lnSpc>
+              <a:spcBef>
+                <a:spcPts val="500"/>
+              </a:spcBef>
+              <a:buFont typeface="Arial" panose="020B0604020202020204" pitchFamily="34" charset="0"/>
+              <a:buNone/>
+              <a:defRPr sz="1800" kern="1200">
+                <a:solidFill>
+                  <a:schemeClr val="tx1"/>
+                </a:solidFill>
+                <a:latin typeface="+mn-lt"/>
+                <a:ea typeface="+mn-ea"/>
+                <a:cs typeface="+mn-cs"/>
+              </a:defRPr>
+            </a:lvl3pPr>
+            <a:lvl4pPr marL="1371600" indent="0" algn="ctr" defTabSz="914400" rtl="0" eaLnBrk="1" latinLnBrk="0" hangingPunct="1">
+              <a:lnSpc>
+                <a:spcPct val="90000"/>
+              </a:lnSpc>
+              <a:spcBef>
+                <a:spcPts val="500"/>
+              </a:spcBef>
+              <a:buFont typeface="Arial" panose="020B0604020202020204" pitchFamily="34" charset="0"/>
+              <a:buNone/>
+              <a:defRPr sz="1600" kern="1200">
+                <a:solidFill>
+                  <a:schemeClr val="tx1"/>
+                </a:solidFill>
+                <a:latin typeface="+mn-lt"/>
+                <a:ea typeface="+mn-ea"/>
+                <a:cs typeface="+mn-cs"/>
+              </a:defRPr>
+            </a:lvl4pPr>
+            <a:lvl5pPr marL="1828800" indent="0" algn="ctr" defTabSz="914400" rtl="0" eaLnBrk="1" latinLnBrk="0" hangingPunct="1">
+              <a:lnSpc>
+                <a:spcPct val="90000"/>
+              </a:lnSpc>
+              <a:spcBef>
+                <a:spcPts val="500"/>
+              </a:spcBef>
+              <a:buFont typeface="Arial" panose="020B0604020202020204" pitchFamily="34" charset="0"/>
+              <a:buNone/>
+              <a:defRPr sz="1600" kern="1200">
+                <a:solidFill>
+                  <a:schemeClr val="tx1"/>
+                </a:solidFill>
+                <a:latin typeface="+mn-lt"/>
+                <a:ea typeface="+mn-ea"/>
+                <a:cs typeface="+mn-cs"/>
+              </a:defRPr>
+            </a:lvl5pPr>
+            <a:lvl6pPr marL="2286000" indent="0" algn="ctr" defTabSz="914400" rtl="0" eaLnBrk="1" latinLnBrk="0" hangingPunct="1">
+              <a:lnSpc>
+                <a:spcPct val="90000"/>
+              </a:lnSpc>
+              <a:spcBef>
+                <a:spcPts val="500"/>
+              </a:spcBef>
+              <a:buFont typeface="Arial" panose="020B0604020202020204" pitchFamily="34" charset="0"/>
+              <a:buNone/>
+              <a:defRPr sz="1600" kern="1200">
+                <a:solidFill>
+                  <a:schemeClr val="tx1"/>
+                </a:solidFill>
+                <a:latin typeface="+mn-lt"/>
+                <a:ea typeface="+mn-ea"/>
+                <a:cs typeface="+mn-cs"/>
+              </a:defRPr>
+            </a:lvl6pPr>
+            <a:lvl7pPr marL="2743200" indent="0" algn="ctr" defTabSz="914400" rtl="0" eaLnBrk="1" latinLnBrk="0" hangingPunct="1">
+              <a:lnSpc>
+                <a:spcPct val="90000"/>
+              </a:lnSpc>
+              <a:spcBef>
+                <a:spcPts val="500"/>
+              </a:spcBef>
+              <a:buFont typeface="Arial" panose="020B0604020202020204" pitchFamily="34" charset="0"/>
+              <a:buNone/>
+              <a:defRPr sz="1600" kern="1200">
+                <a:solidFill>
+                  <a:schemeClr val="tx1"/>
+                </a:solidFill>
+                <a:latin typeface="+mn-lt"/>
+                <a:ea typeface="+mn-ea"/>
+                <a:cs typeface="+mn-cs"/>
+              </a:defRPr>
+            </a:lvl7pPr>
+            <a:lvl8pPr marL="3200400" indent="0" algn="ctr" defTabSz="914400" rtl="0" eaLnBrk="1" latinLnBrk="0" hangingPunct="1">
+              <a:lnSpc>
+                <a:spcPct val="90000"/>
+              </a:lnSpc>
+              <a:spcBef>
+                <a:spcPts val="500"/>
+              </a:spcBef>
+              <a:buFont typeface="Arial" panose="020B0604020202020204" pitchFamily="34" charset="0"/>
+              <a:buNone/>
+              <a:defRPr sz="1600" kern="1200">
+                <a:solidFill>
+                  <a:schemeClr val="tx1"/>
+                </a:solidFill>
+                <a:latin typeface="+mn-lt"/>
+                <a:ea typeface="+mn-ea"/>
+                <a:cs typeface="+mn-cs"/>
+              </a:defRPr>
+            </a:lvl8pPr>
+            <a:lvl9pPr marL="3657600" indent="0" algn="ctr" defTabSz="914400" rtl="0" eaLnBrk="1" latinLnBrk="0" hangingPunct="1">
+              <a:lnSpc>
+                <a:spcPct val="90000"/>
+              </a:lnSpc>
+              <a:spcBef>
+                <a:spcPts val="500"/>
+              </a:spcBef>
+              <a:buFont typeface="Arial" panose="020B0604020202020204" pitchFamily="34" charset="0"/>
+              <a:buNone/>
+              <a:defRPr sz="1600" kern="1200">
+                <a:solidFill>
+                  <a:schemeClr val="tx1"/>
+                </a:solidFill>
+                <a:latin typeface="+mn-lt"/>
+                <a:ea typeface="+mn-ea"/>
+                <a:cs typeface="+mn-cs"/>
+              </a:defRPr>
+            </a:lvl9pPr>
+          </a:lstStyle>
+          <a:p>
+            <a:r>
+              <a:rPr lang="en-US" sz="1600" dirty="0"/>
+              <a:t>Replication of Huang et al., 2014</a:t>
+            </a:r>
+          </a:p>
+          <a:p>
+            <a:pPr marL="342900" indent="-342900" algn="l">
+              <a:buFont typeface="Arial" panose="020B0604020202020204" pitchFamily="34" charset="0"/>
+              <a:buChar char="•"/>
+            </a:pPr>
+            <a:r>
+              <a:rPr lang="en-US" sz="1400" dirty="0"/>
+              <a:t>(3) </a:t>
+            </a:r>
+            <a:r>
+              <a:rPr lang="en-US" sz="1400" dirty="0" err="1"/>
+              <a:t>replicatable</a:t>
+            </a:r>
+            <a:endParaRPr lang="en-US" sz="1400" dirty="0"/>
+          </a:p>
+          <a:p>
+            <a:pPr marL="342900" indent="-342900" algn="l">
+              <a:buFont typeface="Arial" panose="020B0604020202020204" pitchFamily="34" charset="0"/>
+              <a:buChar char="•"/>
+            </a:pPr>
+            <a:r>
+              <a:rPr lang="en-US" sz="1400" dirty="0"/>
+              <a:t>(4) and (5) not </a:t>
+            </a:r>
+            <a:r>
+              <a:rPr lang="en-US" sz="1400" dirty="0" err="1"/>
+              <a:t>replicatable</a:t>
+            </a:r>
+            <a:endParaRPr lang="en-US" sz="1400" dirty="0"/>
+          </a:p>
+        </p:txBody>
+      </p:sp>
+      <p:cxnSp>
+        <p:nvCxnSpPr>
+          <p:cNvPr id="36" name="Straight Arrow Connector 35">
+            <a:extLst>
+              <a:ext uri="{FF2B5EF4-FFF2-40B4-BE49-F238E27FC236}">
+                <a16:creationId xmlns:a16="http://schemas.microsoft.com/office/drawing/2014/main" id="{D54DE2CC-92F2-40B0-99F5-7B9648EE0415}"/>
+              </a:ext>
+            </a:extLst>
+          </p:cNvPr>
+          <p:cNvCxnSpPr/>
+          <p:nvPr/>
+        </p:nvCxnSpPr>
+        <p:spPr>
+          <a:xfrm>
+            <a:off x="5468645" y="4808314"/>
+            <a:ext cx="0" cy="345550"/>
+          </a:xfrm>
+          <a:prstGeom prst="straightConnector1">
+            <a:avLst/>
+          </a:prstGeom>
+          <a:ln w="25400">
+            <a:tailEnd type="triangle"/>
+          </a:ln>
+        </p:spPr>
+        <p:style>
+          <a:lnRef idx="1">
+            <a:schemeClr val="accent1"/>
+          </a:lnRef>
+          <a:fillRef idx="0">
+            <a:schemeClr val="accent1"/>
+          </a:fillRef>
+          <a:effectRef idx="0">
+            <a:schemeClr val="accent1"/>
+          </a:effectRef>
+          <a:fontRef idx="minor">
+            <a:schemeClr val="tx1"/>
+          </a:fontRef>
+        </p:style>
+      </p:cxnSp>
+      <p:grpSp>
+        <p:nvGrpSpPr>
+          <p:cNvPr id="31" name="Group 30">
+            <a:extLst>
+              <a:ext uri="{FF2B5EF4-FFF2-40B4-BE49-F238E27FC236}">
+                <a16:creationId xmlns:a16="http://schemas.microsoft.com/office/drawing/2014/main" id="{9E578073-1093-4CEA-9E9E-0A9343811DC2}"/>
+              </a:ext>
+            </a:extLst>
+          </p:cNvPr>
+          <p:cNvGrpSpPr/>
+          <p:nvPr/>
+        </p:nvGrpSpPr>
+        <p:grpSpPr>
+          <a:xfrm>
+            <a:off x="6800295" y="5072518"/>
+            <a:ext cx="502471" cy="1296139"/>
+            <a:chOff x="6800295" y="5072518"/>
+            <a:chExt cx="502471" cy="1296139"/>
+          </a:xfrm>
+        </p:grpSpPr>
+        <p:cxnSp>
+          <p:nvCxnSpPr>
+            <p:cNvPr id="4" name="Straight Connector 3">
+              <a:extLst>
+                <a:ext uri="{FF2B5EF4-FFF2-40B4-BE49-F238E27FC236}">
+                  <a16:creationId xmlns:a16="http://schemas.microsoft.com/office/drawing/2014/main" id="{BB75A48A-34BF-4285-A0D1-530D8DBCE49C}"/>
+                </a:ext>
+              </a:extLst>
+            </p:cNvPr>
+            <p:cNvCxnSpPr>
+              <a:cxnSpLocks/>
+            </p:cNvCxnSpPr>
+            <p:nvPr/>
+          </p:nvCxnSpPr>
+          <p:spPr>
+            <a:xfrm>
+              <a:off x="6800295" y="5681708"/>
+              <a:ext cx="239697" cy="0"/>
+            </a:xfrm>
+            <a:prstGeom prst="line">
+              <a:avLst/>
+            </a:prstGeom>
+            <a:ln w="25400"/>
+          </p:spPr>
+          <p:style>
+            <a:lnRef idx="1">
+              <a:schemeClr val="accent1"/>
+            </a:lnRef>
+            <a:fillRef idx="0">
+              <a:schemeClr val="accent1"/>
+            </a:fillRef>
+            <a:effectRef idx="0">
+              <a:schemeClr val="accent1"/>
+            </a:effectRef>
+            <a:fontRef idx="minor">
+              <a:schemeClr val="tx1"/>
+            </a:fontRef>
+          </p:style>
+        </p:cxnSp>
+        <p:cxnSp>
+          <p:nvCxnSpPr>
+            <p:cNvPr id="10" name="Straight Connector 9">
+              <a:extLst>
+                <a:ext uri="{FF2B5EF4-FFF2-40B4-BE49-F238E27FC236}">
+                  <a16:creationId xmlns:a16="http://schemas.microsoft.com/office/drawing/2014/main" id="{2C512011-9AD5-4F17-94D5-142759AE6EE8}"/>
+                </a:ext>
+              </a:extLst>
+            </p:cNvPr>
+            <p:cNvCxnSpPr>
+              <a:cxnSpLocks/>
+            </p:cNvCxnSpPr>
+            <p:nvPr/>
+          </p:nvCxnSpPr>
+          <p:spPr>
+            <a:xfrm>
+              <a:off x="7039992" y="5072518"/>
+              <a:ext cx="0" cy="1296139"/>
+            </a:xfrm>
+            <a:prstGeom prst="line">
+              <a:avLst/>
+            </a:prstGeom>
+            <a:ln w="25400"/>
+          </p:spPr>
+          <p:style>
+            <a:lnRef idx="1">
+              <a:schemeClr val="accent1"/>
+            </a:lnRef>
+            <a:fillRef idx="0">
+              <a:schemeClr val="accent1"/>
+            </a:fillRef>
+            <a:effectRef idx="0">
+              <a:schemeClr val="accent1"/>
+            </a:effectRef>
+            <a:fontRef idx="minor">
+              <a:schemeClr val="tx1"/>
+            </a:fontRef>
+          </p:style>
+        </p:cxnSp>
+        <p:cxnSp>
+          <p:nvCxnSpPr>
+            <p:cNvPr id="12" name="Straight Arrow Connector 11">
+              <a:extLst>
+                <a:ext uri="{FF2B5EF4-FFF2-40B4-BE49-F238E27FC236}">
+                  <a16:creationId xmlns:a16="http://schemas.microsoft.com/office/drawing/2014/main" id="{0803E9B0-83A4-4098-862C-11BE424DE6B7}"/>
+                </a:ext>
+              </a:extLst>
+            </p:cNvPr>
+            <p:cNvCxnSpPr/>
+            <p:nvPr/>
+          </p:nvCxnSpPr>
+          <p:spPr>
+            <a:xfrm>
+              <a:off x="7039992" y="5078027"/>
+              <a:ext cx="262774" cy="0"/>
+            </a:xfrm>
+            <a:prstGeom prst="straightConnector1">
+              <a:avLst/>
+            </a:prstGeom>
+            <a:ln w="25400">
+              <a:tailEnd type="triangle"/>
+            </a:ln>
+          </p:spPr>
+          <p:style>
+            <a:lnRef idx="1">
+              <a:schemeClr val="accent1"/>
+            </a:lnRef>
+            <a:fillRef idx="0">
+              <a:schemeClr val="accent1"/>
+            </a:fillRef>
+            <a:effectRef idx="0">
+              <a:schemeClr val="accent1"/>
+            </a:effectRef>
+            <a:fontRef idx="minor">
+              <a:schemeClr val="tx1"/>
+            </a:fontRef>
+          </p:style>
+        </p:cxnSp>
+        <p:cxnSp>
+          <p:nvCxnSpPr>
+            <p:cNvPr id="32" name="Straight Arrow Connector 31">
+              <a:extLst>
+                <a:ext uri="{FF2B5EF4-FFF2-40B4-BE49-F238E27FC236}">
+                  <a16:creationId xmlns:a16="http://schemas.microsoft.com/office/drawing/2014/main" id="{60768CB1-BCDC-48F1-8446-DE7D90DBE464}"/>
+                </a:ext>
+              </a:extLst>
+            </p:cNvPr>
+            <p:cNvCxnSpPr/>
+            <p:nvPr/>
+          </p:nvCxnSpPr>
+          <p:spPr>
+            <a:xfrm>
+              <a:off x="7039992" y="6368657"/>
+              <a:ext cx="262774" cy="0"/>
+            </a:xfrm>
+            <a:prstGeom prst="straightConnector1">
+              <a:avLst/>
+            </a:prstGeom>
+            <a:ln w="25400">
+              <a:tailEnd type="triangle"/>
+            </a:ln>
+          </p:spPr>
+          <p:style>
+            <a:lnRef idx="1">
+              <a:schemeClr val="accent1"/>
+            </a:lnRef>
+            <a:fillRef idx="0">
+              <a:schemeClr val="accent1"/>
+            </a:fillRef>
+            <a:effectRef idx="0">
+              <a:schemeClr val="accent1"/>
+            </a:effectRef>
+            <a:fontRef idx="minor">
+              <a:schemeClr val="tx1"/>
+            </a:fontRef>
+          </p:style>
+        </p:cxnSp>
+        <p:cxnSp>
+          <p:nvCxnSpPr>
+            <p:cNvPr id="37" name="Straight Arrow Connector 36">
+              <a:extLst>
+                <a:ext uri="{FF2B5EF4-FFF2-40B4-BE49-F238E27FC236}">
+                  <a16:creationId xmlns:a16="http://schemas.microsoft.com/office/drawing/2014/main" id="{C86A46CC-952D-4F54-9CF5-E8630A0E9F9A}"/>
+                </a:ext>
+              </a:extLst>
+            </p:cNvPr>
+            <p:cNvCxnSpPr/>
+            <p:nvPr/>
+          </p:nvCxnSpPr>
+          <p:spPr>
+            <a:xfrm>
+              <a:off x="7039992" y="5681708"/>
+              <a:ext cx="262774" cy="0"/>
             </a:xfrm>
             <a:prstGeom prst="straightConnector1">
               <a:avLst/>
@@ -15341,7 +15953,7 @@
         </p:spPr>
         <p:txBody>
           <a:bodyPr vert="horz" lIns="91440" tIns="45720" rIns="91440" bIns="45720" rtlCol="0">
-            <a:normAutofit fontScale="92500" lnSpcReduction="10000"/>
+            <a:normAutofit fontScale="85000" lnSpcReduction="10000"/>
           </a:bodyPr>
           <a:lstStyle>
             <a:lvl1pPr marL="0" indent="0" algn="ctr" defTabSz="914400" rtl="0" eaLnBrk="1" latinLnBrk="0" hangingPunct="1">
@@ -15569,6 +16181,17 @@
           <a:p>
             <a:pPr algn="l"/>
             <a:r>
+              <a:rPr lang="en-US" sz="1400" dirty="0">
+                <a:solidFill>
+                  <a:schemeClr val="bg1"/>
+                </a:solidFill>
+                <a:highlight>
+                  <a:srgbClr val="FF0000"/>
+                </a:highlight>
+              </a:rPr>
+              <a:t>HT1 </a:t>
+            </a:r>
+            <a:r>
               <a:rPr lang="en-US" sz="1400" dirty="0" err="1">
                 <a:solidFill>
                   <a:schemeClr val="bg1"/>
@@ -15588,7 +16211,7 @@
                   <a:srgbClr val="FF0000"/>
                 </a:highlight>
               </a:rPr>
-              <a:t> (T4), but ABTONE main results not significant (T5) </a:t>
+              <a:t> (T4), but ABTONE main results in my paper not significant (T5) </a:t>
             </a:r>
           </a:p>
         </p:txBody>

</xml_diff>

<commit_message>
small modifications: change id_crsp_comp_text.csv to crsp_comp_edgar.csv
</commit_message>
<xml_diff>
--- a/output/Figures.pptx
+++ b/output/Figures.pptx
@@ -17639,7 +17639,7 @@
         <p:spPr>
           <a:xfrm>
             <a:off x="3317899" y="5807682"/>
-            <a:ext cx="8456173" cy="923330"/>
+            <a:ext cx="8676707" cy="646331"/>
           </a:xfrm>
           <a:prstGeom prst="rect">
             <a:avLst/>
@@ -17750,11 +17750,11 @@
               <a:t>*</a:t>
             </a:r>
             <a:r>
-              <a:rPr lang="en-US"/>
+              <a:rPr lang="en-US" dirty="0" err="1"/>
               <a:t>DRET</a:t>
             </a:r>
             <a:r>
-              <a:rPr lang="en-US" baseline="-25000"/>
+              <a:rPr lang="en-US" baseline="-25000" dirty="0" err="1"/>
               <a:t>t-tlag</a:t>
             </a:r>
             <a:r>

</xml_diff>

<commit_message>
add 8-K results and TLAG logistic model
</commit_message>
<xml_diff>
--- a/output/Figures.pptx
+++ b/output/Figures.pptx
@@ -263,7 +263,7 @@
           <a:p>
             <a:fld id="{F6465CF2-20FA-4A27-B5DD-24B9293428AE}" type="datetimeFigureOut">
               <a:rPr lang="en-US" smtClean="0"/>
-              <a:t>5/4/2020</a:t>
+              <a:t>5/7/2020</a:t>
             </a:fld>
             <a:endParaRPr lang="en-US"/>
           </a:p>
@@ -461,7 +461,7 @@
           <a:p>
             <a:fld id="{F6465CF2-20FA-4A27-B5DD-24B9293428AE}" type="datetimeFigureOut">
               <a:rPr lang="en-US" smtClean="0"/>
-              <a:t>5/4/2020</a:t>
+              <a:t>5/7/2020</a:t>
             </a:fld>
             <a:endParaRPr lang="en-US"/>
           </a:p>
@@ -669,7 +669,7 @@
           <a:p>
             <a:fld id="{F6465CF2-20FA-4A27-B5DD-24B9293428AE}" type="datetimeFigureOut">
               <a:rPr lang="en-US" smtClean="0"/>
-              <a:t>5/4/2020</a:t>
+              <a:t>5/7/2020</a:t>
             </a:fld>
             <a:endParaRPr lang="en-US"/>
           </a:p>
@@ -867,7 +867,7 @@
           <a:p>
             <a:fld id="{F6465CF2-20FA-4A27-B5DD-24B9293428AE}" type="datetimeFigureOut">
               <a:rPr lang="en-US" smtClean="0"/>
-              <a:t>5/4/2020</a:t>
+              <a:t>5/7/2020</a:t>
             </a:fld>
             <a:endParaRPr lang="en-US"/>
           </a:p>
@@ -1142,7 +1142,7 @@
           <a:p>
             <a:fld id="{F6465CF2-20FA-4A27-B5DD-24B9293428AE}" type="datetimeFigureOut">
               <a:rPr lang="en-US" smtClean="0"/>
-              <a:t>5/4/2020</a:t>
+              <a:t>5/7/2020</a:t>
             </a:fld>
             <a:endParaRPr lang="en-US"/>
           </a:p>
@@ -1407,7 +1407,7 @@
           <a:p>
             <a:fld id="{F6465CF2-20FA-4A27-B5DD-24B9293428AE}" type="datetimeFigureOut">
               <a:rPr lang="en-US" smtClean="0"/>
-              <a:t>5/4/2020</a:t>
+              <a:t>5/7/2020</a:t>
             </a:fld>
             <a:endParaRPr lang="en-US"/>
           </a:p>
@@ -1819,7 +1819,7 @@
           <a:p>
             <a:fld id="{F6465CF2-20FA-4A27-B5DD-24B9293428AE}" type="datetimeFigureOut">
               <a:rPr lang="en-US" smtClean="0"/>
-              <a:t>5/4/2020</a:t>
+              <a:t>5/7/2020</a:t>
             </a:fld>
             <a:endParaRPr lang="en-US"/>
           </a:p>
@@ -1960,7 +1960,7 @@
           <a:p>
             <a:fld id="{F6465CF2-20FA-4A27-B5DD-24B9293428AE}" type="datetimeFigureOut">
               <a:rPr lang="en-US" smtClean="0"/>
-              <a:t>5/4/2020</a:t>
+              <a:t>5/7/2020</a:t>
             </a:fld>
             <a:endParaRPr lang="en-US"/>
           </a:p>
@@ -2073,7 +2073,7 @@
           <a:p>
             <a:fld id="{F6465CF2-20FA-4A27-B5DD-24B9293428AE}" type="datetimeFigureOut">
               <a:rPr lang="en-US" smtClean="0"/>
-              <a:t>5/4/2020</a:t>
+              <a:t>5/7/2020</a:t>
             </a:fld>
             <a:endParaRPr lang="en-US"/>
           </a:p>
@@ -2384,7 +2384,7 @@
           <a:p>
             <a:fld id="{F6465CF2-20FA-4A27-B5DD-24B9293428AE}" type="datetimeFigureOut">
               <a:rPr lang="en-US" smtClean="0"/>
-              <a:t>5/4/2020</a:t>
+              <a:t>5/7/2020</a:t>
             </a:fld>
             <a:endParaRPr lang="en-US"/>
           </a:p>
@@ -2672,7 +2672,7 @@
           <a:p>
             <a:fld id="{F6465CF2-20FA-4A27-B5DD-24B9293428AE}" type="datetimeFigureOut">
               <a:rPr lang="en-US" smtClean="0"/>
-              <a:t>5/4/2020</a:t>
+              <a:t>5/7/2020</a:t>
             </a:fld>
             <a:endParaRPr lang="en-US"/>
           </a:p>
@@ -2913,7 +2913,7 @@
           <a:p>
             <a:fld id="{F6465CF2-20FA-4A27-B5DD-24B9293428AE}" type="datetimeFigureOut">
               <a:rPr lang="en-US" smtClean="0"/>
-              <a:t>5/4/2020</a:t>
+              <a:t>5/7/2020</a:t>
             </a:fld>
             <a:endParaRPr lang="en-US"/>
           </a:p>
@@ -6690,7 +6690,11 @@
           </a:p>
           <a:p>
             <a:r>
-              <a:rPr lang="en-US" sz="1800" dirty="0"/>
+              <a:rPr lang="en-US" sz="1800" dirty="0">
+                <a:highlight>
+                  <a:srgbClr val="00FFFF"/>
+                </a:highlight>
+              </a:rPr>
               <a:t>ABTONE – Huang et al. 2014</a:t>
             </a:r>
           </a:p>
@@ -10132,7 +10136,7 @@
             <a:r>
               <a:rPr lang="en-US" sz="1400" dirty="0">
                 <a:highlight>
-                  <a:srgbClr val="FF0000"/>
+                  <a:srgbClr val="808000"/>
                 </a:highlight>
               </a:rPr>
               <a:t>190,</a:t>
@@ -10140,14 +10144,14 @@
             <a:r>
               <a:rPr lang="en-US" altLang="zh-CN" sz="1400" dirty="0">
                 <a:highlight>
-                  <a:srgbClr val="FF0000"/>
+                  <a:srgbClr val="808000"/>
                 </a:highlight>
               </a:rPr>
               <a:t>341</a:t>
             </a:r>
             <a:endParaRPr lang="en-US" sz="1400" dirty="0">
               <a:highlight>
-                <a:srgbClr val="FF0000"/>
+                <a:srgbClr val="808000"/>
               </a:highlight>
             </a:endParaRPr>
           </a:p>
@@ -10584,8 +10588,8 @@
         </p:nvSpPr>
         <p:spPr>
           <a:xfrm>
-            <a:off x="4381359" y="6612674"/>
-            <a:ext cx="8340569" cy="301374"/>
+            <a:off x="9224473" y="6612673"/>
+            <a:ext cx="2967527" cy="245327"/>
           </a:xfrm>
           <a:prstGeom prst="rect">
             <a:avLst/>
@@ -10593,7 +10597,7 @@
         </p:spPr>
         <p:txBody>
           <a:bodyPr vert="horz" lIns="91440" tIns="45720" rIns="91440" bIns="45720" rtlCol="0">
-            <a:normAutofit fontScale="92500"/>
+            <a:normAutofit fontScale="92500" lnSpcReduction="20000"/>
           </a:bodyPr>
           <a:lstStyle>
             <a:lvl1pPr marL="0" indent="0" algn="ctr" defTabSz="914400" rtl="0" eaLnBrk="1" latinLnBrk="0" hangingPunct="1">
@@ -10767,7 +10771,7 @@
                   <a:srgbClr val="C0C0C0"/>
                 </a:highlight>
               </a:rPr>
-              <a:t>* For example, dropping non-positive total asset and book equity, 10-Q words less than 1% quantile etc., see code.</a:t>
+              <a:t>* see variable screening criterion in code</a:t>
             </a:r>
           </a:p>
         </p:txBody>
@@ -10786,8 +10790,8 @@
         </p:nvSpPr>
         <p:spPr>
           <a:xfrm>
-            <a:off x="3713825" y="5918645"/>
-            <a:ext cx="7438079" cy="646331"/>
+            <a:off x="6469481" y="5911887"/>
+            <a:ext cx="879404" cy="369332"/>
           </a:xfrm>
           <a:prstGeom prst="rect">
             <a:avLst/>
@@ -10801,117 +10805,7 @@
           <a:p>
             <a:r>
               <a:rPr lang="en-US" b="1" dirty="0"/>
-              <a:t>TABLE 1: </a:t>
-            </a:r>
-            <a:r>
-              <a:rPr lang="en-US" dirty="0"/>
-              <a:t>Summary statistics</a:t>
-            </a:r>
-          </a:p>
-          <a:p>
-            <a:r>
-              <a:rPr lang="en-US" b="1" dirty="0"/>
-              <a:t>TABLE 2: </a:t>
-            </a:r>
-            <a:r>
-              <a:rPr lang="en-US" dirty="0" err="1"/>
-              <a:t>Doc_measure</a:t>
-            </a:r>
-            <a:r>
-              <a:rPr lang="en-US" baseline="-25000" dirty="0" err="1"/>
-              <a:t>t</a:t>
-            </a:r>
-            <a:r>
-              <a:rPr lang="en-US" dirty="0"/>
-              <a:t> = b</a:t>
-            </a:r>
-            <a:r>
-              <a:rPr lang="en-US" baseline="-25000" dirty="0"/>
-              <a:t>0</a:t>
-            </a:r>
-            <a:r>
-              <a:rPr lang="en-US" dirty="0"/>
-              <a:t> + b</a:t>
-            </a:r>
-            <a:r>
-              <a:rPr lang="en-US" baseline="-25000" dirty="0"/>
-              <a:t>1</a:t>
-            </a:r>
-            <a:r>
-              <a:rPr lang="en-US" dirty="0"/>
-              <a:t>*</a:t>
-            </a:r>
-            <a:r>
-              <a:rPr lang="en-US" dirty="0" err="1"/>
-              <a:t>RET</a:t>
-            </a:r>
-            <a:r>
-              <a:rPr lang="en-US" baseline="-25000" dirty="0" err="1"/>
-              <a:t>t</a:t>
-            </a:r>
-            <a:r>
-              <a:rPr lang="en-US" dirty="0"/>
-              <a:t> + b</a:t>
-            </a:r>
-            <a:r>
-              <a:rPr lang="en-US" baseline="-25000" dirty="0"/>
-              <a:t>2</a:t>
-            </a:r>
-            <a:r>
-              <a:rPr lang="en-US" dirty="0"/>
-              <a:t>*</a:t>
-            </a:r>
-            <a:r>
-              <a:rPr lang="en-US" dirty="0" err="1"/>
-              <a:t>NEG</a:t>
-            </a:r>
-            <a:r>
-              <a:rPr lang="en-US" baseline="-25000" dirty="0" err="1"/>
-              <a:t>t</a:t>
-            </a:r>
-            <a:r>
-              <a:rPr lang="en-US" dirty="0"/>
-              <a:t> + b</a:t>
-            </a:r>
-            <a:r>
-              <a:rPr lang="en-US" baseline="-25000" dirty="0"/>
-              <a:t>3</a:t>
-            </a:r>
-            <a:r>
-              <a:rPr lang="en-US" dirty="0"/>
-              <a:t>*</a:t>
-            </a:r>
-            <a:r>
-              <a:rPr lang="en-US" dirty="0" err="1"/>
-              <a:t>RET</a:t>
-            </a:r>
-            <a:r>
-              <a:rPr lang="en-US" baseline="-25000" dirty="0" err="1"/>
-              <a:t>t</a:t>
-            </a:r>
-            <a:r>
-              <a:rPr lang="en-US" dirty="0"/>
-              <a:t>*</a:t>
-            </a:r>
-            <a:r>
-              <a:rPr lang="en-US" dirty="0" err="1"/>
-              <a:t>NEG</a:t>
-            </a:r>
-            <a:r>
-              <a:rPr lang="en-US" baseline="-25000" dirty="0" err="1"/>
-              <a:t>t</a:t>
-            </a:r>
-            <a:r>
-              <a:rPr lang="en-US" dirty="0"/>
-              <a:t> + </a:t>
-            </a:r>
-            <a:r>
-              <a:rPr lang="en-US" dirty="0" err="1"/>
-              <a:t>controls</a:t>
-            </a:r>
-            <a:r>
-              <a:rPr lang="en-US" baseline="-25000" dirty="0" err="1"/>
-              <a:t>t</a:t>
+              <a:t>CONT.</a:t>
             </a:r>
             <a:endParaRPr lang="en-US" dirty="0"/>
           </a:p>
@@ -13392,8 +13286,8 @@
         </p:nvSpPr>
         <p:spPr>
           <a:xfrm>
-            <a:off x="9237437" y="4691712"/>
-            <a:ext cx="3056439" cy="503069"/>
+            <a:off x="9237437" y="4038256"/>
+            <a:ext cx="2900184" cy="503069"/>
           </a:xfrm>
           <a:prstGeom prst="rect">
             <a:avLst/>
@@ -13571,318 +13465,12 @@
             <a:pPr algn="l"/>
             <a:r>
               <a:rPr lang="en-US" sz="1400" b="1" dirty="0"/>
-              <a:t>TABLE 6</a:t>
+              <a:t>OAT2</a:t>
             </a:r>
             <a:r>
               <a:rPr lang="en-US" sz="1400" dirty="0"/>
               <a:t>: Huang et al., 2014 main results replication; Equation (4) and (5) </a:t>
             </a:r>
-          </a:p>
-        </p:txBody>
-      </p:sp>
-      <p:sp>
-        <p:nvSpPr>
-          <p:cNvPr id="33" name="Subtitle 2">
-            <a:extLst>
-              <a:ext uri="{FF2B5EF4-FFF2-40B4-BE49-F238E27FC236}">
-                <a16:creationId xmlns:a16="http://schemas.microsoft.com/office/drawing/2014/main" id="{E8DDF53F-2743-4AA9-9F93-1DF90111ACE2}"/>
-              </a:ext>
-            </a:extLst>
-          </p:cNvPr>
-          <p:cNvSpPr txBox="1">
-            <a:spLocks/>
-          </p:cNvSpPr>
-          <p:nvPr/>
-        </p:nvSpPr>
-        <p:spPr>
-          <a:xfrm>
-            <a:off x="1905000" y="5236663"/>
-            <a:ext cx="4044055" cy="631654"/>
-          </a:xfrm>
-          <a:prstGeom prst="rect">
-            <a:avLst/>
-          </a:prstGeom>
-        </p:spPr>
-        <p:txBody>
-          <a:bodyPr vert="horz" lIns="91440" tIns="45720" rIns="91440" bIns="45720" rtlCol="0">
-            <a:normAutofit fontScale="85000" lnSpcReduction="10000"/>
-          </a:bodyPr>
-          <a:lstStyle>
-            <a:lvl1pPr marL="0" indent="0" algn="ctr" defTabSz="914400" rtl="0" eaLnBrk="1" latinLnBrk="0" hangingPunct="1">
-              <a:lnSpc>
-                <a:spcPct val="90000"/>
-              </a:lnSpc>
-              <a:spcBef>
-                <a:spcPts val="1000"/>
-              </a:spcBef>
-              <a:buFont typeface="Arial" panose="020B0604020202020204" pitchFamily="34" charset="0"/>
-              <a:buNone/>
-              <a:defRPr sz="2400" kern="1200">
-                <a:solidFill>
-                  <a:schemeClr val="tx1"/>
-                </a:solidFill>
-                <a:latin typeface="+mn-lt"/>
-                <a:ea typeface="+mn-ea"/>
-                <a:cs typeface="+mn-cs"/>
-              </a:defRPr>
-            </a:lvl1pPr>
-            <a:lvl2pPr marL="457200" indent="0" algn="ctr" defTabSz="914400" rtl="0" eaLnBrk="1" latinLnBrk="0" hangingPunct="1">
-              <a:lnSpc>
-                <a:spcPct val="90000"/>
-              </a:lnSpc>
-              <a:spcBef>
-                <a:spcPts val="500"/>
-              </a:spcBef>
-              <a:buFont typeface="Arial" panose="020B0604020202020204" pitchFamily="34" charset="0"/>
-              <a:buNone/>
-              <a:defRPr sz="2000" kern="1200">
-                <a:solidFill>
-                  <a:schemeClr val="tx1"/>
-                </a:solidFill>
-                <a:latin typeface="+mn-lt"/>
-                <a:ea typeface="+mn-ea"/>
-                <a:cs typeface="+mn-cs"/>
-              </a:defRPr>
-            </a:lvl2pPr>
-            <a:lvl3pPr marL="914400" indent="0" algn="ctr" defTabSz="914400" rtl="0" eaLnBrk="1" latinLnBrk="0" hangingPunct="1">
-              <a:lnSpc>
-                <a:spcPct val="90000"/>
-              </a:lnSpc>
-              <a:spcBef>
-                <a:spcPts val="500"/>
-              </a:spcBef>
-              <a:buFont typeface="Arial" panose="020B0604020202020204" pitchFamily="34" charset="0"/>
-              <a:buNone/>
-              <a:defRPr sz="1800" kern="1200">
-                <a:solidFill>
-                  <a:schemeClr val="tx1"/>
-                </a:solidFill>
-                <a:latin typeface="+mn-lt"/>
-                <a:ea typeface="+mn-ea"/>
-                <a:cs typeface="+mn-cs"/>
-              </a:defRPr>
-            </a:lvl3pPr>
-            <a:lvl4pPr marL="1371600" indent="0" algn="ctr" defTabSz="914400" rtl="0" eaLnBrk="1" latinLnBrk="0" hangingPunct="1">
-              <a:lnSpc>
-                <a:spcPct val="90000"/>
-              </a:lnSpc>
-              <a:spcBef>
-                <a:spcPts val="500"/>
-              </a:spcBef>
-              <a:buFont typeface="Arial" panose="020B0604020202020204" pitchFamily="34" charset="0"/>
-              <a:buNone/>
-              <a:defRPr sz="1600" kern="1200">
-                <a:solidFill>
-                  <a:schemeClr val="tx1"/>
-                </a:solidFill>
-                <a:latin typeface="+mn-lt"/>
-                <a:ea typeface="+mn-ea"/>
-                <a:cs typeface="+mn-cs"/>
-              </a:defRPr>
-            </a:lvl4pPr>
-            <a:lvl5pPr marL="1828800" indent="0" algn="ctr" defTabSz="914400" rtl="0" eaLnBrk="1" latinLnBrk="0" hangingPunct="1">
-              <a:lnSpc>
-                <a:spcPct val="90000"/>
-              </a:lnSpc>
-              <a:spcBef>
-                <a:spcPts val="500"/>
-              </a:spcBef>
-              <a:buFont typeface="Arial" panose="020B0604020202020204" pitchFamily="34" charset="0"/>
-              <a:buNone/>
-              <a:defRPr sz="1600" kern="1200">
-                <a:solidFill>
-                  <a:schemeClr val="tx1"/>
-                </a:solidFill>
-                <a:latin typeface="+mn-lt"/>
-                <a:ea typeface="+mn-ea"/>
-                <a:cs typeface="+mn-cs"/>
-              </a:defRPr>
-            </a:lvl5pPr>
-            <a:lvl6pPr marL="2286000" indent="0" algn="ctr" defTabSz="914400" rtl="0" eaLnBrk="1" latinLnBrk="0" hangingPunct="1">
-              <a:lnSpc>
-                <a:spcPct val="90000"/>
-              </a:lnSpc>
-              <a:spcBef>
-                <a:spcPts val="500"/>
-              </a:spcBef>
-              <a:buFont typeface="Arial" panose="020B0604020202020204" pitchFamily="34" charset="0"/>
-              <a:buNone/>
-              <a:defRPr sz="1600" kern="1200">
-                <a:solidFill>
-                  <a:schemeClr val="tx1"/>
-                </a:solidFill>
-                <a:latin typeface="+mn-lt"/>
-                <a:ea typeface="+mn-ea"/>
-                <a:cs typeface="+mn-cs"/>
-              </a:defRPr>
-            </a:lvl6pPr>
-            <a:lvl7pPr marL="2743200" indent="0" algn="ctr" defTabSz="914400" rtl="0" eaLnBrk="1" latinLnBrk="0" hangingPunct="1">
-              <a:lnSpc>
-                <a:spcPct val="90000"/>
-              </a:lnSpc>
-              <a:spcBef>
-                <a:spcPts val="500"/>
-              </a:spcBef>
-              <a:buFont typeface="Arial" panose="020B0604020202020204" pitchFamily="34" charset="0"/>
-              <a:buNone/>
-              <a:defRPr sz="1600" kern="1200">
-                <a:solidFill>
-                  <a:schemeClr val="tx1"/>
-                </a:solidFill>
-                <a:latin typeface="+mn-lt"/>
-                <a:ea typeface="+mn-ea"/>
-                <a:cs typeface="+mn-cs"/>
-              </a:defRPr>
-            </a:lvl7pPr>
-            <a:lvl8pPr marL="3200400" indent="0" algn="ctr" defTabSz="914400" rtl="0" eaLnBrk="1" latinLnBrk="0" hangingPunct="1">
-              <a:lnSpc>
-                <a:spcPct val="90000"/>
-              </a:lnSpc>
-              <a:spcBef>
-                <a:spcPts val="500"/>
-              </a:spcBef>
-              <a:buFont typeface="Arial" panose="020B0604020202020204" pitchFamily="34" charset="0"/>
-              <a:buNone/>
-              <a:defRPr sz="1600" kern="1200">
-                <a:solidFill>
-                  <a:schemeClr val="tx1"/>
-                </a:solidFill>
-                <a:latin typeface="+mn-lt"/>
-                <a:ea typeface="+mn-ea"/>
-                <a:cs typeface="+mn-cs"/>
-              </a:defRPr>
-            </a:lvl8pPr>
-            <a:lvl9pPr marL="3657600" indent="0" algn="ctr" defTabSz="914400" rtl="0" eaLnBrk="1" latinLnBrk="0" hangingPunct="1">
-              <a:lnSpc>
-                <a:spcPct val="90000"/>
-              </a:lnSpc>
-              <a:spcBef>
-                <a:spcPts val="500"/>
-              </a:spcBef>
-              <a:buFont typeface="Arial" panose="020B0604020202020204" pitchFamily="34" charset="0"/>
-              <a:buNone/>
-              <a:defRPr sz="1600" kern="1200">
-                <a:solidFill>
-                  <a:schemeClr val="tx1"/>
-                </a:solidFill>
-                <a:latin typeface="+mn-lt"/>
-                <a:ea typeface="+mn-ea"/>
-                <a:cs typeface="+mn-cs"/>
-              </a:defRPr>
-            </a:lvl9pPr>
-          </a:lstStyle>
-          <a:p>
-            <a:r>
-              <a:rPr lang="en-US" sz="1400" b="1" dirty="0"/>
-              <a:t>TABLE 5: </a:t>
-            </a:r>
-            <a:r>
-              <a:rPr lang="en-US" sz="1400" dirty="0"/>
-              <a:t>Integrate ABTONE into my study</a:t>
-            </a:r>
-          </a:p>
-          <a:p>
-            <a:r>
-              <a:rPr lang="en-US" sz="1400" dirty="0" err="1"/>
-              <a:t>ABTONE</a:t>
-            </a:r>
-            <a:r>
-              <a:rPr lang="en-US" sz="1400" baseline="-25000" dirty="0" err="1"/>
-              <a:t>t</a:t>
-            </a:r>
-            <a:r>
-              <a:rPr lang="en-US" sz="1400" dirty="0"/>
-              <a:t> = b</a:t>
-            </a:r>
-            <a:r>
-              <a:rPr lang="en-US" sz="1400" baseline="-25000" dirty="0"/>
-              <a:t>0</a:t>
-            </a:r>
-            <a:r>
-              <a:rPr lang="en-US" sz="1400" dirty="0"/>
-              <a:t> + b</a:t>
-            </a:r>
-            <a:r>
-              <a:rPr lang="en-US" sz="1400" baseline="-25000" dirty="0"/>
-              <a:t>1</a:t>
-            </a:r>
-            <a:r>
-              <a:rPr lang="en-US" sz="1400" dirty="0"/>
-              <a:t>*</a:t>
-            </a:r>
-            <a:r>
-              <a:rPr lang="en-US" sz="1400" dirty="0" err="1"/>
-              <a:t>RET</a:t>
-            </a:r>
-            <a:r>
-              <a:rPr lang="en-US" sz="1400" baseline="-25000" dirty="0" err="1"/>
-              <a:t>t</a:t>
-            </a:r>
-            <a:r>
-              <a:rPr lang="en-US" sz="1400" dirty="0"/>
-              <a:t> + b</a:t>
-            </a:r>
-            <a:r>
-              <a:rPr lang="en-US" sz="1400" baseline="-25000" dirty="0"/>
-              <a:t>2</a:t>
-            </a:r>
-            <a:r>
-              <a:rPr lang="en-US" sz="1400" dirty="0"/>
-              <a:t>*</a:t>
-            </a:r>
-            <a:r>
-              <a:rPr lang="en-US" sz="1400" dirty="0" err="1"/>
-              <a:t>NEG</a:t>
-            </a:r>
-            <a:r>
-              <a:rPr lang="en-US" sz="1400" baseline="-25000" dirty="0" err="1"/>
-              <a:t>t</a:t>
-            </a:r>
-            <a:r>
-              <a:rPr lang="en-US" sz="1400" dirty="0"/>
-              <a:t> + b</a:t>
-            </a:r>
-            <a:r>
-              <a:rPr lang="en-US" sz="1400" baseline="-25000" dirty="0"/>
-              <a:t>3</a:t>
-            </a:r>
-            <a:r>
-              <a:rPr lang="en-US" sz="1400" dirty="0"/>
-              <a:t>*</a:t>
-            </a:r>
-            <a:r>
-              <a:rPr lang="en-US" sz="1400" dirty="0" err="1"/>
-              <a:t>RET</a:t>
-            </a:r>
-            <a:r>
-              <a:rPr lang="en-US" sz="1400" baseline="-25000" dirty="0" err="1"/>
-              <a:t>t</a:t>
-            </a:r>
-            <a:r>
-              <a:rPr lang="en-US" sz="1400" dirty="0"/>
-              <a:t>*</a:t>
-            </a:r>
-            <a:r>
-              <a:rPr lang="en-US" sz="1400" dirty="0" err="1"/>
-              <a:t>NEG</a:t>
-            </a:r>
-            <a:r>
-              <a:rPr lang="en-US" sz="1400" baseline="-25000" dirty="0" err="1"/>
-              <a:t>t</a:t>
-            </a:r>
-            <a:r>
-              <a:rPr lang="en-US" sz="1400" dirty="0"/>
-              <a:t> + </a:t>
-            </a:r>
-            <a:r>
-              <a:rPr lang="en-US" sz="1400" dirty="0" err="1"/>
-              <a:t>controls</a:t>
-            </a:r>
-            <a:r>
-              <a:rPr lang="en-US" sz="1400" baseline="-25000" dirty="0" err="1"/>
-              <a:t>t</a:t>
-            </a:r>
-            <a:endParaRPr lang="en-US" sz="1400" dirty="0"/>
           </a:p>
         </p:txBody>
       </p:sp>
@@ -14417,8 +14005,8 @@
         </p:nvCxnSpPr>
         <p:spPr>
           <a:xfrm>
-            <a:off x="5949057" y="4240031"/>
-            <a:ext cx="332498" cy="1"/>
+            <a:off x="6180442" y="4202767"/>
+            <a:ext cx="253181" cy="0"/>
           </a:xfrm>
           <a:prstGeom prst="straightConnector1">
             <a:avLst/>
@@ -14458,8 +14046,8 @@
         </p:nvCxnSpPr>
         <p:spPr>
           <a:xfrm>
-            <a:off x="9044099" y="4357916"/>
-            <a:ext cx="387037" cy="288644"/>
+            <a:off x="9044099" y="4265948"/>
+            <a:ext cx="193338" cy="1"/>
           </a:xfrm>
           <a:prstGeom prst="straightConnector1">
             <a:avLst/>
@@ -14483,251 +14071,6 @@
           </a:fontRef>
         </p:style>
       </p:cxnSp>
-      <p:cxnSp>
-        <p:nvCxnSpPr>
-          <p:cNvPr id="63" name="Straight Arrow Connector 62">
-            <a:extLst>
-              <a:ext uri="{FF2B5EF4-FFF2-40B4-BE49-F238E27FC236}">
-                <a16:creationId xmlns:a16="http://schemas.microsoft.com/office/drawing/2014/main" id="{7888C0DF-E94B-46B9-9A6E-CF4A3EFA5C24}"/>
-              </a:ext>
-            </a:extLst>
-          </p:cNvPr>
-          <p:cNvCxnSpPr>
-            <a:cxnSpLocks/>
-          </p:cNvCxnSpPr>
-          <p:nvPr/>
-        </p:nvCxnSpPr>
-        <p:spPr>
-          <a:xfrm flipV="1">
-            <a:off x="9043738" y="3664481"/>
-            <a:ext cx="387398" cy="251765"/>
-          </a:xfrm>
-          <a:prstGeom prst="straightConnector1">
-            <a:avLst/>
-          </a:prstGeom>
-          <a:ln w="25400">
-            <a:tailEnd type="triangle"/>
-          </a:ln>
-        </p:spPr>
-        <p:style>
-          <a:lnRef idx="1">
-            <a:schemeClr val="accent1"/>
-          </a:lnRef>
-          <a:fillRef idx="0">
-            <a:schemeClr val="accent1"/>
-          </a:fillRef>
-          <a:effectRef idx="0">
-            <a:schemeClr val="accent1"/>
-          </a:effectRef>
-          <a:fontRef idx="minor">
-            <a:schemeClr val="tx1"/>
-          </a:fontRef>
-        </p:style>
-      </p:cxnSp>
-      <p:sp>
-        <p:nvSpPr>
-          <p:cNvPr id="64" name="Subtitle 2">
-            <a:extLst>
-              <a:ext uri="{FF2B5EF4-FFF2-40B4-BE49-F238E27FC236}">
-                <a16:creationId xmlns:a16="http://schemas.microsoft.com/office/drawing/2014/main" id="{0B23A04E-AC32-454B-809C-1E92A44468F3}"/>
-              </a:ext>
-            </a:extLst>
-          </p:cNvPr>
-          <p:cNvSpPr txBox="1">
-            <a:spLocks/>
-          </p:cNvSpPr>
-          <p:nvPr/>
-        </p:nvSpPr>
-        <p:spPr>
-          <a:xfrm>
-            <a:off x="9361225" y="3340391"/>
-            <a:ext cx="2760857" cy="721213"/>
-          </a:xfrm>
-          <a:prstGeom prst="rect">
-            <a:avLst/>
-          </a:prstGeom>
-        </p:spPr>
-        <p:txBody>
-          <a:bodyPr vert="horz" lIns="91440" tIns="45720" rIns="91440" bIns="45720" rtlCol="0">
-            <a:noAutofit/>
-          </a:bodyPr>
-          <a:lstStyle>
-            <a:lvl1pPr marL="0" indent="0" algn="ctr" defTabSz="914400" rtl="0" eaLnBrk="1" latinLnBrk="0" hangingPunct="1">
-              <a:lnSpc>
-                <a:spcPct val="90000"/>
-              </a:lnSpc>
-              <a:spcBef>
-                <a:spcPts val="1000"/>
-              </a:spcBef>
-              <a:buFont typeface="Arial" panose="020B0604020202020204" pitchFamily="34" charset="0"/>
-              <a:buNone/>
-              <a:defRPr sz="2400" kern="1200">
-                <a:solidFill>
-                  <a:schemeClr val="tx1"/>
-                </a:solidFill>
-                <a:latin typeface="+mn-lt"/>
-                <a:ea typeface="+mn-ea"/>
-                <a:cs typeface="+mn-cs"/>
-              </a:defRPr>
-            </a:lvl1pPr>
-            <a:lvl2pPr marL="457200" indent="0" algn="ctr" defTabSz="914400" rtl="0" eaLnBrk="1" latinLnBrk="0" hangingPunct="1">
-              <a:lnSpc>
-                <a:spcPct val="90000"/>
-              </a:lnSpc>
-              <a:spcBef>
-                <a:spcPts val="500"/>
-              </a:spcBef>
-              <a:buFont typeface="Arial" panose="020B0604020202020204" pitchFamily="34" charset="0"/>
-              <a:buNone/>
-              <a:defRPr sz="2000" kern="1200">
-                <a:solidFill>
-                  <a:schemeClr val="tx1"/>
-                </a:solidFill>
-                <a:latin typeface="+mn-lt"/>
-                <a:ea typeface="+mn-ea"/>
-                <a:cs typeface="+mn-cs"/>
-              </a:defRPr>
-            </a:lvl2pPr>
-            <a:lvl3pPr marL="914400" indent="0" algn="ctr" defTabSz="914400" rtl="0" eaLnBrk="1" latinLnBrk="0" hangingPunct="1">
-              <a:lnSpc>
-                <a:spcPct val="90000"/>
-              </a:lnSpc>
-              <a:spcBef>
-                <a:spcPts val="500"/>
-              </a:spcBef>
-              <a:buFont typeface="Arial" panose="020B0604020202020204" pitchFamily="34" charset="0"/>
-              <a:buNone/>
-              <a:defRPr sz="1800" kern="1200">
-                <a:solidFill>
-                  <a:schemeClr val="tx1"/>
-                </a:solidFill>
-                <a:latin typeface="+mn-lt"/>
-                <a:ea typeface="+mn-ea"/>
-                <a:cs typeface="+mn-cs"/>
-              </a:defRPr>
-            </a:lvl3pPr>
-            <a:lvl4pPr marL="1371600" indent="0" algn="ctr" defTabSz="914400" rtl="0" eaLnBrk="1" latinLnBrk="0" hangingPunct="1">
-              <a:lnSpc>
-                <a:spcPct val="90000"/>
-              </a:lnSpc>
-              <a:spcBef>
-                <a:spcPts val="500"/>
-              </a:spcBef>
-              <a:buFont typeface="Arial" panose="020B0604020202020204" pitchFamily="34" charset="0"/>
-              <a:buNone/>
-              <a:defRPr sz="1600" kern="1200">
-                <a:solidFill>
-                  <a:schemeClr val="tx1"/>
-                </a:solidFill>
-                <a:latin typeface="+mn-lt"/>
-                <a:ea typeface="+mn-ea"/>
-                <a:cs typeface="+mn-cs"/>
-              </a:defRPr>
-            </a:lvl4pPr>
-            <a:lvl5pPr marL="1828800" indent="0" algn="ctr" defTabSz="914400" rtl="0" eaLnBrk="1" latinLnBrk="0" hangingPunct="1">
-              <a:lnSpc>
-                <a:spcPct val="90000"/>
-              </a:lnSpc>
-              <a:spcBef>
-                <a:spcPts val="500"/>
-              </a:spcBef>
-              <a:buFont typeface="Arial" panose="020B0604020202020204" pitchFamily="34" charset="0"/>
-              <a:buNone/>
-              <a:defRPr sz="1600" kern="1200">
-                <a:solidFill>
-                  <a:schemeClr val="tx1"/>
-                </a:solidFill>
-                <a:latin typeface="+mn-lt"/>
-                <a:ea typeface="+mn-ea"/>
-                <a:cs typeface="+mn-cs"/>
-              </a:defRPr>
-            </a:lvl5pPr>
-            <a:lvl6pPr marL="2286000" indent="0" algn="ctr" defTabSz="914400" rtl="0" eaLnBrk="1" latinLnBrk="0" hangingPunct="1">
-              <a:lnSpc>
-                <a:spcPct val="90000"/>
-              </a:lnSpc>
-              <a:spcBef>
-                <a:spcPts val="500"/>
-              </a:spcBef>
-              <a:buFont typeface="Arial" panose="020B0604020202020204" pitchFamily="34" charset="0"/>
-              <a:buNone/>
-              <a:defRPr sz="1600" kern="1200">
-                <a:solidFill>
-                  <a:schemeClr val="tx1"/>
-                </a:solidFill>
-                <a:latin typeface="+mn-lt"/>
-                <a:ea typeface="+mn-ea"/>
-                <a:cs typeface="+mn-cs"/>
-              </a:defRPr>
-            </a:lvl6pPr>
-            <a:lvl7pPr marL="2743200" indent="0" algn="ctr" defTabSz="914400" rtl="0" eaLnBrk="1" latinLnBrk="0" hangingPunct="1">
-              <a:lnSpc>
-                <a:spcPct val="90000"/>
-              </a:lnSpc>
-              <a:spcBef>
-                <a:spcPts val="500"/>
-              </a:spcBef>
-              <a:buFont typeface="Arial" panose="020B0604020202020204" pitchFamily="34" charset="0"/>
-              <a:buNone/>
-              <a:defRPr sz="1600" kern="1200">
-                <a:solidFill>
-                  <a:schemeClr val="tx1"/>
-                </a:solidFill>
-                <a:latin typeface="+mn-lt"/>
-                <a:ea typeface="+mn-ea"/>
-                <a:cs typeface="+mn-cs"/>
-              </a:defRPr>
-            </a:lvl7pPr>
-            <a:lvl8pPr marL="3200400" indent="0" algn="ctr" defTabSz="914400" rtl="0" eaLnBrk="1" latinLnBrk="0" hangingPunct="1">
-              <a:lnSpc>
-                <a:spcPct val="90000"/>
-              </a:lnSpc>
-              <a:spcBef>
-                <a:spcPts val="500"/>
-              </a:spcBef>
-              <a:buFont typeface="Arial" panose="020B0604020202020204" pitchFamily="34" charset="0"/>
-              <a:buNone/>
-              <a:defRPr sz="1600" kern="1200">
-                <a:solidFill>
-                  <a:schemeClr val="tx1"/>
-                </a:solidFill>
-                <a:latin typeface="+mn-lt"/>
-                <a:ea typeface="+mn-ea"/>
-                <a:cs typeface="+mn-cs"/>
-              </a:defRPr>
-            </a:lvl8pPr>
-            <a:lvl9pPr marL="3657600" indent="0" algn="ctr" defTabSz="914400" rtl="0" eaLnBrk="1" latinLnBrk="0" hangingPunct="1">
-              <a:lnSpc>
-                <a:spcPct val="90000"/>
-              </a:lnSpc>
-              <a:spcBef>
-                <a:spcPts val="500"/>
-              </a:spcBef>
-              <a:buFont typeface="Arial" panose="020B0604020202020204" pitchFamily="34" charset="0"/>
-              <a:buNone/>
-              <a:defRPr sz="1600" kern="1200">
-                <a:solidFill>
-                  <a:schemeClr val="tx1"/>
-                </a:solidFill>
-                <a:latin typeface="+mn-lt"/>
-                <a:ea typeface="+mn-ea"/>
-                <a:cs typeface="+mn-cs"/>
-              </a:defRPr>
-            </a:lvl9pPr>
-          </a:lstStyle>
-          <a:p>
-            <a:pPr algn="l"/>
-            <a:r>
-              <a:rPr lang="en-US" sz="1400" b="1" dirty="0"/>
-              <a:t>TABLE 3: </a:t>
-            </a:r>
-            <a:r>
-              <a:rPr lang="en-US" sz="1400" dirty="0"/>
-              <a:t>summary statistics, with all variables necessary to construct ABTONE and replicate</a:t>
-            </a:r>
-          </a:p>
-        </p:txBody>
-      </p:sp>
       <p:cxnSp>
         <p:nvCxnSpPr>
           <p:cNvPr id="65" name="Straight Arrow Connector 64">
@@ -14963,7 +14306,7 @@
           <a:p>
             <a:r>
               <a:rPr lang="en-US" sz="1400" b="1" dirty="0"/>
-              <a:t>TABLE 4: </a:t>
+              <a:t>OAT1: </a:t>
             </a:r>
             <a:r>
               <a:rPr lang="en-US" sz="1400" dirty="0"/>
@@ -14986,8 +14329,8 @@
         </p:nvSpPr>
         <p:spPr>
           <a:xfrm>
-            <a:off x="5949055" y="2907831"/>
-            <a:ext cx="6242945" cy="3950169"/>
+            <a:off x="6180442" y="2980189"/>
+            <a:ext cx="6011558" cy="3887238"/>
           </a:xfrm>
           <a:prstGeom prst="flowChartManualInput">
             <a:avLst/>
@@ -15023,6 +14366,261 @@
           <a:p>
             <a:pPr algn="ctr"/>
             <a:endParaRPr lang="en-US"/>
+          </a:p>
+        </p:txBody>
+      </p:sp>
+      <p:sp>
+        <p:nvSpPr>
+          <p:cNvPr id="37" name="Rectangle 36">
+            <a:extLst>
+              <a:ext uri="{FF2B5EF4-FFF2-40B4-BE49-F238E27FC236}">
+                <a16:creationId xmlns:a16="http://schemas.microsoft.com/office/drawing/2014/main" id="{D6EE3446-987A-4F89-B4E6-4A55099177D3}"/>
+              </a:ext>
+            </a:extLst>
+          </p:cNvPr>
+          <p:cNvSpPr/>
+          <p:nvPr/>
+        </p:nvSpPr>
+        <p:spPr>
+          <a:xfrm>
+            <a:off x="3088355" y="5162508"/>
+            <a:ext cx="2902655" cy="1200329"/>
+          </a:xfrm>
+          <a:prstGeom prst="rect">
+            <a:avLst/>
+          </a:prstGeom>
+        </p:spPr>
+        <p:txBody>
+          <a:bodyPr wrap="square">
+            <a:spAutoFit/>
+          </a:bodyPr>
+          <a:lstStyle/>
+          <a:p>
+            <a:r>
+              <a:rPr lang="en-US" sz="1200" b="1" dirty="0"/>
+              <a:t>TABLE 1 - PA, PB: </a:t>
+            </a:r>
+            <a:r>
+              <a:rPr lang="en-US" sz="1200" dirty="0"/>
+              <a:t>Summary statistics 10-Q</a:t>
+            </a:r>
+          </a:p>
+          <a:p>
+            <a:r>
+              <a:rPr lang="en-US" sz="1200" b="1" dirty="0"/>
+              <a:t>TABLE 2 - PA: </a:t>
+            </a:r>
+            <a:r>
+              <a:rPr lang="en-US" sz="1200" dirty="0" err="1"/>
+              <a:t>Doc_measure</a:t>
+            </a:r>
+            <a:r>
+              <a:rPr lang="en-US" sz="1200" baseline="-25000" dirty="0" err="1"/>
+              <a:t>t</a:t>
+            </a:r>
+            <a:r>
+              <a:rPr lang="en-US" sz="1200" dirty="0"/>
+              <a:t> = b</a:t>
+            </a:r>
+            <a:r>
+              <a:rPr lang="en-US" sz="1200" baseline="-25000" dirty="0"/>
+              <a:t>0</a:t>
+            </a:r>
+            <a:r>
+              <a:rPr lang="en-US" sz="1200" dirty="0"/>
+              <a:t> + b</a:t>
+            </a:r>
+            <a:r>
+              <a:rPr lang="en-US" sz="1200" baseline="-25000" dirty="0"/>
+              <a:t>1</a:t>
+            </a:r>
+            <a:r>
+              <a:rPr lang="en-US" sz="1200" dirty="0"/>
+              <a:t>*</a:t>
+            </a:r>
+            <a:r>
+              <a:rPr lang="en-US" sz="1200" dirty="0" err="1"/>
+              <a:t>RET</a:t>
+            </a:r>
+            <a:r>
+              <a:rPr lang="en-US" sz="1200" baseline="-25000" dirty="0" err="1"/>
+              <a:t>t</a:t>
+            </a:r>
+            <a:r>
+              <a:rPr lang="en-US" sz="1200" dirty="0"/>
+              <a:t> + b</a:t>
+            </a:r>
+            <a:r>
+              <a:rPr lang="en-US" sz="1200" baseline="-25000" dirty="0"/>
+              <a:t>2</a:t>
+            </a:r>
+            <a:r>
+              <a:rPr lang="en-US" sz="1200" dirty="0"/>
+              <a:t>*</a:t>
+            </a:r>
+            <a:r>
+              <a:rPr lang="en-US" sz="1200" dirty="0" err="1"/>
+              <a:t>NEG</a:t>
+            </a:r>
+            <a:r>
+              <a:rPr lang="en-US" sz="1200" baseline="-25000" dirty="0" err="1"/>
+              <a:t>t</a:t>
+            </a:r>
+            <a:r>
+              <a:rPr lang="en-US" sz="1200" dirty="0"/>
+              <a:t> + b</a:t>
+            </a:r>
+            <a:r>
+              <a:rPr lang="en-US" sz="1200" baseline="-25000" dirty="0"/>
+              <a:t>3</a:t>
+            </a:r>
+            <a:r>
+              <a:rPr lang="en-US" sz="1200" dirty="0"/>
+              <a:t>*</a:t>
+            </a:r>
+            <a:r>
+              <a:rPr lang="en-US" sz="1200" dirty="0" err="1"/>
+              <a:t>RET</a:t>
+            </a:r>
+            <a:r>
+              <a:rPr lang="en-US" sz="1200" baseline="-25000" dirty="0" err="1"/>
+              <a:t>t</a:t>
+            </a:r>
+            <a:r>
+              <a:rPr lang="en-US" sz="1200" dirty="0"/>
+              <a:t>*</a:t>
+            </a:r>
+            <a:r>
+              <a:rPr lang="en-US" sz="1200" dirty="0" err="1"/>
+              <a:t>NEG</a:t>
+            </a:r>
+            <a:r>
+              <a:rPr lang="en-US" sz="1200" baseline="-25000" dirty="0" err="1"/>
+              <a:t>t</a:t>
+            </a:r>
+            <a:r>
+              <a:rPr lang="en-US" sz="1200" dirty="0"/>
+              <a:t> + </a:t>
+            </a:r>
+            <a:r>
+              <a:rPr lang="en-US" sz="1200" dirty="0" err="1"/>
+              <a:t>controls</a:t>
+            </a:r>
+            <a:r>
+              <a:rPr lang="en-US" sz="1200" baseline="-25000" dirty="0" err="1"/>
+              <a:t>t</a:t>
+            </a:r>
+            <a:endParaRPr lang="en-US" sz="1200" baseline="-25000" dirty="0"/>
+          </a:p>
+          <a:p>
+            <a:r>
+              <a:rPr lang="en-US" sz="1200" b="1" dirty="0"/>
+              <a:t>TABLE 2 - PB: </a:t>
+            </a:r>
+            <a:r>
+              <a:rPr lang="en-US" sz="1200" dirty="0" err="1"/>
+              <a:t>ABTONE</a:t>
+            </a:r>
+            <a:r>
+              <a:rPr lang="en-US" sz="1200" baseline="-25000" dirty="0" err="1"/>
+              <a:t>t</a:t>
+            </a:r>
+            <a:r>
+              <a:rPr lang="en-US" sz="1200" dirty="0"/>
+              <a:t> = b</a:t>
+            </a:r>
+            <a:r>
+              <a:rPr lang="en-US" sz="1200" baseline="-25000" dirty="0"/>
+              <a:t>0</a:t>
+            </a:r>
+            <a:r>
+              <a:rPr lang="en-US" sz="1200" dirty="0"/>
+              <a:t> + b</a:t>
+            </a:r>
+            <a:r>
+              <a:rPr lang="en-US" sz="1200" baseline="-25000" dirty="0"/>
+              <a:t>1</a:t>
+            </a:r>
+            <a:r>
+              <a:rPr lang="en-US" sz="1200" dirty="0"/>
+              <a:t>*</a:t>
+            </a:r>
+            <a:r>
+              <a:rPr lang="en-US" sz="1200" dirty="0" err="1"/>
+              <a:t>RET</a:t>
+            </a:r>
+            <a:r>
+              <a:rPr lang="en-US" sz="1200" baseline="-25000" dirty="0" err="1"/>
+              <a:t>t</a:t>
+            </a:r>
+            <a:r>
+              <a:rPr lang="en-US" sz="1200" dirty="0"/>
+              <a:t> + b</a:t>
+            </a:r>
+            <a:r>
+              <a:rPr lang="en-US" sz="1200" baseline="-25000" dirty="0"/>
+              <a:t>2</a:t>
+            </a:r>
+            <a:r>
+              <a:rPr lang="en-US" sz="1200" dirty="0"/>
+              <a:t>*</a:t>
+            </a:r>
+            <a:r>
+              <a:rPr lang="en-US" sz="1200" dirty="0" err="1"/>
+              <a:t>NEG</a:t>
+            </a:r>
+            <a:r>
+              <a:rPr lang="en-US" sz="1200" baseline="-25000" dirty="0" err="1"/>
+              <a:t>t</a:t>
+            </a:r>
+            <a:r>
+              <a:rPr lang="en-US" sz="1200" dirty="0"/>
+              <a:t> + b</a:t>
+            </a:r>
+            <a:r>
+              <a:rPr lang="en-US" sz="1200" baseline="-25000" dirty="0"/>
+              <a:t>3</a:t>
+            </a:r>
+            <a:r>
+              <a:rPr lang="en-US" sz="1200" dirty="0"/>
+              <a:t>*</a:t>
+            </a:r>
+            <a:r>
+              <a:rPr lang="en-US" sz="1200" dirty="0" err="1"/>
+              <a:t>RET</a:t>
+            </a:r>
+            <a:r>
+              <a:rPr lang="en-US" sz="1200" baseline="-25000" dirty="0" err="1"/>
+              <a:t>t</a:t>
+            </a:r>
+            <a:r>
+              <a:rPr lang="en-US" sz="1200" dirty="0"/>
+              <a:t>*</a:t>
+            </a:r>
+            <a:r>
+              <a:rPr lang="en-US" sz="1200" dirty="0" err="1"/>
+              <a:t>NEG</a:t>
+            </a:r>
+            <a:r>
+              <a:rPr lang="en-US" sz="1200" baseline="-25000" dirty="0" err="1"/>
+              <a:t>t</a:t>
+            </a:r>
+            <a:r>
+              <a:rPr lang="en-US" sz="1200" dirty="0"/>
+              <a:t> + </a:t>
+            </a:r>
+            <a:r>
+              <a:rPr lang="en-US" sz="1200" dirty="0" err="1"/>
+              <a:t>controls</a:t>
+            </a:r>
+            <a:r>
+              <a:rPr lang="en-US" sz="1200" baseline="-25000" dirty="0" err="1"/>
+              <a:t>t</a:t>
+            </a:r>
+            <a:endParaRPr lang="en-US" sz="1200" dirty="0"/>
+          </a:p>
+          <a:p>
+            <a:endParaRPr lang="en-US" sz="1200" dirty="0"/>
           </a:p>
         </p:txBody>
       </p:sp>
@@ -16722,7 +16320,7 @@
             </a:pPr>
             <a:r>
               <a:rPr lang="en-US" sz="1400" dirty="0"/>
-              <a:t>Variable creation and screening*: </a:t>
+              <a:t>Variable creation and screening**: </a:t>
             </a:r>
             <a:r>
               <a:rPr lang="en-US" sz="1400" dirty="0">
@@ -16938,7 +16536,7 @@
                   <a:srgbClr val="C0C0C0"/>
                 </a:highlight>
               </a:rPr>
-              <a:t>Merge – Match</a:t>
+              <a:t>Merge – Match*</a:t>
             </a:r>
           </a:p>
           <a:p>
@@ -17436,8 +17034,8 @@
         </p:nvSpPr>
         <p:spPr>
           <a:xfrm>
-            <a:off x="9577727" y="6567003"/>
-            <a:ext cx="2660463" cy="270397"/>
+            <a:off x="7588577" y="6661182"/>
+            <a:ext cx="4649613" cy="290997"/>
           </a:xfrm>
           <a:prstGeom prst="rect">
             <a:avLst/>
@@ -17445,7 +17043,7 @@
         </p:spPr>
         <p:txBody>
           <a:bodyPr vert="horz" lIns="91440" tIns="45720" rIns="91440" bIns="45720" rtlCol="0">
-            <a:normAutofit lnSpcReduction="10000"/>
+            <a:normAutofit fontScale="77500" lnSpcReduction="20000"/>
           </a:bodyPr>
           <a:lstStyle>
             <a:lvl1pPr marL="0" indent="0" algn="ctr" defTabSz="914400" rtl="0" eaLnBrk="1" latinLnBrk="0" hangingPunct="1">
@@ -17619,7 +17217,7 @@
                   <a:srgbClr val="C0C0C0"/>
                 </a:highlight>
               </a:rPr>
-              <a:t>* see code for screening criterion.</a:t>
+              <a:t>* see matching rule description in next page ** see screening criterion in code</a:t>
             </a:r>
           </a:p>
         </p:txBody>
@@ -17638,8 +17236,8 @@
         </p:nvSpPr>
         <p:spPr>
           <a:xfrm>
-            <a:off x="3317899" y="5807682"/>
-            <a:ext cx="8676707" cy="646331"/>
+            <a:off x="3445328" y="5971341"/>
+            <a:ext cx="7602885" cy="738664"/>
           </a:xfrm>
           <a:prstGeom prst="rect">
             <a:avLst/>
@@ -17652,136 +17250,134 @@
           <a:lstStyle/>
           <a:p>
             <a:r>
-              <a:rPr lang="en-US" b="1" dirty="0"/>
-              <a:t>TABLE </a:t>
-            </a:r>
-            <a:r>
-              <a:rPr lang="en-US" altLang="zh-CN" b="1" dirty="0"/>
-              <a:t>7</a:t>
-            </a:r>
-            <a:r>
-              <a:rPr lang="en-US" b="1" dirty="0"/>
-              <a:t>: </a:t>
-            </a:r>
-            <a:r>
-              <a:rPr lang="en-US" dirty="0"/>
+              <a:rPr lang="en-US" sz="1400" b="1" dirty="0"/>
+              <a:t>TABLE 1 – PC, PD: </a:t>
+            </a:r>
+            <a:r>
+              <a:rPr lang="en-US" sz="1400" dirty="0"/>
               <a:t>Summary statistics</a:t>
             </a:r>
           </a:p>
           <a:p>
             <a:r>
-              <a:rPr lang="en-US" b="1" dirty="0"/>
-              <a:t>TABLE </a:t>
-            </a:r>
-            <a:r>
-              <a:rPr lang="en-US" altLang="zh-CN" b="1" dirty="0"/>
-              <a:t>8</a:t>
-            </a:r>
-            <a:r>
-              <a:rPr lang="en-US" b="1" dirty="0"/>
-              <a:t>: </a:t>
-            </a:r>
-            <a:r>
-              <a:rPr lang="en-US" dirty="0" err="1"/>
+              <a:rPr lang="en-US" sz="1400" b="1" dirty="0"/>
+              <a:t>TABLE 3 - PA: </a:t>
+            </a:r>
+            <a:r>
+              <a:rPr lang="en-US" sz="1400" dirty="0" err="1"/>
               <a:t>Doc_measure</a:t>
             </a:r>
             <a:r>
-              <a:rPr lang="en-US" baseline="-25000" dirty="0" err="1"/>
+              <a:rPr lang="en-US" sz="1400" baseline="-25000" dirty="0" err="1"/>
               <a:t>t</a:t>
             </a:r>
             <a:r>
-              <a:rPr lang="en-US" dirty="0"/>
+              <a:rPr lang="en-US" sz="1400" dirty="0"/>
               <a:t> = b</a:t>
             </a:r>
             <a:r>
-              <a:rPr lang="en-US" baseline="-25000" dirty="0"/>
+              <a:rPr lang="en-US" sz="1400" baseline="-25000" dirty="0"/>
               <a:t>0</a:t>
             </a:r>
             <a:r>
-              <a:rPr lang="en-US" dirty="0"/>
+              <a:rPr lang="en-US" sz="1400" dirty="0"/>
               <a:t> + b</a:t>
             </a:r>
             <a:r>
-              <a:rPr lang="en-US" baseline="-25000" dirty="0"/>
+              <a:rPr lang="en-US" sz="1400" baseline="-25000" dirty="0"/>
               <a:t>1</a:t>
             </a:r>
             <a:r>
-              <a:rPr lang="en-US" dirty="0"/>
+              <a:rPr lang="en-US" sz="1400" dirty="0"/>
               <a:t>*</a:t>
             </a:r>
             <a:r>
-              <a:rPr lang="en-US" dirty="0" err="1"/>
+              <a:rPr lang="en-US" sz="1400" dirty="0" err="1"/>
               <a:t>DRET</a:t>
             </a:r>
             <a:r>
-              <a:rPr lang="en-US" baseline="-25000" dirty="0" err="1"/>
+              <a:rPr lang="en-US" sz="1400" baseline="-25000" dirty="0" err="1"/>
               <a:t>t-tlag</a:t>
             </a:r>
             <a:r>
-              <a:rPr lang="en-US" dirty="0"/>
+              <a:rPr lang="en-US" sz="1400" dirty="0"/>
               <a:t> + b</a:t>
             </a:r>
             <a:r>
-              <a:rPr lang="en-US" baseline="-25000" dirty="0"/>
+              <a:rPr lang="en-US" sz="1400" baseline="-25000" dirty="0"/>
               <a:t>2</a:t>
             </a:r>
             <a:r>
-              <a:rPr lang="en-US" dirty="0"/>
+              <a:rPr lang="en-US" sz="1400" dirty="0"/>
               <a:t>*</a:t>
             </a:r>
             <a:r>
-              <a:rPr lang="en-US" dirty="0" err="1"/>
+              <a:rPr lang="en-US" sz="1400" dirty="0" err="1"/>
               <a:t>BN</a:t>
             </a:r>
             <a:r>
-              <a:rPr lang="en-US" baseline="-25000" dirty="0" err="1"/>
+              <a:rPr lang="en-US" sz="1400" baseline="-25000" dirty="0" err="1"/>
               <a:t>t-tlag</a:t>
             </a:r>
             <a:r>
-              <a:rPr lang="en-US" dirty="0"/>
+              <a:rPr lang="en-US" sz="1400" dirty="0"/>
               <a:t> + b</a:t>
             </a:r>
             <a:r>
-              <a:rPr lang="en-US" baseline="-25000" dirty="0"/>
+              <a:rPr lang="en-US" sz="1400" baseline="-25000" dirty="0"/>
               <a:t>3</a:t>
             </a:r>
             <a:r>
-              <a:rPr lang="en-US" dirty="0"/>
+              <a:rPr lang="en-US" sz="1400" dirty="0"/>
               <a:t>*</a:t>
             </a:r>
             <a:r>
-              <a:rPr lang="en-US" dirty="0" err="1"/>
+              <a:rPr lang="en-US" sz="1400" dirty="0" err="1"/>
               <a:t>DRET</a:t>
             </a:r>
             <a:r>
-              <a:rPr lang="en-US" baseline="-25000" dirty="0" err="1"/>
+              <a:rPr lang="en-US" sz="1400" baseline="-25000" dirty="0" err="1"/>
               <a:t>t-tlag</a:t>
             </a:r>
             <a:r>
-              <a:rPr lang="en-US" dirty="0"/>
+              <a:rPr lang="en-US" sz="1400" dirty="0"/>
               <a:t>*</a:t>
             </a:r>
             <a:r>
-              <a:rPr lang="en-US" dirty="0" err="1"/>
+              <a:rPr lang="en-US" sz="1400" dirty="0" err="1"/>
               <a:t>BN</a:t>
             </a:r>
             <a:r>
-              <a:rPr lang="en-US" baseline="-25000" dirty="0" err="1"/>
+              <a:rPr lang="en-US" sz="1400" baseline="-25000" dirty="0" err="1"/>
               <a:t>t-tlag</a:t>
             </a:r>
             <a:r>
-              <a:rPr lang="en-US" dirty="0"/>
+              <a:rPr lang="en-US" sz="1400" dirty="0"/>
               <a:t> + </a:t>
             </a:r>
             <a:r>
-              <a:rPr lang="en-US" dirty="0" err="1"/>
+              <a:rPr lang="en-US" sz="1400" dirty="0" err="1"/>
               <a:t>controls</a:t>
             </a:r>
             <a:r>
-              <a:rPr lang="en-US" baseline="-25000" dirty="0" err="1"/>
+              <a:rPr lang="en-US" sz="1400" baseline="-25000" dirty="0" err="1"/>
               <a:t>t-tlag</a:t>
             </a:r>
-            <a:endParaRPr lang="en-US" dirty="0"/>
+            <a:endParaRPr lang="en-US" sz="1400" baseline="-25000" dirty="0"/>
+          </a:p>
+          <a:p>
+            <a:r>
+              <a:rPr lang="en-US" sz="1400" b="1" dirty="0"/>
+              <a:t>TABLE 3 - PB: </a:t>
+            </a:r>
+            <a:r>
+              <a:rPr lang="en-US" sz="1400"/>
+              <a:t>8-K ordered </a:t>
+            </a:r>
+            <a:r>
+              <a:rPr lang="en-US" sz="1400" dirty="0"/>
+              <a:t>logistics model (TLAG = 1, 2, 3, 4)</a:t>
+            </a:r>
           </a:p>
         </p:txBody>
       </p:sp>
@@ -17796,13 +17392,14 @@
           </p:cNvPr>
           <p:cNvCxnSpPr>
             <a:cxnSpLocks/>
+            <a:endCxn id="30" idx="0"/>
           </p:cNvCxnSpPr>
           <p:nvPr/>
         </p:nvCxnSpPr>
         <p:spPr>
           <a:xfrm>
-            <a:off x="6844459" y="5686036"/>
-            <a:ext cx="0" cy="188629"/>
+            <a:off x="6844460" y="5780350"/>
+            <a:ext cx="402311" cy="190991"/>
           </a:xfrm>
           <a:prstGeom prst="straightConnector1">
             <a:avLst/>

</xml_diff>

<commit_message>
paper: research design and results
</commit_message>
<xml_diff>
--- a/output/Figures.pptx
+++ b/output/Figures.pptx
@@ -116,6 +116,18 @@
 </p:presentation>
 </file>
 
+<file path=ppt/commentAuthors.xml><?xml version="1.0" encoding="utf-8"?>
+<p:cmAuthorLst xmlns:a="http://schemas.openxmlformats.org/drawingml/2006/main" xmlns:r="http://schemas.openxmlformats.org/officeDocument/2006/relationships" xmlns:p="http://schemas.openxmlformats.org/presentationml/2006/main">
+  <p:cmAuthor id="1" name="ZhuFengzhi" initials="Z" lastIdx="1" clrIdx="0">
+    <p:extLst>
+      <p:ext uri="{19B8F6BF-5375-455C-9EA6-DF929625EA0E}">
+        <p15:presenceInfo xmlns:p15="http://schemas.microsoft.com/office/powerpoint/2012/main" userId="S::fzhu@emp.uc3m.es::711df637-fa83-4360-bab4-f8fafcbd8de9" providerId="AD"/>
+      </p:ext>
+    </p:extLst>
+  </p:cmAuthor>
+</p:cmAuthorLst>
+</file>
+
 <file path=ppt/slideLayouts/slideLayout1.xml><?xml version="1.0" encoding="utf-8"?>
 <p:sldLayout xmlns:a="http://schemas.openxmlformats.org/drawingml/2006/main" xmlns:r="http://schemas.openxmlformats.org/officeDocument/2006/relationships" xmlns:p="http://schemas.openxmlformats.org/presentationml/2006/main" type="title" preserve="1">
   <p:cSld name="Title Slide">
@@ -263,7 +275,7 @@
           <a:p>
             <a:fld id="{F6465CF2-20FA-4A27-B5DD-24B9293428AE}" type="datetimeFigureOut">
               <a:rPr lang="en-US" smtClean="0"/>
-              <a:t>5/7/2020</a:t>
+              <a:t>5/18/2020</a:t>
             </a:fld>
             <a:endParaRPr lang="en-US"/>
           </a:p>
@@ -461,7 +473,7 @@
           <a:p>
             <a:fld id="{F6465CF2-20FA-4A27-B5DD-24B9293428AE}" type="datetimeFigureOut">
               <a:rPr lang="en-US" smtClean="0"/>
-              <a:t>5/7/2020</a:t>
+              <a:t>5/18/2020</a:t>
             </a:fld>
             <a:endParaRPr lang="en-US"/>
           </a:p>
@@ -669,7 +681,7 @@
           <a:p>
             <a:fld id="{F6465CF2-20FA-4A27-B5DD-24B9293428AE}" type="datetimeFigureOut">
               <a:rPr lang="en-US" smtClean="0"/>
-              <a:t>5/7/2020</a:t>
+              <a:t>5/18/2020</a:t>
             </a:fld>
             <a:endParaRPr lang="en-US"/>
           </a:p>
@@ -867,7 +879,7 @@
           <a:p>
             <a:fld id="{F6465CF2-20FA-4A27-B5DD-24B9293428AE}" type="datetimeFigureOut">
               <a:rPr lang="en-US" smtClean="0"/>
-              <a:t>5/7/2020</a:t>
+              <a:t>5/18/2020</a:t>
             </a:fld>
             <a:endParaRPr lang="en-US"/>
           </a:p>
@@ -1142,7 +1154,7 @@
           <a:p>
             <a:fld id="{F6465CF2-20FA-4A27-B5DD-24B9293428AE}" type="datetimeFigureOut">
               <a:rPr lang="en-US" smtClean="0"/>
-              <a:t>5/7/2020</a:t>
+              <a:t>5/18/2020</a:t>
             </a:fld>
             <a:endParaRPr lang="en-US"/>
           </a:p>
@@ -1407,7 +1419,7 @@
           <a:p>
             <a:fld id="{F6465CF2-20FA-4A27-B5DD-24B9293428AE}" type="datetimeFigureOut">
               <a:rPr lang="en-US" smtClean="0"/>
-              <a:t>5/7/2020</a:t>
+              <a:t>5/18/2020</a:t>
             </a:fld>
             <a:endParaRPr lang="en-US"/>
           </a:p>
@@ -1819,7 +1831,7 @@
           <a:p>
             <a:fld id="{F6465CF2-20FA-4A27-B5DD-24B9293428AE}" type="datetimeFigureOut">
               <a:rPr lang="en-US" smtClean="0"/>
-              <a:t>5/7/2020</a:t>
+              <a:t>5/18/2020</a:t>
             </a:fld>
             <a:endParaRPr lang="en-US"/>
           </a:p>
@@ -1960,7 +1972,7 @@
           <a:p>
             <a:fld id="{F6465CF2-20FA-4A27-B5DD-24B9293428AE}" type="datetimeFigureOut">
               <a:rPr lang="en-US" smtClean="0"/>
-              <a:t>5/7/2020</a:t>
+              <a:t>5/18/2020</a:t>
             </a:fld>
             <a:endParaRPr lang="en-US"/>
           </a:p>
@@ -2073,7 +2085,7 @@
           <a:p>
             <a:fld id="{F6465CF2-20FA-4A27-B5DD-24B9293428AE}" type="datetimeFigureOut">
               <a:rPr lang="en-US" smtClean="0"/>
-              <a:t>5/7/2020</a:t>
+              <a:t>5/18/2020</a:t>
             </a:fld>
             <a:endParaRPr lang="en-US"/>
           </a:p>
@@ -2384,7 +2396,7 @@
           <a:p>
             <a:fld id="{F6465CF2-20FA-4A27-B5DD-24B9293428AE}" type="datetimeFigureOut">
               <a:rPr lang="en-US" smtClean="0"/>
-              <a:t>5/7/2020</a:t>
+              <a:t>5/18/2020</a:t>
             </a:fld>
             <a:endParaRPr lang="en-US"/>
           </a:p>
@@ -2672,7 +2684,7 @@
           <a:p>
             <a:fld id="{F6465CF2-20FA-4A27-B5DD-24B9293428AE}" type="datetimeFigureOut">
               <a:rPr lang="en-US" smtClean="0"/>
-              <a:t>5/7/2020</a:t>
+              <a:t>5/18/2020</a:t>
             </a:fld>
             <a:endParaRPr lang="en-US"/>
           </a:p>
@@ -2913,7 +2925,7 @@
           <a:p>
             <a:fld id="{F6465CF2-20FA-4A27-B5DD-24B9293428AE}" type="datetimeFigureOut">
               <a:rPr lang="en-US" smtClean="0"/>
-              <a:t>5/7/2020</a:t>
+              <a:t>5/18/2020</a:t>
             </a:fld>
             <a:endParaRPr lang="en-US"/>
           </a:p>
@@ -4590,7 +4602,7 @@
                   <a:srgbClr val="C0C0C0"/>
                 </a:highlight>
               </a:rPr>
-              <a:t>Doc_measure</a:t>
+              <a:t>TEX</a:t>
             </a:r>
             <a:r>
               <a:rPr lang="en-US" sz="2900" b="1" baseline="-25000" dirty="0" err="1">
@@ -4598,7 +4610,7 @@
                   <a:srgbClr val="C0C0C0"/>
                 </a:highlight>
               </a:rPr>
-              <a:t>t</a:t>
+              <a:t>i,t</a:t>
             </a:r>
             <a:r>
               <a:rPr lang="en-US" sz="2900" b="1" dirty="0">
@@ -4654,7 +4666,7 @@
                   <a:srgbClr val="C0C0C0"/>
                 </a:highlight>
               </a:rPr>
-              <a:t>t</a:t>
+              <a:t>i,t</a:t>
             </a:r>
             <a:r>
               <a:rPr lang="en-US" sz="2900" b="1" dirty="0">
@@ -4694,7 +4706,7 @@
                   <a:srgbClr val="C0C0C0"/>
                 </a:highlight>
               </a:rPr>
-              <a:t>t</a:t>
+              <a:t>i,t</a:t>
             </a:r>
             <a:r>
               <a:rPr lang="en-US" sz="2900" b="1" dirty="0">
@@ -4734,7 +4746,7 @@
                   <a:srgbClr val="C0C0C0"/>
                 </a:highlight>
               </a:rPr>
-              <a:t>t</a:t>
+              <a:t>i,t</a:t>
             </a:r>
             <a:r>
               <a:rPr lang="en-US" sz="2900" b="1" dirty="0">
@@ -4758,7 +4770,7 @@
                   <a:srgbClr val="C0C0C0"/>
                 </a:highlight>
               </a:rPr>
-              <a:t>t</a:t>
+              <a:t>i,t</a:t>
             </a:r>
             <a:r>
               <a:rPr lang="en-US" sz="2900" b="1" dirty="0">
@@ -4782,7 +4794,7 @@
                   <a:srgbClr val="C0C0C0"/>
                 </a:highlight>
               </a:rPr>
-              <a:t>t</a:t>
+              <a:t>i,t</a:t>
             </a:r>
             <a:r>
               <a:rPr lang="en-US" sz="2900" dirty="0"/>
@@ -6516,7 +6528,7 @@
         </p:spPr>
         <p:txBody>
           <a:bodyPr vert="horz" lIns="91440" tIns="45720" rIns="91440" bIns="45720" rtlCol="0">
-            <a:normAutofit fontScale="55000" lnSpcReduction="20000"/>
+            <a:normAutofit/>
           </a:bodyPr>
           <a:lstStyle>
             <a:lvl1pPr marL="228600" indent="-228600" algn="l" defTabSz="914400" rtl="0" eaLnBrk="1" latinLnBrk="0" hangingPunct="1">
@@ -6686,16 +6698,6 @@
             <a:r>
               <a:rPr lang="en-US" sz="1800" dirty="0"/>
               <a:t>Other news proxy: tariff / oil price (case study for specific industries)</a:t>
-            </a:r>
-          </a:p>
-          <a:p>
-            <a:r>
-              <a:rPr lang="en-US" sz="1800" dirty="0">
-                <a:highlight>
-                  <a:srgbClr val="00FFFF"/>
-                </a:highlight>
-              </a:rPr>
-              <a:t>ABTONE – Huang et al. 2014</a:t>
             </a:r>
           </a:p>
         </p:txBody>
@@ -10866,6 +10868,16 @@
 <file path=ppt/slides/slide3.xml><?xml version="1.0" encoding="utf-8"?>
 <p:sld xmlns:a="http://schemas.openxmlformats.org/drawingml/2006/main" xmlns:r="http://schemas.openxmlformats.org/officeDocument/2006/relationships" xmlns:p="http://schemas.openxmlformats.org/presentationml/2006/main">
   <p:cSld>
+    <p:bg>
+      <p:bgPr>
+        <a:solidFill>
+          <a:schemeClr val="bg1">
+            <a:alpha val="29000"/>
+          </a:schemeClr>
+        </a:solidFill>
+        <a:effectLst/>
+      </p:bgPr>
+    </p:bg>
     <p:spTree>
       <p:nvGrpSpPr>
         <p:cNvPr id="1" name=""/>
@@ -12968,8 +12980,8 @@
         </p:blipFill>
         <p:spPr>
           <a:xfrm>
-            <a:off x="3415909" y="4085578"/>
-            <a:ext cx="2902662" cy="619106"/>
+            <a:off x="3415908" y="4085578"/>
+            <a:ext cx="3052309" cy="619106"/>
           </a:xfrm>
           <a:prstGeom prst="rect">
             <a:avLst/>
@@ -14317,10 +14329,10 @@
       </p:sp>
       <p:sp>
         <p:nvSpPr>
-          <p:cNvPr id="36" name="Flowchart: Manual Input 35">
+          <p:cNvPr id="37" name="Rectangle 36">
             <a:extLst>
               <a:ext uri="{FF2B5EF4-FFF2-40B4-BE49-F238E27FC236}">
-                <a16:creationId xmlns:a16="http://schemas.microsoft.com/office/drawing/2014/main" id="{DCD2E0B9-350E-4CA6-B325-1C096AA13ED5}"/>
+                <a16:creationId xmlns:a16="http://schemas.microsoft.com/office/drawing/2014/main" id="{D6EE3446-987A-4F89-B4E6-4A55099177D3}"/>
               </a:ext>
             </a:extLst>
           </p:cNvPr>
@@ -14329,15 +14341,271 @@
         </p:nvSpPr>
         <p:spPr>
           <a:xfrm>
-            <a:off x="6180442" y="2980189"/>
-            <a:ext cx="6011558" cy="3887238"/>
+            <a:off x="3088355" y="5162508"/>
+            <a:ext cx="2902655" cy="1200329"/>
           </a:xfrm>
-          <a:prstGeom prst="flowChartManualInput">
+          <a:prstGeom prst="rect">
+            <a:avLst/>
+          </a:prstGeom>
+        </p:spPr>
+        <p:txBody>
+          <a:bodyPr wrap="square">
+            <a:spAutoFit/>
+          </a:bodyPr>
+          <a:lstStyle/>
+          <a:p>
+            <a:r>
+              <a:rPr lang="en-US" sz="1200" b="1" dirty="0"/>
+              <a:t>TABLE 1 - PA, PB: </a:t>
+            </a:r>
+            <a:r>
+              <a:rPr lang="en-US" sz="1200" dirty="0"/>
+              <a:t>Summary statistics 10-Q</a:t>
+            </a:r>
+          </a:p>
+          <a:p>
+            <a:r>
+              <a:rPr lang="en-US" sz="1200" b="1" dirty="0"/>
+              <a:t>TABLE 2 - PA: </a:t>
+            </a:r>
+            <a:r>
+              <a:rPr lang="en-US" sz="1200" dirty="0" err="1"/>
+              <a:t>TEX</a:t>
+            </a:r>
+            <a:r>
+              <a:rPr lang="en-US" sz="1200" baseline="-25000" dirty="0" err="1"/>
+              <a:t>t</a:t>
+            </a:r>
+            <a:r>
+              <a:rPr lang="en-US" sz="1200" dirty="0"/>
+              <a:t> = b</a:t>
+            </a:r>
+            <a:r>
+              <a:rPr lang="en-US" sz="1200" baseline="-25000" dirty="0"/>
+              <a:t>0</a:t>
+            </a:r>
+            <a:r>
+              <a:rPr lang="en-US" sz="1200" dirty="0"/>
+              <a:t> + b</a:t>
+            </a:r>
+            <a:r>
+              <a:rPr lang="en-US" sz="1200" baseline="-25000" dirty="0"/>
+              <a:t>1</a:t>
+            </a:r>
+            <a:r>
+              <a:rPr lang="en-US" sz="1200" dirty="0"/>
+              <a:t>*</a:t>
+            </a:r>
+            <a:r>
+              <a:rPr lang="en-US" sz="1200" dirty="0" err="1"/>
+              <a:t>QRET</a:t>
+            </a:r>
+            <a:r>
+              <a:rPr lang="en-US" sz="1200" baseline="-25000" dirty="0" err="1"/>
+              <a:t>t</a:t>
+            </a:r>
+            <a:r>
+              <a:rPr lang="en-US" sz="1200" dirty="0"/>
+              <a:t> + b</a:t>
+            </a:r>
+            <a:r>
+              <a:rPr lang="en-US" sz="1200" baseline="-25000" dirty="0"/>
+              <a:t>2</a:t>
+            </a:r>
+            <a:r>
+              <a:rPr lang="en-US" sz="1200" dirty="0"/>
+              <a:t>*</a:t>
+            </a:r>
+            <a:r>
+              <a:rPr lang="en-US" sz="1200" dirty="0" err="1"/>
+              <a:t>NEG</a:t>
+            </a:r>
+            <a:r>
+              <a:rPr lang="en-US" sz="1200" baseline="-25000" dirty="0" err="1"/>
+              <a:t>t</a:t>
+            </a:r>
+            <a:r>
+              <a:rPr lang="en-US" sz="1200" dirty="0"/>
+              <a:t> + b</a:t>
+            </a:r>
+            <a:r>
+              <a:rPr lang="en-US" sz="1200" baseline="-25000" dirty="0"/>
+              <a:t>3</a:t>
+            </a:r>
+            <a:r>
+              <a:rPr lang="en-US" sz="1200" dirty="0"/>
+              <a:t>*</a:t>
+            </a:r>
+            <a:r>
+              <a:rPr lang="en-US" sz="1200" dirty="0" err="1"/>
+              <a:t>QRET</a:t>
+            </a:r>
+            <a:r>
+              <a:rPr lang="en-US" sz="1200" baseline="-25000" dirty="0" err="1"/>
+              <a:t>t</a:t>
+            </a:r>
+            <a:r>
+              <a:rPr lang="en-US" sz="1200" dirty="0"/>
+              <a:t>*</a:t>
+            </a:r>
+            <a:r>
+              <a:rPr lang="en-US" sz="1200" dirty="0" err="1"/>
+              <a:t>NEG</a:t>
+            </a:r>
+            <a:r>
+              <a:rPr lang="en-US" sz="1200" baseline="-25000" dirty="0" err="1"/>
+              <a:t>t</a:t>
+            </a:r>
+            <a:r>
+              <a:rPr lang="en-US" sz="1200" dirty="0"/>
+              <a:t> + </a:t>
+            </a:r>
+            <a:r>
+              <a:rPr lang="en-US" sz="1200" dirty="0" err="1"/>
+              <a:t>controls</a:t>
+            </a:r>
+            <a:r>
+              <a:rPr lang="en-US" sz="1200" baseline="-25000" dirty="0" err="1"/>
+              <a:t>t</a:t>
+            </a:r>
+            <a:endParaRPr lang="en-US" sz="1200" baseline="-25000" dirty="0"/>
+          </a:p>
+          <a:p>
+            <a:r>
+              <a:rPr lang="en-US" sz="1200" b="1" dirty="0"/>
+              <a:t>TABLE 2 - PB: </a:t>
+            </a:r>
+            <a:r>
+              <a:rPr lang="en-US" sz="1200" dirty="0" err="1"/>
+              <a:t>ABTONE</a:t>
+            </a:r>
+            <a:r>
+              <a:rPr lang="en-US" sz="1200" baseline="-25000" dirty="0" err="1"/>
+              <a:t>t</a:t>
+            </a:r>
+            <a:r>
+              <a:rPr lang="en-US" sz="1200" dirty="0"/>
+              <a:t> = b</a:t>
+            </a:r>
+            <a:r>
+              <a:rPr lang="en-US" sz="1200" baseline="-25000" dirty="0"/>
+              <a:t>0</a:t>
+            </a:r>
+            <a:r>
+              <a:rPr lang="en-US" sz="1200" dirty="0"/>
+              <a:t> + b</a:t>
+            </a:r>
+            <a:r>
+              <a:rPr lang="en-US" sz="1200" baseline="-25000" dirty="0"/>
+              <a:t>1</a:t>
+            </a:r>
+            <a:r>
+              <a:rPr lang="en-US" sz="1200" dirty="0"/>
+              <a:t>*</a:t>
+            </a:r>
+            <a:r>
+              <a:rPr lang="en-US" sz="1200" dirty="0" err="1"/>
+              <a:t>QRET</a:t>
+            </a:r>
+            <a:r>
+              <a:rPr lang="en-US" sz="1200" baseline="-25000" dirty="0" err="1"/>
+              <a:t>t</a:t>
+            </a:r>
+            <a:r>
+              <a:rPr lang="en-US" sz="1200" dirty="0"/>
+              <a:t> + b</a:t>
+            </a:r>
+            <a:r>
+              <a:rPr lang="en-US" sz="1200" baseline="-25000" dirty="0"/>
+              <a:t>2</a:t>
+            </a:r>
+            <a:r>
+              <a:rPr lang="en-US" sz="1200" dirty="0"/>
+              <a:t>*</a:t>
+            </a:r>
+            <a:r>
+              <a:rPr lang="en-US" sz="1200" dirty="0" err="1"/>
+              <a:t>NEG</a:t>
+            </a:r>
+            <a:r>
+              <a:rPr lang="en-US" sz="1200" baseline="-25000" dirty="0" err="1"/>
+              <a:t>t</a:t>
+            </a:r>
+            <a:r>
+              <a:rPr lang="en-US" sz="1200" dirty="0"/>
+              <a:t> + b</a:t>
+            </a:r>
+            <a:r>
+              <a:rPr lang="en-US" sz="1200" baseline="-25000" dirty="0"/>
+              <a:t>3</a:t>
+            </a:r>
+            <a:r>
+              <a:rPr lang="en-US" sz="1200" dirty="0"/>
+              <a:t>*</a:t>
+            </a:r>
+            <a:r>
+              <a:rPr lang="en-US" sz="1200" dirty="0" err="1"/>
+              <a:t>QRET</a:t>
+            </a:r>
+            <a:r>
+              <a:rPr lang="en-US" sz="1200" baseline="-25000" dirty="0" err="1"/>
+              <a:t>t</a:t>
+            </a:r>
+            <a:r>
+              <a:rPr lang="en-US" sz="1200" dirty="0"/>
+              <a:t>*</a:t>
+            </a:r>
+            <a:r>
+              <a:rPr lang="en-US" sz="1200" dirty="0" err="1"/>
+              <a:t>NEG</a:t>
+            </a:r>
+            <a:r>
+              <a:rPr lang="en-US" sz="1200" baseline="-25000" dirty="0" err="1"/>
+              <a:t>t</a:t>
+            </a:r>
+            <a:r>
+              <a:rPr lang="en-US" sz="1200" dirty="0"/>
+              <a:t> + </a:t>
+            </a:r>
+            <a:r>
+              <a:rPr lang="en-US" sz="1200" dirty="0" err="1"/>
+              <a:t>controls</a:t>
+            </a:r>
+            <a:r>
+              <a:rPr lang="en-US" sz="1200" baseline="-25000" dirty="0" err="1"/>
+              <a:t>t</a:t>
+            </a:r>
+            <a:endParaRPr lang="en-US" sz="1200" dirty="0"/>
+          </a:p>
+          <a:p>
+            <a:endParaRPr lang="en-US" sz="1200" dirty="0"/>
+          </a:p>
+        </p:txBody>
+      </p:sp>
+      <p:sp>
+        <p:nvSpPr>
+          <p:cNvPr id="2" name="Rectangle 1">
+            <a:extLst>
+              <a:ext uri="{FF2B5EF4-FFF2-40B4-BE49-F238E27FC236}">
+                <a16:creationId xmlns:a16="http://schemas.microsoft.com/office/drawing/2014/main" id="{B30C3AE2-D2B2-4C56-B0A9-A53BE9544F83}"/>
+              </a:ext>
+            </a:extLst>
+          </p:cNvPr>
+          <p:cNvSpPr/>
+          <p:nvPr/>
+        </p:nvSpPr>
+        <p:spPr>
+          <a:xfrm>
+            <a:off x="6109098" y="3714517"/>
+            <a:ext cx="6082902" cy="3167747"/>
+          </a:xfrm>
+          <a:prstGeom prst="rect">
             <a:avLst/>
           </a:prstGeom>
           <a:solidFill>
-            <a:schemeClr val="tx1">
-              <a:alpha val="20000"/>
+            <a:schemeClr val="bg1">
+              <a:lumMod val="50000"/>
+              <a:alpha val="40000"/>
             </a:schemeClr>
           </a:solidFill>
           <a:ln>
@@ -14366,261 +14634,6 @@
           <a:p>
             <a:pPr algn="ctr"/>
             <a:endParaRPr lang="en-US"/>
-          </a:p>
-        </p:txBody>
-      </p:sp>
-      <p:sp>
-        <p:nvSpPr>
-          <p:cNvPr id="37" name="Rectangle 36">
-            <a:extLst>
-              <a:ext uri="{FF2B5EF4-FFF2-40B4-BE49-F238E27FC236}">
-                <a16:creationId xmlns:a16="http://schemas.microsoft.com/office/drawing/2014/main" id="{D6EE3446-987A-4F89-B4E6-4A55099177D3}"/>
-              </a:ext>
-            </a:extLst>
-          </p:cNvPr>
-          <p:cNvSpPr/>
-          <p:nvPr/>
-        </p:nvSpPr>
-        <p:spPr>
-          <a:xfrm>
-            <a:off x="3088355" y="5162508"/>
-            <a:ext cx="2902655" cy="1200329"/>
-          </a:xfrm>
-          <a:prstGeom prst="rect">
-            <a:avLst/>
-          </a:prstGeom>
-        </p:spPr>
-        <p:txBody>
-          <a:bodyPr wrap="square">
-            <a:spAutoFit/>
-          </a:bodyPr>
-          <a:lstStyle/>
-          <a:p>
-            <a:r>
-              <a:rPr lang="en-US" sz="1200" b="1" dirty="0"/>
-              <a:t>TABLE 1 - PA, PB: </a:t>
-            </a:r>
-            <a:r>
-              <a:rPr lang="en-US" sz="1200" dirty="0"/>
-              <a:t>Summary statistics 10-Q</a:t>
-            </a:r>
-          </a:p>
-          <a:p>
-            <a:r>
-              <a:rPr lang="en-US" sz="1200" b="1" dirty="0"/>
-              <a:t>TABLE 2 - PA: </a:t>
-            </a:r>
-            <a:r>
-              <a:rPr lang="en-US" sz="1200" dirty="0" err="1"/>
-              <a:t>Doc_measure</a:t>
-            </a:r>
-            <a:r>
-              <a:rPr lang="en-US" sz="1200" baseline="-25000" dirty="0" err="1"/>
-              <a:t>t</a:t>
-            </a:r>
-            <a:r>
-              <a:rPr lang="en-US" sz="1200" dirty="0"/>
-              <a:t> = b</a:t>
-            </a:r>
-            <a:r>
-              <a:rPr lang="en-US" sz="1200" baseline="-25000" dirty="0"/>
-              <a:t>0</a:t>
-            </a:r>
-            <a:r>
-              <a:rPr lang="en-US" sz="1200" dirty="0"/>
-              <a:t> + b</a:t>
-            </a:r>
-            <a:r>
-              <a:rPr lang="en-US" sz="1200" baseline="-25000" dirty="0"/>
-              <a:t>1</a:t>
-            </a:r>
-            <a:r>
-              <a:rPr lang="en-US" sz="1200" dirty="0"/>
-              <a:t>*</a:t>
-            </a:r>
-            <a:r>
-              <a:rPr lang="en-US" sz="1200" dirty="0" err="1"/>
-              <a:t>RET</a:t>
-            </a:r>
-            <a:r>
-              <a:rPr lang="en-US" sz="1200" baseline="-25000" dirty="0" err="1"/>
-              <a:t>t</a:t>
-            </a:r>
-            <a:r>
-              <a:rPr lang="en-US" sz="1200" dirty="0"/>
-              <a:t> + b</a:t>
-            </a:r>
-            <a:r>
-              <a:rPr lang="en-US" sz="1200" baseline="-25000" dirty="0"/>
-              <a:t>2</a:t>
-            </a:r>
-            <a:r>
-              <a:rPr lang="en-US" sz="1200" dirty="0"/>
-              <a:t>*</a:t>
-            </a:r>
-            <a:r>
-              <a:rPr lang="en-US" sz="1200" dirty="0" err="1"/>
-              <a:t>NEG</a:t>
-            </a:r>
-            <a:r>
-              <a:rPr lang="en-US" sz="1200" baseline="-25000" dirty="0" err="1"/>
-              <a:t>t</a:t>
-            </a:r>
-            <a:r>
-              <a:rPr lang="en-US" sz="1200" dirty="0"/>
-              <a:t> + b</a:t>
-            </a:r>
-            <a:r>
-              <a:rPr lang="en-US" sz="1200" baseline="-25000" dirty="0"/>
-              <a:t>3</a:t>
-            </a:r>
-            <a:r>
-              <a:rPr lang="en-US" sz="1200" dirty="0"/>
-              <a:t>*</a:t>
-            </a:r>
-            <a:r>
-              <a:rPr lang="en-US" sz="1200" dirty="0" err="1"/>
-              <a:t>RET</a:t>
-            </a:r>
-            <a:r>
-              <a:rPr lang="en-US" sz="1200" baseline="-25000" dirty="0" err="1"/>
-              <a:t>t</a:t>
-            </a:r>
-            <a:r>
-              <a:rPr lang="en-US" sz="1200" dirty="0"/>
-              <a:t>*</a:t>
-            </a:r>
-            <a:r>
-              <a:rPr lang="en-US" sz="1200" dirty="0" err="1"/>
-              <a:t>NEG</a:t>
-            </a:r>
-            <a:r>
-              <a:rPr lang="en-US" sz="1200" baseline="-25000" dirty="0" err="1"/>
-              <a:t>t</a:t>
-            </a:r>
-            <a:r>
-              <a:rPr lang="en-US" sz="1200" dirty="0"/>
-              <a:t> + </a:t>
-            </a:r>
-            <a:r>
-              <a:rPr lang="en-US" sz="1200" dirty="0" err="1"/>
-              <a:t>controls</a:t>
-            </a:r>
-            <a:r>
-              <a:rPr lang="en-US" sz="1200" baseline="-25000" dirty="0" err="1"/>
-              <a:t>t</a:t>
-            </a:r>
-            <a:endParaRPr lang="en-US" sz="1200" baseline="-25000" dirty="0"/>
-          </a:p>
-          <a:p>
-            <a:r>
-              <a:rPr lang="en-US" sz="1200" b="1" dirty="0"/>
-              <a:t>TABLE 2 - PB: </a:t>
-            </a:r>
-            <a:r>
-              <a:rPr lang="en-US" sz="1200" dirty="0" err="1"/>
-              <a:t>ABTONE</a:t>
-            </a:r>
-            <a:r>
-              <a:rPr lang="en-US" sz="1200" baseline="-25000" dirty="0" err="1"/>
-              <a:t>t</a:t>
-            </a:r>
-            <a:r>
-              <a:rPr lang="en-US" sz="1200" dirty="0"/>
-              <a:t> = b</a:t>
-            </a:r>
-            <a:r>
-              <a:rPr lang="en-US" sz="1200" baseline="-25000" dirty="0"/>
-              <a:t>0</a:t>
-            </a:r>
-            <a:r>
-              <a:rPr lang="en-US" sz="1200" dirty="0"/>
-              <a:t> + b</a:t>
-            </a:r>
-            <a:r>
-              <a:rPr lang="en-US" sz="1200" baseline="-25000" dirty="0"/>
-              <a:t>1</a:t>
-            </a:r>
-            <a:r>
-              <a:rPr lang="en-US" sz="1200" dirty="0"/>
-              <a:t>*</a:t>
-            </a:r>
-            <a:r>
-              <a:rPr lang="en-US" sz="1200" dirty="0" err="1"/>
-              <a:t>RET</a:t>
-            </a:r>
-            <a:r>
-              <a:rPr lang="en-US" sz="1200" baseline="-25000" dirty="0" err="1"/>
-              <a:t>t</a:t>
-            </a:r>
-            <a:r>
-              <a:rPr lang="en-US" sz="1200" dirty="0"/>
-              <a:t> + b</a:t>
-            </a:r>
-            <a:r>
-              <a:rPr lang="en-US" sz="1200" baseline="-25000" dirty="0"/>
-              <a:t>2</a:t>
-            </a:r>
-            <a:r>
-              <a:rPr lang="en-US" sz="1200" dirty="0"/>
-              <a:t>*</a:t>
-            </a:r>
-            <a:r>
-              <a:rPr lang="en-US" sz="1200" dirty="0" err="1"/>
-              <a:t>NEG</a:t>
-            </a:r>
-            <a:r>
-              <a:rPr lang="en-US" sz="1200" baseline="-25000" dirty="0" err="1"/>
-              <a:t>t</a:t>
-            </a:r>
-            <a:r>
-              <a:rPr lang="en-US" sz="1200" dirty="0"/>
-              <a:t> + b</a:t>
-            </a:r>
-            <a:r>
-              <a:rPr lang="en-US" sz="1200" baseline="-25000" dirty="0"/>
-              <a:t>3</a:t>
-            </a:r>
-            <a:r>
-              <a:rPr lang="en-US" sz="1200" dirty="0"/>
-              <a:t>*</a:t>
-            </a:r>
-            <a:r>
-              <a:rPr lang="en-US" sz="1200" dirty="0" err="1"/>
-              <a:t>RET</a:t>
-            </a:r>
-            <a:r>
-              <a:rPr lang="en-US" sz="1200" baseline="-25000" dirty="0" err="1"/>
-              <a:t>t</a:t>
-            </a:r>
-            <a:r>
-              <a:rPr lang="en-US" sz="1200" dirty="0"/>
-              <a:t>*</a:t>
-            </a:r>
-            <a:r>
-              <a:rPr lang="en-US" sz="1200" dirty="0" err="1"/>
-              <a:t>NEG</a:t>
-            </a:r>
-            <a:r>
-              <a:rPr lang="en-US" sz="1200" baseline="-25000" dirty="0" err="1"/>
-              <a:t>t</a:t>
-            </a:r>
-            <a:r>
-              <a:rPr lang="en-US" sz="1200" dirty="0"/>
-              <a:t> + </a:t>
-            </a:r>
-            <a:r>
-              <a:rPr lang="en-US" sz="1200" dirty="0" err="1"/>
-              <a:t>controls</a:t>
-            </a:r>
-            <a:r>
-              <a:rPr lang="en-US" sz="1200" baseline="-25000" dirty="0" err="1"/>
-              <a:t>t</a:t>
-            </a:r>
-            <a:endParaRPr lang="en-US" sz="1200" dirty="0"/>
-          </a:p>
-          <a:p>
-            <a:endParaRPr lang="en-US" sz="1200" dirty="0"/>
           </a:p>
         </p:txBody>
       </p:sp>
@@ -16320,7 +16333,7 @@
             </a:pPr>
             <a:r>
               <a:rPr lang="en-US" sz="1400" dirty="0"/>
-              <a:t>Variable creation and screening**: </a:t>
+              <a:t>Variable creation and screening***: </a:t>
             </a:r>
             <a:r>
               <a:rPr lang="en-US" sz="1400" dirty="0">
@@ -16353,8 +16366,8 @@
         </p:nvSpPr>
         <p:spPr>
           <a:xfrm>
-            <a:off x="6183053" y="3622768"/>
-            <a:ext cx="1501128" cy="296747"/>
+            <a:off x="6183052" y="3622768"/>
+            <a:ext cx="1622333" cy="317081"/>
           </a:xfrm>
           <a:prstGeom prst="rect">
             <a:avLst/>
@@ -16362,7 +16375,7 @@
         </p:spPr>
         <p:txBody>
           <a:bodyPr vert="horz" lIns="91440" tIns="45720" rIns="91440" bIns="45720" rtlCol="0">
-            <a:normAutofit/>
+            <a:normAutofit fontScale="92500"/>
           </a:bodyPr>
           <a:lstStyle>
             <a:lvl1pPr marL="0" indent="0" algn="ctr" defTabSz="914400" rtl="0" eaLnBrk="1" latinLnBrk="0" hangingPunct="1">
@@ -16536,7 +16549,7 @@
                   <a:srgbClr val="C0C0C0"/>
                 </a:highlight>
               </a:rPr>
-              <a:t>Merge – Match*</a:t>
+              <a:t>Merge and Match**</a:t>
             </a:r>
           </a:p>
           <a:p>
@@ -17034,8 +17047,8 @@
         </p:nvSpPr>
         <p:spPr>
           <a:xfrm>
-            <a:off x="7588577" y="6661182"/>
-            <a:ext cx="4649613" cy="290997"/>
+            <a:off x="6259403" y="6676644"/>
+            <a:ext cx="6042578" cy="342933"/>
           </a:xfrm>
           <a:prstGeom prst="rect">
             <a:avLst/>
@@ -17217,7 +17230,7 @@
                   <a:srgbClr val="C0C0C0"/>
                 </a:highlight>
               </a:rPr>
-              <a:t>* see matching rule description in next page ** see screening criterion in code</a:t>
+              <a:t>* see code 8-K [6] ** see matching rule illustration in next page *** see screening criterion in 8-K code</a:t>
             </a:r>
           </a:p>
         </p:txBody>
@@ -17265,7 +17278,7 @@
             </a:r>
             <a:r>
               <a:rPr lang="en-US" sz="1400" dirty="0" err="1"/>
-              <a:t>Doc_measure</a:t>
+              <a:t>TEX</a:t>
             </a:r>
             <a:r>
               <a:rPr lang="en-US" sz="1400" baseline="-25000" dirty="0" err="1"/>
@@ -17293,7 +17306,7 @@
             </a:r>
             <a:r>
               <a:rPr lang="en-US" sz="1400" dirty="0" err="1"/>
-              <a:t>DRET</a:t>
+              <a:t>DeltaDRET</a:t>
             </a:r>
             <a:r>
               <a:rPr lang="en-US" sz="1400" baseline="-25000" dirty="0" err="1"/>
@@ -17333,7 +17346,7 @@
             </a:r>
             <a:r>
               <a:rPr lang="en-US" sz="1400" dirty="0" err="1"/>
-              <a:t>DRET</a:t>
+              <a:t>DeltaDRET</a:t>
             </a:r>
             <a:r>
               <a:rPr lang="en-US" sz="1400" baseline="-25000" dirty="0" err="1"/>
@@ -17368,15 +17381,11 @@
           <a:p>
             <a:r>
               <a:rPr lang="en-US" sz="1400" b="1" dirty="0"/>
-              <a:t>TABLE 3 - PB: </a:t>
-            </a:r>
-            <a:r>
-              <a:rPr lang="en-US" sz="1400"/>
-              <a:t>8-K ordered </a:t>
+              <a:t>TABLE 3 - PB:</a:t>
             </a:r>
             <a:r>
               <a:rPr lang="en-US" sz="1400" dirty="0"/>
-              <a:t>logistics model (TLAG = 1, 2, 3, 4)</a:t>
+              <a:t> OLS (NITEM); ordered logistics model (N8K and TLAG)</a:t>
             </a:r>
           </a:p>
         </p:txBody>
@@ -17392,14 +17401,13 @@
           </p:cNvPr>
           <p:cNvCxnSpPr>
             <a:cxnSpLocks/>
-            <a:endCxn id="30" idx="0"/>
           </p:cNvCxnSpPr>
           <p:nvPr/>
         </p:nvCxnSpPr>
         <p:spPr>
           <a:xfrm>
             <a:off x="6844460" y="5780350"/>
-            <a:ext cx="402311" cy="190991"/>
+            <a:ext cx="0" cy="190991"/>
           </a:xfrm>
           <a:prstGeom prst="straightConnector1">
             <a:avLst/>
@@ -17473,7 +17481,10 @@
           <a:prstGeom prst="straightConnector1">
             <a:avLst/>
           </a:prstGeom>
-          <a:ln>
+          <a:ln w="25400">
+            <a:solidFill>
+              <a:schemeClr val="tx1"/>
+            </a:solidFill>
             <a:tailEnd type="triangle"/>
           </a:ln>
         </p:spPr>
@@ -17508,12 +17519,17 @@
         </p:nvCxnSpPr>
         <p:spPr>
           <a:xfrm>
-            <a:off x="2762054" y="1512277"/>
-            <a:ext cx="0" cy="137414"/>
+            <a:off x="2762054" y="1593548"/>
+            <a:ext cx="0" cy="56143"/>
           </a:xfrm>
           <a:prstGeom prst="line">
             <a:avLst/>
           </a:prstGeom>
+          <a:ln w="25400">
+            <a:solidFill>
+              <a:schemeClr val="tx1"/>
+            </a:solidFill>
+          </a:ln>
         </p:spPr>
         <p:style>
           <a:lnRef idx="1">
@@ -17546,12 +17562,17 @@
         </p:nvCxnSpPr>
         <p:spPr>
           <a:xfrm>
-            <a:off x="5516252" y="1512277"/>
-            <a:ext cx="0" cy="137414"/>
+            <a:off x="5516252" y="1562886"/>
+            <a:ext cx="0" cy="86805"/>
           </a:xfrm>
           <a:prstGeom prst="line">
             <a:avLst/>
           </a:prstGeom>
+          <a:ln w="25400">
+            <a:solidFill>
+              <a:schemeClr val="tx1"/>
+            </a:solidFill>
+          </a:ln>
         </p:spPr>
         <p:style>
           <a:lnRef idx="1">
@@ -17588,6 +17609,11 @@
           <a:prstGeom prst="line">
             <a:avLst/>
           </a:prstGeom>
+          <a:ln w="25400">
+            <a:solidFill>
+              <a:schemeClr val="tx1"/>
+            </a:solidFill>
+          </a:ln>
         </p:spPr>
         <p:style>
           <a:lnRef idx="1">
@@ -17633,8 +17659,12 @@
           <a:lstStyle/>
           <a:p>
             <a:r>
-              <a:rPr lang="en-US" dirty="0"/>
-              <a:t>News</a:t>
+              <a:rPr lang="en-US" dirty="0">
+                <a:solidFill>
+                  <a:srgbClr val="7030A0"/>
+                </a:solidFill>
+              </a:rPr>
+              <a:t>News-1</a:t>
             </a:r>
           </a:p>
         </p:txBody>
@@ -17653,7 +17683,7 @@
         </p:nvSpPr>
         <p:spPr>
           <a:xfrm>
-            <a:off x="5181600" y="1186091"/>
+            <a:off x="5115624" y="1198662"/>
             <a:ext cx="914400" cy="369332"/>
           </a:xfrm>
           <a:prstGeom prst="rect">
@@ -17668,8 +17698,12 @@
           <a:lstStyle/>
           <a:p>
             <a:r>
-              <a:rPr lang="en-US" dirty="0"/>
-              <a:t>News</a:t>
+              <a:rPr lang="en-US" dirty="0">
+                <a:solidFill>
+                  <a:srgbClr val="7030A0"/>
+                </a:solidFill>
+              </a:rPr>
+              <a:t>News-2</a:t>
             </a:r>
           </a:p>
         </p:txBody>
@@ -17688,8 +17722,8 @@
         </p:nvSpPr>
         <p:spPr>
           <a:xfrm>
-            <a:off x="3804896" y="1227668"/>
-            <a:ext cx="516113" cy="369332"/>
+            <a:off x="3668228" y="1214904"/>
+            <a:ext cx="680689" cy="369332"/>
           </a:xfrm>
           <a:prstGeom prst="rect">
             <a:avLst/>
@@ -17703,8 +17737,12 @@
           <a:lstStyle/>
           <a:p>
             <a:r>
-              <a:rPr lang="en-US" dirty="0"/>
-              <a:t>8-K</a:t>
+              <a:rPr lang="en-US" dirty="0">
+                <a:solidFill>
+                  <a:schemeClr val="accent1"/>
+                </a:solidFill>
+              </a:rPr>
+              <a:t>8-K-1</a:t>
             </a:r>
           </a:p>
         </p:txBody>
@@ -17775,8 +17813,8 @@
         </p:nvSpPr>
         <p:spPr>
           <a:xfrm>
-            <a:off x="4410965" y="1227668"/>
-            <a:ext cx="516113" cy="369332"/>
+            <a:off x="4405718" y="1227668"/>
+            <a:ext cx="693042" cy="369332"/>
           </a:xfrm>
           <a:prstGeom prst="rect">
             <a:avLst/>
@@ -17790,8 +17828,12 @@
           <a:lstStyle/>
           <a:p>
             <a:r>
-              <a:rPr lang="en-US" dirty="0"/>
-              <a:t>8-K</a:t>
+              <a:rPr lang="en-US" dirty="0">
+                <a:solidFill>
+                  <a:schemeClr val="accent1"/>
+                </a:solidFill>
+              </a:rPr>
+              <a:t>8-K-2</a:t>
             </a:r>
           </a:p>
         </p:txBody>
@@ -17812,12 +17854,17 @@
         </p:nvCxnSpPr>
         <p:spPr>
           <a:xfrm>
-            <a:off x="7019826" y="1512277"/>
-            <a:ext cx="0" cy="137142"/>
+            <a:off x="7201011" y="1546854"/>
+            <a:ext cx="0" cy="107510"/>
           </a:xfrm>
           <a:prstGeom prst="line">
             <a:avLst/>
           </a:prstGeom>
+          <a:ln w="25400">
+            <a:solidFill>
+              <a:schemeClr val="tx1"/>
+            </a:solidFill>
+          </a:ln>
         </p:spPr>
         <p:style>
           <a:lnRef idx="1">
@@ -17848,8 +17895,8 @@
         </p:nvSpPr>
         <p:spPr>
           <a:xfrm>
-            <a:off x="6685174" y="1185819"/>
-            <a:ext cx="914400" cy="369332"/>
+            <a:off x="6309034" y="1178196"/>
+            <a:ext cx="1741457" cy="369332"/>
           </a:xfrm>
           <a:prstGeom prst="rect">
             <a:avLst/>
@@ -17863,8 +17910,24 @@
           <a:lstStyle/>
           <a:p>
             <a:r>
+              <a:rPr lang="en-US" dirty="0">
+                <a:solidFill>
+                  <a:srgbClr val="7030A0"/>
+                </a:solidFill>
+              </a:rPr>
+              <a:t>News-3</a:t>
+            </a:r>
+            <a:r>
               <a:rPr lang="en-US" dirty="0"/>
-              <a:t>News</a:t>
+              <a:t> &amp; </a:t>
+            </a:r>
+            <a:r>
+              <a:rPr lang="en-US" dirty="0">
+                <a:solidFill>
+                  <a:schemeClr val="accent1"/>
+                </a:solidFill>
+              </a:rPr>
+              <a:t>8-K-3</a:t>
             </a:r>
           </a:p>
         </p:txBody>
@@ -17883,8 +17946,8 @@
         </p:nvSpPr>
         <p:spPr>
           <a:xfrm>
-            <a:off x="2986817" y="848798"/>
-            <a:ext cx="914400" cy="369332"/>
+            <a:off x="2899681" y="813150"/>
+            <a:ext cx="1041336" cy="369332"/>
           </a:xfrm>
           <a:prstGeom prst="rect">
             <a:avLst/>
@@ -17903,7 +17966,7 @@
                   <a:srgbClr val="FF0000"/>
                 </a:solidFill>
               </a:rPr>
-              <a:t>Match</a:t>
+              <a:t>Match-1</a:t>
             </a:r>
           </a:p>
         </p:txBody>
@@ -17957,8 +18020,8 @@
         </p:nvSpPr>
         <p:spPr>
           <a:xfrm>
-            <a:off x="3079852" y="1586653"/>
-            <a:ext cx="821365" cy="369332"/>
+            <a:off x="3020109" y="1593548"/>
+            <a:ext cx="932826" cy="369332"/>
           </a:xfrm>
           <a:prstGeom prst="rect">
             <a:avLst/>
@@ -17972,8 +18035,14 @@
           <a:lstStyle/>
           <a:p>
             <a:r>
-              <a:rPr lang="en-US" dirty="0"/>
-              <a:t>TLAG</a:t>
+              <a:rPr lang="en-US" dirty="0">
+                <a:solidFill>
+                  <a:schemeClr val="accent6">
+                    <a:lumMod val="75000"/>
+                  </a:schemeClr>
+                </a:solidFill>
+              </a:rPr>
+              <a:t>TLAG-1</a:t>
             </a:r>
           </a:p>
         </p:txBody>
@@ -18000,6 +18069,11 @@
           <a:prstGeom prst="line">
             <a:avLst/>
           </a:prstGeom>
+          <a:ln w="25400">
+            <a:solidFill>
+              <a:schemeClr val="tx1"/>
+            </a:solidFill>
+          </a:ln>
         </p:spPr>
         <p:style>
           <a:lnRef idx="1">
@@ -18038,6 +18112,11 @@
           <a:prstGeom prst="line">
             <a:avLst/>
           </a:prstGeom>
+          <a:ln w="25400">
+            <a:solidFill>
+              <a:schemeClr val="tx1"/>
+            </a:solidFill>
+          </a:ln>
         </p:spPr>
         <p:style>
           <a:lnRef idx="1">
@@ -18064,19 +18143,22 @@
             </a:extLst>
           </p:cNvPr>
           <p:cNvCxnSpPr>
-            <a:stCxn id="28" idx="1"/>
+            <a:cxnSpLocks/>
           </p:cNvCxnSpPr>
           <p:nvPr/>
         </p:nvCxnSpPr>
         <p:spPr>
           <a:xfrm flipH="1" flipV="1">
-            <a:off x="2762054" y="1764369"/>
-            <a:ext cx="317798" cy="6950"/>
+            <a:off x="2762054" y="1778214"/>
+            <a:ext cx="306936" cy="1020"/>
           </a:xfrm>
           <a:prstGeom prst="straightConnector1">
             <a:avLst/>
           </a:prstGeom>
-          <a:ln>
+          <a:ln w="25400">
+            <a:solidFill>
+              <a:schemeClr val="tx1"/>
+            </a:solidFill>
             <a:tailEnd type="triangle"/>
           </a:ln>
         </p:spPr>
@@ -18104,18 +18186,23 @@
               </a:ext>
             </a:extLst>
           </p:cNvPr>
-          <p:cNvCxnSpPr/>
+          <p:cNvCxnSpPr>
+            <a:cxnSpLocks/>
+          </p:cNvCxnSpPr>
           <p:nvPr/>
         </p:nvCxnSpPr>
         <p:spPr>
           <a:xfrm>
-            <a:off x="3727938" y="1786833"/>
-            <a:ext cx="335014" cy="0"/>
+            <a:off x="3821723" y="1778214"/>
+            <a:ext cx="241229" cy="0"/>
           </a:xfrm>
           <a:prstGeom prst="straightConnector1">
             <a:avLst/>
           </a:prstGeom>
-          <a:ln>
+          <a:ln w="25400">
+            <a:solidFill>
+              <a:schemeClr val="tx1"/>
+            </a:solidFill>
             <a:tailEnd type="triangle"/>
           </a:ln>
         </p:spPr>
@@ -18154,6 +18241,11 @@
           <a:prstGeom prst="line">
             <a:avLst/>
           </a:prstGeom>
+          <a:ln w="25400">
+            <a:solidFill>
+              <a:schemeClr val="tx1"/>
+            </a:solidFill>
+          </a:ln>
         </p:spPr>
         <p:style>
           <a:lnRef idx="1">
@@ -18170,6 +18262,97 @@
           </a:fontRef>
         </p:style>
       </p:cxnSp>
+      <p:sp>
+        <p:nvSpPr>
+          <p:cNvPr id="52" name="Oval 51">
+            <a:extLst>
+              <a:ext uri="{FF2B5EF4-FFF2-40B4-BE49-F238E27FC236}">
+                <a16:creationId xmlns:a16="http://schemas.microsoft.com/office/drawing/2014/main" id="{BDAC114B-D443-4764-AA79-72A63EF277E3}"/>
+              </a:ext>
+            </a:extLst>
+          </p:cNvPr>
+          <p:cNvSpPr/>
+          <p:nvPr/>
+        </p:nvSpPr>
+        <p:spPr>
+          <a:xfrm>
+            <a:off x="6262991" y="1170978"/>
+            <a:ext cx="1741457" cy="369332"/>
+          </a:xfrm>
+          <a:prstGeom prst="ellipse">
+            <a:avLst/>
+          </a:prstGeom>
+          <a:noFill/>
+          <a:ln>
+            <a:solidFill>
+              <a:srgbClr val="FF0000"/>
+            </a:solidFill>
+          </a:ln>
+        </p:spPr>
+        <p:style>
+          <a:lnRef idx="2">
+            <a:schemeClr val="accent1">
+              <a:shade val="50000"/>
+            </a:schemeClr>
+          </a:lnRef>
+          <a:fillRef idx="1">
+            <a:schemeClr val="accent1"/>
+          </a:fillRef>
+          <a:effectRef idx="0">
+            <a:schemeClr val="accent1"/>
+          </a:effectRef>
+          <a:fontRef idx="minor">
+            <a:schemeClr val="lt1"/>
+          </a:fontRef>
+        </p:style>
+        <p:txBody>
+          <a:bodyPr rtlCol="0" anchor="ctr"/>
+          <a:lstStyle/>
+          <a:p>
+            <a:pPr algn="ctr"/>
+            <a:endParaRPr lang="en-US"/>
+          </a:p>
+        </p:txBody>
+      </p:sp>
+      <p:sp>
+        <p:nvSpPr>
+          <p:cNvPr id="53" name="TextBox 52">
+            <a:extLst>
+              <a:ext uri="{FF2B5EF4-FFF2-40B4-BE49-F238E27FC236}">
+                <a16:creationId xmlns:a16="http://schemas.microsoft.com/office/drawing/2014/main" id="{7B11C845-A0A6-4B78-9690-960EADE06B5E}"/>
+              </a:ext>
+            </a:extLst>
+          </p:cNvPr>
+          <p:cNvSpPr txBox="1"/>
+          <p:nvPr/>
+        </p:nvSpPr>
+        <p:spPr>
+          <a:xfrm>
+            <a:off x="6680343" y="845572"/>
+            <a:ext cx="1041336" cy="369332"/>
+          </a:xfrm>
+          <a:prstGeom prst="rect">
+            <a:avLst/>
+          </a:prstGeom>
+          <a:noFill/>
+        </p:spPr>
+        <p:txBody>
+          <a:bodyPr wrap="square" rtlCol="0">
+            <a:spAutoFit/>
+          </a:bodyPr>
+          <a:lstStyle/>
+          <a:p>
+            <a:r>
+              <a:rPr lang="en-US" dirty="0">
+                <a:solidFill>
+                  <a:srgbClr val="FF0000"/>
+                </a:solidFill>
+              </a:rPr>
+              <a:t>Match-2</a:t>
+            </a:r>
+          </a:p>
+        </p:txBody>
+      </p:sp>
     </p:spTree>
     <p:extLst>
       <p:ext uri="{BB962C8B-B14F-4D97-AF65-F5344CB8AC3E}">

</xml_diff>

<commit_message>
new match, revised paper V4
</commit_message>
<xml_diff>
--- a/output/Figures.pptx
+++ b/output/Figures.pptx
@@ -275,7 +275,7 @@
           <a:p>
             <a:fld id="{F6465CF2-20FA-4A27-B5DD-24B9293428AE}" type="datetimeFigureOut">
               <a:rPr lang="en-US" smtClean="0"/>
-              <a:t>5/28/2020</a:t>
+              <a:t>7/15/2020</a:t>
             </a:fld>
             <a:endParaRPr lang="en-US"/>
           </a:p>
@@ -473,7 +473,7 @@
           <a:p>
             <a:fld id="{F6465CF2-20FA-4A27-B5DD-24B9293428AE}" type="datetimeFigureOut">
               <a:rPr lang="en-US" smtClean="0"/>
-              <a:t>5/28/2020</a:t>
+              <a:t>7/15/2020</a:t>
             </a:fld>
             <a:endParaRPr lang="en-US"/>
           </a:p>
@@ -681,7 +681,7 @@
           <a:p>
             <a:fld id="{F6465CF2-20FA-4A27-B5DD-24B9293428AE}" type="datetimeFigureOut">
               <a:rPr lang="en-US" smtClean="0"/>
-              <a:t>5/28/2020</a:t>
+              <a:t>7/15/2020</a:t>
             </a:fld>
             <a:endParaRPr lang="en-US"/>
           </a:p>
@@ -879,7 +879,7 @@
           <a:p>
             <a:fld id="{F6465CF2-20FA-4A27-B5DD-24B9293428AE}" type="datetimeFigureOut">
               <a:rPr lang="en-US" smtClean="0"/>
-              <a:t>5/28/2020</a:t>
+              <a:t>7/15/2020</a:t>
             </a:fld>
             <a:endParaRPr lang="en-US"/>
           </a:p>
@@ -1154,7 +1154,7 @@
           <a:p>
             <a:fld id="{F6465CF2-20FA-4A27-B5DD-24B9293428AE}" type="datetimeFigureOut">
               <a:rPr lang="en-US" smtClean="0"/>
-              <a:t>5/28/2020</a:t>
+              <a:t>7/15/2020</a:t>
             </a:fld>
             <a:endParaRPr lang="en-US"/>
           </a:p>
@@ -1419,7 +1419,7 @@
           <a:p>
             <a:fld id="{F6465CF2-20FA-4A27-B5DD-24B9293428AE}" type="datetimeFigureOut">
               <a:rPr lang="en-US" smtClean="0"/>
-              <a:t>5/28/2020</a:t>
+              <a:t>7/15/2020</a:t>
             </a:fld>
             <a:endParaRPr lang="en-US"/>
           </a:p>
@@ -1831,7 +1831,7 @@
           <a:p>
             <a:fld id="{F6465CF2-20FA-4A27-B5DD-24B9293428AE}" type="datetimeFigureOut">
               <a:rPr lang="en-US" smtClean="0"/>
-              <a:t>5/28/2020</a:t>
+              <a:t>7/15/2020</a:t>
             </a:fld>
             <a:endParaRPr lang="en-US"/>
           </a:p>
@@ -1972,7 +1972,7 @@
           <a:p>
             <a:fld id="{F6465CF2-20FA-4A27-B5DD-24B9293428AE}" type="datetimeFigureOut">
               <a:rPr lang="en-US" smtClean="0"/>
-              <a:t>5/28/2020</a:t>
+              <a:t>7/15/2020</a:t>
             </a:fld>
             <a:endParaRPr lang="en-US"/>
           </a:p>
@@ -2085,7 +2085,7 @@
           <a:p>
             <a:fld id="{F6465CF2-20FA-4A27-B5DD-24B9293428AE}" type="datetimeFigureOut">
               <a:rPr lang="en-US" smtClean="0"/>
-              <a:t>5/28/2020</a:t>
+              <a:t>7/15/2020</a:t>
             </a:fld>
             <a:endParaRPr lang="en-US"/>
           </a:p>
@@ -2396,7 +2396,7 @@
           <a:p>
             <a:fld id="{F6465CF2-20FA-4A27-B5DD-24B9293428AE}" type="datetimeFigureOut">
               <a:rPr lang="en-US" smtClean="0"/>
-              <a:t>5/28/2020</a:t>
+              <a:t>7/15/2020</a:t>
             </a:fld>
             <a:endParaRPr lang="en-US"/>
           </a:p>
@@ -2684,7 +2684,7 @@
           <a:p>
             <a:fld id="{F6465CF2-20FA-4A27-B5DD-24B9293428AE}" type="datetimeFigureOut">
               <a:rPr lang="en-US" smtClean="0"/>
-              <a:t>5/28/2020</a:t>
+              <a:t>7/15/2020</a:t>
             </a:fld>
             <a:endParaRPr lang="en-US"/>
           </a:p>
@@ -2925,7 +2925,7 @@
           <a:p>
             <a:fld id="{F6465CF2-20FA-4A27-B5DD-24B9293428AE}" type="datetimeFigureOut">
               <a:rPr lang="en-US" smtClean="0"/>
-              <a:t>5/28/2020</a:t>
+              <a:t>7/15/2020</a:t>
             </a:fld>
             <a:endParaRPr lang="en-US"/>
           </a:p>
@@ -16323,7 +16323,7 @@
                   <a:srgbClr val="FFFF00"/>
                 </a:highlight>
               </a:rPr>
-              <a:t>390,698</a:t>
+              <a:t>442,611</a:t>
             </a:r>
           </a:p>
           <a:p>
@@ -16341,7 +16341,7 @@
                   <a:srgbClr val="FF0000"/>
                 </a:highlight>
               </a:rPr>
-              <a:t>244,401</a:t>
+              <a:t>137,718</a:t>
             </a:r>
           </a:p>
           <a:p>
@@ -17470,13 +17470,15 @@
               </a:ext>
             </a:extLst>
           </p:cNvPr>
-          <p:cNvCxnSpPr/>
+          <p:cNvCxnSpPr>
+            <a:cxnSpLocks/>
+          </p:cNvCxnSpPr>
           <p:nvPr/>
         </p:nvCxnSpPr>
         <p:spPr>
-          <a:xfrm>
-            <a:off x="1545996" y="1649691"/>
-            <a:ext cx="6504495" cy="0"/>
+          <a:xfrm flipV="1">
+            <a:off x="594804" y="1652075"/>
+            <a:ext cx="8753382" cy="4834"/>
           </a:xfrm>
           <a:prstGeom prst="straightConnector1">
             <a:avLst/>
@@ -17503,491 +17505,6 @@
           </a:fontRef>
         </p:style>
       </p:cxnSp>
-      <p:cxnSp>
-        <p:nvCxnSpPr>
-          <p:cNvPr id="7" name="Straight Connector 6">
-            <a:extLst>
-              <a:ext uri="{FF2B5EF4-FFF2-40B4-BE49-F238E27FC236}">
-                <a16:creationId xmlns:a16="http://schemas.microsoft.com/office/drawing/2014/main" id="{388A44D9-DE0C-4353-A989-BBFC0F9CD759}"/>
-              </a:ext>
-            </a:extLst>
-          </p:cNvPr>
-          <p:cNvCxnSpPr>
-            <a:cxnSpLocks/>
-          </p:cNvCxnSpPr>
-          <p:nvPr/>
-        </p:nvCxnSpPr>
-        <p:spPr>
-          <a:xfrm>
-            <a:off x="2762054" y="1593548"/>
-            <a:ext cx="0" cy="56143"/>
-          </a:xfrm>
-          <a:prstGeom prst="line">
-            <a:avLst/>
-          </a:prstGeom>
-          <a:ln w="25400">
-            <a:solidFill>
-              <a:schemeClr val="tx1"/>
-            </a:solidFill>
-          </a:ln>
-        </p:spPr>
-        <p:style>
-          <a:lnRef idx="1">
-            <a:schemeClr val="accent1"/>
-          </a:lnRef>
-          <a:fillRef idx="0">
-            <a:schemeClr val="accent1"/>
-          </a:fillRef>
-          <a:effectRef idx="0">
-            <a:schemeClr val="accent1"/>
-          </a:effectRef>
-          <a:fontRef idx="minor">
-            <a:schemeClr val="tx1"/>
-          </a:fontRef>
-        </p:style>
-      </p:cxnSp>
-      <p:cxnSp>
-        <p:nvCxnSpPr>
-          <p:cNvPr id="9" name="Straight Connector 8">
-            <a:extLst>
-              <a:ext uri="{FF2B5EF4-FFF2-40B4-BE49-F238E27FC236}">
-                <a16:creationId xmlns:a16="http://schemas.microsoft.com/office/drawing/2014/main" id="{0C0E7299-FE7B-4513-B1DE-E55865A86FD4}"/>
-              </a:ext>
-            </a:extLst>
-          </p:cNvPr>
-          <p:cNvCxnSpPr>
-            <a:cxnSpLocks/>
-          </p:cNvCxnSpPr>
-          <p:nvPr/>
-        </p:nvCxnSpPr>
-        <p:spPr>
-          <a:xfrm>
-            <a:off x="5516252" y="1562886"/>
-            <a:ext cx="0" cy="86805"/>
-          </a:xfrm>
-          <a:prstGeom prst="line">
-            <a:avLst/>
-          </a:prstGeom>
-          <a:ln w="25400">
-            <a:solidFill>
-              <a:schemeClr val="tx1"/>
-            </a:solidFill>
-          </a:ln>
-        </p:spPr>
-        <p:style>
-          <a:lnRef idx="1">
-            <a:schemeClr val="accent1"/>
-          </a:lnRef>
-          <a:fillRef idx="0">
-            <a:schemeClr val="accent1"/>
-          </a:fillRef>
-          <a:effectRef idx="0">
-            <a:schemeClr val="accent1"/>
-          </a:effectRef>
-          <a:fontRef idx="minor">
-            <a:schemeClr val="tx1"/>
-          </a:fontRef>
-        </p:style>
-      </p:cxnSp>
-      <p:cxnSp>
-        <p:nvCxnSpPr>
-          <p:cNvPr id="12" name="Straight Connector 11">
-            <a:extLst>
-              <a:ext uri="{FF2B5EF4-FFF2-40B4-BE49-F238E27FC236}">
-                <a16:creationId xmlns:a16="http://schemas.microsoft.com/office/drawing/2014/main" id="{2058D670-BC32-478F-A34A-F342B0665ED9}"/>
-              </a:ext>
-            </a:extLst>
-          </p:cNvPr>
-          <p:cNvCxnSpPr/>
-          <p:nvPr/>
-        </p:nvCxnSpPr>
-        <p:spPr>
-          <a:xfrm>
-            <a:off x="4062953" y="1574276"/>
-            <a:ext cx="0" cy="75415"/>
-          </a:xfrm>
-          <a:prstGeom prst="line">
-            <a:avLst/>
-          </a:prstGeom>
-          <a:ln w="25400">
-            <a:solidFill>
-              <a:schemeClr val="tx1"/>
-            </a:solidFill>
-          </a:ln>
-        </p:spPr>
-        <p:style>
-          <a:lnRef idx="1">
-            <a:schemeClr val="accent1"/>
-          </a:lnRef>
-          <a:fillRef idx="0">
-            <a:schemeClr val="accent1"/>
-          </a:fillRef>
-          <a:effectRef idx="0">
-            <a:schemeClr val="accent1"/>
-          </a:effectRef>
-          <a:fontRef idx="minor">
-            <a:schemeClr val="tx1"/>
-          </a:fontRef>
-        </p:style>
-      </p:cxnSp>
-      <p:sp>
-        <p:nvSpPr>
-          <p:cNvPr id="14" name="TextBox 13">
-            <a:extLst>
-              <a:ext uri="{FF2B5EF4-FFF2-40B4-BE49-F238E27FC236}">
-                <a16:creationId xmlns:a16="http://schemas.microsoft.com/office/drawing/2014/main" id="{6BF2BB52-BD0E-425C-BE82-62C833A89DDD}"/>
-              </a:ext>
-            </a:extLst>
-          </p:cNvPr>
-          <p:cNvSpPr txBox="1"/>
-          <p:nvPr/>
-        </p:nvSpPr>
-        <p:spPr>
-          <a:xfrm>
-            <a:off x="2432115" y="1186091"/>
-            <a:ext cx="914400" cy="369332"/>
-          </a:xfrm>
-          <a:prstGeom prst="rect">
-            <a:avLst/>
-          </a:prstGeom>
-          <a:noFill/>
-        </p:spPr>
-        <p:txBody>
-          <a:bodyPr wrap="square" rtlCol="0">
-            <a:spAutoFit/>
-          </a:bodyPr>
-          <a:lstStyle/>
-          <a:p>
-            <a:r>
-              <a:rPr lang="en-US" dirty="0">
-                <a:solidFill>
-                  <a:srgbClr val="7030A0"/>
-                </a:solidFill>
-                <a:latin typeface="Times New Roman" panose="02020603050405020304" pitchFamily="18" charset="0"/>
-                <a:cs typeface="Times New Roman" panose="02020603050405020304" pitchFamily="18" charset="0"/>
-              </a:rPr>
-              <a:t>News-1</a:t>
-            </a:r>
-          </a:p>
-        </p:txBody>
-      </p:sp>
-      <p:sp>
-        <p:nvSpPr>
-          <p:cNvPr id="15" name="TextBox 14">
-            <a:extLst>
-              <a:ext uri="{FF2B5EF4-FFF2-40B4-BE49-F238E27FC236}">
-                <a16:creationId xmlns:a16="http://schemas.microsoft.com/office/drawing/2014/main" id="{317AF4FD-00FC-4A28-948E-0B54EDFD4118}"/>
-              </a:ext>
-            </a:extLst>
-          </p:cNvPr>
-          <p:cNvSpPr txBox="1"/>
-          <p:nvPr/>
-        </p:nvSpPr>
-        <p:spPr>
-          <a:xfrm>
-            <a:off x="5115624" y="1198662"/>
-            <a:ext cx="914400" cy="369332"/>
-          </a:xfrm>
-          <a:prstGeom prst="rect">
-            <a:avLst/>
-          </a:prstGeom>
-          <a:noFill/>
-        </p:spPr>
-        <p:txBody>
-          <a:bodyPr wrap="square" rtlCol="0">
-            <a:spAutoFit/>
-          </a:bodyPr>
-          <a:lstStyle/>
-          <a:p>
-            <a:r>
-              <a:rPr lang="en-US" dirty="0">
-                <a:solidFill>
-                  <a:srgbClr val="7030A0"/>
-                </a:solidFill>
-                <a:latin typeface="Times New Roman" panose="02020603050405020304" pitchFamily="18" charset="0"/>
-                <a:cs typeface="Times New Roman" panose="02020603050405020304" pitchFamily="18" charset="0"/>
-              </a:rPr>
-              <a:t>News-2</a:t>
-            </a:r>
-          </a:p>
-        </p:txBody>
-      </p:sp>
-      <p:sp>
-        <p:nvSpPr>
-          <p:cNvPr id="16" name="TextBox 15">
-            <a:extLst>
-              <a:ext uri="{FF2B5EF4-FFF2-40B4-BE49-F238E27FC236}">
-                <a16:creationId xmlns:a16="http://schemas.microsoft.com/office/drawing/2014/main" id="{74924842-75E3-466F-926C-4718DEFEA4FA}"/>
-              </a:ext>
-            </a:extLst>
-          </p:cNvPr>
-          <p:cNvSpPr txBox="1"/>
-          <p:nvPr/>
-        </p:nvSpPr>
-        <p:spPr>
-          <a:xfrm>
-            <a:off x="3588272" y="1214904"/>
-            <a:ext cx="760646" cy="369332"/>
-          </a:xfrm>
-          <a:prstGeom prst="rect">
-            <a:avLst/>
-          </a:prstGeom>
-          <a:noFill/>
-        </p:spPr>
-        <p:txBody>
-          <a:bodyPr wrap="square" rtlCol="0">
-            <a:spAutoFit/>
-          </a:bodyPr>
-          <a:lstStyle/>
-          <a:p>
-            <a:r>
-              <a:rPr lang="en-US" dirty="0">
-                <a:solidFill>
-                  <a:schemeClr val="accent1"/>
-                </a:solidFill>
-                <a:latin typeface="Times New Roman" panose="02020603050405020304" pitchFamily="18" charset="0"/>
-                <a:cs typeface="Times New Roman" panose="02020603050405020304" pitchFamily="18" charset="0"/>
-              </a:rPr>
-              <a:t>8-K-1</a:t>
-            </a:r>
-          </a:p>
-        </p:txBody>
-      </p:sp>
-      <p:sp>
-        <p:nvSpPr>
-          <p:cNvPr id="17" name="Oval 16">
-            <a:extLst>
-              <a:ext uri="{FF2B5EF4-FFF2-40B4-BE49-F238E27FC236}">
-                <a16:creationId xmlns:a16="http://schemas.microsoft.com/office/drawing/2014/main" id="{25413754-51A6-46AA-8FF6-21072F309844}"/>
-              </a:ext>
-            </a:extLst>
-          </p:cNvPr>
-          <p:cNvSpPr/>
-          <p:nvPr/>
-        </p:nvSpPr>
-        <p:spPr>
-          <a:xfrm>
-            <a:off x="2381846" y="1137010"/>
-            <a:ext cx="1992588" cy="463599"/>
-          </a:xfrm>
-          <a:prstGeom prst="ellipse">
-            <a:avLst/>
-          </a:prstGeom>
-          <a:noFill/>
-          <a:ln>
-            <a:solidFill>
-              <a:srgbClr val="FF0000"/>
-            </a:solidFill>
-          </a:ln>
-        </p:spPr>
-        <p:style>
-          <a:lnRef idx="2">
-            <a:schemeClr val="accent1">
-              <a:shade val="50000"/>
-            </a:schemeClr>
-          </a:lnRef>
-          <a:fillRef idx="1">
-            <a:schemeClr val="accent1"/>
-          </a:fillRef>
-          <a:effectRef idx="0">
-            <a:schemeClr val="accent1"/>
-          </a:effectRef>
-          <a:fontRef idx="minor">
-            <a:schemeClr val="lt1"/>
-          </a:fontRef>
-        </p:style>
-        <p:txBody>
-          <a:bodyPr rtlCol="0" anchor="ctr"/>
-          <a:lstStyle/>
-          <a:p>
-            <a:pPr algn="ctr"/>
-            <a:endParaRPr lang="en-US"/>
-          </a:p>
-        </p:txBody>
-      </p:sp>
-      <p:sp>
-        <p:nvSpPr>
-          <p:cNvPr id="18" name="TextBox 17">
-            <a:extLst>
-              <a:ext uri="{FF2B5EF4-FFF2-40B4-BE49-F238E27FC236}">
-                <a16:creationId xmlns:a16="http://schemas.microsoft.com/office/drawing/2014/main" id="{EE7D486E-C97F-40DB-8CC5-7166DA21AA3F}"/>
-              </a:ext>
-            </a:extLst>
-          </p:cNvPr>
-          <p:cNvSpPr txBox="1"/>
-          <p:nvPr/>
-        </p:nvSpPr>
-        <p:spPr>
-          <a:xfrm>
-            <a:off x="4333479" y="1227668"/>
-            <a:ext cx="765281" cy="369332"/>
-          </a:xfrm>
-          <a:prstGeom prst="rect">
-            <a:avLst/>
-          </a:prstGeom>
-          <a:noFill/>
-        </p:spPr>
-        <p:txBody>
-          <a:bodyPr wrap="square" rtlCol="0">
-            <a:spAutoFit/>
-          </a:bodyPr>
-          <a:lstStyle/>
-          <a:p>
-            <a:r>
-              <a:rPr lang="en-US" dirty="0">
-                <a:solidFill>
-                  <a:schemeClr val="accent1"/>
-                </a:solidFill>
-                <a:latin typeface="Times New Roman" panose="02020603050405020304" pitchFamily="18" charset="0"/>
-                <a:cs typeface="Times New Roman" panose="02020603050405020304" pitchFamily="18" charset="0"/>
-              </a:rPr>
-              <a:t>8-K-2</a:t>
-            </a:r>
-          </a:p>
-        </p:txBody>
-      </p:sp>
-      <p:cxnSp>
-        <p:nvCxnSpPr>
-          <p:cNvPr id="24" name="Straight Connector 23">
-            <a:extLst>
-              <a:ext uri="{FF2B5EF4-FFF2-40B4-BE49-F238E27FC236}">
-                <a16:creationId xmlns:a16="http://schemas.microsoft.com/office/drawing/2014/main" id="{CBD4BB6E-DBBE-47FC-B077-DEDD8DCF03E0}"/>
-              </a:ext>
-            </a:extLst>
-          </p:cNvPr>
-          <p:cNvCxnSpPr>
-            <a:cxnSpLocks/>
-          </p:cNvCxnSpPr>
-          <p:nvPr/>
-        </p:nvCxnSpPr>
-        <p:spPr>
-          <a:xfrm>
-            <a:off x="7201011" y="1546854"/>
-            <a:ext cx="0" cy="107510"/>
-          </a:xfrm>
-          <a:prstGeom prst="line">
-            <a:avLst/>
-          </a:prstGeom>
-          <a:ln w="25400">
-            <a:solidFill>
-              <a:schemeClr val="tx1"/>
-            </a:solidFill>
-          </a:ln>
-        </p:spPr>
-        <p:style>
-          <a:lnRef idx="1">
-            <a:schemeClr val="accent1"/>
-          </a:lnRef>
-          <a:fillRef idx="0">
-            <a:schemeClr val="accent1"/>
-          </a:fillRef>
-          <a:effectRef idx="0">
-            <a:schemeClr val="accent1"/>
-          </a:effectRef>
-          <a:fontRef idx="minor">
-            <a:schemeClr val="tx1"/>
-          </a:fontRef>
-        </p:style>
-      </p:cxnSp>
-      <p:sp>
-        <p:nvSpPr>
-          <p:cNvPr id="25" name="TextBox 24">
-            <a:extLst>
-              <a:ext uri="{FF2B5EF4-FFF2-40B4-BE49-F238E27FC236}">
-                <a16:creationId xmlns:a16="http://schemas.microsoft.com/office/drawing/2014/main" id="{CAD6CE28-709F-461F-B14D-5FFD03C91A08}"/>
-              </a:ext>
-            </a:extLst>
-          </p:cNvPr>
-          <p:cNvSpPr txBox="1"/>
-          <p:nvPr/>
-        </p:nvSpPr>
-        <p:spPr>
-          <a:xfrm>
-            <a:off x="6309034" y="1178196"/>
-            <a:ext cx="1741457" cy="369332"/>
-          </a:xfrm>
-          <a:prstGeom prst="rect">
-            <a:avLst/>
-          </a:prstGeom>
-          <a:noFill/>
-        </p:spPr>
-        <p:txBody>
-          <a:bodyPr wrap="square" rtlCol="0">
-            <a:spAutoFit/>
-          </a:bodyPr>
-          <a:lstStyle/>
-          <a:p>
-            <a:r>
-              <a:rPr lang="en-US" dirty="0">
-                <a:solidFill>
-                  <a:srgbClr val="7030A0"/>
-                </a:solidFill>
-                <a:latin typeface="Times New Roman" panose="02020603050405020304" pitchFamily="18" charset="0"/>
-                <a:cs typeface="Times New Roman" panose="02020603050405020304" pitchFamily="18" charset="0"/>
-              </a:rPr>
-              <a:t>News-3</a:t>
-            </a:r>
-            <a:r>
-              <a:rPr lang="en-US" dirty="0">
-                <a:latin typeface="Times New Roman" panose="02020603050405020304" pitchFamily="18" charset="0"/>
-                <a:cs typeface="Times New Roman" panose="02020603050405020304" pitchFamily="18" charset="0"/>
-              </a:rPr>
-              <a:t> &amp; </a:t>
-            </a:r>
-            <a:r>
-              <a:rPr lang="en-US" dirty="0">
-                <a:solidFill>
-                  <a:schemeClr val="accent1"/>
-                </a:solidFill>
-                <a:latin typeface="Times New Roman" panose="02020603050405020304" pitchFamily="18" charset="0"/>
-                <a:cs typeface="Times New Roman" panose="02020603050405020304" pitchFamily="18" charset="0"/>
-              </a:rPr>
-              <a:t>8-K-3</a:t>
-            </a:r>
-          </a:p>
-        </p:txBody>
-      </p:sp>
-      <p:sp>
-        <p:nvSpPr>
-          <p:cNvPr id="26" name="TextBox 25">
-            <a:extLst>
-              <a:ext uri="{FF2B5EF4-FFF2-40B4-BE49-F238E27FC236}">
-                <a16:creationId xmlns:a16="http://schemas.microsoft.com/office/drawing/2014/main" id="{DD82AAF3-11F0-4584-B508-1BAFDA352E3F}"/>
-              </a:ext>
-            </a:extLst>
-          </p:cNvPr>
-          <p:cNvSpPr txBox="1"/>
-          <p:nvPr/>
-        </p:nvSpPr>
-        <p:spPr>
-          <a:xfrm>
-            <a:off x="2899681" y="813150"/>
-            <a:ext cx="1041336" cy="369332"/>
-          </a:xfrm>
-          <a:prstGeom prst="rect">
-            <a:avLst/>
-          </a:prstGeom>
-          <a:noFill/>
-        </p:spPr>
-        <p:txBody>
-          <a:bodyPr wrap="square" rtlCol="0">
-            <a:spAutoFit/>
-          </a:bodyPr>
-          <a:lstStyle/>
-          <a:p>
-            <a:r>
-              <a:rPr lang="en-US" dirty="0">
-                <a:solidFill>
-                  <a:srgbClr val="FF0000"/>
-                </a:solidFill>
-                <a:latin typeface="Times New Roman" panose="02020603050405020304" pitchFamily="18" charset="0"/>
-                <a:cs typeface="Times New Roman" panose="02020603050405020304" pitchFamily="18" charset="0"/>
-              </a:rPr>
-              <a:t>Match-1</a:t>
-            </a:r>
-          </a:p>
-        </p:txBody>
-      </p:sp>
       <p:sp>
         <p:nvSpPr>
           <p:cNvPr id="27" name="TextBox 26">
@@ -18002,7 +17519,7 @@
         </p:nvSpPr>
         <p:spPr>
           <a:xfrm>
-            <a:off x="7858522" y="1656910"/>
+            <a:off x="9130206" y="1638597"/>
             <a:ext cx="383938" cy="369332"/>
           </a:xfrm>
           <a:prstGeom prst="rect">
@@ -18017,1132 +17534,1140 @@
           <a:lstStyle/>
           <a:p>
             <a:r>
-              <a:rPr lang="en-US" dirty="0"/>
+              <a:rPr lang="en-US" dirty="0">
+                <a:latin typeface="LM Mono 10" panose="00000509000000000000" pitchFamily="49" charset="0"/>
+              </a:rPr>
               <a:t>t</a:t>
             </a:r>
           </a:p>
         </p:txBody>
       </p:sp>
-      <p:sp>
-        <p:nvSpPr>
-          <p:cNvPr id="28" name="TextBox 27">
+      <p:grpSp>
+        <p:nvGrpSpPr>
+          <p:cNvPr id="3" name="Group 2">
             <a:extLst>
               <a:ext uri="{FF2B5EF4-FFF2-40B4-BE49-F238E27FC236}">
-                <a16:creationId xmlns:a16="http://schemas.microsoft.com/office/drawing/2014/main" id="{92FC2D2B-F6F7-47B2-9087-8BBB2145F7A6}"/>
+                <a16:creationId xmlns:a16="http://schemas.microsoft.com/office/drawing/2014/main" id="{E3D6EAC8-63B1-438D-83C1-E778B12B187F}"/>
               </a:ext>
             </a:extLst>
           </p:cNvPr>
-          <p:cNvSpPr txBox="1"/>
+          <p:cNvGrpSpPr/>
           <p:nvPr/>
-        </p:nvSpPr>
-        <p:spPr>
+        </p:nvGrpSpPr>
+        <p:grpSpPr>
           <a:xfrm>
-            <a:off x="2956614" y="1584236"/>
-            <a:ext cx="1041336" cy="369332"/>
+            <a:off x="810716" y="744829"/>
+            <a:ext cx="1992588" cy="1232503"/>
+            <a:chOff x="1555876" y="744829"/>
+            <a:chExt cx="1992588" cy="1232503"/>
           </a:xfrm>
-          <a:prstGeom prst="rect">
-            <a:avLst/>
-          </a:prstGeom>
-          <a:noFill/>
-        </p:spPr>
-        <p:txBody>
-          <a:bodyPr wrap="square" rtlCol="0">
-            <a:spAutoFit/>
-          </a:bodyPr>
-          <a:lstStyle/>
-          <a:p>
-            <a:r>
-              <a:rPr lang="en-US" dirty="0">
-                <a:solidFill>
-                  <a:schemeClr val="accent6">
-                    <a:lumMod val="75000"/>
-                  </a:schemeClr>
-                </a:solidFill>
-                <a:latin typeface="Times New Roman" panose="02020603050405020304" pitchFamily="18" charset="0"/>
-                <a:cs typeface="Times New Roman" panose="02020603050405020304" pitchFamily="18" charset="0"/>
-              </a:rPr>
-              <a:t>TLAG-1</a:t>
-            </a:r>
-          </a:p>
-        </p:txBody>
-      </p:sp>
-      <p:cxnSp>
-        <p:nvCxnSpPr>
-          <p:cNvPr id="32" name="Straight Connector 31">
+        </p:grpSpPr>
+        <p:sp>
+          <p:nvSpPr>
+            <p:cNvPr id="28" name="TextBox 27">
+              <a:extLst>
+                <a:ext uri="{FF2B5EF4-FFF2-40B4-BE49-F238E27FC236}">
+                  <a16:creationId xmlns:a16="http://schemas.microsoft.com/office/drawing/2014/main" id="{92FC2D2B-F6F7-47B2-9087-8BBB2145F7A6}"/>
+                </a:ext>
+              </a:extLst>
+            </p:cNvPr>
+            <p:cNvSpPr txBox="1"/>
+            <p:nvPr/>
+          </p:nvSpPr>
+          <p:spPr>
+            <a:xfrm>
+              <a:off x="2063052" y="1608000"/>
+              <a:ext cx="1282969" cy="369332"/>
+            </a:xfrm>
+            <a:prstGeom prst="rect">
+              <a:avLst/>
+            </a:prstGeom>
+            <a:noFill/>
+          </p:spPr>
+          <p:txBody>
+            <a:bodyPr wrap="square" rtlCol="0">
+              <a:spAutoFit/>
+            </a:bodyPr>
+            <a:lstStyle/>
+            <a:p>
+              <a:r>
+                <a:rPr lang="en-US" dirty="0">
+                  <a:solidFill>
+                    <a:schemeClr val="accent6">
+                      <a:lumMod val="75000"/>
+                    </a:schemeClr>
+                  </a:solidFill>
+                  <a:latin typeface="LM Mono 10" panose="00000509000000000000" pitchFamily="49" charset="0"/>
+                  <a:cs typeface="Times New Roman" panose="02020603050405020304" pitchFamily="18" charset="0"/>
+                </a:rPr>
+                <a:t>TLAG-1&gt;0</a:t>
+              </a:r>
+            </a:p>
+          </p:txBody>
+        </p:sp>
+        <p:grpSp>
+          <p:nvGrpSpPr>
+            <p:cNvPr id="4" name="Group 3">
+              <a:extLst>
+                <a:ext uri="{FF2B5EF4-FFF2-40B4-BE49-F238E27FC236}">
+                  <a16:creationId xmlns:a16="http://schemas.microsoft.com/office/drawing/2014/main" id="{071213A7-5887-416A-B410-0F58618A64CD}"/>
+                </a:ext>
+              </a:extLst>
+            </p:cNvPr>
+            <p:cNvGrpSpPr/>
+            <p:nvPr/>
+          </p:nvGrpSpPr>
+          <p:grpSpPr>
+            <a:xfrm>
+              <a:off x="1555876" y="744829"/>
+              <a:ext cx="1992588" cy="1005547"/>
+              <a:chOff x="2381846" y="813150"/>
+              <a:chExt cx="1992588" cy="1005547"/>
+            </a:xfrm>
+          </p:grpSpPr>
+          <p:sp>
+            <p:nvSpPr>
+              <p:cNvPr id="14" name="TextBox 13">
+                <a:extLst>
+                  <a:ext uri="{FF2B5EF4-FFF2-40B4-BE49-F238E27FC236}">
+                    <a16:creationId xmlns:a16="http://schemas.microsoft.com/office/drawing/2014/main" id="{6BF2BB52-BD0E-425C-BE82-62C833A89DDD}"/>
+                  </a:ext>
+                </a:extLst>
+              </p:cNvPr>
+              <p:cNvSpPr txBox="1"/>
+              <p:nvPr/>
+            </p:nvSpPr>
+            <p:spPr>
+              <a:xfrm>
+                <a:off x="2432115" y="1186091"/>
+                <a:ext cx="914400" cy="369332"/>
+              </a:xfrm>
+              <a:prstGeom prst="rect">
+                <a:avLst/>
+              </a:prstGeom>
+              <a:noFill/>
+            </p:spPr>
+            <p:txBody>
+              <a:bodyPr wrap="square" rtlCol="0">
+                <a:spAutoFit/>
+              </a:bodyPr>
+              <a:lstStyle/>
+              <a:p>
+                <a:r>
+                  <a:rPr lang="en-US" dirty="0">
+                    <a:solidFill>
+                      <a:srgbClr val="7030A0"/>
+                    </a:solidFill>
+                    <a:latin typeface="LM Mono 10" panose="00000509000000000000" pitchFamily="49" charset="0"/>
+                    <a:cs typeface="Times New Roman" panose="02020603050405020304" pitchFamily="18" charset="0"/>
+                  </a:rPr>
+                  <a:t>News-1</a:t>
+                </a:r>
+              </a:p>
+            </p:txBody>
+          </p:sp>
+          <p:sp>
+            <p:nvSpPr>
+              <p:cNvPr id="16" name="TextBox 15">
+                <a:extLst>
+                  <a:ext uri="{FF2B5EF4-FFF2-40B4-BE49-F238E27FC236}">
+                    <a16:creationId xmlns:a16="http://schemas.microsoft.com/office/drawing/2014/main" id="{74924842-75E3-466F-926C-4718DEFEA4FA}"/>
+                  </a:ext>
+                </a:extLst>
+              </p:cNvPr>
+              <p:cNvSpPr txBox="1"/>
+              <p:nvPr/>
+            </p:nvSpPr>
+            <p:spPr>
+              <a:xfrm>
+                <a:off x="3609291" y="1184143"/>
+                <a:ext cx="760646" cy="369332"/>
+              </a:xfrm>
+              <a:prstGeom prst="rect">
+                <a:avLst/>
+              </a:prstGeom>
+              <a:noFill/>
+            </p:spPr>
+            <p:txBody>
+              <a:bodyPr wrap="square" rtlCol="0">
+                <a:spAutoFit/>
+              </a:bodyPr>
+              <a:lstStyle/>
+              <a:p>
+                <a:r>
+                  <a:rPr lang="en-US" dirty="0">
+                    <a:solidFill>
+                      <a:schemeClr val="accent1"/>
+                    </a:solidFill>
+                    <a:latin typeface="LM Mono 10" panose="00000509000000000000" pitchFamily="49" charset="0"/>
+                    <a:cs typeface="Times New Roman" panose="02020603050405020304" pitchFamily="18" charset="0"/>
+                  </a:rPr>
+                  <a:t>8-K-1</a:t>
+                </a:r>
+              </a:p>
+            </p:txBody>
+          </p:sp>
+          <p:sp>
+            <p:nvSpPr>
+              <p:cNvPr id="17" name="Oval 16">
+                <a:extLst>
+                  <a:ext uri="{FF2B5EF4-FFF2-40B4-BE49-F238E27FC236}">
+                    <a16:creationId xmlns:a16="http://schemas.microsoft.com/office/drawing/2014/main" id="{25413754-51A6-46AA-8FF6-21072F309844}"/>
+                  </a:ext>
+                </a:extLst>
+              </p:cNvPr>
+              <p:cNvSpPr/>
+              <p:nvPr/>
+            </p:nvSpPr>
+            <p:spPr>
+              <a:xfrm>
+                <a:off x="2381846" y="1137010"/>
+                <a:ext cx="1992588" cy="463599"/>
+              </a:xfrm>
+              <a:prstGeom prst="ellipse">
+                <a:avLst/>
+              </a:prstGeom>
+              <a:noFill/>
+              <a:ln>
+                <a:solidFill>
+                  <a:srgbClr val="FF0000"/>
+                </a:solidFill>
+              </a:ln>
+            </p:spPr>
+            <p:style>
+              <a:lnRef idx="2">
+                <a:schemeClr val="accent1">
+                  <a:shade val="50000"/>
+                </a:schemeClr>
+              </a:lnRef>
+              <a:fillRef idx="1">
+                <a:schemeClr val="accent1"/>
+              </a:fillRef>
+              <a:effectRef idx="0">
+                <a:schemeClr val="accent1"/>
+              </a:effectRef>
+              <a:fontRef idx="minor">
+                <a:schemeClr val="lt1"/>
+              </a:fontRef>
+            </p:style>
+            <p:txBody>
+              <a:bodyPr rtlCol="0" anchor="ctr"/>
+              <a:lstStyle/>
+              <a:p>
+                <a:pPr algn="ctr"/>
+                <a:endParaRPr lang="en-US"/>
+              </a:p>
+            </p:txBody>
+          </p:sp>
+          <p:sp>
+            <p:nvSpPr>
+              <p:cNvPr id="26" name="TextBox 25">
+                <a:extLst>
+                  <a:ext uri="{FF2B5EF4-FFF2-40B4-BE49-F238E27FC236}">
+                    <a16:creationId xmlns:a16="http://schemas.microsoft.com/office/drawing/2014/main" id="{DD82AAF3-11F0-4584-B508-1BAFDA352E3F}"/>
+                  </a:ext>
+                </a:extLst>
+              </p:cNvPr>
+              <p:cNvSpPr txBox="1"/>
+              <p:nvPr/>
+            </p:nvSpPr>
+            <p:spPr>
+              <a:xfrm>
+                <a:off x="2899681" y="813150"/>
+                <a:ext cx="1041336" cy="369332"/>
+              </a:xfrm>
+              <a:prstGeom prst="rect">
+                <a:avLst/>
+              </a:prstGeom>
+              <a:noFill/>
+            </p:spPr>
+            <p:txBody>
+              <a:bodyPr wrap="square" rtlCol="0">
+                <a:spAutoFit/>
+              </a:bodyPr>
+              <a:lstStyle/>
+              <a:p>
+                <a:r>
+                  <a:rPr lang="en-US" dirty="0">
+                    <a:solidFill>
+                      <a:srgbClr val="FF0000"/>
+                    </a:solidFill>
+                    <a:latin typeface="LM Mono 10" panose="00000509000000000000" pitchFamily="49" charset="0"/>
+                    <a:cs typeface="Times New Roman" panose="02020603050405020304" pitchFamily="18" charset="0"/>
+                  </a:rPr>
+                  <a:t>Match-1</a:t>
+                </a:r>
+              </a:p>
+            </p:txBody>
+          </p:sp>
+          <p:cxnSp>
+            <p:nvCxnSpPr>
+              <p:cNvPr id="32" name="Straight Connector 31">
+                <a:extLst>
+                  <a:ext uri="{FF2B5EF4-FFF2-40B4-BE49-F238E27FC236}">
+                    <a16:creationId xmlns:a16="http://schemas.microsoft.com/office/drawing/2014/main" id="{E39220F8-6846-4647-BCCC-44EB0B3E7BA7}"/>
+                  </a:ext>
+                </a:extLst>
+              </p:cNvPr>
+              <p:cNvCxnSpPr>
+                <a:cxnSpLocks/>
+              </p:cNvCxnSpPr>
+              <p:nvPr/>
+            </p:nvCxnSpPr>
+            <p:spPr>
+              <a:xfrm>
+                <a:off x="2654830" y="1635243"/>
+                <a:ext cx="0" cy="166199"/>
+              </a:xfrm>
+              <a:prstGeom prst="line">
+                <a:avLst/>
+              </a:prstGeom>
+              <a:ln w="25400">
+                <a:solidFill>
+                  <a:schemeClr val="tx1"/>
+                </a:solidFill>
+              </a:ln>
+            </p:spPr>
+            <p:style>
+              <a:lnRef idx="1">
+                <a:schemeClr val="accent1"/>
+              </a:lnRef>
+              <a:fillRef idx="0">
+                <a:schemeClr val="accent1"/>
+              </a:fillRef>
+              <a:effectRef idx="0">
+                <a:schemeClr val="accent1"/>
+              </a:effectRef>
+              <a:fontRef idx="minor">
+                <a:schemeClr val="tx1"/>
+              </a:fontRef>
+            </p:style>
+          </p:cxnSp>
+          <p:cxnSp>
+            <p:nvCxnSpPr>
+              <p:cNvPr id="33" name="Straight Connector 32">
+                <a:extLst>
+                  <a:ext uri="{FF2B5EF4-FFF2-40B4-BE49-F238E27FC236}">
+                    <a16:creationId xmlns:a16="http://schemas.microsoft.com/office/drawing/2014/main" id="{7BC5ADDE-7D97-4B41-B738-4DF0907FD201}"/>
+                  </a:ext>
+                </a:extLst>
+              </p:cNvPr>
+              <p:cNvCxnSpPr>
+                <a:cxnSpLocks/>
+              </p:cNvCxnSpPr>
+              <p:nvPr/>
+            </p:nvCxnSpPr>
+            <p:spPr>
+              <a:xfrm>
+                <a:off x="4171991" y="1631764"/>
+                <a:ext cx="0" cy="186933"/>
+              </a:xfrm>
+              <a:prstGeom prst="line">
+                <a:avLst/>
+              </a:prstGeom>
+              <a:ln w="25400">
+                <a:solidFill>
+                  <a:schemeClr val="tx1"/>
+                </a:solidFill>
+              </a:ln>
+            </p:spPr>
+            <p:style>
+              <a:lnRef idx="1">
+                <a:schemeClr val="accent1"/>
+              </a:lnRef>
+              <a:fillRef idx="0">
+                <a:schemeClr val="accent1"/>
+              </a:fillRef>
+              <a:effectRef idx="0">
+                <a:schemeClr val="accent1"/>
+              </a:effectRef>
+              <a:fontRef idx="minor">
+                <a:schemeClr val="tx1"/>
+              </a:fontRef>
+            </p:style>
+          </p:cxnSp>
+        </p:grpSp>
+        <p:cxnSp>
+          <p:nvCxnSpPr>
+            <p:cNvPr id="35" name="Straight Arrow Connector 34">
+              <a:extLst>
+                <a:ext uri="{FF2B5EF4-FFF2-40B4-BE49-F238E27FC236}">
+                  <a16:creationId xmlns:a16="http://schemas.microsoft.com/office/drawing/2014/main" id="{01A759DF-8EE6-4630-9CEF-F6DC02AC22EE}"/>
+                </a:ext>
+              </a:extLst>
+            </p:cNvPr>
+            <p:cNvCxnSpPr>
+              <a:cxnSpLocks/>
+            </p:cNvCxnSpPr>
+            <p:nvPr/>
+          </p:nvCxnSpPr>
+          <p:spPr>
+            <a:xfrm flipH="1" flipV="1">
+              <a:off x="1831663" y="1779081"/>
+              <a:ext cx="306936" cy="1020"/>
+            </a:xfrm>
+            <a:prstGeom prst="straightConnector1">
+              <a:avLst/>
+            </a:prstGeom>
+            <a:ln w="25400">
+              <a:solidFill>
+                <a:schemeClr val="tx1"/>
+              </a:solidFill>
+              <a:tailEnd type="triangle"/>
+            </a:ln>
+          </p:spPr>
+          <p:style>
+            <a:lnRef idx="1">
+              <a:schemeClr val="accent1"/>
+            </a:lnRef>
+            <a:fillRef idx="0">
+              <a:schemeClr val="accent1"/>
+            </a:fillRef>
+            <a:effectRef idx="0">
+              <a:schemeClr val="accent1"/>
+            </a:effectRef>
+            <a:fontRef idx="minor">
+              <a:schemeClr val="tx1"/>
+            </a:fontRef>
+          </p:style>
+        </p:cxnSp>
+        <p:cxnSp>
+          <p:nvCxnSpPr>
+            <p:cNvPr id="37" name="Straight Arrow Connector 36">
+              <a:extLst>
+                <a:ext uri="{FF2B5EF4-FFF2-40B4-BE49-F238E27FC236}">
+                  <a16:creationId xmlns:a16="http://schemas.microsoft.com/office/drawing/2014/main" id="{694BAD15-A81A-4F74-808E-2FA8AEAE43E9}"/>
+                </a:ext>
+              </a:extLst>
+            </p:cNvPr>
+            <p:cNvCxnSpPr>
+              <a:cxnSpLocks/>
+            </p:cNvCxnSpPr>
+            <p:nvPr/>
+          </p:nvCxnSpPr>
+          <p:spPr>
+            <a:xfrm>
+              <a:off x="3104792" y="1770656"/>
+              <a:ext cx="241229" cy="0"/>
+            </a:xfrm>
+            <a:prstGeom prst="straightConnector1">
+              <a:avLst/>
+            </a:prstGeom>
+            <a:ln w="25400">
+              <a:solidFill>
+                <a:schemeClr val="tx1"/>
+              </a:solidFill>
+              <a:tailEnd type="triangle"/>
+            </a:ln>
+          </p:spPr>
+          <p:style>
+            <a:lnRef idx="1">
+              <a:schemeClr val="accent1"/>
+            </a:lnRef>
+            <a:fillRef idx="0">
+              <a:schemeClr val="accent1"/>
+            </a:fillRef>
+            <a:effectRef idx="0">
+              <a:schemeClr val="accent1"/>
+            </a:effectRef>
+            <a:fontRef idx="minor">
+              <a:schemeClr val="tx1"/>
+            </a:fontRef>
+          </p:style>
+        </p:cxnSp>
+      </p:grpSp>
+      <p:grpSp>
+        <p:nvGrpSpPr>
+          <p:cNvPr id="44" name="Group 43">
             <a:extLst>
               <a:ext uri="{FF2B5EF4-FFF2-40B4-BE49-F238E27FC236}">
-                <a16:creationId xmlns:a16="http://schemas.microsoft.com/office/drawing/2014/main" id="{E39220F8-6846-4647-BCCC-44EB0B3E7BA7}"/>
+                <a16:creationId xmlns:a16="http://schemas.microsoft.com/office/drawing/2014/main" id="{314DC391-1571-4BB5-9C08-B59176B3ED13}"/>
               </a:ext>
             </a:extLst>
           </p:cNvPr>
-          <p:cNvCxnSpPr>
-            <a:cxnSpLocks/>
-          </p:cNvCxnSpPr>
+          <p:cNvGrpSpPr/>
           <p:nvPr/>
-        </p:nvCxnSpPr>
-        <p:spPr>
+        </p:nvGrpSpPr>
+        <p:grpSpPr>
           <a:xfrm>
-            <a:off x="2762054" y="1626955"/>
-            <a:ext cx="0" cy="137414"/>
+            <a:off x="7052121" y="819909"/>
+            <a:ext cx="2062315" cy="1157423"/>
+            <a:chOff x="4000703" y="801646"/>
+            <a:chExt cx="2062315" cy="1157423"/>
           </a:xfrm>
-          <a:prstGeom prst="line">
-            <a:avLst/>
-          </a:prstGeom>
-          <a:ln w="25400">
-            <a:solidFill>
+        </p:grpSpPr>
+        <p:cxnSp>
+          <p:nvCxnSpPr>
+            <p:cNvPr id="9" name="Straight Connector 8">
+              <a:extLst>
+                <a:ext uri="{FF2B5EF4-FFF2-40B4-BE49-F238E27FC236}">
+                  <a16:creationId xmlns:a16="http://schemas.microsoft.com/office/drawing/2014/main" id="{0C0E7299-FE7B-4513-B1DE-E55865A86FD4}"/>
+                </a:ext>
+              </a:extLst>
+            </p:cNvPr>
+            <p:cNvCxnSpPr>
+              <a:cxnSpLocks/>
+            </p:cNvCxnSpPr>
+            <p:nvPr/>
+          </p:nvCxnSpPr>
+          <p:spPr>
+            <a:xfrm>
+              <a:off x="5802113" y="1557315"/>
+              <a:ext cx="0" cy="150167"/>
+            </a:xfrm>
+            <a:prstGeom prst="line">
+              <a:avLst/>
+            </a:prstGeom>
+            <a:ln w="25400">
+              <a:solidFill>
+                <a:schemeClr val="tx1"/>
+              </a:solidFill>
+            </a:ln>
+          </p:spPr>
+          <p:style>
+            <a:lnRef idx="1">
+              <a:schemeClr val="accent1"/>
+            </a:lnRef>
+            <a:fillRef idx="0">
+              <a:schemeClr val="accent1"/>
+            </a:fillRef>
+            <a:effectRef idx="0">
+              <a:schemeClr val="accent1"/>
+            </a:effectRef>
+            <a:fontRef idx="minor">
               <a:schemeClr val="tx1"/>
-            </a:solidFill>
-          </a:ln>
-        </p:spPr>
-        <p:style>
-          <a:lnRef idx="1">
-            <a:schemeClr val="accent1"/>
-          </a:lnRef>
-          <a:fillRef idx="0">
-            <a:schemeClr val="accent1"/>
-          </a:fillRef>
-          <a:effectRef idx="0">
-            <a:schemeClr val="accent1"/>
-          </a:effectRef>
-          <a:fontRef idx="minor">
-            <a:schemeClr val="tx1"/>
-          </a:fontRef>
-        </p:style>
-      </p:cxnSp>
-      <p:cxnSp>
-        <p:nvCxnSpPr>
-          <p:cNvPr id="33" name="Straight Connector 32">
+            </a:fontRef>
+          </p:style>
+        </p:cxnSp>
+        <p:sp>
+          <p:nvSpPr>
+            <p:cNvPr id="15" name="TextBox 14">
+              <a:extLst>
+                <a:ext uri="{FF2B5EF4-FFF2-40B4-BE49-F238E27FC236}">
+                  <a16:creationId xmlns:a16="http://schemas.microsoft.com/office/drawing/2014/main" id="{317AF4FD-00FC-4A28-948E-0B54EDFD4118}"/>
+                </a:ext>
+              </a:extLst>
+            </p:cNvPr>
+            <p:cNvSpPr txBox="1"/>
+            <p:nvPr/>
+          </p:nvSpPr>
+          <p:spPr>
+            <a:xfrm>
+              <a:off x="5148618" y="1143122"/>
+              <a:ext cx="914400" cy="369332"/>
+            </a:xfrm>
+            <a:prstGeom prst="rect">
+              <a:avLst/>
+            </a:prstGeom>
+            <a:noFill/>
+          </p:spPr>
+          <p:txBody>
+            <a:bodyPr wrap="square" rtlCol="0">
+              <a:spAutoFit/>
+            </a:bodyPr>
+            <a:lstStyle/>
+            <a:p>
+              <a:r>
+                <a:rPr lang="en-US" dirty="0">
+                  <a:solidFill>
+                    <a:srgbClr val="7030A0"/>
+                  </a:solidFill>
+                  <a:latin typeface="LM Mono 10" panose="00000509000000000000" pitchFamily="49" charset="0"/>
+                  <a:cs typeface="Times New Roman" panose="02020603050405020304" pitchFamily="18" charset="0"/>
+                </a:rPr>
+                <a:t>News-3</a:t>
+              </a:r>
+            </a:p>
+          </p:txBody>
+        </p:sp>
+        <p:sp>
+          <p:nvSpPr>
+            <p:cNvPr id="18" name="TextBox 17">
+              <a:extLst>
+                <a:ext uri="{FF2B5EF4-FFF2-40B4-BE49-F238E27FC236}">
+                  <a16:creationId xmlns:a16="http://schemas.microsoft.com/office/drawing/2014/main" id="{EE7D486E-C97F-40DB-8CC5-7166DA21AA3F}"/>
+                </a:ext>
+              </a:extLst>
+            </p:cNvPr>
+            <p:cNvSpPr txBox="1"/>
+            <p:nvPr/>
+          </p:nvSpPr>
+          <p:spPr>
+            <a:xfrm>
+              <a:off x="4000703" y="1152076"/>
+              <a:ext cx="765281" cy="369332"/>
+            </a:xfrm>
+            <a:prstGeom prst="rect">
+              <a:avLst/>
+            </a:prstGeom>
+            <a:noFill/>
+          </p:spPr>
+          <p:txBody>
+            <a:bodyPr wrap="square" rtlCol="0">
+              <a:spAutoFit/>
+            </a:bodyPr>
+            <a:lstStyle/>
+            <a:p>
+              <a:r>
+                <a:rPr lang="en-US" dirty="0">
+                  <a:solidFill>
+                    <a:schemeClr val="accent1"/>
+                  </a:solidFill>
+                  <a:latin typeface="LM Mono 10" panose="00000509000000000000" pitchFamily="49" charset="0"/>
+                  <a:cs typeface="Times New Roman" panose="02020603050405020304" pitchFamily="18" charset="0"/>
+                </a:rPr>
+                <a:t>8-K-3</a:t>
+              </a:r>
+            </a:p>
+          </p:txBody>
+        </p:sp>
+        <p:cxnSp>
+          <p:nvCxnSpPr>
+            <p:cNvPr id="39" name="Straight Connector 38">
+              <a:extLst>
+                <a:ext uri="{FF2B5EF4-FFF2-40B4-BE49-F238E27FC236}">
+                  <a16:creationId xmlns:a16="http://schemas.microsoft.com/office/drawing/2014/main" id="{4ABB7177-2E2F-4CF3-9422-8EB11129F294}"/>
+                </a:ext>
+              </a:extLst>
+            </p:cNvPr>
+            <p:cNvCxnSpPr>
+              <a:cxnSpLocks/>
+            </p:cNvCxnSpPr>
+            <p:nvPr/>
+          </p:nvCxnSpPr>
+          <p:spPr>
+            <a:xfrm>
+              <a:off x="4181341" y="1573733"/>
+              <a:ext cx="0" cy="138777"/>
+            </a:xfrm>
+            <a:prstGeom prst="line">
+              <a:avLst/>
+            </a:prstGeom>
+            <a:ln w="25400">
+              <a:solidFill>
+                <a:schemeClr val="tx1"/>
+              </a:solidFill>
+            </a:ln>
+          </p:spPr>
+          <p:style>
+            <a:lnRef idx="1">
+              <a:schemeClr val="accent1"/>
+            </a:lnRef>
+            <a:fillRef idx="0">
+              <a:schemeClr val="accent1"/>
+            </a:fillRef>
+            <a:effectRef idx="0">
+              <a:schemeClr val="accent1"/>
+            </a:effectRef>
+            <a:fontRef idx="minor">
+              <a:schemeClr val="tx1"/>
+            </a:fontRef>
+          </p:style>
+        </p:cxnSp>
+        <p:sp>
+          <p:nvSpPr>
+            <p:cNvPr id="46" name="TextBox 45">
+              <a:extLst>
+                <a:ext uri="{FF2B5EF4-FFF2-40B4-BE49-F238E27FC236}">
+                  <a16:creationId xmlns:a16="http://schemas.microsoft.com/office/drawing/2014/main" id="{6C3A041E-A58C-4A5B-9979-4AFB7DAF08C7}"/>
+                </a:ext>
+              </a:extLst>
+            </p:cNvPr>
+            <p:cNvSpPr txBox="1"/>
+            <p:nvPr/>
+          </p:nvSpPr>
+          <p:spPr>
+            <a:xfrm>
+              <a:off x="4461962" y="801646"/>
+              <a:ext cx="1041336" cy="369332"/>
+            </a:xfrm>
+            <a:prstGeom prst="rect">
+              <a:avLst/>
+            </a:prstGeom>
+            <a:noFill/>
+          </p:spPr>
+          <p:txBody>
+            <a:bodyPr wrap="square" rtlCol="0">
+              <a:spAutoFit/>
+            </a:bodyPr>
+            <a:lstStyle/>
+            <a:p>
+              <a:r>
+                <a:rPr lang="en-US" dirty="0">
+                  <a:solidFill>
+                    <a:srgbClr val="FF0000"/>
+                  </a:solidFill>
+                  <a:latin typeface="LM Mono 10" panose="00000509000000000000" pitchFamily="49" charset="0"/>
+                  <a:cs typeface="Times New Roman" panose="02020603050405020304" pitchFamily="18" charset="0"/>
+                </a:rPr>
+                <a:t>Match-3</a:t>
+              </a:r>
+            </a:p>
+          </p:txBody>
+        </p:sp>
+        <p:sp>
+          <p:nvSpPr>
+            <p:cNvPr id="48" name="Oval 47">
+              <a:extLst>
+                <a:ext uri="{FF2B5EF4-FFF2-40B4-BE49-F238E27FC236}">
+                  <a16:creationId xmlns:a16="http://schemas.microsoft.com/office/drawing/2014/main" id="{DC35E334-7D3E-4E78-857C-002287910FD6}"/>
+                </a:ext>
+              </a:extLst>
+            </p:cNvPr>
+            <p:cNvSpPr/>
+            <p:nvPr/>
+          </p:nvSpPr>
+          <p:spPr>
+            <a:xfrm>
+              <a:off x="4000703" y="1098744"/>
+              <a:ext cx="1992588" cy="463599"/>
+            </a:xfrm>
+            <a:prstGeom prst="ellipse">
+              <a:avLst/>
+            </a:prstGeom>
+            <a:noFill/>
+            <a:ln>
+              <a:solidFill>
+                <a:srgbClr val="FF0000"/>
+              </a:solidFill>
+            </a:ln>
+          </p:spPr>
+          <p:style>
+            <a:lnRef idx="2">
+              <a:schemeClr val="accent1">
+                <a:shade val="50000"/>
+              </a:schemeClr>
+            </a:lnRef>
+            <a:fillRef idx="1">
+              <a:schemeClr val="accent1"/>
+            </a:fillRef>
+            <a:effectRef idx="0">
+              <a:schemeClr val="accent1"/>
+            </a:effectRef>
+            <a:fontRef idx="minor">
+              <a:schemeClr val="lt1"/>
+            </a:fontRef>
+          </p:style>
+          <p:txBody>
+            <a:bodyPr rtlCol="0" anchor="ctr"/>
+            <a:lstStyle/>
+            <a:p>
+              <a:pPr algn="ctr"/>
+              <a:endParaRPr lang="en-US"/>
+            </a:p>
+          </p:txBody>
+        </p:sp>
+        <p:sp>
+          <p:nvSpPr>
+            <p:cNvPr id="50" name="TextBox 49">
+              <a:extLst>
+                <a:ext uri="{FF2B5EF4-FFF2-40B4-BE49-F238E27FC236}">
+                  <a16:creationId xmlns:a16="http://schemas.microsoft.com/office/drawing/2014/main" id="{38A1C366-BD7F-411D-AE48-E4B21A672965}"/>
+                </a:ext>
+              </a:extLst>
+            </p:cNvPr>
+            <p:cNvSpPr txBox="1"/>
+            <p:nvPr/>
+          </p:nvSpPr>
+          <p:spPr>
+            <a:xfrm>
+              <a:off x="4513258" y="1589737"/>
+              <a:ext cx="1107016" cy="369332"/>
+            </a:xfrm>
+            <a:prstGeom prst="rect">
+              <a:avLst/>
+            </a:prstGeom>
+            <a:noFill/>
+          </p:spPr>
+          <p:txBody>
+            <a:bodyPr wrap="square" rtlCol="0">
+              <a:spAutoFit/>
+            </a:bodyPr>
+            <a:lstStyle/>
+            <a:p>
+              <a:r>
+                <a:rPr lang="en-US" dirty="0">
+                  <a:solidFill>
+                    <a:schemeClr val="accent6">
+                      <a:lumMod val="75000"/>
+                    </a:schemeClr>
+                  </a:solidFill>
+                  <a:latin typeface="LM Mono 10" panose="00000509000000000000" pitchFamily="49" charset="0"/>
+                  <a:cs typeface="Times New Roman" panose="02020603050405020304" pitchFamily="18" charset="0"/>
+                </a:rPr>
+                <a:t>TLAG-3&lt;0</a:t>
+              </a:r>
+            </a:p>
+          </p:txBody>
+        </p:sp>
+        <p:cxnSp>
+          <p:nvCxnSpPr>
+            <p:cNvPr id="54" name="Straight Arrow Connector 53">
+              <a:extLst>
+                <a:ext uri="{FF2B5EF4-FFF2-40B4-BE49-F238E27FC236}">
+                  <a16:creationId xmlns:a16="http://schemas.microsoft.com/office/drawing/2014/main" id="{97DC4645-D36E-4D9F-91B4-5B74F4C07D09}"/>
+                </a:ext>
+              </a:extLst>
+            </p:cNvPr>
+            <p:cNvCxnSpPr>
+              <a:cxnSpLocks/>
+            </p:cNvCxnSpPr>
+            <p:nvPr/>
+          </p:nvCxnSpPr>
+          <p:spPr>
+            <a:xfrm flipH="1" flipV="1">
+              <a:off x="4218040" y="1774531"/>
+              <a:ext cx="306936" cy="1020"/>
+            </a:xfrm>
+            <a:prstGeom prst="straightConnector1">
+              <a:avLst/>
+            </a:prstGeom>
+            <a:ln w="25400">
+              <a:solidFill>
+                <a:schemeClr val="tx1"/>
+              </a:solidFill>
+              <a:tailEnd type="triangle"/>
+            </a:ln>
+          </p:spPr>
+          <p:style>
+            <a:lnRef idx="1">
+              <a:schemeClr val="accent1"/>
+            </a:lnRef>
+            <a:fillRef idx="0">
+              <a:schemeClr val="accent1"/>
+            </a:fillRef>
+            <a:effectRef idx="0">
+              <a:schemeClr val="accent1"/>
+            </a:effectRef>
+            <a:fontRef idx="minor">
+              <a:schemeClr val="tx1"/>
+            </a:fontRef>
+          </p:style>
+        </p:cxnSp>
+        <p:cxnSp>
+          <p:nvCxnSpPr>
+            <p:cNvPr id="55" name="Straight Arrow Connector 54">
+              <a:extLst>
+                <a:ext uri="{FF2B5EF4-FFF2-40B4-BE49-F238E27FC236}">
+                  <a16:creationId xmlns:a16="http://schemas.microsoft.com/office/drawing/2014/main" id="{8B6B6D2B-4BD9-4C4B-9D82-1E63F2EC2E64}"/>
+                </a:ext>
+              </a:extLst>
+            </p:cNvPr>
+            <p:cNvCxnSpPr>
+              <a:cxnSpLocks/>
+            </p:cNvCxnSpPr>
+            <p:nvPr/>
+          </p:nvCxnSpPr>
+          <p:spPr>
+            <a:xfrm>
+              <a:off x="5560884" y="1778042"/>
+              <a:ext cx="241229" cy="0"/>
+            </a:xfrm>
+            <a:prstGeom prst="straightConnector1">
+              <a:avLst/>
+            </a:prstGeom>
+            <a:ln w="25400">
+              <a:solidFill>
+                <a:schemeClr val="tx1"/>
+              </a:solidFill>
+              <a:tailEnd type="triangle"/>
+            </a:ln>
+          </p:spPr>
+          <p:style>
+            <a:lnRef idx="1">
+              <a:schemeClr val="accent1"/>
+            </a:lnRef>
+            <a:fillRef idx="0">
+              <a:schemeClr val="accent1"/>
+            </a:fillRef>
+            <a:effectRef idx="0">
+              <a:schemeClr val="accent1"/>
+            </a:effectRef>
+            <a:fontRef idx="minor">
+              <a:schemeClr val="tx1"/>
+            </a:fontRef>
+          </p:style>
+        </p:cxnSp>
+      </p:grpSp>
+      <p:grpSp>
+        <p:nvGrpSpPr>
+          <p:cNvPr id="6" name="Group 5">
             <a:extLst>
               <a:ext uri="{FF2B5EF4-FFF2-40B4-BE49-F238E27FC236}">
-                <a16:creationId xmlns:a16="http://schemas.microsoft.com/office/drawing/2014/main" id="{7BC5ADDE-7D97-4B41-B738-4DF0907FD201}"/>
+                <a16:creationId xmlns:a16="http://schemas.microsoft.com/office/drawing/2014/main" id="{05C2259B-953F-4477-847D-306AD6149221}"/>
               </a:ext>
             </a:extLst>
           </p:cNvPr>
-          <p:cNvCxnSpPr>
-            <a:cxnSpLocks/>
-          </p:cNvCxnSpPr>
+          <p:cNvGrpSpPr/>
           <p:nvPr/>
-        </p:nvCxnSpPr>
-        <p:spPr>
+        </p:nvGrpSpPr>
+        <p:grpSpPr>
           <a:xfrm>
-            <a:off x="4062952" y="1649419"/>
-            <a:ext cx="0" cy="137414"/>
+            <a:off x="3919036" y="861669"/>
+            <a:ext cx="1946497" cy="1115663"/>
+            <a:chOff x="3691131" y="861669"/>
+            <a:chExt cx="1946497" cy="1115663"/>
           </a:xfrm>
-          <a:prstGeom prst="line">
-            <a:avLst/>
-          </a:prstGeom>
-          <a:ln w="25400">
-            <a:solidFill>
-              <a:schemeClr val="tx1"/>
-            </a:solidFill>
-          </a:ln>
-        </p:spPr>
-        <p:style>
-          <a:lnRef idx="1">
-            <a:schemeClr val="accent1"/>
-          </a:lnRef>
-          <a:fillRef idx="0">
-            <a:schemeClr val="accent1"/>
-          </a:fillRef>
-          <a:effectRef idx="0">
-            <a:schemeClr val="accent1"/>
-          </a:effectRef>
-          <a:fontRef idx="minor">
-            <a:schemeClr val="tx1"/>
-          </a:fontRef>
-        </p:style>
-      </p:cxnSp>
-      <p:cxnSp>
-        <p:nvCxnSpPr>
-          <p:cNvPr id="35" name="Straight Arrow Connector 34">
-            <a:extLst>
-              <a:ext uri="{FF2B5EF4-FFF2-40B4-BE49-F238E27FC236}">
-                <a16:creationId xmlns:a16="http://schemas.microsoft.com/office/drawing/2014/main" id="{01A759DF-8EE6-4630-9CEF-F6DC02AC22EE}"/>
-              </a:ext>
-            </a:extLst>
-          </p:cNvPr>
-          <p:cNvCxnSpPr>
-            <a:cxnSpLocks/>
-          </p:cNvCxnSpPr>
-          <p:nvPr/>
-        </p:nvCxnSpPr>
-        <p:spPr>
-          <a:xfrm flipH="1" flipV="1">
-            <a:off x="2762054" y="1778214"/>
-            <a:ext cx="306936" cy="1020"/>
-          </a:xfrm>
-          <a:prstGeom prst="straightConnector1">
-            <a:avLst/>
-          </a:prstGeom>
-          <a:ln w="25400">
-            <a:solidFill>
-              <a:schemeClr val="tx1"/>
-            </a:solidFill>
-            <a:tailEnd type="triangle"/>
-          </a:ln>
-        </p:spPr>
-        <p:style>
-          <a:lnRef idx="1">
-            <a:schemeClr val="accent1"/>
-          </a:lnRef>
-          <a:fillRef idx="0">
-            <a:schemeClr val="accent1"/>
-          </a:fillRef>
-          <a:effectRef idx="0">
-            <a:schemeClr val="accent1"/>
-          </a:effectRef>
-          <a:fontRef idx="minor">
-            <a:schemeClr val="tx1"/>
-          </a:fontRef>
-        </p:style>
-      </p:cxnSp>
-      <p:cxnSp>
-        <p:nvCxnSpPr>
-          <p:cNvPr id="37" name="Straight Arrow Connector 36">
-            <a:extLst>
-              <a:ext uri="{FF2B5EF4-FFF2-40B4-BE49-F238E27FC236}">
-                <a16:creationId xmlns:a16="http://schemas.microsoft.com/office/drawing/2014/main" id="{694BAD15-A81A-4F74-808E-2FA8AEAE43E9}"/>
-              </a:ext>
-            </a:extLst>
-          </p:cNvPr>
-          <p:cNvCxnSpPr>
-            <a:cxnSpLocks/>
-          </p:cNvCxnSpPr>
-          <p:nvPr/>
-        </p:nvCxnSpPr>
-        <p:spPr>
-          <a:xfrm>
-            <a:off x="3821723" y="1778214"/>
-            <a:ext cx="241229" cy="0"/>
-          </a:xfrm>
-          <a:prstGeom prst="straightConnector1">
-            <a:avLst/>
-          </a:prstGeom>
-          <a:ln w="25400">
-            <a:solidFill>
-              <a:schemeClr val="tx1"/>
-            </a:solidFill>
-            <a:tailEnd type="triangle"/>
-          </a:ln>
-        </p:spPr>
-        <p:style>
-          <a:lnRef idx="1">
-            <a:schemeClr val="accent1"/>
-          </a:lnRef>
-          <a:fillRef idx="0">
-            <a:schemeClr val="accent1"/>
-          </a:fillRef>
-          <a:effectRef idx="0">
-            <a:schemeClr val="accent1"/>
-          </a:effectRef>
-          <a:fontRef idx="minor">
-            <a:schemeClr val="tx1"/>
-          </a:fontRef>
-        </p:style>
-      </p:cxnSp>
-      <p:cxnSp>
-        <p:nvCxnSpPr>
-          <p:cNvPr id="39" name="Straight Connector 38">
-            <a:extLst>
-              <a:ext uri="{FF2B5EF4-FFF2-40B4-BE49-F238E27FC236}">
-                <a16:creationId xmlns:a16="http://schemas.microsoft.com/office/drawing/2014/main" id="{4ABB7177-2E2F-4CF3-9422-8EB11129F294}"/>
-              </a:ext>
-            </a:extLst>
-          </p:cNvPr>
-          <p:cNvCxnSpPr/>
-          <p:nvPr/>
-        </p:nvCxnSpPr>
-        <p:spPr>
-          <a:xfrm>
-            <a:off x="4669021" y="1574276"/>
-            <a:ext cx="0" cy="75415"/>
-          </a:xfrm>
-          <a:prstGeom prst="line">
-            <a:avLst/>
-          </a:prstGeom>
-          <a:ln w="25400">
-            <a:solidFill>
-              <a:schemeClr val="tx1"/>
-            </a:solidFill>
-          </a:ln>
-        </p:spPr>
-        <p:style>
-          <a:lnRef idx="1">
-            <a:schemeClr val="accent1"/>
-          </a:lnRef>
-          <a:fillRef idx="0">
-            <a:schemeClr val="accent1"/>
-          </a:fillRef>
-          <a:effectRef idx="0">
-            <a:schemeClr val="accent1"/>
-          </a:effectRef>
-          <a:fontRef idx="minor">
-            <a:schemeClr val="tx1"/>
-          </a:fontRef>
-        </p:style>
-      </p:cxnSp>
-      <p:sp>
-        <p:nvSpPr>
-          <p:cNvPr id="52" name="Oval 51">
-            <a:extLst>
-              <a:ext uri="{FF2B5EF4-FFF2-40B4-BE49-F238E27FC236}">
-                <a16:creationId xmlns:a16="http://schemas.microsoft.com/office/drawing/2014/main" id="{BDAC114B-D443-4764-AA79-72A63EF277E3}"/>
-              </a:ext>
-            </a:extLst>
-          </p:cNvPr>
-          <p:cNvSpPr/>
-          <p:nvPr/>
-        </p:nvSpPr>
-        <p:spPr>
-          <a:xfrm>
-            <a:off x="6262991" y="1170978"/>
-            <a:ext cx="1741457" cy="369332"/>
-          </a:xfrm>
-          <a:prstGeom prst="ellipse">
-            <a:avLst/>
-          </a:prstGeom>
-          <a:noFill/>
-          <a:ln>
-            <a:solidFill>
-              <a:srgbClr val="FF0000"/>
-            </a:solidFill>
-          </a:ln>
-        </p:spPr>
-        <p:style>
-          <a:lnRef idx="2">
-            <a:schemeClr val="accent1">
-              <a:shade val="50000"/>
-            </a:schemeClr>
-          </a:lnRef>
-          <a:fillRef idx="1">
-            <a:schemeClr val="accent1"/>
-          </a:fillRef>
-          <a:effectRef idx="0">
-            <a:schemeClr val="accent1"/>
-          </a:effectRef>
-          <a:fontRef idx="minor">
-            <a:schemeClr val="lt1"/>
-          </a:fontRef>
-        </p:style>
-        <p:txBody>
-          <a:bodyPr rtlCol="0" anchor="ctr"/>
-          <a:lstStyle/>
-          <a:p>
-            <a:pPr algn="ctr"/>
-            <a:endParaRPr lang="en-US"/>
-          </a:p>
-        </p:txBody>
-      </p:sp>
-      <p:sp>
-        <p:nvSpPr>
-          <p:cNvPr id="53" name="TextBox 52">
-            <a:extLst>
-              <a:ext uri="{FF2B5EF4-FFF2-40B4-BE49-F238E27FC236}">
-                <a16:creationId xmlns:a16="http://schemas.microsoft.com/office/drawing/2014/main" id="{7B11C845-A0A6-4B78-9690-960EADE06B5E}"/>
-              </a:ext>
-            </a:extLst>
-          </p:cNvPr>
-          <p:cNvSpPr txBox="1"/>
-          <p:nvPr/>
-        </p:nvSpPr>
-        <p:spPr>
-          <a:xfrm>
-            <a:off x="6680343" y="845572"/>
-            <a:ext cx="1041336" cy="369332"/>
-          </a:xfrm>
-          <a:prstGeom prst="rect">
-            <a:avLst/>
-          </a:prstGeom>
-          <a:noFill/>
-        </p:spPr>
-        <p:txBody>
-          <a:bodyPr wrap="square" rtlCol="0">
-            <a:spAutoFit/>
-          </a:bodyPr>
-          <a:lstStyle/>
-          <a:p>
-            <a:r>
-              <a:rPr lang="en-US" dirty="0">
+        </p:grpSpPr>
+        <p:grpSp>
+          <p:nvGrpSpPr>
+            <p:cNvPr id="56" name="Group 55">
+              <a:extLst>
+                <a:ext uri="{FF2B5EF4-FFF2-40B4-BE49-F238E27FC236}">
+                  <a16:creationId xmlns:a16="http://schemas.microsoft.com/office/drawing/2014/main" id="{AB9D8CBF-7763-4544-8805-04C958F1670A}"/>
+                </a:ext>
+              </a:extLst>
+            </p:cNvPr>
+            <p:cNvGrpSpPr/>
+            <p:nvPr/>
+          </p:nvGrpSpPr>
+          <p:grpSpPr>
+            <a:xfrm>
+              <a:off x="3691131" y="861669"/>
+              <a:ext cx="1946497" cy="788022"/>
+              <a:chOff x="6262991" y="868888"/>
+              <a:chExt cx="1946497" cy="788022"/>
+            </a:xfrm>
+          </p:grpSpPr>
+          <p:cxnSp>
+            <p:nvCxnSpPr>
+              <p:cNvPr id="24" name="Straight Connector 23">
+                <a:extLst>
+                  <a:ext uri="{FF2B5EF4-FFF2-40B4-BE49-F238E27FC236}">
+                    <a16:creationId xmlns:a16="http://schemas.microsoft.com/office/drawing/2014/main" id="{CBD4BB6E-DBBE-47FC-B077-DEDD8DCF03E0}"/>
+                  </a:ext>
+                </a:extLst>
+              </p:cNvPr>
+              <p:cNvCxnSpPr>
+                <a:cxnSpLocks/>
+              </p:cNvCxnSpPr>
+              <p:nvPr/>
+            </p:nvCxnSpPr>
+            <p:spPr>
+              <a:xfrm>
+                <a:off x="7259261" y="1549400"/>
+                <a:ext cx="0" cy="107510"/>
+              </a:xfrm>
+              <a:prstGeom prst="line">
+                <a:avLst/>
+              </a:prstGeom>
+              <a:ln w="25400">
+                <a:solidFill>
+                  <a:schemeClr val="tx1"/>
+                </a:solidFill>
+              </a:ln>
+            </p:spPr>
+            <p:style>
+              <a:lnRef idx="1">
+                <a:schemeClr val="accent1"/>
+              </a:lnRef>
+              <a:fillRef idx="0">
+                <a:schemeClr val="accent1"/>
+              </a:fillRef>
+              <a:effectRef idx="0">
+                <a:schemeClr val="accent1"/>
+              </a:effectRef>
+              <a:fontRef idx="minor">
+                <a:schemeClr val="tx1"/>
+              </a:fontRef>
+            </p:style>
+          </p:cxnSp>
+          <p:sp>
+            <p:nvSpPr>
+              <p:cNvPr id="25" name="TextBox 24">
+                <a:extLst>
+                  <a:ext uri="{FF2B5EF4-FFF2-40B4-BE49-F238E27FC236}">
+                    <a16:creationId xmlns:a16="http://schemas.microsoft.com/office/drawing/2014/main" id="{CAD6CE28-709F-461F-B14D-5FFD03C91A08}"/>
+                  </a:ext>
+                </a:extLst>
+              </p:cNvPr>
+              <p:cNvSpPr txBox="1"/>
+              <p:nvPr/>
+            </p:nvSpPr>
+            <p:spPr>
+              <a:xfrm>
+                <a:off x="6309034" y="1178196"/>
+                <a:ext cx="1900454" cy="369332"/>
+              </a:xfrm>
+              <a:prstGeom prst="rect">
+                <a:avLst/>
+              </a:prstGeom>
+              <a:noFill/>
+            </p:spPr>
+            <p:txBody>
+              <a:bodyPr wrap="square" rtlCol="0">
+                <a:spAutoFit/>
+              </a:bodyPr>
+              <a:lstStyle/>
+              <a:p>
+                <a:r>
+                  <a:rPr lang="en-US" dirty="0">
+                    <a:solidFill>
+                      <a:srgbClr val="7030A0"/>
+                    </a:solidFill>
+                    <a:latin typeface="LM Mono 10" panose="00000509000000000000" pitchFamily="49" charset="0"/>
+                    <a:cs typeface="Times New Roman" panose="02020603050405020304" pitchFamily="18" charset="0"/>
+                  </a:rPr>
+                  <a:t>News-2</a:t>
+                </a:r>
+                <a:r>
+                  <a:rPr lang="en-US" dirty="0">
+                    <a:latin typeface="LM Mono 10" panose="00000509000000000000" pitchFamily="49" charset="0"/>
+                    <a:cs typeface="Times New Roman" panose="02020603050405020304" pitchFamily="18" charset="0"/>
+                  </a:rPr>
+                  <a:t> &amp; </a:t>
+                </a:r>
+                <a:r>
+                  <a:rPr lang="en-US" dirty="0">
+                    <a:solidFill>
+                      <a:schemeClr val="accent1"/>
+                    </a:solidFill>
+                    <a:latin typeface="LM Mono 10" panose="00000509000000000000" pitchFamily="49" charset="0"/>
+                    <a:cs typeface="Times New Roman" panose="02020603050405020304" pitchFamily="18" charset="0"/>
+                  </a:rPr>
+                  <a:t>8-K-2</a:t>
+                </a:r>
+              </a:p>
+            </p:txBody>
+          </p:sp>
+          <p:sp>
+            <p:nvSpPr>
+              <p:cNvPr id="52" name="Oval 51">
+                <a:extLst>
+                  <a:ext uri="{FF2B5EF4-FFF2-40B4-BE49-F238E27FC236}">
+                    <a16:creationId xmlns:a16="http://schemas.microsoft.com/office/drawing/2014/main" id="{BDAC114B-D443-4764-AA79-72A63EF277E3}"/>
+                  </a:ext>
+                </a:extLst>
+              </p:cNvPr>
+              <p:cNvSpPr/>
+              <p:nvPr/>
+            </p:nvSpPr>
+            <p:spPr>
+              <a:xfrm>
+                <a:off x="6262991" y="1170978"/>
+                <a:ext cx="1900451" cy="361289"/>
+              </a:xfrm>
+              <a:prstGeom prst="ellipse">
+                <a:avLst/>
+              </a:prstGeom>
+              <a:noFill/>
+              <a:ln>
                 <a:solidFill>
                   <a:srgbClr val="FF0000"/>
                 </a:solidFill>
-                <a:latin typeface="Times New Roman" panose="02020603050405020304" pitchFamily="18" charset="0"/>
-                <a:cs typeface="Times New Roman" panose="02020603050405020304" pitchFamily="18" charset="0"/>
-              </a:rPr>
-              <a:t>Match-2</a:t>
-            </a:r>
-          </a:p>
-        </p:txBody>
-      </p:sp>
-      <p:sp>
-        <p:nvSpPr>
-          <p:cNvPr id="3" name="TextBox 2">
-            <a:extLst>
-              <a:ext uri="{FF2B5EF4-FFF2-40B4-BE49-F238E27FC236}">
-                <a16:creationId xmlns:a16="http://schemas.microsoft.com/office/drawing/2014/main" id="{B28B3F38-94E6-456A-A7F1-CB5BDCEE4735}"/>
-              </a:ext>
-            </a:extLst>
-          </p:cNvPr>
-          <p:cNvSpPr txBox="1"/>
-          <p:nvPr/>
-        </p:nvSpPr>
-        <p:spPr>
-          <a:xfrm>
-            <a:off x="1094930" y="2373946"/>
-            <a:ext cx="4003830" cy="369332"/>
-          </a:xfrm>
-          <a:prstGeom prst="rect">
-            <a:avLst/>
-          </a:prstGeom>
-          <a:noFill/>
-        </p:spPr>
-        <p:txBody>
-          <a:bodyPr wrap="square" rtlCol="0">
-            <a:spAutoFit/>
-          </a:bodyPr>
-          <a:lstStyle/>
-          <a:p>
-            <a:r>
-              <a:rPr lang="en-US" dirty="0"/>
-              <a:t>Fundamental Qualitative Characteristics </a:t>
-            </a:r>
-          </a:p>
-        </p:txBody>
-      </p:sp>
-      <p:sp>
-        <p:nvSpPr>
-          <p:cNvPr id="29" name="TextBox 28">
-            <a:extLst>
-              <a:ext uri="{FF2B5EF4-FFF2-40B4-BE49-F238E27FC236}">
-                <a16:creationId xmlns:a16="http://schemas.microsoft.com/office/drawing/2014/main" id="{3D5FD2D5-A266-4748-9D02-85750EF48F7F}"/>
-              </a:ext>
-            </a:extLst>
-          </p:cNvPr>
-          <p:cNvSpPr txBox="1"/>
-          <p:nvPr/>
-        </p:nvSpPr>
-        <p:spPr>
-          <a:xfrm>
-            <a:off x="342705" y="2993665"/>
-            <a:ext cx="1203291" cy="369332"/>
-          </a:xfrm>
-          <a:prstGeom prst="rect">
-            <a:avLst/>
-          </a:prstGeom>
-          <a:noFill/>
-        </p:spPr>
-        <p:txBody>
-          <a:bodyPr wrap="square" rtlCol="0">
-            <a:spAutoFit/>
-          </a:bodyPr>
-          <a:lstStyle/>
-          <a:p>
-            <a:r>
-              <a:rPr lang="en-US" dirty="0"/>
-              <a:t>Relevance</a:t>
-            </a:r>
-          </a:p>
-        </p:txBody>
-      </p:sp>
-      <p:sp>
-        <p:nvSpPr>
-          <p:cNvPr id="30" name="TextBox 29">
-            <a:extLst>
-              <a:ext uri="{FF2B5EF4-FFF2-40B4-BE49-F238E27FC236}">
-                <a16:creationId xmlns:a16="http://schemas.microsoft.com/office/drawing/2014/main" id="{3325403F-70BE-488A-9AFE-5BD45199EFFA}"/>
-              </a:ext>
-            </a:extLst>
-          </p:cNvPr>
-          <p:cNvSpPr txBox="1"/>
-          <p:nvPr/>
-        </p:nvSpPr>
-        <p:spPr>
-          <a:xfrm>
-            <a:off x="3155194" y="2970548"/>
-            <a:ext cx="2501048" cy="369332"/>
-          </a:xfrm>
-          <a:prstGeom prst="rect">
-            <a:avLst/>
-          </a:prstGeom>
-          <a:noFill/>
-        </p:spPr>
-        <p:txBody>
-          <a:bodyPr wrap="square" rtlCol="0">
-            <a:spAutoFit/>
-          </a:bodyPr>
-          <a:lstStyle/>
-          <a:p>
-            <a:r>
-              <a:rPr lang="en-US" dirty="0"/>
-              <a:t>Faithful Representation</a:t>
-            </a:r>
-          </a:p>
-        </p:txBody>
-      </p:sp>
-      <p:sp>
-        <p:nvSpPr>
-          <p:cNvPr id="31" name="TextBox 30">
-            <a:extLst>
-              <a:ext uri="{FF2B5EF4-FFF2-40B4-BE49-F238E27FC236}">
-                <a16:creationId xmlns:a16="http://schemas.microsoft.com/office/drawing/2014/main" id="{A7B18CF0-C5A6-435E-9519-811D7EAA6C04}"/>
-              </a:ext>
-            </a:extLst>
-          </p:cNvPr>
-          <p:cNvSpPr txBox="1"/>
-          <p:nvPr/>
-        </p:nvSpPr>
-        <p:spPr>
-          <a:xfrm>
-            <a:off x="2011387" y="3364929"/>
-            <a:ext cx="1203291" cy="646331"/>
-          </a:xfrm>
-          <a:prstGeom prst="rect">
-            <a:avLst/>
-          </a:prstGeom>
-          <a:noFill/>
-        </p:spPr>
-        <p:txBody>
-          <a:bodyPr wrap="square" rtlCol="0">
-            <a:spAutoFit/>
-          </a:bodyPr>
-          <a:lstStyle/>
-          <a:p>
-            <a:r>
-              <a:rPr lang="en-US" dirty="0"/>
-              <a:t>Complete</a:t>
-            </a:r>
-          </a:p>
-          <a:p>
-            <a:r>
-              <a:rPr lang="en-US" dirty="0"/>
-              <a:t>(NW)</a:t>
-            </a:r>
-          </a:p>
-        </p:txBody>
-      </p:sp>
-      <p:sp>
-        <p:nvSpPr>
-          <p:cNvPr id="34" name="TextBox 33">
-            <a:extLst>
-              <a:ext uri="{FF2B5EF4-FFF2-40B4-BE49-F238E27FC236}">
-                <a16:creationId xmlns:a16="http://schemas.microsoft.com/office/drawing/2014/main" id="{AB1A1690-C5B4-4356-92D5-FC1E4228FACD}"/>
-              </a:ext>
-            </a:extLst>
-          </p:cNvPr>
-          <p:cNvSpPr txBox="1"/>
-          <p:nvPr/>
-        </p:nvSpPr>
-        <p:spPr>
-          <a:xfrm>
-            <a:off x="3588271" y="3364929"/>
-            <a:ext cx="1203291" cy="646331"/>
-          </a:xfrm>
-          <a:prstGeom prst="rect">
-            <a:avLst/>
-          </a:prstGeom>
-          <a:noFill/>
-        </p:spPr>
-        <p:txBody>
-          <a:bodyPr wrap="square" rtlCol="0">
-            <a:spAutoFit/>
-          </a:bodyPr>
-          <a:lstStyle/>
-          <a:p>
-            <a:r>
-              <a:rPr lang="en-US" dirty="0"/>
-              <a:t>Neutral</a:t>
-            </a:r>
-          </a:p>
-          <a:p>
-            <a:r>
-              <a:rPr lang="en-US" dirty="0"/>
-              <a:t>(TONE)</a:t>
-            </a:r>
-          </a:p>
-        </p:txBody>
-      </p:sp>
-      <p:sp>
-        <p:nvSpPr>
-          <p:cNvPr id="36" name="TextBox 35">
-            <a:extLst>
-              <a:ext uri="{FF2B5EF4-FFF2-40B4-BE49-F238E27FC236}">
-                <a16:creationId xmlns:a16="http://schemas.microsoft.com/office/drawing/2014/main" id="{7471B540-E498-45C7-B148-C3C528FC59C7}"/>
-              </a:ext>
-            </a:extLst>
-          </p:cNvPr>
-          <p:cNvSpPr txBox="1"/>
-          <p:nvPr/>
-        </p:nvSpPr>
-        <p:spPr>
-          <a:xfrm>
-            <a:off x="7133719" y="2380756"/>
-            <a:ext cx="4003830" cy="369332"/>
-          </a:xfrm>
-          <a:prstGeom prst="rect">
-            <a:avLst/>
-          </a:prstGeom>
-          <a:noFill/>
-        </p:spPr>
-        <p:txBody>
-          <a:bodyPr wrap="square" rtlCol="0">
-            <a:spAutoFit/>
-          </a:bodyPr>
-          <a:lstStyle/>
-          <a:p>
-            <a:r>
-              <a:rPr lang="en-US" dirty="0"/>
-              <a:t>Enhancing Qualitative Characteristics </a:t>
-            </a:r>
-          </a:p>
-        </p:txBody>
-      </p:sp>
-      <p:sp>
-        <p:nvSpPr>
-          <p:cNvPr id="38" name="TextBox 37">
-            <a:extLst>
-              <a:ext uri="{FF2B5EF4-FFF2-40B4-BE49-F238E27FC236}">
-                <a16:creationId xmlns:a16="http://schemas.microsoft.com/office/drawing/2014/main" id="{A27F4DDF-408D-4AC4-AF9E-E4F125EF4CAA}"/>
-              </a:ext>
-            </a:extLst>
-          </p:cNvPr>
-          <p:cNvSpPr txBox="1"/>
-          <p:nvPr/>
-        </p:nvSpPr>
-        <p:spPr>
-          <a:xfrm>
-            <a:off x="6030024" y="2884283"/>
-            <a:ext cx="1611165" cy="369332"/>
-          </a:xfrm>
-          <a:prstGeom prst="rect">
-            <a:avLst/>
-          </a:prstGeom>
-          <a:noFill/>
-        </p:spPr>
-        <p:txBody>
-          <a:bodyPr wrap="square" rtlCol="0">
-            <a:spAutoFit/>
-          </a:bodyPr>
-          <a:lstStyle/>
-          <a:p>
-            <a:r>
-              <a:rPr lang="en-US" dirty="0"/>
-              <a:t>Comparability</a:t>
-            </a:r>
-          </a:p>
-        </p:txBody>
-      </p:sp>
-      <p:sp>
-        <p:nvSpPr>
-          <p:cNvPr id="40" name="TextBox 39">
-            <a:extLst>
-              <a:ext uri="{FF2B5EF4-FFF2-40B4-BE49-F238E27FC236}">
-                <a16:creationId xmlns:a16="http://schemas.microsoft.com/office/drawing/2014/main" id="{5C63CCEB-7E84-495C-88F2-595BDEFB90BF}"/>
-              </a:ext>
-            </a:extLst>
-          </p:cNvPr>
-          <p:cNvSpPr txBox="1"/>
-          <p:nvPr/>
-        </p:nvSpPr>
-        <p:spPr>
-          <a:xfrm>
-            <a:off x="7679732" y="2884283"/>
-            <a:ext cx="1242236" cy="369332"/>
-          </a:xfrm>
-          <a:prstGeom prst="rect">
-            <a:avLst/>
-          </a:prstGeom>
-          <a:noFill/>
-        </p:spPr>
-        <p:txBody>
-          <a:bodyPr wrap="square" rtlCol="0">
-            <a:spAutoFit/>
-          </a:bodyPr>
-          <a:lstStyle/>
-          <a:p>
-            <a:r>
-              <a:rPr lang="en-US" dirty="0"/>
-              <a:t>Verifiability</a:t>
-            </a:r>
-          </a:p>
-        </p:txBody>
-      </p:sp>
-      <p:sp>
-        <p:nvSpPr>
-          <p:cNvPr id="41" name="TextBox 40">
-            <a:extLst>
-              <a:ext uri="{FF2B5EF4-FFF2-40B4-BE49-F238E27FC236}">
-                <a16:creationId xmlns:a16="http://schemas.microsoft.com/office/drawing/2014/main" id="{19F5C527-343D-4EEF-AEEC-4CCBCF88C119}"/>
-              </a:ext>
-            </a:extLst>
-          </p:cNvPr>
-          <p:cNvSpPr txBox="1"/>
-          <p:nvPr/>
-        </p:nvSpPr>
-        <p:spPr>
-          <a:xfrm>
-            <a:off x="9039495" y="2884283"/>
-            <a:ext cx="1177933" cy="646331"/>
-          </a:xfrm>
-          <a:prstGeom prst="rect">
-            <a:avLst/>
-          </a:prstGeom>
-          <a:noFill/>
-        </p:spPr>
-        <p:txBody>
-          <a:bodyPr wrap="square" rtlCol="0">
-            <a:spAutoFit/>
-          </a:bodyPr>
-          <a:lstStyle/>
-          <a:p>
-            <a:r>
-              <a:rPr lang="en-US" dirty="0"/>
-              <a:t>Timeliness</a:t>
-            </a:r>
-          </a:p>
-          <a:p>
-            <a:r>
-              <a:rPr lang="en-US" dirty="0"/>
-              <a:t>(TLAG)</a:t>
-            </a:r>
-          </a:p>
-        </p:txBody>
-      </p:sp>
-      <p:sp>
-        <p:nvSpPr>
-          <p:cNvPr id="42" name="TextBox 41">
-            <a:extLst>
-              <a:ext uri="{FF2B5EF4-FFF2-40B4-BE49-F238E27FC236}">
-                <a16:creationId xmlns:a16="http://schemas.microsoft.com/office/drawing/2014/main" id="{1B8DF6B7-490B-4F3E-8943-215261965077}"/>
-              </a:ext>
-            </a:extLst>
-          </p:cNvPr>
-          <p:cNvSpPr txBox="1"/>
-          <p:nvPr/>
-        </p:nvSpPr>
-        <p:spPr>
-          <a:xfrm>
-            <a:off x="10245540" y="2884283"/>
-            <a:ext cx="1852475" cy="646331"/>
-          </a:xfrm>
-          <a:prstGeom prst="rect">
-            <a:avLst/>
-          </a:prstGeom>
-          <a:noFill/>
-        </p:spPr>
-        <p:txBody>
-          <a:bodyPr wrap="square" rtlCol="0">
-            <a:spAutoFit/>
-          </a:bodyPr>
-          <a:lstStyle/>
-          <a:p>
-            <a:r>
-              <a:rPr lang="en-US" dirty="0"/>
-              <a:t>Understandability</a:t>
-            </a:r>
-          </a:p>
-          <a:p>
-            <a:r>
-              <a:rPr lang="en-US" dirty="0"/>
-              <a:t>(READABILITY)</a:t>
-            </a:r>
-          </a:p>
-        </p:txBody>
-      </p:sp>
-      <p:sp>
-        <p:nvSpPr>
-          <p:cNvPr id="43" name="TextBox 42">
-            <a:extLst>
-              <a:ext uri="{FF2B5EF4-FFF2-40B4-BE49-F238E27FC236}">
-                <a16:creationId xmlns:a16="http://schemas.microsoft.com/office/drawing/2014/main" id="{3F45A45E-EC4A-434C-985F-68515B4DF9DC}"/>
-              </a:ext>
-            </a:extLst>
-          </p:cNvPr>
-          <p:cNvSpPr txBox="1"/>
-          <p:nvPr/>
-        </p:nvSpPr>
-        <p:spPr>
-          <a:xfrm>
-            <a:off x="4868726" y="3362997"/>
-            <a:ext cx="1394265" cy="369332"/>
-          </a:xfrm>
-          <a:prstGeom prst="rect">
-            <a:avLst/>
-          </a:prstGeom>
-          <a:noFill/>
-        </p:spPr>
-        <p:txBody>
-          <a:bodyPr wrap="square" rtlCol="0">
-            <a:spAutoFit/>
-          </a:bodyPr>
-          <a:lstStyle/>
-          <a:p>
-            <a:r>
-              <a:rPr lang="en-US" dirty="0"/>
-              <a:t>Free of error</a:t>
-            </a:r>
-          </a:p>
-        </p:txBody>
-      </p:sp>
-      <p:cxnSp>
-        <p:nvCxnSpPr>
-          <p:cNvPr id="6" name="Straight Arrow Connector 5">
-            <a:extLst>
-              <a:ext uri="{FF2B5EF4-FFF2-40B4-BE49-F238E27FC236}">
-                <a16:creationId xmlns:a16="http://schemas.microsoft.com/office/drawing/2014/main" id="{BB369C9F-F754-4426-A4A0-3EF2F1781F1F}"/>
-              </a:ext>
-            </a:extLst>
-          </p:cNvPr>
-          <p:cNvCxnSpPr>
-            <a:stCxn id="3" idx="2"/>
-          </p:cNvCxnSpPr>
-          <p:nvPr/>
-        </p:nvCxnSpPr>
-        <p:spPr>
-          <a:xfrm flipH="1">
-            <a:off x="1180730" y="2743278"/>
-            <a:ext cx="1916115" cy="319518"/>
-          </a:xfrm>
-          <a:prstGeom prst="straightConnector1">
-            <a:avLst/>
-          </a:prstGeom>
-          <a:ln>
-            <a:tailEnd type="triangle"/>
-          </a:ln>
-        </p:spPr>
-        <p:style>
-          <a:lnRef idx="1">
-            <a:schemeClr val="accent1"/>
-          </a:lnRef>
-          <a:fillRef idx="0">
-            <a:schemeClr val="accent1"/>
-          </a:fillRef>
-          <a:effectRef idx="0">
-            <a:schemeClr val="accent1"/>
-          </a:effectRef>
-          <a:fontRef idx="minor">
-            <a:schemeClr val="tx1"/>
-          </a:fontRef>
-        </p:style>
-      </p:cxnSp>
-      <p:cxnSp>
-        <p:nvCxnSpPr>
-          <p:cNvPr id="10" name="Straight Arrow Connector 9">
-            <a:extLst>
-              <a:ext uri="{FF2B5EF4-FFF2-40B4-BE49-F238E27FC236}">
-                <a16:creationId xmlns:a16="http://schemas.microsoft.com/office/drawing/2014/main" id="{6CEB1AC1-93C1-43AD-B1F8-A6CD9BA27474}"/>
-              </a:ext>
-            </a:extLst>
-          </p:cNvPr>
-          <p:cNvCxnSpPr>
-            <a:cxnSpLocks/>
-            <a:stCxn id="3" idx="2"/>
-          </p:cNvCxnSpPr>
-          <p:nvPr/>
-        </p:nvCxnSpPr>
-        <p:spPr>
-          <a:xfrm>
-            <a:off x="3096845" y="2743278"/>
-            <a:ext cx="997306" cy="266185"/>
-          </a:xfrm>
-          <a:prstGeom prst="straightConnector1">
-            <a:avLst/>
-          </a:prstGeom>
-          <a:ln>
-            <a:tailEnd type="triangle"/>
-          </a:ln>
-        </p:spPr>
-        <p:style>
-          <a:lnRef idx="1">
-            <a:schemeClr val="accent1"/>
-          </a:lnRef>
-          <a:fillRef idx="0">
-            <a:schemeClr val="accent1"/>
-          </a:fillRef>
-          <a:effectRef idx="0">
-            <a:schemeClr val="accent1"/>
-          </a:effectRef>
-          <a:fontRef idx="minor">
-            <a:schemeClr val="tx1"/>
-          </a:fontRef>
-        </p:style>
-      </p:cxnSp>
-      <p:cxnSp>
-        <p:nvCxnSpPr>
-          <p:cNvPr id="13" name="Straight Arrow Connector 12">
-            <a:extLst>
-              <a:ext uri="{FF2B5EF4-FFF2-40B4-BE49-F238E27FC236}">
-                <a16:creationId xmlns:a16="http://schemas.microsoft.com/office/drawing/2014/main" id="{DA3CA69F-0617-4576-AA1D-261B99BCFC70}"/>
-              </a:ext>
-            </a:extLst>
-          </p:cNvPr>
-          <p:cNvCxnSpPr>
-            <a:cxnSpLocks/>
-          </p:cNvCxnSpPr>
-          <p:nvPr/>
-        </p:nvCxnSpPr>
-        <p:spPr>
-          <a:xfrm flipH="1">
-            <a:off x="2454915" y="3274164"/>
-            <a:ext cx="1624306" cy="127652"/>
-          </a:xfrm>
-          <a:prstGeom prst="straightConnector1">
-            <a:avLst/>
-          </a:prstGeom>
-          <a:ln>
-            <a:tailEnd type="triangle"/>
-          </a:ln>
-        </p:spPr>
-        <p:style>
-          <a:lnRef idx="1">
-            <a:schemeClr val="accent1"/>
-          </a:lnRef>
-          <a:fillRef idx="0">
-            <a:schemeClr val="accent1"/>
-          </a:fillRef>
-          <a:effectRef idx="0">
-            <a:schemeClr val="accent1"/>
-          </a:effectRef>
-          <a:fontRef idx="minor">
-            <a:schemeClr val="tx1"/>
-          </a:fontRef>
-        </p:style>
-      </p:cxnSp>
-      <p:cxnSp>
-        <p:nvCxnSpPr>
-          <p:cNvPr id="20" name="Straight Arrow Connector 19">
-            <a:extLst>
-              <a:ext uri="{FF2B5EF4-FFF2-40B4-BE49-F238E27FC236}">
-                <a16:creationId xmlns:a16="http://schemas.microsoft.com/office/drawing/2014/main" id="{CF456221-C666-494C-B7B6-7177FBF9C1ED}"/>
-              </a:ext>
-            </a:extLst>
-          </p:cNvPr>
-          <p:cNvCxnSpPr/>
-          <p:nvPr/>
-        </p:nvCxnSpPr>
-        <p:spPr>
-          <a:xfrm>
-            <a:off x="4094151" y="3283736"/>
-            <a:ext cx="0" cy="183796"/>
-          </a:xfrm>
-          <a:prstGeom prst="straightConnector1">
-            <a:avLst/>
-          </a:prstGeom>
-          <a:ln>
-            <a:tailEnd type="triangle"/>
-          </a:ln>
-        </p:spPr>
-        <p:style>
-          <a:lnRef idx="1">
-            <a:schemeClr val="accent1"/>
-          </a:lnRef>
-          <a:fillRef idx="0">
-            <a:schemeClr val="accent1"/>
-          </a:fillRef>
-          <a:effectRef idx="0">
-            <a:schemeClr val="accent1"/>
-          </a:effectRef>
-          <a:fontRef idx="minor">
-            <a:schemeClr val="tx1"/>
-          </a:fontRef>
-        </p:style>
-      </p:cxnSp>
-      <p:cxnSp>
-        <p:nvCxnSpPr>
-          <p:cNvPr id="22" name="Straight Arrow Connector 21">
-            <a:extLst>
-              <a:ext uri="{FF2B5EF4-FFF2-40B4-BE49-F238E27FC236}">
-                <a16:creationId xmlns:a16="http://schemas.microsoft.com/office/drawing/2014/main" id="{43134235-65AA-48D6-870B-E50CE42121E3}"/>
-              </a:ext>
-            </a:extLst>
-          </p:cNvPr>
-          <p:cNvCxnSpPr/>
-          <p:nvPr/>
-        </p:nvCxnSpPr>
-        <p:spPr>
-          <a:xfrm>
-            <a:off x="4079221" y="3274164"/>
-            <a:ext cx="1577021" cy="154836"/>
-          </a:xfrm>
-          <a:prstGeom prst="straightConnector1">
-            <a:avLst/>
-          </a:prstGeom>
-          <a:ln>
-            <a:tailEnd type="triangle"/>
-          </a:ln>
-        </p:spPr>
-        <p:style>
-          <a:lnRef idx="1">
-            <a:schemeClr val="accent1"/>
-          </a:lnRef>
-          <a:fillRef idx="0">
-            <a:schemeClr val="accent1"/>
-          </a:fillRef>
-          <a:effectRef idx="0">
-            <a:schemeClr val="accent1"/>
-          </a:effectRef>
-          <a:fontRef idx="minor">
-            <a:schemeClr val="tx1"/>
-          </a:fontRef>
-        </p:style>
-      </p:cxnSp>
-      <p:cxnSp>
-        <p:nvCxnSpPr>
-          <p:cNvPr id="45" name="Straight Arrow Connector 44">
-            <a:extLst>
-              <a:ext uri="{FF2B5EF4-FFF2-40B4-BE49-F238E27FC236}">
-                <a16:creationId xmlns:a16="http://schemas.microsoft.com/office/drawing/2014/main" id="{4E7133E7-CAC4-4B89-B081-7D0E0CE11053}"/>
-              </a:ext>
-            </a:extLst>
-          </p:cNvPr>
-          <p:cNvCxnSpPr/>
-          <p:nvPr/>
-        </p:nvCxnSpPr>
-        <p:spPr>
-          <a:xfrm flipH="1">
-            <a:off x="7201011" y="2672179"/>
-            <a:ext cx="1720957" cy="298369"/>
-          </a:xfrm>
-          <a:prstGeom prst="straightConnector1">
-            <a:avLst/>
-          </a:prstGeom>
-          <a:ln>
-            <a:tailEnd type="triangle"/>
-          </a:ln>
-        </p:spPr>
-        <p:style>
-          <a:lnRef idx="1">
-            <a:schemeClr val="accent1"/>
-          </a:lnRef>
-          <a:fillRef idx="0">
-            <a:schemeClr val="accent1"/>
-          </a:fillRef>
-          <a:effectRef idx="0">
-            <a:schemeClr val="accent1"/>
-          </a:effectRef>
-          <a:fontRef idx="minor">
-            <a:schemeClr val="tx1"/>
-          </a:fontRef>
-        </p:style>
-      </p:cxnSp>
-      <p:cxnSp>
-        <p:nvCxnSpPr>
-          <p:cNvPr id="47" name="Straight Arrow Connector 46">
-            <a:extLst>
-              <a:ext uri="{FF2B5EF4-FFF2-40B4-BE49-F238E27FC236}">
-                <a16:creationId xmlns:a16="http://schemas.microsoft.com/office/drawing/2014/main" id="{F887675D-815F-41C0-8D7D-7AC8BDA32B9B}"/>
-              </a:ext>
-            </a:extLst>
-          </p:cNvPr>
-          <p:cNvCxnSpPr/>
-          <p:nvPr/>
-        </p:nvCxnSpPr>
-        <p:spPr>
-          <a:xfrm flipH="1">
-            <a:off x="8519802" y="2668001"/>
-            <a:ext cx="402166" cy="302547"/>
-          </a:xfrm>
-          <a:prstGeom prst="straightConnector1">
-            <a:avLst/>
-          </a:prstGeom>
-          <a:ln>
-            <a:tailEnd type="triangle"/>
-          </a:ln>
-        </p:spPr>
-        <p:style>
-          <a:lnRef idx="1">
-            <a:schemeClr val="accent1"/>
-          </a:lnRef>
-          <a:fillRef idx="0">
-            <a:schemeClr val="accent1"/>
-          </a:fillRef>
-          <a:effectRef idx="0">
-            <a:schemeClr val="accent1"/>
-          </a:effectRef>
-          <a:fontRef idx="minor">
-            <a:schemeClr val="tx1"/>
-          </a:fontRef>
-        </p:style>
-      </p:cxnSp>
-      <p:cxnSp>
-        <p:nvCxnSpPr>
-          <p:cNvPr id="49" name="Straight Arrow Connector 48">
-            <a:extLst>
-              <a:ext uri="{FF2B5EF4-FFF2-40B4-BE49-F238E27FC236}">
-                <a16:creationId xmlns:a16="http://schemas.microsoft.com/office/drawing/2014/main" id="{9322ECA5-EF92-4180-8409-1EA35A98977C}"/>
-              </a:ext>
-            </a:extLst>
-          </p:cNvPr>
-          <p:cNvCxnSpPr/>
-          <p:nvPr/>
-        </p:nvCxnSpPr>
-        <p:spPr>
-          <a:xfrm>
-            <a:off x="8921968" y="2665912"/>
-            <a:ext cx="706493" cy="327753"/>
-          </a:xfrm>
-          <a:prstGeom prst="straightConnector1">
-            <a:avLst/>
-          </a:prstGeom>
-          <a:ln>
-            <a:tailEnd type="triangle"/>
-          </a:ln>
-        </p:spPr>
-        <p:style>
-          <a:lnRef idx="1">
-            <a:schemeClr val="accent1"/>
-          </a:lnRef>
-          <a:fillRef idx="0">
-            <a:schemeClr val="accent1"/>
-          </a:fillRef>
-          <a:effectRef idx="0">
-            <a:schemeClr val="accent1"/>
-          </a:effectRef>
-          <a:fontRef idx="minor">
-            <a:schemeClr val="tx1"/>
-          </a:fontRef>
-        </p:style>
-      </p:cxnSp>
-      <p:cxnSp>
-        <p:nvCxnSpPr>
-          <p:cNvPr id="51" name="Straight Arrow Connector 50">
-            <a:extLst>
-              <a:ext uri="{FF2B5EF4-FFF2-40B4-BE49-F238E27FC236}">
-                <a16:creationId xmlns:a16="http://schemas.microsoft.com/office/drawing/2014/main" id="{7EDC2BD3-1038-47F2-8D4D-96FF51187F61}"/>
-              </a:ext>
-            </a:extLst>
-          </p:cNvPr>
-          <p:cNvCxnSpPr>
-            <a:endCxn id="42" idx="0"/>
-          </p:cNvCxnSpPr>
-          <p:nvPr/>
-        </p:nvCxnSpPr>
-        <p:spPr>
-          <a:xfrm>
-            <a:off x="8921968" y="2653309"/>
-            <a:ext cx="2249810" cy="230974"/>
-          </a:xfrm>
-          <a:prstGeom prst="straightConnector1">
-            <a:avLst/>
-          </a:prstGeom>
-          <a:ln>
-            <a:tailEnd type="triangle"/>
-          </a:ln>
-        </p:spPr>
-        <p:style>
-          <a:lnRef idx="1">
-            <a:schemeClr val="accent1"/>
-          </a:lnRef>
-          <a:fillRef idx="0">
-            <a:schemeClr val="accent1"/>
-          </a:fillRef>
-          <a:effectRef idx="0">
-            <a:schemeClr val="accent1"/>
-          </a:effectRef>
-          <a:fontRef idx="minor">
-            <a:schemeClr val="tx1"/>
-          </a:fontRef>
-        </p:style>
-      </p:cxnSp>
+              </a:ln>
+            </p:spPr>
+            <p:style>
+              <a:lnRef idx="2">
+                <a:schemeClr val="accent1">
+                  <a:shade val="50000"/>
+                </a:schemeClr>
+              </a:lnRef>
+              <a:fillRef idx="1">
+                <a:schemeClr val="accent1"/>
+              </a:fillRef>
+              <a:effectRef idx="0">
+                <a:schemeClr val="accent1"/>
+              </a:effectRef>
+              <a:fontRef idx="minor">
+                <a:schemeClr val="lt1"/>
+              </a:fontRef>
+            </p:style>
+            <p:txBody>
+              <a:bodyPr rtlCol="0" anchor="ctr"/>
+              <a:lstStyle/>
+              <a:p>
+                <a:pPr algn="ctr"/>
+                <a:endParaRPr lang="en-US"/>
+              </a:p>
+            </p:txBody>
+          </p:sp>
+          <p:sp>
+            <p:nvSpPr>
+              <p:cNvPr id="53" name="TextBox 52">
+                <a:extLst>
+                  <a:ext uri="{FF2B5EF4-FFF2-40B4-BE49-F238E27FC236}">
+                    <a16:creationId xmlns:a16="http://schemas.microsoft.com/office/drawing/2014/main" id="{7B11C845-A0A6-4B78-9690-960EADE06B5E}"/>
+                  </a:ext>
+                </a:extLst>
+              </p:cNvPr>
+              <p:cNvSpPr txBox="1"/>
+              <p:nvPr/>
+            </p:nvSpPr>
+            <p:spPr>
+              <a:xfrm>
+                <a:off x="6749674" y="868888"/>
+                <a:ext cx="1041336" cy="369332"/>
+              </a:xfrm>
+              <a:prstGeom prst="rect">
+                <a:avLst/>
+              </a:prstGeom>
+              <a:noFill/>
+            </p:spPr>
+            <p:txBody>
+              <a:bodyPr wrap="square" rtlCol="0">
+                <a:spAutoFit/>
+              </a:bodyPr>
+              <a:lstStyle/>
+              <a:p>
+                <a:r>
+                  <a:rPr lang="en-US" dirty="0">
+                    <a:solidFill>
+                      <a:srgbClr val="FF0000"/>
+                    </a:solidFill>
+                    <a:latin typeface="LM Mono 10" panose="00000509000000000000" pitchFamily="49" charset="0"/>
+                    <a:cs typeface="Times New Roman" panose="02020603050405020304" pitchFamily="18" charset="0"/>
+                  </a:rPr>
+                  <a:t>Match-2</a:t>
+                </a:r>
+              </a:p>
+            </p:txBody>
+          </p:sp>
+        </p:grpSp>
+        <p:sp>
+          <p:nvSpPr>
+            <p:cNvPr id="57" name="TextBox 56">
+              <a:extLst>
+                <a:ext uri="{FF2B5EF4-FFF2-40B4-BE49-F238E27FC236}">
+                  <a16:creationId xmlns:a16="http://schemas.microsoft.com/office/drawing/2014/main" id="{746F4BC3-17EC-409E-9A3A-351BAA69E81E}"/>
+                </a:ext>
+              </a:extLst>
+            </p:cNvPr>
+            <p:cNvSpPr txBox="1"/>
+            <p:nvPr/>
+          </p:nvSpPr>
+          <p:spPr>
+            <a:xfrm>
+              <a:off x="4041741" y="1608000"/>
+              <a:ext cx="1441355" cy="369332"/>
+            </a:xfrm>
+            <a:prstGeom prst="rect">
+              <a:avLst/>
+            </a:prstGeom>
+            <a:noFill/>
+          </p:spPr>
+          <p:txBody>
+            <a:bodyPr wrap="square" rtlCol="0">
+              <a:spAutoFit/>
+            </a:bodyPr>
+            <a:lstStyle/>
+            <a:p>
+              <a:r>
+                <a:rPr lang="en-US" dirty="0">
+                  <a:solidFill>
+                    <a:schemeClr val="accent6">
+                      <a:lumMod val="75000"/>
+                    </a:schemeClr>
+                  </a:solidFill>
+                  <a:latin typeface="LM Mono 10" panose="00000509000000000000" pitchFamily="49" charset="0"/>
+                  <a:cs typeface="Times New Roman" panose="02020603050405020304" pitchFamily="18" charset="0"/>
+                </a:rPr>
+                <a:t>TLAG-2=0</a:t>
+              </a:r>
+            </a:p>
+          </p:txBody>
+        </p:sp>
+      </p:grpSp>
     </p:spTree>
     <p:extLst>
       <p:ext uri="{BB962C8B-B14F-4D97-AF65-F5344CB8AC3E}">

</xml_diff>

<commit_message>
NC_V4:PhD follow-up evaluation version
</commit_message>
<xml_diff>
--- a/output/Figures.pptx
+++ b/output/Figures.pptx
@@ -275,7 +275,7 @@
           <a:p>
             <a:fld id="{F6465CF2-20FA-4A27-B5DD-24B9293428AE}" type="datetimeFigureOut">
               <a:rPr lang="en-US" smtClean="0"/>
-              <a:t>8/26/2020</a:t>
+              <a:t>9/19/2020</a:t>
             </a:fld>
             <a:endParaRPr lang="en-US"/>
           </a:p>
@@ -473,7 +473,7 @@
           <a:p>
             <a:fld id="{F6465CF2-20FA-4A27-B5DD-24B9293428AE}" type="datetimeFigureOut">
               <a:rPr lang="en-US" smtClean="0"/>
-              <a:t>8/26/2020</a:t>
+              <a:t>9/19/2020</a:t>
             </a:fld>
             <a:endParaRPr lang="en-US"/>
           </a:p>
@@ -681,7 +681,7 @@
           <a:p>
             <a:fld id="{F6465CF2-20FA-4A27-B5DD-24B9293428AE}" type="datetimeFigureOut">
               <a:rPr lang="en-US" smtClean="0"/>
-              <a:t>8/26/2020</a:t>
+              <a:t>9/19/2020</a:t>
             </a:fld>
             <a:endParaRPr lang="en-US"/>
           </a:p>
@@ -879,7 +879,7 @@
           <a:p>
             <a:fld id="{F6465CF2-20FA-4A27-B5DD-24B9293428AE}" type="datetimeFigureOut">
               <a:rPr lang="en-US" smtClean="0"/>
-              <a:t>8/26/2020</a:t>
+              <a:t>9/19/2020</a:t>
             </a:fld>
             <a:endParaRPr lang="en-US"/>
           </a:p>
@@ -1154,7 +1154,7 @@
           <a:p>
             <a:fld id="{F6465CF2-20FA-4A27-B5DD-24B9293428AE}" type="datetimeFigureOut">
               <a:rPr lang="en-US" smtClean="0"/>
-              <a:t>8/26/2020</a:t>
+              <a:t>9/19/2020</a:t>
             </a:fld>
             <a:endParaRPr lang="en-US"/>
           </a:p>
@@ -1419,7 +1419,7 @@
           <a:p>
             <a:fld id="{F6465CF2-20FA-4A27-B5DD-24B9293428AE}" type="datetimeFigureOut">
               <a:rPr lang="en-US" smtClean="0"/>
-              <a:t>8/26/2020</a:t>
+              <a:t>9/19/2020</a:t>
             </a:fld>
             <a:endParaRPr lang="en-US"/>
           </a:p>
@@ -1831,7 +1831,7 @@
           <a:p>
             <a:fld id="{F6465CF2-20FA-4A27-B5DD-24B9293428AE}" type="datetimeFigureOut">
               <a:rPr lang="en-US" smtClean="0"/>
-              <a:t>8/26/2020</a:t>
+              <a:t>9/19/2020</a:t>
             </a:fld>
             <a:endParaRPr lang="en-US"/>
           </a:p>
@@ -1972,7 +1972,7 @@
           <a:p>
             <a:fld id="{F6465CF2-20FA-4A27-B5DD-24B9293428AE}" type="datetimeFigureOut">
               <a:rPr lang="en-US" smtClean="0"/>
-              <a:t>8/26/2020</a:t>
+              <a:t>9/19/2020</a:t>
             </a:fld>
             <a:endParaRPr lang="en-US"/>
           </a:p>
@@ -2085,7 +2085,7 @@
           <a:p>
             <a:fld id="{F6465CF2-20FA-4A27-B5DD-24B9293428AE}" type="datetimeFigureOut">
               <a:rPr lang="en-US" smtClean="0"/>
-              <a:t>8/26/2020</a:t>
+              <a:t>9/19/2020</a:t>
             </a:fld>
             <a:endParaRPr lang="en-US"/>
           </a:p>
@@ -2396,7 +2396,7 @@
           <a:p>
             <a:fld id="{F6465CF2-20FA-4A27-B5DD-24B9293428AE}" type="datetimeFigureOut">
               <a:rPr lang="en-US" smtClean="0"/>
-              <a:t>8/26/2020</a:t>
+              <a:t>9/19/2020</a:t>
             </a:fld>
             <a:endParaRPr lang="en-US"/>
           </a:p>
@@ -2684,7 +2684,7 @@
           <a:p>
             <a:fld id="{F6465CF2-20FA-4A27-B5DD-24B9293428AE}" type="datetimeFigureOut">
               <a:rPr lang="en-US" smtClean="0"/>
-              <a:t>8/26/2020</a:t>
+              <a:t>9/19/2020</a:t>
             </a:fld>
             <a:endParaRPr lang="en-US"/>
           </a:p>
@@ -2925,7 +2925,7 @@
           <a:p>
             <a:fld id="{F6465CF2-20FA-4A27-B5DD-24B9293428AE}" type="datetimeFigureOut">
               <a:rPr lang="en-US" smtClean="0"/>
-              <a:t>8/26/2020</a:t>
+              <a:t>9/19/2020</a:t>
             </a:fld>
             <a:endParaRPr lang="en-US"/>
           </a:p>
@@ -8256,7 +8256,7 @@
                   <a:srgbClr val="808000"/>
                 </a:highlight>
               </a:rPr>
-              <a:t>1,142,966</a:t>
+              <a:t>1,146,058</a:t>
             </a:r>
           </a:p>
           <a:p>
@@ -8281,17 +8281,22 @@
               <a:t>cusips</a:t>
             </a:r>
             <a:r>
-              <a:rPr lang="en-US" sz="1700" dirty="0"/>
+              <a:rPr lang="en-US" sz="1700"/>
               <a:t>: </a:t>
             </a:r>
             <a:r>
-              <a:rPr lang="en-US" sz="1700" dirty="0">
+              <a:rPr lang="en-US" sz="1700">
                 <a:highlight>
                   <a:srgbClr val="FFFF00"/>
                 </a:highlight>
               </a:rPr>
-              <a:t>1,142,561</a:t>
-            </a:r>
+              <a:t>1,145,653</a:t>
+            </a:r>
+            <a:endParaRPr lang="en-US" sz="1700" dirty="0">
+              <a:highlight>
+                <a:srgbClr val="FFFF00"/>
+              </a:highlight>
+            </a:endParaRPr>
           </a:p>
         </p:txBody>
       </p:sp>
@@ -10149,7 +10154,7 @@
                   <a:srgbClr val="808000"/>
                 </a:highlight>
               </a:rPr>
-              <a:t>341</a:t>
+              <a:t>336</a:t>
             </a:r>
             <a:endParaRPr lang="en-US" sz="1400" dirty="0">
               <a:highlight>
@@ -11638,23 +11643,7 @@
                   <a:srgbClr val="FFFF00"/>
                 </a:highlight>
               </a:rPr>
-              <a:t>110,</a:t>
-            </a:r>
-            <a:r>
-              <a:rPr lang="en-US" altLang="zh-CN" sz="1400" dirty="0">
-                <a:highlight>
-                  <a:srgbClr val="FFFF00"/>
-                </a:highlight>
-              </a:rPr>
-              <a:t>095</a:t>
-            </a:r>
-            <a:r>
-              <a:rPr lang="en-US" sz="1400" dirty="0">
-                <a:highlight>
-                  <a:srgbClr val="FFFF00"/>
-                </a:highlight>
-              </a:rPr>
-              <a:t> </a:t>
+              <a:t>110,116 </a:t>
             </a:r>
           </a:p>
         </p:txBody>
@@ -12268,7 +12257,7 @@
                   <a:srgbClr val="808000"/>
                 </a:highlight>
               </a:rPr>
-              <a:t>341</a:t>
+              <a:t>336</a:t>
             </a:r>
             <a:endParaRPr lang="en-US" sz="1600" dirty="0">
               <a:highlight>
@@ -13200,16 +13189,25 @@
             </a:r>
             <a:r>
               <a:rPr lang="en-US" sz="1400" dirty="0"/>
-              <a:t>-quarter obs. after merging: </a:t>
-            </a:r>
-            <a:r>
-              <a:rPr lang="en-US" sz="1400" dirty="0">
+              <a:t>-quarter obs. after merging</a:t>
+            </a:r>
+            <a:r>
+              <a:rPr lang="en-US" sz="1400"/>
+              <a:t>: </a:t>
+            </a:r>
+            <a:r>
+              <a:rPr lang="en-US" sz="1400">
                 <a:highlight>
                   <a:srgbClr val="FFFF00"/>
                 </a:highlight>
               </a:rPr>
-              <a:t>110,114</a:t>
-            </a:r>
+              <a:t>110,116</a:t>
+            </a:r>
+            <a:endParaRPr lang="en-US" sz="1400" dirty="0">
+              <a:highlight>
+                <a:srgbClr val="FFFF00"/>
+              </a:highlight>
+            </a:endParaRPr>
           </a:p>
           <a:p>
             <a:pPr marL="342900" indent="-342900" algn="l">
@@ -13242,7 +13240,7 @@
                   <a:srgbClr val="FF0000"/>
                 </a:highlight>
               </a:rPr>
-              <a:t>06</a:t>
+              <a:t>07</a:t>
             </a:r>
             <a:endParaRPr lang="en-US" sz="1400" dirty="0">
               <a:highlight>

</xml_diff>

<commit_message>
NC_V5: comments addressed after evaluation
</commit_message>
<xml_diff>
--- a/output/Figures.pptx
+++ b/output/Figures.pptx
@@ -275,7 +275,7 @@
           <a:p>
             <a:fld id="{F6465CF2-20FA-4A27-B5DD-24B9293428AE}" type="datetimeFigureOut">
               <a:rPr lang="en-US" smtClean="0"/>
-              <a:t>9/19/2020</a:t>
+              <a:t>10/24/2020</a:t>
             </a:fld>
             <a:endParaRPr lang="en-US"/>
           </a:p>
@@ -473,7 +473,7 @@
           <a:p>
             <a:fld id="{F6465CF2-20FA-4A27-B5DD-24B9293428AE}" type="datetimeFigureOut">
               <a:rPr lang="en-US" smtClean="0"/>
-              <a:t>9/19/2020</a:t>
+              <a:t>10/24/2020</a:t>
             </a:fld>
             <a:endParaRPr lang="en-US"/>
           </a:p>
@@ -681,7 +681,7 @@
           <a:p>
             <a:fld id="{F6465CF2-20FA-4A27-B5DD-24B9293428AE}" type="datetimeFigureOut">
               <a:rPr lang="en-US" smtClean="0"/>
-              <a:t>9/19/2020</a:t>
+              <a:t>10/24/2020</a:t>
             </a:fld>
             <a:endParaRPr lang="en-US"/>
           </a:p>
@@ -879,7 +879,7 @@
           <a:p>
             <a:fld id="{F6465CF2-20FA-4A27-B5DD-24B9293428AE}" type="datetimeFigureOut">
               <a:rPr lang="en-US" smtClean="0"/>
-              <a:t>9/19/2020</a:t>
+              <a:t>10/24/2020</a:t>
             </a:fld>
             <a:endParaRPr lang="en-US"/>
           </a:p>
@@ -1154,7 +1154,7 @@
           <a:p>
             <a:fld id="{F6465CF2-20FA-4A27-B5DD-24B9293428AE}" type="datetimeFigureOut">
               <a:rPr lang="en-US" smtClean="0"/>
-              <a:t>9/19/2020</a:t>
+              <a:t>10/24/2020</a:t>
             </a:fld>
             <a:endParaRPr lang="en-US"/>
           </a:p>
@@ -1419,7 +1419,7 @@
           <a:p>
             <a:fld id="{F6465CF2-20FA-4A27-B5DD-24B9293428AE}" type="datetimeFigureOut">
               <a:rPr lang="en-US" smtClean="0"/>
-              <a:t>9/19/2020</a:t>
+              <a:t>10/24/2020</a:t>
             </a:fld>
             <a:endParaRPr lang="en-US"/>
           </a:p>
@@ -1831,7 +1831,7 @@
           <a:p>
             <a:fld id="{F6465CF2-20FA-4A27-B5DD-24B9293428AE}" type="datetimeFigureOut">
               <a:rPr lang="en-US" smtClean="0"/>
-              <a:t>9/19/2020</a:t>
+              <a:t>10/24/2020</a:t>
             </a:fld>
             <a:endParaRPr lang="en-US"/>
           </a:p>
@@ -1972,7 +1972,7 @@
           <a:p>
             <a:fld id="{F6465CF2-20FA-4A27-B5DD-24B9293428AE}" type="datetimeFigureOut">
               <a:rPr lang="en-US" smtClean="0"/>
-              <a:t>9/19/2020</a:t>
+              <a:t>10/24/2020</a:t>
             </a:fld>
             <a:endParaRPr lang="en-US"/>
           </a:p>
@@ -2085,7 +2085,7 @@
           <a:p>
             <a:fld id="{F6465CF2-20FA-4A27-B5DD-24B9293428AE}" type="datetimeFigureOut">
               <a:rPr lang="en-US" smtClean="0"/>
-              <a:t>9/19/2020</a:t>
+              <a:t>10/24/2020</a:t>
             </a:fld>
             <a:endParaRPr lang="en-US"/>
           </a:p>
@@ -2396,7 +2396,7 @@
           <a:p>
             <a:fld id="{F6465CF2-20FA-4A27-B5DD-24B9293428AE}" type="datetimeFigureOut">
               <a:rPr lang="en-US" smtClean="0"/>
-              <a:t>9/19/2020</a:t>
+              <a:t>10/24/2020</a:t>
             </a:fld>
             <a:endParaRPr lang="en-US"/>
           </a:p>
@@ -2684,7 +2684,7 @@
           <a:p>
             <a:fld id="{F6465CF2-20FA-4A27-B5DD-24B9293428AE}" type="datetimeFigureOut">
               <a:rPr lang="en-US" smtClean="0"/>
-              <a:t>9/19/2020</a:t>
+              <a:t>10/24/2020</a:t>
             </a:fld>
             <a:endParaRPr lang="en-US"/>
           </a:p>
@@ -2925,7 +2925,7 @@
           <a:p>
             <a:fld id="{F6465CF2-20FA-4A27-B5DD-24B9293428AE}" type="datetimeFigureOut">
               <a:rPr lang="en-US" smtClean="0"/>
-              <a:t>9/19/2020</a:t>
+              <a:t>10/24/2020</a:t>
             </a:fld>
             <a:endParaRPr lang="en-US"/>
           </a:p>
@@ -11635,16 +11635,25 @@
             </a:r>
             <a:r>
               <a:rPr lang="en-US" sz="1400" dirty="0"/>
-              <a:t>-quarter observations after merging: </a:t>
-            </a:r>
-            <a:r>
-              <a:rPr lang="en-US" sz="1400" dirty="0">
+              <a:t>-quarter observations after merging</a:t>
+            </a:r>
+            <a:r>
+              <a:rPr lang="en-US" sz="1400"/>
+              <a:t>: </a:t>
+            </a:r>
+            <a:r>
+              <a:rPr lang="en-US" sz="1400">
                 <a:highlight>
                   <a:srgbClr val="FFFF00"/>
                 </a:highlight>
               </a:rPr>
-              <a:t>110,116 </a:t>
-            </a:r>
+              <a:t>110,062 </a:t>
+            </a:r>
+            <a:endParaRPr lang="en-US" sz="1400" dirty="0">
+              <a:highlight>
+                <a:srgbClr val="FFFF00"/>
+              </a:highlight>
+            </a:endParaRPr>
           </a:p>
         </p:txBody>
       </p:sp>
@@ -13189,25 +13198,16 @@
             </a:r>
             <a:r>
               <a:rPr lang="en-US" sz="1400" dirty="0"/>
-              <a:t>-quarter obs. after merging</a:t>
-            </a:r>
-            <a:r>
-              <a:rPr lang="en-US" sz="1400"/>
-              <a:t>: </a:t>
-            </a:r>
-            <a:r>
-              <a:rPr lang="en-US" sz="1400">
+              <a:t>-quarter obs. after merging: </a:t>
+            </a:r>
+            <a:r>
+              <a:rPr lang="en-US" sz="1400" dirty="0">
                 <a:highlight>
                   <a:srgbClr val="FFFF00"/>
                 </a:highlight>
               </a:rPr>
-              <a:t>110,116</a:t>
-            </a:r>
-            <a:endParaRPr lang="en-US" sz="1400" dirty="0">
-              <a:highlight>
-                <a:srgbClr val="FFFF00"/>
-              </a:highlight>
-            </a:endParaRPr>
+              <a:t>110,062</a:t>
+            </a:r>
           </a:p>
           <a:p>
             <a:pPr marL="342900" indent="-342900" algn="l">
@@ -14339,8 +14339,8 @@
         </p:nvSpPr>
         <p:spPr>
           <a:xfrm>
-            <a:off x="3088355" y="5162508"/>
-            <a:ext cx="2902655" cy="1200329"/>
+            <a:off x="3289176" y="5166083"/>
+            <a:ext cx="2806824" cy="1200329"/>
           </a:xfrm>
           <a:prstGeom prst="rect">
             <a:avLst/>
@@ -14594,8 +14594,8 @@
         </p:nvSpPr>
         <p:spPr>
           <a:xfrm>
-            <a:off x="6109098" y="3714517"/>
-            <a:ext cx="6082902" cy="3167747"/>
+            <a:off x="3289176" y="3714517"/>
+            <a:ext cx="8902824" cy="3167747"/>
           </a:xfrm>
           <a:prstGeom prst="rect">
             <a:avLst/>
@@ -17563,10 +17563,10 @@
         </p:nvGrpSpPr>
         <p:grpSpPr>
           <a:xfrm>
-            <a:off x="810716" y="744829"/>
-            <a:ext cx="1992588" cy="1232503"/>
-            <a:chOff x="1555876" y="744829"/>
-            <a:chExt cx="1992588" cy="1232503"/>
+            <a:off x="860985" y="799664"/>
+            <a:ext cx="1937822" cy="1177668"/>
+            <a:chOff x="1606145" y="799664"/>
+            <a:chExt cx="1937822" cy="1177668"/>
           </a:xfrm>
         </p:grpSpPr>
         <p:sp>
@@ -17599,11 +17599,6 @@
             <a:p>
               <a:r>
                 <a:rPr lang="en-US" dirty="0">
-                  <a:solidFill>
-                    <a:schemeClr val="accent6">
-                      <a:lumMod val="75000"/>
-                    </a:schemeClr>
-                  </a:solidFill>
                   <a:latin typeface="LM Mono 10" panose="00000509000000000000" pitchFamily="49" charset="0"/>
                   <a:cs typeface="Times New Roman" panose="02020603050405020304" pitchFamily="18" charset="0"/>
                 </a:rPr>
@@ -17626,10 +17621,10 @@
           </p:nvGrpSpPr>
           <p:grpSpPr>
             <a:xfrm>
-              <a:off x="1555876" y="744829"/>
-              <a:ext cx="1992588" cy="1005547"/>
-              <a:chOff x="2381846" y="813150"/>
-              <a:chExt cx="1992588" cy="1005547"/>
+              <a:off x="1606145" y="799664"/>
+              <a:ext cx="1937822" cy="950712"/>
+              <a:chOff x="2432115" y="867985"/>
+              <a:chExt cx="1937822" cy="950712"/>
             </a:xfrm>
           </p:grpSpPr>
           <p:sp>
@@ -17662,9 +17657,6 @@
               <a:p>
                 <a:r>
                   <a:rPr lang="en-US" dirty="0">
-                    <a:solidFill>
-                      <a:srgbClr val="7030A0"/>
-                    </a:solidFill>
                     <a:latin typeface="LM Mono 10" panose="00000509000000000000" pitchFamily="49" charset="0"/>
                     <a:cs typeface="Times New Roman" panose="02020603050405020304" pitchFamily="18" charset="0"/>
                   </a:rPr>
@@ -17703,66 +17695,11 @@
               <a:p>
                 <a:r>
                   <a:rPr lang="en-US" dirty="0">
-                    <a:solidFill>
-                      <a:schemeClr val="accent1"/>
-                    </a:solidFill>
                     <a:latin typeface="LM Mono 10" panose="00000509000000000000" pitchFamily="49" charset="0"/>
                     <a:cs typeface="Times New Roman" panose="02020603050405020304" pitchFamily="18" charset="0"/>
                   </a:rPr>
                   <a:t>8-K-1</a:t>
                 </a:r>
-              </a:p>
-            </p:txBody>
-          </p:sp>
-          <p:sp>
-            <p:nvSpPr>
-              <p:cNvPr id="17" name="Oval 16">
-                <a:extLst>
-                  <a:ext uri="{FF2B5EF4-FFF2-40B4-BE49-F238E27FC236}">
-                    <a16:creationId xmlns:a16="http://schemas.microsoft.com/office/drawing/2014/main" id="{25413754-51A6-46AA-8FF6-21072F309844}"/>
-                  </a:ext>
-                </a:extLst>
-              </p:cNvPr>
-              <p:cNvSpPr/>
-              <p:nvPr/>
-            </p:nvSpPr>
-            <p:spPr>
-              <a:xfrm>
-                <a:off x="2381846" y="1137010"/>
-                <a:ext cx="1992588" cy="463599"/>
-              </a:xfrm>
-              <a:prstGeom prst="ellipse">
-                <a:avLst/>
-              </a:prstGeom>
-              <a:noFill/>
-              <a:ln>
-                <a:solidFill>
-                  <a:srgbClr val="FF0000"/>
-                </a:solidFill>
-              </a:ln>
-            </p:spPr>
-            <p:style>
-              <a:lnRef idx="2">
-                <a:schemeClr val="accent1">
-                  <a:shade val="50000"/>
-                </a:schemeClr>
-              </a:lnRef>
-              <a:fillRef idx="1">
-                <a:schemeClr val="accent1"/>
-              </a:fillRef>
-              <a:effectRef idx="0">
-                <a:schemeClr val="accent1"/>
-              </a:effectRef>
-              <a:fontRef idx="minor">
-                <a:schemeClr val="lt1"/>
-              </a:fontRef>
-            </p:style>
-            <p:txBody>
-              <a:bodyPr rtlCol="0" anchor="ctr"/>
-              <a:lstStyle/>
-              <a:p>
-                <a:pPr algn="ctr"/>
-                <a:endParaRPr lang="en-US"/>
               </a:p>
             </p:txBody>
           </p:sp>
@@ -17780,7 +17717,7 @@
             </p:nvSpPr>
             <p:spPr>
               <a:xfrm>
-                <a:off x="2899681" y="813150"/>
+                <a:off x="2889022" y="867985"/>
                 <a:ext cx="1041336" cy="369332"/>
               </a:xfrm>
               <a:prstGeom prst="rect">
@@ -17796,9 +17733,6 @@
               <a:p>
                 <a:r>
                   <a:rPr lang="en-US" dirty="0">
-                    <a:solidFill>
-                      <a:srgbClr val="FF0000"/>
-                    </a:solidFill>
                     <a:latin typeface="LM Mono 10" panose="00000509000000000000" pitchFamily="49" charset="0"/>
                     <a:cs typeface="Times New Roman" panose="02020603050405020304" pitchFamily="18" charset="0"/>
                   </a:rPr>
@@ -17997,10 +17931,10 @@
         </p:nvGrpSpPr>
         <p:grpSpPr>
           <a:xfrm>
-            <a:off x="7052121" y="819909"/>
-            <a:ext cx="2062315" cy="1157423"/>
-            <a:chOff x="4000703" y="801646"/>
-            <a:chExt cx="2062315" cy="1157423"/>
+            <a:off x="7079688" y="870583"/>
+            <a:ext cx="1973041" cy="1106749"/>
+            <a:chOff x="4028270" y="852320"/>
+            <a:chExt cx="1973041" cy="1106749"/>
           </a:xfrm>
         </p:grpSpPr>
         <p:cxnSp>
@@ -18060,7 +17994,7 @@
           </p:nvSpPr>
           <p:spPr>
             <a:xfrm>
-              <a:off x="5148618" y="1143122"/>
+              <a:off x="5086911" y="1152107"/>
               <a:ext cx="914400" cy="369332"/>
             </a:xfrm>
             <a:prstGeom prst="rect">
@@ -18076,9 +18010,6 @@
             <a:p>
               <a:r>
                 <a:rPr lang="en-US" dirty="0">
-                  <a:solidFill>
-                    <a:srgbClr val="7030A0"/>
-                  </a:solidFill>
                   <a:latin typeface="LM Mono 10" panose="00000509000000000000" pitchFamily="49" charset="0"/>
                   <a:cs typeface="Times New Roman" panose="02020603050405020304" pitchFamily="18" charset="0"/>
                 </a:rPr>
@@ -18101,7 +18032,7 @@
           </p:nvSpPr>
           <p:spPr>
             <a:xfrm>
-              <a:off x="4000703" y="1152076"/>
+              <a:off x="4028270" y="1150733"/>
               <a:ext cx="765281" cy="369332"/>
             </a:xfrm>
             <a:prstGeom prst="rect">
@@ -18117,9 +18048,6 @@
             <a:p>
               <a:r>
                 <a:rPr lang="en-US" dirty="0">
-                  <a:solidFill>
-                    <a:schemeClr val="accent1"/>
-                  </a:solidFill>
                   <a:latin typeface="LM Mono 10" panose="00000509000000000000" pitchFamily="49" charset="0"/>
                   <a:cs typeface="Times New Roman" panose="02020603050405020304" pitchFamily="18" charset="0"/>
                 </a:rPr>
@@ -18185,7 +18113,7 @@
           </p:nvSpPr>
           <p:spPr>
             <a:xfrm>
-              <a:off x="4461962" y="801646"/>
+              <a:off x="4524976" y="852320"/>
               <a:ext cx="1041336" cy="369332"/>
             </a:xfrm>
             <a:prstGeom prst="rect">
@@ -18201,66 +18129,11 @@
             <a:p>
               <a:r>
                 <a:rPr lang="en-US" dirty="0">
-                  <a:solidFill>
-                    <a:srgbClr val="FF0000"/>
-                  </a:solidFill>
                   <a:latin typeface="LM Mono 10" panose="00000509000000000000" pitchFamily="49" charset="0"/>
                   <a:cs typeface="Times New Roman" panose="02020603050405020304" pitchFamily="18" charset="0"/>
                 </a:rPr>
                 <a:t>Match-3</a:t>
               </a:r>
-            </a:p>
-          </p:txBody>
-        </p:sp>
-        <p:sp>
-          <p:nvSpPr>
-            <p:cNvPr id="48" name="Oval 47">
-              <a:extLst>
-                <a:ext uri="{FF2B5EF4-FFF2-40B4-BE49-F238E27FC236}">
-                  <a16:creationId xmlns:a16="http://schemas.microsoft.com/office/drawing/2014/main" id="{DC35E334-7D3E-4E78-857C-002287910FD6}"/>
-                </a:ext>
-              </a:extLst>
-            </p:cNvPr>
-            <p:cNvSpPr/>
-            <p:nvPr/>
-          </p:nvSpPr>
-          <p:spPr>
-            <a:xfrm>
-              <a:off x="4000703" y="1098744"/>
-              <a:ext cx="1992588" cy="463599"/>
-            </a:xfrm>
-            <a:prstGeom prst="ellipse">
-              <a:avLst/>
-            </a:prstGeom>
-            <a:noFill/>
-            <a:ln>
-              <a:solidFill>
-                <a:srgbClr val="FF0000"/>
-              </a:solidFill>
-            </a:ln>
-          </p:spPr>
-          <p:style>
-            <a:lnRef idx="2">
-              <a:schemeClr val="accent1">
-                <a:shade val="50000"/>
-              </a:schemeClr>
-            </a:lnRef>
-            <a:fillRef idx="1">
-              <a:schemeClr val="accent1"/>
-            </a:fillRef>
-            <a:effectRef idx="0">
-              <a:schemeClr val="accent1"/>
-            </a:effectRef>
-            <a:fontRef idx="minor">
-              <a:schemeClr val="lt1"/>
-            </a:fontRef>
-          </p:style>
-          <p:txBody>
-            <a:bodyPr rtlCol="0" anchor="ctr"/>
-            <a:lstStyle/>
-            <a:p>
-              <a:pPr algn="ctr"/>
-              <a:endParaRPr lang="en-US"/>
             </a:p>
           </p:txBody>
         </p:sp>
@@ -18294,11 +18167,6 @@
             <a:p>
               <a:r>
                 <a:rPr lang="en-US" dirty="0">
-                  <a:solidFill>
-                    <a:schemeClr val="accent6">
-                      <a:lumMod val="75000"/>
-                    </a:schemeClr>
-                  </a:solidFill>
                   <a:latin typeface="LM Mono 10" panose="00000509000000000000" pitchFamily="49" charset="0"/>
                   <a:cs typeface="Times New Roman" panose="02020603050405020304" pitchFamily="18" charset="0"/>
                 </a:rPr>
@@ -18410,10 +18278,10 @@
         </p:nvGrpSpPr>
         <p:grpSpPr>
           <a:xfrm>
-            <a:off x="3919036" y="861669"/>
-            <a:ext cx="1946497" cy="1115663"/>
-            <a:chOff x="3691131" y="861669"/>
-            <a:chExt cx="1946497" cy="1115663"/>
+            <a:off x="3965079" y="833005"/>
+            <a:ext cx="1900454" cy="1144327"/>
+            <a:chOff x="3737174" y="833005"/>
+            <a:chExt cx="1900454" cy="1144327"/>
           </a:xfrm>
         </p:grpSpPr>
         <p:grpSp>
@@ -18430,10 +18298,10 @@
           </p:nvGrpSpPr>
           <p:grpSpPr>
             <a:xfrm>
-              <a:off x="3691131" y="861669"/>
-              <a:ext cx="1946497" cy="788022"/>
-              <a:chOff x="6262991" y="868888"/>
-              <a:chExt cx="1946497" cy="788022"/>
+              <a:off x="3737174" y="833005"/>
+              <a:ext cx="1900454" cy="816686"/>
+              <a:chOff x="6309034" y="840224"/>
+              <a:chExt cx="1900454" cy="816686"/>
             </a:xfrm>
           </p:grpSpPr>
           <p:cxnSp>
@@ -18509,83 +18377,11 @@
               <a:p>
                 <a:r>
                   <a:rPr lang="en-US" dirty="0">
-                    <a:solidFill>
-                      <a:srgbClr val="7030A0"/>
-                    </a:solidFill>
                     <a:latin typeface="LM Mono 10" panose="00000509000000000000" pitchFamily="49" charset="0"/>
                     <a:cs typeface="Times New Roman" panose="02020603050405020304" pitchFamily="18" charset="0"/>
                   </a:rPr>
-                  <a:t>News-2</a:t>
+                  <a:t>News-2 &amp; 8-K-2</a:t>
                 </a:r>
-                <a:r>
-                  <a:rPr lang="en-US" dirty="0">
-                    <a:latin typeface="LM Mono 10" panose="00000509000000000000" pitchFamily="49" charset="0"/>
-                    <a:cs typeface="Times New Roman" panose="02020603050405020304" pitchFamily="18" charset="0"/>
-                  </a:rPr>
-                  <a:t> &amp; </a:t>
-                </a:r>
-                <a:r>
-                  <a:rPr lang="en-US" dirty="0">
-                    <a:solidFill>
-                      <a:schemeClr val="accent1"/>
-                    </a:solidFill>
-                    <a:latin typeface="LM Mono 10" panose="00000509000000000000" pitchFamily="49" charset="0"/>
-                    <a:cs typeface="Times New Roman" panose="02020603050405020304" pitchFamily="18" charset="0"/>
-                  </a:rPr>
-                  <a:t>8-K-2</a:t>
-                </a:r>
-              </a:p>
-            </p:txBody>
-          </p:sp>
-          <p:sp>
-            <p:nvSpPr>
-              <p:cNvPr id="52" name="Oval 51">
-                <a:extLst>
-                  <a:ext uri="{FF2B5EF4-FFF2-40B4-BE49-F238E27FC236}">
-                    <a16:creationId xmlns:a16="http://schemas.microsoft.com/office/drawing/2014/main" id="{BDAC114B-D443-4764-AA79-72A63EF277E3}"/>
-                  </a:ext>
-                </a:extLst>
-              </p:cNvPr>
-              <p:cNvSpPr/>
-              <p:nvPr/>
-            </p:nvSpPr>
-            <p:spPr>
-              <a:xfrm>
-                <a:off x="6262991" y="1170978"/>
-                <a:ext cx="1900451" cy="361289"/>
-              </a:xfrm>
-              <a:prstGeom prst="ellipse">
-                <a:avLst/>
-              </a:prstGeom>
-              <a:noFill/>
-              <a:ln>
-                <a:solidFill>
-                  <a:srgbClr val="FF0000"/>
-                </a:solidFill>
-              </a:ln>
-            </p:spPr>
-            <p:style>
-              <a:lnRef idx="2">
-                <a:schemeClr val="accent1">
-                  <a:shade val="50000"/>
-                </a:schemeClr>
-              </a:lnRef>
-              <a:fillRef idx="1">
-                <a:schemeClr val="accent1"/>
-              </a:fillRef>
-              <a:effectRef idx="0">
-                <a:schemeClr val="accent1"/>
-              </a:effectRef>
-              <a:fontRef idx="minor">
-                <a:schemeClr val="lt1"/>
-              </a:fontRef>
-            </p:style>
-            <p:txBody>
-              <a:bodyPr rtlCol="0" anchor="ctr"/>
-              <a:lstStyle/>
-              <a:p>
-                <a:pPr algn="ctr"/>
-                <a:endParaRPr lang="en-US"/>
               </a:p>
             </p:txBody>
           </p:sp>
@@ -18603,7 +18399,7 @@
             </p:nvSpPr>
             <p:spPr>
               <a:xfrm>
-                <a:off x="6749674" y="868888"/>
+                <a:off x="6732772" y="840224"/>
                 <a:ext cx="1041336" cy="369332"/>
               </a:xfrm>
               <a:prstGeom prst="rect">
@@ -18619,9 +18415,6 @@
               <a:p>
                 <a:r>
                   <a:rPr lang="en-US" dirty="0">
-                    <a:solidFill>
-                      <a:srgbClr val="FF0000"/>
-                    </a:solidFill>
                     <a:latin typeface="LM Mono 10" panose="00000509000000000000" pitchFamily="49" charset="0"/>
                     <a:cs typeface="Times New Roman" panose="02020603050405020304" pitchFamily="18" charset="0"/>
                   </a:rPr>
@@ -18661,11 +18454,6 @@
             <a:p>
               <a:r>
                 <a:rPr lang="en-US" dirty="0">
-                  <a:solidFill>
-                    <a:schemeClr val="accent6">
-                      <a:lumMod val="75000"/>
-                    </a:schemeClr>
-                  </a:solidFill>
                   <a:latin typeface="LM Mono 10" panose="00000509000000000000" pitchFamily="49" charset="0"/>
                   <a:cs typeface="Times New Roman" panose="02020603050405020304" pitchFamily="18" charset="0"/>
                 </a:rPr>
@@ -18675,6 +18463,166 @@
           </p:txBody>
         </p:sp>
       </p:grpSp>
+      <p:sp>
+        <p:nvSpPr>
+          <p:cNvPr id="7" name="Rectangle 6">
+            <a:extLst>
+              <a:ext uri="{FF2B5EF4-FFF2-40B4-BE49-F238E27FC236}">
+                <a16:creationId xmlns:a16="http://schemas.microsoft.com/office/drawing/2014/main" id="{2A79E9C4-D623-4BDB-B020-AA6FDA706EBD}"/>
+              </a:ext>
+            </a:extLst>
+          </p:cNvPr>
+          <p:cNvSpPr/>
+          <p:nvPr/>
+        </p:nvSpPr>
+        <p:spPr>
+          <a:xfrm>
+            <a:off x="860985" y="1114161"/>
+            <a:ext cx="1917506" cy="369332"/>
+          </a:xfrm>
+          <a:prstGeom prst="rect">
+            <a:avLst/>
+          </a:prstGeom>
+          <a:noFill/>
+          <a:ln>
+            <a:solidFill>
+              <a:schemeClr val="tx1"/>
+            </a:solidFill>
+          </a:ln>
+        </p:spPr>
+        <p:style>
+          <a:lnRef idx="2">
+            <a:schemeClr val="accent1">
+              <a:shade val="50000"/>
+            </a:schemeClr>
+          </a:lnRef>
+          <a:fillRef idx="1">
+            <a:schemeClr val="accent1"/>
+          </a:fillRef>
+          <a:effectRef idx="0">
+            <a:schemeClr val="accent1"/>
+          </a:effectRef>
+          <a:fontRef idx="minor">
+            <a:schemeClr val="lt1"/>
+          </a:fontRef>
+        </p:style>
+        <p:txBody>
+          <a:bodyPr rtlCol="0" anchor="ctr"/>
+          <a:lstStyle/>
+          <a:p>
+            <a:pPr algn="ctr"/>
+            <a:endParaRPr lang="en-US">
+              <a:solidFill>
+                <a:schemeClr val="tx1"/>
+              </a:solidFill>
+            </a:endParaRPr>
+          </a:p>
+        </p:txBody>
+      </p:sp>
+      <p:sp>
+        <p:nvSpPr>
+          <p:cNvPr id="2" name="Rectangle 1">
+            <a:extLst>
+              <a:ext uri="{FF2B5EF4-FFF2-40B4-BE49-F238E27FC236}">
+                <a16:creationId xmlns:a16="http://schemas.microsoft.com/office/drawing/2014/main" id="{4BACB2BD-180D-4248-A7C1-6F4BB06773F7}"/>
+              </a:ext>
+            </a:extLst>
+          </p:cNvPr>
+          <p:cNvSpPr/>
+          <p:nvPr/>
+        </p:nvSpPr>
+        <p:spPr>
+          <a:xfrm>
+            <a:off x="3906379" y="1139843"/>
+            <a:ext cx="1917506" cy="369332"/>
+          </a:xfrm>
+          <a:prstGeom prst="rect">
+            <a:avLst/>
+          </a:prstGeom>
+          <a:noFill/>
+          <a:ln>
+            <a:solidFill>
+              <a:schemeClr val="tx1"/>
+            </a:solidFill>
+          </a:ln>
+        </p:spPr>
+        <p:style>
+          <a:lnRef idx="2">
+            <a:schemeClr val="accent1">
+              <a:shade val="50000"/>
+            </a:schemeClr>
+          </a:lnRef>
+          <a:fillRef idx="1">
+            <a:schemeClr val="accent1"/>
+          </a:fillRef>
+          <a:effectRef idx="0">
+            <a:schemeClr val="accent1"/>
+          </a:effectRef>
+          <a:fontRef idx="minor">
+            <a:schemeClr val="lt1"/>
+          </a:fontRef>
+        </p:style>
+        <p:txBody>
+          <a:bodyPr rtlCol="0" anchor="ctr"/>
+          <a:lstStyle/>
+          <a:p>
+            <a:pPr algn="ctr"/>
+            <a:endParaRPr lang="en-US"/>
+          </a:p>
+        </p:txBody>
+      </p:sp>
+      <p:sp>
+        <p:nvSpPr>
+          <p:cNvPr id="8" name="Rectangle 7">
+            <a:extLst>
+              <a:ext uri="{FF2B5EF4-FFF2-40B4-BE49-F238E27FC236}">
+                <a16:creationId xmlns:a16="http://schemas.microsoft.com/office/drawing/2014/main" id="{1F781D59-80FB-4218-BF87-56BA169C562C}"/>
+              </a:ext>
+            </a:extLst>
+          </p:cNvPr>
+          <p:cNvSpPr/>
+          <p:nvPr/>
+        </p:nvSpPr>
+        <p:spPr>
+          <a:xfrm>
+            <a:off x="7096910" y="1168996"/>
+            <a:ext cx="1917506" cy="369332"/>
+          </a:xfrm>
+          <a:prstGeom prst="rect">
+            <a:avLst/>
+          </a:prstGeom>
+          <a:noFill/>
+          <a:ln>
+            <a:solidFill>
+              <a:schemeClr val="tx1"/>
+            </a:solidFill>
+          </a:ln>
+        </p:spPr>
+        <p:style>
+          <a:lnRef idx="2">
+            <a:schemeClr val="accent1">
+              <a:shade val="50000"/>
+            </a:schemeClr>
+          </a:lnRef>
+          <a:fillRef idx="1">
+            <a:schemeClr val="accent1"/>
+          </a:fillRef>
+          <a:effectRef idx="0">
+            <a:schemeClr val="accent1"/>
+          </a:effectRef>
+          <a:fontRef idx="minor">
+            <a:schemeClr val="lt1"/>
+          </a:fontRef>
+        </p:style>
+        <p:txBody>
+          <a:bodyPr rtlCol="0" anchor="ctr"/>
+          <a:lstStyle/>
+          <a:p>
+            <a:pPr algn="ctr"/>
+            <a:endParaRPr lang="en-US"/>
+          </a:p>
+        </p:txBody>
+      </p:sp>
     </p:spTree>
     <p:extLst>
       <p:ext uri="{BB962C8B-B14F-4D97-AF65-F5344CB8AC3E}">

</xml_diff>

<commit_message>
extend IBES data to 2020; try alternative 8-K thresholds
</commit_message>
<xml_diff>
--- a/output/Figures.pptx
+++ b/output/Figures.pptx
@@ -275,7 +275,7 @@
           <a:p>
             <a:fld id="{F6465CF2-20FA-4A27-B5DD-24B9293428AE}" type="datetimeFigureOut">
               <a:rPr lang="en-US" smtClean="0"/>
-              <a:t>10/24/2020</a:t>
+              <a:t>11/29/2020</a:t>
             </a:fld>
             <a:endParaRPr lang="en-US"/>
           </a:p>
@@ -473,7 +473,7 @@
           <a:p>
             <a:fld id="{F6465CF2-20FA-4A27-B5DD-24B9293428AE}" type="datetimeFigureOut">
               <a:rPr lang="en-US" smtClean="0"/>
-              <a:t>10/24/2020</a:t>
+              <a:t>11/29/2020</a:t>
             </a:fld>
             <a:endParaRPr lang="en-US"/>
           </a:p>
@@ -681,7 +681,7 @@
           <a:p>
             <a:fld id="{F6465CF2-20FA-4A27-B5DD-24B9293428AE}" type="datetimeFigureOut">
               <a:rPr lang="en-US" smtClean="0"/>
-              <a:t>10/24/2020</a:t>
+              <a:t>11/29/2020</a:t>
             </a:fld>
             <a:endParaRPr lang="en-US"/>
           </a:p>
@@ -879,7 +879,7 @@
           <a:p>
             <a:fld id="{F6465CF2-20FA-4A27-B5DD-24B9293428AE}" type="datetimeFigureOut">
               <a:rPr lang="en-US" smtClean="0"/>
-              <a:t>10/24/2020</a:t>
+              <a:t>11/29/2020</a:t>
             </a:fld>
             <a:endParaRPr lang="en-US"/>
           </a:p>
@@ -1154,7 +1154,7 @@
           <a:p>
             <a:fld id="{F6465CF2-20FA-4A27-B5DD-24B9293428AE}" type="datetimeFigureOut">
               <a:rPr lang="en-US" smtClean="0"/>
-              <a:t>10/24/2020</a:t>
+              <a:t>11/29/2020</a:t>
             </a:fld>
             <a:endParaRPr lang="en-US"/>
           </a:p>
@@ -1419,7 +1419,7 @@
           <a:p>
             <a:fld id="{F6465CF2-20FA-4A27-B5DD-24B9293428AE}" type="datetimeFigureOut">
               <a:rPr lang="en-US" smtClean="0"/>
-              <a:t>10/24/2020</a:t>
+              <a:t>11/29/2020</a:t>
             </a:fld>
             <a:endParaRPr lang="en-US"/>
           </a:p>
@@ -1831,7 +1831,7 @@
           <a:p>
             <a:fld id="{F6465CF2-20FA-4A27-B5DD-24B9293428AE}" type="datetimeFigureOut">
               <a:rPr lang="en-US" smtClean="0"/>
-              <a:t>10/24/2020</a:t>
+              <a:t>11/29/2020</a:t>
             </a:fld>
             <a:endParaRPr lang="en-US"/>
           </a:p>
@@ -1972,7 +1972,7 @@
           <a:p>
             <a:fld id="{F6465CF2-20FA-4A27-B5DD-24B9293428AE}" type="datetimeFigureOut">
               <a:rPr lang="en-US" smtClean="0"/>
-              <a:t>10/24/2020</a:t>
+              <a:t>11/29/2020</a:t>
             </a:fld>
             <a:endParaRPr lang="en-US"/>
           </a:p>
@@ -2085,7 +2085,7 @@
           <a:p>
             <a:fld id="{F6465CF2-20FA-4A27-B5DD-24B9293428AE}" type="datetimeFigureOut">
               <a:rPr lang="en-US" smtClean="0"/>
-              <a:t>10/24/2020</a:t>
+              <a:t>11/29/2020</a:t>
             </a:fld>
             <a:endParaRPr lang="en-US"/>
           </a:p>
@@ -2396,7 +2396,7 @@
           <a:p>
             <a:fld id="{F6465CF2-20FA-4A27-B5DD-24B9293428AE}" type="datetimeFigureOut">
               <a:rPr lang="en-US" smtClean="0"/>
-              <a:t>10/24/2020</a:t>
+              <a:t>11/29/2020</a:t>
             </a:fld>
             <a:endParaRPr lang="en-US"/>
           </a:p>
@@ -2684,7 +2684,7 @@
           <a:p>
             <a:fld id="{F6465CF2-20FA-4A27-B5DD-24B9293428AE}" type="datetimeFigureOut">
               <a:rPr lang="en-US" smtClean="0"/>
-              <a:t>10/24/2020</a:t>
+              <a:t>11/29/2020</a:t>
             </a:fld>
             <a:endParaRPr lang="en-US"/>
           </a:p>
@@ -2925,7 +2925,7 @@
           <a:p>
             <a:fld id="{F6465CF2-20FA-4A27-B5DD-24B9293428AE}" type="datetimeFigureOut">
               <a:rPr lang="en-US" smtClean="0"/>
-              <a:t>10/24/2020</a:t>
+              <a:t>11/29/2020</a:t>
             </a:fld>
             <a:endParaRPr lang="en-US"/>
           </a:p>
@@ -8256,7 +8256,7 @@
                   <a:srgbClr val="808000"/>
                 </a:highlight>
               </a:rPr>
-              <a:t>1,146,058</a:t>
+              <a:t>1,189,346</a:t>
             </a:r>
           </a:p>
           <a:p>
@@ -8281,22 +8281,17 @@
               <a:t>cusips</a:t>
             </a:r>
             <a:r>
-              <a:rPr lang="en-US" sz="1700"/>
+              <a:rPr lang="en-US" sz="1700" dirty="0"/>
               <a:t>: </a:t>
             </a:r>
             <a:r>
-              <a:rPr lang="en-US" sz="1700">
+              <a:rPr lang="en-US" sz="1700" dirty="0">
                 <a:highlight>
                   <a:srgbClr val="FFFF00"/>
                 </a:highlight>
               </a:rPr>
-              <a:t>1,145,653</a:t>
-            </a:r>
-            <a:endParaRPr lang="en-US" sz="1700" dirty="0">
-              <a:highlight>
-                <a:srgbClr val="FFFF00"/>
-              </a:highlight>
-            </a:endParaRPr>
+              <a:t>1,188,941</a:t>
+            </a:r>
           </a:p>
         </p:txBody>
       </p:sp>
@@ -10146,21 +10141,8 @@
                   <a:srgbClr val="808000"/>
                 </a:highlight>
               </a:rPr>
-              <a:t>190,</a:t>
-            </a:r>
-            <a:r>
-              <a:rPr lang="en-US" altLang="zh-CN" sz="1400" dirty="0">
-                <a:highlight>
-                  <a:srgbClr val="808000"/>
-                </a:highlight>
-              </a:rPr>
-              <a:t>336</a:t>
-            </a:r>
-            <a:endParaRPr lang="en-US" sz="1400" dirty="0">
-              <a:highlight>
-                <a:srgbClr val="808000"/>
-              </a:highlight>
-            </a:endParaRPr>
+              <a:t>190,148</a:t>
+            </a:r>
           </a:p>
           <a:p>
             <a:pPr marL="742950" lvl="1" indent="-285750" algn="l">
@@ -11125,7 +11107,7 @@
                   <a:srgbClr val="808000"/>
                 </a:highlight>
               </a:rPr>
-              <a:t>9,812,071</a:t>
+              <a:t>9,927,842</a:t>
             </a:r>
           </a:p>
           <a:p>
@@ -11159,7 +11141,7 @@
                   <a:srgbClr val="FFFF00"/>
                 </a:highlight>
               </a:rPr>
-              <a:t>155,539</a:t>
+              <a:t>151,715</a:t>
             </a:r>
             <a:endParaRPr lang="en-US" dirty="0">
               <a:highlight>
@@ -11382,7 +11364,23 @@
                   <a:srgbClr val="C0C0C0"/>
                 </a:highlight>
               </a:rPr>
-              <a:t>IBES: 1981 Dec. – 2019 Jul. </a:t>
+              <a:t>IBES: 1991 A</a:t>
+            </a:r>
+            <a:r>
+              <a:rPr lang="en-US" altLang="zh-CN" sz="1100" dirty="0">
+                <a:highlight>
+                  <a:srgbClr val="C0C0C0"/>
+                </a:highlight>
+              </a:rPr>
+              <a:t>pr</a:t>
+            </a:r>
+            <a:r>
+              <a:rPr lang="en-US" sz="1100" dirty="0">
+                <a:highlight>
+                  <a:srgbClr val="C0C0C0"/>
+                </a:highlight>
+              </a:rPr>
+              <a:t>. – 2019 Oct. </a:t>
             </a:r>
           </a:p>
           <a:p>
@@ -11635,25 +11633,16 @@
             </a:r>
             <a:r>
               <a:rPr lang="en-US" sz="1400" dirty="0"/>
-              <a:t>-quarter observations after merging</a:t>
-            </a:r>
-            <a:r>
-              <a:rPr lang="en-US" sz="1400"/>
-              <a:t>: </a:t>
-            </a:r>
-            <a:r>
-              <a:rPr lang="en-US" sz="1400">
+              <a:t>-quarter observations after merging: </a:t>
+            </a:r>
+            <a:r>
+              <a:rPr lang="en-US" sz="1400" dirty="0">
                 <a:highlight>
                   <a:srgbClr val="FFFF00"/>
                 </a:highlight>
               </a:rPr>
-              <a:t>110,062 </a:t>
-            </a:r>
-            <a:endParaRPr lang="en-US" sz="1400" dirty="0">
-              <a:highlight>
-                <a:srgbClr val="FFFF00"/>
-              </a:highlight>
-            </a:endParaRPr>
+              <a:t>130,777 </a:t>
+            </a:r>
           </a:p>
         </p:txBody>
       </p:sp>
@@ -12258,21 +12247,8 @@
                   <a:srgbClr val="808000"/>
                 </a:highlight>
               </a:rPr>
-              <a:t>190,</a:t>
-            </a:r>
-            <a:r>
-              <a:rPr lang="en-US" altLang="zh-CN" sz="1600" dirty="0">
-                <a:highlight>
-                  <a:srgbClr val="808000"/>
-                </a:highlight>
-              </a:rPr>
-              <a:t>336</a:t>
-            </a:r>
-            <a:endParaRPr lang="en-US" sz="1600" dirty="0">
-              <a:highlight>
-                <a:srgbClr val="808000"/>
-              </a:highlight>
-            </a:endParaRPr>
+              <a:t>190,148</a:t>
+            </a:r>
           </a:p>
           <a:p>
             <a:pPr marL="742950" lvl="1" indent="-285750" algn="l">
@@ -13206,7 +13182,7 @@
                   <a:srgbClr val="FFFF00"/>
                 </a:highlight>
               </a:rPr>
-              <a:t>110,062</a:t>
+              <a:t>130,745</a:t>
             </a:r>
           </a:p>
           <a:p>
@@ -13232,21 +13208,8 @@
                   <a:srgbClr val="FF0000"/>
                 </a:highlight>
               </a:rPr>
-              <a:t>91,6</a:t>
-            </a:r>
-            <a:r>
-              <a:rPr lang="en-US" altLang="zh-CN" sz="1400" dirty="0">
-                <a:highlight>
-                  <a:srgbClr val="FF0000"/>
-                </a:highlight>
-              </a:rPr>
-              <a:t>07</a:t>
-            </a:r>
-            <a:endParaRPr lang="en-US" sz="1400" dirty="0">
-              <a:highlight>
-                <a:srgbClr val="FF0000"/>
-              </a:highlight>
-            </a:endParaRPr>
+              <a:t>110,285</a:t>
+            </a:r>
           </a:p>
         </p:txBody>
       </p:sp>

</xml_diff>

<commit_message>
add 10-K results; update T8; alternative 8-K thresholds; address QM feedback
</commit_message>
<xml_diff>
--- a/output/Figures.pptx
+++ b/output/Figures.pptx
@@ -275,7 +275,7 @@
           <a:p>
             <a:fld id="{F6465CF2-20FA-4A27-B5DD-24B9293428AE}" type="datetimeFigureOut">
               <a:rPr lang="en-US" smtClean="0"/>
-              <a:t>11/29/2020</a:t>
+              <a:t>12/6/2020</a:t>
             </a:fld>
             <a:endParaRPr lang="en-US"/>
           </a:p>
@@ -473,7 +473,7 @@
           <a:p>
             <a:fld id="{F6465CF2-20FA-4A27-B5DD-24B9293428AE}" type="datetimeFigureOut">
               <a:rPr lang="en-US" smtClean="0"/>
-              <a:t>11/29/2020</a:t>
+              <a:t>12/6/2020</a:t>
             </a:fld>
             <a:endParaRPr lang="en-US"/>
           </a:p>
@@ -681,7 +681,7 @@
           <a:p>
             <a:fld id="{F6465CF2-20FA-4A27-B5DD-24B9293428AE}" type="datetimeFigureOut">
               <a:rPr lang="en-US" smtClean="0"/>
-              <a:t>11/29/2020</a:t>
+              <a:t>12/6/2020</a:t>
             </a:fld>
             <a:endParaRPr lang="en-US"/>
           </a:p>
@@ -879,7 +879,7 @@
           <a:p>
             <a:fld id="{F6465CF2-20FA-4A27-B5DD-24B9293428AE}" type="datetimeFigureOut">
               <a:rPr lang="en-US" smtClean="0"/>
-              <a:t>11/29/2020</a:t>
+              <a:t>12/6/2020</a:t>
             </a:fld>
             <a:endParaRPr lang="en-US"/>
           </a:p>
@@ -1154,7 +1154,7 @@
           <a:p>
             <a:fld id="{F6465CF2-20FA-4A27-B5DD-24B9293428AE}" type="datetimeFigureOut">
               <a:rPr lang="en-US" smtClean="0"/>
-              <a:t>11/29/2020</a:t>
+              <a:t>12/6/2020</a:t>
             </a:fld>
             <a:endParaRPr lang="en-US"/>
           </a:p>
@@ -1419,7 +1419,7 @@
           <a:p>
             <a:fld id="{F6465CF2-20FA-4A27-B5DD-24B9293428AE}" type="datetimeFigureOut">
               <a:rPr lang="en-US" smtClean="0"/>
-              <a:t>11/29/2020</a:t>
+              <a:t>12/6/2020</a:t>
             </a:fld>
             <a:endParaRPr lang="en-US"/>
           </a:p>
@@ -1831,7 +1831,7 @@
           <a:p>
             <a:fld id="{F6465CF2-20FA-4A27-B5DD-24B9293428AE}" type="datetimeFigureOut">
               <a:rPr lang="en-US" smtClean="0"/>
-              <a:t>11/29/2020</a:t>
+              <a:t>12/6/2020</a:t>
             </a:fld>
             <a:endParaRPr lang="en-US"/>
           </a:p>
@@ -1972,7 +1972,7 @@
           <a:p>
             <a:fld id="{F6465CF2-20FA-4A27-B5DD-24B9293428AE}" type="datetimeFigureOut">
               <a:rPr lang="en-US" smtClean="0"/>
-              <a:t>11/29/2020</a:t>
+              <a:t>12/6/2020</a:t>
             </a:fld>
             <a:endParaRPr lang="en-US"/>
           </a:p>
@@ -2085,7 +2085,7 @@
           <a:p>
             <a:fld id="{F6465CF2-20FA-4A27-B5DD-24B9293428AE}" type="datetimeFigureOut">
               <a:rPr lang="en-US" smtClean="0"/>
-              <a:t>11/29/2020</a:t>
+              <a:t>12/6/2020</a:t>
             </a:fld>
             <a:endParaRPr lang="en-US"/>
           </a:p>
@@ -2396,7 +2396,7 @@
           <a:p>
             <a:fld id="{F6465CF2-20FA-4A27-B5DD-24B9293428AE}" type="datetimeFigureOut">
               <a:rPr lang="en-US" smtClean="0"/>
-              <a:t>11/29/2020</a:t>
+              <a:t>12/6/2020</a:t>
             </a:fld>
             <a:endParaRPr lang="en-US"/>
           </a:p>
@@ -2684,7 +2684,7 @@
           <a:p>
             <a:fld id="{F6465CF2-20FA-4A27-B5DD-24B9293428AE}" type="datetimeFigureOut">
               <a:rPr lang="en-US" smtClean="0"/>
-              <a:t>11/29/2020</a:t>
+              <a:t>12/6/2020</a:t>
             </a:fld>
             <a:endParaRPr lang="en-US"/>
           </a:p>
@@ -2925,7 +2925,7 @@
           <a:p>
             <a:fld id="{F6465CF2-20FA-4A27-B5DD-24B9293428AE}" type="datetimeFigureOut">
               <a:rPr lang="en-US" smtClean="0"/>
-              <a:t>11/29/2020</a:t>
+              <a:t>12/6/2020</a:t>
             </a:fld>
             <a:endParaRPr lang="en-US"/>
           </a:p>
@@ -8533,7 +8533,7 @@
                   <a:srgbClr val="FFFF00"/>
                 </a:highlight>
               </a:rPr>
-              <a:t>4,511,394</a:t>
+              <a:t>4,430,927</a:t>
             </a:r>
           </a:p>
           <a:p>
@@ -13200,16 +13200,25 @@
             </a:r>
             <a:r>
               <a:rPr lang="en-US" sz="1400" dirty="0"/>
-              <a:t>-quarter obs. after screening missing data: </a:t>
-            </a:r>
-            <a:r>
-              <a:rPr lang="en-US" sz="1400" dirty="0">
+              <a:t>-quarter obs. after screening missing data</a:t>
+            </a:r>
+            <a:r>
+              <a:rPr lang="en-US" sz="1400"/>
+              <a:t>: </a:t>
+            </a:r>
+            <a:r>
+              <a:rPr lang="en-US" sz="1400">
                 <a:highlight>
                   <a:srgbClr val="FF0000"/>
                 </a:highlight>
               </a:rPr>
-              <a:t>110,285</a:t>
-            </a:r>
+              <a:t>115,980</a:t>
+            </a:r>
+            <a:endParaRPr lang="en-US" sz="1400" dirty="0">
+              <a:highlight>
+                <a:srgbClr val="FF0000"/>
+              </a:highlight>
+            </a:endParaRPr>
           </a:p>
         </p:txBody>
       </p:sp>

</xml_diff>

<commit_message>
new section role of NC #14
</commit_message>
<xml_diff>
--- a/output/Figures.pptx
+++ b/output/Figures.pptx
@@ -275,7 +275,7 @@
           <a:p>
             <a:fld id="{F6465CF2-20FA-4A27-B5DD-24B9293428AE}" type="datetimeFigureOut">
               <a:rPr lang="en-US" smtClean="0"/>
-              <a:t>12/6/2020</a:t>
+              <a:t>12/11/2020</a:t>
             </a:fld>
             <a:endParaRPr lang="en-US"/>
           </a:p>
@@ -473,7 +473,7 @@
           <a:p>
             <a:fld id="{F6465CF2-20FA-4A27-B5DD-24B9293428AE}" type="datetimeFigureOut">
               <a:rPr lang="en-US" smtClean="0"/>
-              <a:t>12/6/2020</a:t>
+              <a:t>12/11/2020</a:t>
             </a:fld>
             <a:endParaRPr lang="en-US"/>
           </a:p>
@@ -681,7 +681,7 @@
           <a:p>
             <a:fld id="{F6465CF2-20FA-4A27-B5DD-24B9293428AE}" type="datetimeFigureOut">
               <a:rPr lang="en-US" smtClean="0"/>
-              <a:t>12/6/2020</a:t>
+              <a:t>12/11/2020</a:t>
             </a:fld>
             <a:endParaRPr lang="en-US"/>
           </a:p>
@@ -879,7 +879,7 @@
           <a:p>
             <a:fld id="{F6465CF2-20FA-4A27-B5DD-24B9293428AE}" type="datetimeFigureOut">
               <a:rPr lang="en-US" smtClean="0"/>
-              <a:t>12/6/2020</a:t>
+              <a:t>12/11/2020</a:t>
             </a:fld>
             <a:endParaRPr lang="en-US"/>
           </a:p>
@@ -1154,7 +1154,7 @@
           <a:p>
             <a:fld id="{F6465CF2-20FA-4A27-B5DD-24B9293428AE}" type="datetimeFigureOut">
               <a:rPr lang="en-US" smtClean="0"/>
-              <a:t>12/6/2020</a:t>
+              <a:t>12/11/2020</a:t>
             </a:fld>
             <a:endParaRPr lang="en-US"/>
           </a:p>
@@ -1419,7 +1419,7 @@
           <a:p>
             <a:fld id="{F6465CF2-20FA-4A27-B5DD-24B9293428AE}" type="datetimeFigureOut">
               <a:rPr lang="en-US" smtClean="0"/>
-              <a:t>12/6/2020</a:t>
+              <a:t>12/11/2020</a:t>
             </a:fld>
             <a:endParaRPr lang="en-US"/>
           </a:p>
@@ -1831,7 +1831,7 @@
           <a:p>
             <a:fld id="{F6465CF2-20FA-4A27-B5DD-24B9293428AE}" type="datetimeFigureOut">
               <a:rPr lang="en-US" smtClean="0"/>
-              <a:t>12/6/2020</a:t>
+              <a:t>12/11/2020</a:t>
             </a:fld>
             <a:endParaRPr lang="en-US"/>
           </a:p>
@@ -1972,7 +1972,7 @@
           <a:p>
             <a:fld id="{F6465CF2-20FA-4A27-B5DD-24B9293428AE}" type="datetimeFigureOut">
               <a:rPr lang="en-US" smtClean="0"/>
-              <a:t>12/6/2020</a:t>
+              <a:t>12/11/2020</a:t>
             </a:fld>
             <a:endParaRPr lang="en-US"/>
           </a:p>
@@ -2085,7 +2085,7 @@
           <a:p>
             <a:fld id="{F6465CF2-20FA-4A27-B5DD-24B9293428AE}" type="datetimeFigureOut">
               <a:rPr lang="en-US" smtClean="0"/>
-              <a:t>12/6/2020</a:t>
+              <a:t>12/11/2020</a:t>
             </a:fld>
             <a:endParaRPr lang="en-US"/>
           </a:p>
@@ -2396,7 +2396,7 @@
           <a:p>
             <a:fld id="{F6465CF2-20FA-4A27-B5DD-24B9293428AE}" type="datetimeFigureOut">
               <a:rPr lang="en-US" smtClean="0"/>
-              <a:t>12/6/2020</a:t>
+              <a:t>12/11/2020</a:t>
             </a:fld>
             <a:endParaRPr lang="en-US"/>
           </a:p>
@@ -2684,7 +2684,7 @@
           <a:p>
             <a:fld id="{F6465CF2-20FA-4A27-B5DD-24B9293428AE}" type="datetimeFigureOut">
               <a:rPr lang="en-US" smtClean="0"/>
-              <a:t>12/6/2020</a:t>
+              <a:t>12/11/2020</a:t>
             </a:fld>
             <a:endParaRPr lang="en-US"/>
           </a:p>
@@ -2925,7 +2925,7 @@
           <a:p>
             <a:fld id="{F6465CF2-20FA-4A27-B5DD-24B9293428AE}" type="datetimeFigureOut">
               <a:rPr lang="en-US" smtClean="0"/>
-              <a:t>12/6/2020</a:t>
+              <a:t>12/11/2020</a:t>
             </a:fld>
             <a:endParaRPr lang="en-US"/>
           </a:p>
@@ -9272,53 +9272,8 @@
                   <a:srgbClr val="FFFF00"/>
                 </a:highlight>
               </a:rPr>
-              <a:t>7</a:t>
-            </a:r>
-            <a:r>
-              <a:rPr lang="en-US" altLang="zh-CN" sz="1400" dirty="0">
-                <a:highlight>
-                  <a:srgbClr val="FFFF00"/>
-                </a:highlight>
-              </a:rPr>
-              <a:t>40</a:t>
-            </a:r>
-            <a:r>
-              <a:rPr lang="en-US" sz="1400" dirty="0">
-                <a:highlight>
-                  <a:srgbClr val="FFFF00"/>
-                </a:highlight>
-              </a:rPr>
-              <a:t>,</a:t>
-            </a:r>
-            <a:r>
-              <a:rPr lang="en-US" altLang="zh-CN" sz="1400" dirty="0">
-                <a:highlight>
-                  <a:srgbClr val="FFFF00"/>
-                </a:highlight>
-              </a:rPr>
-              <a:t>6</a:t>
-            </a:r>
-            <a:r>
-              <a:rPr lang="en-US" sz="1400" dirty="0">
-                <a:highlight>
-                  <a:srgbClr val="FFFF00"/>
-                </a:highlight>
-              </a:rPr>
-              <a:t>9</a:t>
-            </a:r>
-            <a:r>
-              <a:rPr lang="en-US" altLang="zh-CN" sz="1400" dirty="0">
-                <a:highlight>
-                  <a:srgbClr val="FFFF00"/>
-                </a:highlight>
-              </a:rPr>
-              <a:t>7</a:t>
-            </a:r>
-            <a:endParaRPr lang="en-US" sz="1400" dirty="0">
-              <a:highlight>
-                <a:srgbClr val="FFFF00"/>
-              </a:highlight>
-            </a:endParaRPr>
+              <a:t>738,043</a:t>
+            </a:r>
           </a:p>
         </p:txBody>
       </p:sp>
@@ -10110,21 +10065,8 @@
                   <a:srgbClr val="FFFF00"/>
                 </a:highlight>
               </a:rPr>
-              <a:t>303,</a:t>
-            </a:r>
-            <a:r>
-              <a:rPr lang="en-US" altLang="zh-CN" sz="1400" dirty="0">
-                <a:highlight>
-                  <a:srgbClr val="FFFF00"/>
-                </a:highlight>
-              </a:rPr>
-              <a:t>034</a:t>
-            </a:r>
-            <a:endParaRPr lang="en-US" sz="1400" dirty="0">
-              <a:highlight>
-                <a:srgbClr val="FFFF00"/>
-              </a:highlight>
-            </a:endParaRPr>
+              <a:t>302,343</a:t>
+            </a:r>
           </a:p>
           <a:p>
             <a:pPr marL="742950" lvl="1" indent="-285750" algn="l">
@@ -10141,7 +10083,7 @@
                   <a:srgbClr val="808000"/>
                 </a:highlight>
               </a:rPr>
-              <a:t>190,148</a:t>
+              <a:t>190,092</a:t>
             </a:r>
           </a:p>
           <a:p>
@@ -11641,7 +11583,7 @@
                   <a:srgbClr val="FFFF00"/>
                 </a:highlight>
               </a:rPr>
-              <a:t>130,777 </a:t>
+              <a:t>130,782 </a:t>
             </a:r>
           </a:p>
         </p:txBody>
@@ -12247,7 +12189,7 @@
                   <a:srgbClr val="808000"/>
                 </a:highlight>
               </a:rPr>
-              <a:t>190,148</a:t>
+              <a:t>190,092</a:t>
             </a:r>
           </a:p>
           <a:p>
@@ -13182,7 +13124,7 @@
                   <a:srgbClr val="FFFF00"/>
                 </a:highlight>
               </a:rPr>
-              <a:t>130,745</a:t>
+              <a:t>130,750</a:t>
             </a:r>
           </a:p>
           <a:p>

</xml_diff>

<commit_message>
replicating all results with 8-K; adding nexhibit and ngraph
</commit_message>
<xml_diff>
--- a/output/Figures.pptx
+++ b/output/Figures.pptx
@@ -275,7 +275,7 @@
           <a:p>
             <a:fld id="{F6465CF2-20FA-4A27-B5DD-24B9293428AE}" type="datetimeFigureOut">
               <a:rPr lang="en-US" smtClean="0"/>
-              <a:t>12/11/2020</a:t>
+              <a:t>2/4/2021</a:t>
             </a:fld>
             <a:endParaRPr lang="en-US"/>
           </a:p>
@@ -473,7 +473,7 @@
           <a:p>
             <a:fld id="{F6465CF2-20FA-4A27-B5DD-24B9293428AE}" type="datetimeFigureOut">
               <a:rPr lang="en-US" smtClean="0"/>
-              <a:t>12/11/2020</a:t>
+              <a:t>2/4/2021</a:t>
             </a:fld>
             <a:endParaRPr lang="en-US"/>
           </a:p>
@@ -681,7 +681,7 @@
           <a:p>
             <a:fld id="{F6465CF2-20FA-4A27-B5DD-24B9293428AE}" type="datetimeFigureOut">
               <a:rPr lang="en-US" smtClean="0"/>
-              <a:t>12/11/2020</a:t>
+              <a:t>2/4/2021</a:t>
             </a:fld>
             <a:endParaRPr lang="en-US"/>
           </a:p>
@@ -879,7 +879,7 @@
           <a:p>
             <a:fld id="{F6465CF2-20FA-4A27-B5DD-24B9293428AE}" type="datetimeFigureOut">
               <a:rPr lang="en-US" smtClean="0"/>
-              <a:t>12/11/2020</a:t>
+              <a:t>2/4/2021</a:t>
             </a:fld>
             <a:endParaRPr lang="en-US"/>
           </a:p>
@@ -1154,7 +1154,7 @@
           <a:p>
             <a:fld id="{F6465CF2-20FA-4A27-B5DD-24B9293428AE}" type="datetimeFigureOut">
               <a:rPr lang="en-US" smtClean="0"/>
-              <a:t>12/11/2020</a:t>
+              <a:t>2/4/2021</a:t>
             </a:fld>
             <a:endParaRPr lang="en-US"/>
           </a:p>
@@ -1419,7 +1419,7 @@
           <a:p>
             <a:fld id="{F6465CF2-20FA-4A27-B5DD-24B9293428AE}" type="datetimeFigureOut">
               <a:rPr lang="en-US" smtClean="0"/>
-              <a:t>12/11/2020</a:t>
+              <a:t>2/4/2021</a:t>
             </a:fld>
             <a:endParaRPr lang="en-US"/>
           </a:p>
@@ -1831,7 +1831,7 @@
           <a:p>
             <a:fld id="{F6465CF2-20FA-4A27-B5DD-24B9293428AE}" type="datetimeFigureOut">
               <a:rPr lang="en-US" smtClean="0"/>
-              <a:t>12/11/2020</a:t>
+              <a:t>2/4/2021</a:t>
             </a:fld>
             <a:endParaRPr lang="en-US"/>
           </a:p>
@@ -1972,7 +1972,7 @@
           <a:p>
             <a:fld id="{F6465CF2-20FA-4A27-B5DD-24B9293428AE}" type="datetimeFigureOut">
               <a:rPr lang="en-US" smtClean="0"/>
-              <a:t>12/11/2020</a:t>
+              <a:t>2/4/2021</a:t>
             </a:fld>
             <a:endParaRPr lang="en-US"/>
           </a:p>
@@ -2085,7 +2085,7 @@
           <a:p>
             <a:fld id="{F6465CF2-20FA-4A27-B5DD-24B9293428AE}" type="datetimeFigureOut">
               <a:rPr lang="en-US" smtClean="0"/>
-              <a:t>12/11/2020</a:t>
+              <a:t>2/4/2021</a:t>
             </a:fld>
             <a:endParaRPr lang="en-US"/>
           </a:p>
@@ -2396,7 +2396,7 @@
           <a:p>
             <a:fld id="{F6465CF2-20FA-4A27-B5DD-24B9293428AE}" type="datetimeFigureOut">
               <a:rPr lang="en-US" smtClean="0"/>
-              <a:t>12/11/2020</a:t>
+              <a:t>2/4/2021</a:t>
             </a:fld>
             <a:endParaRPr lang="en-US"/>
           </a:p>
@@ -2684,7 +2684,7 @@
           <a:p>
             <a:fld id="{F6465CF2-20FA-4A27-B5DD-24B9293428AE}" type="datetimeFigureOut">
               <a:rPr lang="en-US" smtClean="0"/>
-              <a:t>12/11/2020</a:t>
+              <a:t>2/4/2021</a:t>
             </a:fld>
             <a:endParaRPr lang="en-US"/>
           </a:p>
@@ -2925,7 +2925,7 @@
           <a:p>
             <a:fld id="{F6465CF2-20FA-4A27-B5DD-24B9293428AE}" type="datetimeFigureOut">
               <a:rPr lang="en-US" smtClean="0"/>
-              <a:t>12/11/2020</a:t>
+              <a:t>2/4/2021</a:t>
             </a:fld>
             <a:endParaRPr lang="en-US"/>
           </a:p>
@@ -17477,10 +17477,10 @@
         </p:nvGrpSpPr>
         <p:grpSpPr>
           <a:xfrm>
-            <a:off x="860985" y="799664"/>
-            <a:ext cx="1937822" cy="1177668"/>
-            <a:chOff x="1606145" y="799664"/>
-            <a:chExt cx="1937822" cy="1177668"/>
+            <a:off x="882542" y="799664"/>
+            <a:ext cx="1916265" cy="1177668"/>
+            <a:chOff x="1627702" y="799664"/>
+            <a:chExt cx="1916265" cy="1177668"/>
           </a:xfrm>
         </p:grpSpPr>
         <p:sp>
@@ -17535,10 +17535,10 @@
           </p:nvGrpSpPr>
           <p:grpSpPr>
             <a:xfrm>
-              <a:off x="1606145" y="799664"/>
-              <a:ext cx="1937822" cy="950712"/>
-              <a:chOff x="2432115" y="867985"/>
-              <a:chExt cx="1937822" cy="950712"/>
+              <a:off x="1627702" y="799664"/>
+              <a:ext cx="1916265" cy="950712"/>
+              <a:chOff x="2453672" y="867985"/>
+              <a:chExt cx="1916265" cy="950712"/>
             </a:xfrm>
           </p:grpSpPr>
           <p:sp>
@@ -17555,7 +17555,7 @@
             </p:nvSpPr>
             <p:spPr>
               <a:xfrm>
-                <a:off x="2432115" y="1186091"/>
+                <a:off x="2453672" y="1194461"/>
                 <a:ext cx="914400" cy="369332"/>
               </a:xfrm>
               <a:prstGeom prst="rect">
@@ -18537,6 +18537,660 @@
           </a:p>
         </p:txBody>
       </p:sp>
+      <p:cxnSp>
+        <p:nvCxnSpPr>
+          <p:cNvPr id="34" name="Straight Arrow Connector 33">
+            <a:extLst>
+              <a:ext uri="{FF2B5EF4-FFF2-40B4-BE49-F238E27FC236}">
+                <a16:creationId xmlns:a16="http://schemas.microsoft.com/office/drawing/2014/main" id="{9D0DC95B-63C6-42EE-8631-44E9E7DAC90D}"/>
+              </a:ext>
+            </a:extLst>
+          </p:cNvPr>
+          <p:cNvCxnSpPr>
+            <a:cxnSpLocks/>
+          </p:cNvCxnSpPr>
+          <p:nvPr/>
+        </p:nvCxnSpPr>
+        <p:spPr>
+          <a:xfrm flipV="1">
+            <a:off x="568793" y="4387877"/>
+            <a:ext cx="8753382" cy="4834"/>
+          </a:xfrm>
+          <a:prstGeom prst="straightConnector1">
+            <a:avLst/>
+          </a:prstGeom>
+          <a:ln w="25400">
+            <a:solidFill>
+              <a:schemeClr val="tx1"/>
+            </a:solidFill>
+            <a:tailEnd type="triangle"/>
+          </a:ln>
+        </p:spPr>
+        <p:style>
+          <a:lnRef idx="1">
+            <a:schemeClr val="accent1"/>
+          </a:lnRef>
+          <a:fillRef idx="0">
+            <a:schemeClr val="accent1"/>
+          </a:fillRef>
+          <a:effectRef idx="0">
+            <a:schemeClr val="accent1"/>
+          </a:effectRef>
+          <a:fontRef idx="minor">
+            <a:schemeClr val="tx1"/>
+          </a:fontRef>
+        </p:style>
+      </p:cxnSp>
+      <p:sp>
+        <p:nvSpPr>
+          <p:cNvPr id="36" name="TextBox 35">
+            <a:extLst>
+              <a:ext uri="{FF2B5EF4-FFF2-40B4-BE49-F238E27FC236}">
+                <a16:creationId xmlns:a16="http://schemas.microsoft.com/office/drawing/2014/main" id="{CEC75F2D-91B4-46A4-83F6-DE54B0FCCF82}"/>
+              </a:ext>
+            </a:extLst>
+          </p:cNvPr>
+          <p:cNvSpPr txBox="1"/>
+          <p:nvPr/>
+        </p:nvSpPr>
+        <p:spPr>
+          <a:xfrm>
+            <a:off x="9130206" y="4387877"/>
+            <a:ext cx="383938" cy="369332"/>
+          </a:xfrm>
+          <a:prstGeom prst="rect">
+            <a:avLst/>
+          </a:prstGeom>
+          <a:noFill/>
+        </p:spPr>
+        <p:txBody>
+          <a:bodyPr wrap="square" rtlCol="0">
+            <a:spAutoFit/>
+          </a:bodyPr>
+          <a:lstStyle/>
+          <a:p>
+            <a:r>
+              <a:rPr lang="en-US" dirty="0">
+                <a:latin typeface="LM Mono 10" panose="00000509000000000000" pitchFamily="49" charset="0"/>
+              </a:rPr>
+              <a:t>t</a:t>
+            </a:r>
+          </a:p>
+        </p:txBody>
+      </p:sp>
+      <p:cxnSp>
+        <p:nvCxnSpPr>
+          <p:cNvPr id="38" name="Straight Connector 37">
+            <a:extLst>
+              <a:ext uri="{FF2B5EF4-FFF2-40B4-BE49-F238E27FC236}">
+                <a16:creationId xmlns:a16="http://schemas.microsoft.com/office/drawing/2014/main" id="{536B1A7C-0631-42E5-9C8F-C27C68A72674}"/>
+              </a:ext>
+            </a:extLst>
+          </p:cNvPr>
+          <p:cNvCxnSpPr>
+            <a:cxnSpLocks/>
+          </p:cNvCxnSpPr>
+          <p:nvPr/>
+        </p:nvCxnSpPr>
+        <p:spPr>
+          <a:xfrm>
+            <a:off x="3008467" y="4249100"/>
+            <a:ext cx="0" cy="313998"/>
+          </a:xfrm>
+          <a:prstGeom prst="line">
+            <a:avLst/>
+          </a:prstGeom>
+          <a:ln w="25400">
+            <a:solidFill>
+              <a:schemeClr val="tx1"/>
+            </a:solidFill>
+          </a:ln>
+        </p:spPr>
+        <p:style>
+          <a:lnRef idx="1">
+            <a:schemeClr val="accent1"/>
+          </a:lnRef>
+          <a:fillRef idx="0">
+            <a:schemeClr val="accent1"/>
+          </a:fillRef>
+          <a:effectRef idx="0">
+            <a:schemeClr val="accent1"/>
+          </a:effectRef>
+          <a:fontRef idx="minor">
+            <a:schemeClr val="tx1"/>
+          </a:fontRef>
+        </p:style>
+      </p:cxnSp>
+      <p:sp>
+        <p:nvSpPr>
+          <p:cNvPr id="40" name="TextBox 39">
+            <a:extLst>
+              <a:ext uri="{FF2B5EF4-FFF2-40B4-BE49-F238E27FC236}">
+                <a16:creationId xmlns:a16="http://schemas.microsoft.com/office/drawing/2014/main" id="{E1981132-C894-4729-AD1C-C79E70EFDFCF}"/>
+              </a:ext>
+            </a:extLst>
+          </p:cNvPr>
+          <p:cNvSpPr txBox="1"/>
+          <p:nvPr/>
+        </p:nvSpPr>
+        <p:spPr>
+          <a:xfrm>
+            <a:off x="2372097" y="3568130"/>
+            <a:ext cx="1502983" cy="646331"/>
+          </a:xfrm>
+          <a:prstGeom prst="rect">
+            <a:avLst/>
+          </a:prstGeom>
+          <a:noFill/>
+        </p:spPr>
+        <p:txBody>
+          <a:bodyPr wrap="square" rtlCol="0">
+            <a:spAutoFit/>
+          </a:bodyPr>
+          <a:lstStyle/>
+          <a:p>
+            <a:r>
+              <a:rPr lang="en-US" dirty="0">
+                <a:latin typeface="LM Mono 10" panose="00000509000000000000" pitchFamily="49" charset="0"/>
+                <a:cs typeface="Times New Roman" panose="02020603050405020304" pitchFamily="18" charset="0"/>
+              </a:rPr>
+              <a:t>Reporting period </a:t>
+            </a:r>
+            <a:r>
+              <a:rPr lang="en-US" altLang="zh-CN" dirty="0">
+                <a:latin typeface="LM Mono 10" panose="00000509000000000000" pitchFamily="49" charset="0"/>
+                <a:cs typeface="Times New Roman" panose="02020603050405020304" pitchFamily="18" charset="0"/>
+              </a:rPr>
+              <a:t>date</a:t>
+            </a:r>
+            <a:endParaRPr lang="en-US" dirty="0">
+              <a:latin typeface="LM Mono 10" panose="00000509000000000000" pitchFamily="49" charset="0"/>
+              <a:cs typeface="Times New Roman" panose="02020603050405020304" pitchFamily="18" charset="0"/>
+            </a:endParaRPr>
+          </a:p>
+        </p:txBody>
+      </p:sp>
+      <p:cxnSp>
+        <p:nvCxnSpPr>
+          <p:cNvPr id="41" name="Straight Connector 40">
+            <a:extLst>
+              <a:ext uri="{FF2B5EF4-FFF2-40B4-BE49-F238E27FC236}">
+                <a16:creationId xmlns:a16="http://schemas.microsoft.com/office/drawing/2014/main" id="{071580D7-CB55-4701-ABD8-7F674F2CF3A3}"/>
+              </a:ext>
+            </a:extLst>
+          </p:cNvPr>
+          <p:cNvCxnSpPr>
+            <a:cxnSpLocks/>
+          </p:cNvCxnSpPr>
+          <p:nvPr/>
+        </p:nvCxnSpPr>
+        <p:spPr>
+          <a:xfrm>
+            <a:off x="5958600" y="4249100"/>
+            <a:ext cx="0" cy="313998"/>
+          </a:xfrm>
+          <a:prstGeom prst="line">
+            <a:avLst/>
+          </a:prstGeom>
+          <a:ln w="25400">
+            <a:solidFill>
+              <a:schemeClr val="tx1"/>
+            </a:solidFill>
+          </a:ln>
+        </p:spPr>
+        <p:style>
+          <a:lnRef idx="1">
+            <a:schemeClr val="accent1"/>
+          </a:lnRef>
+          <a:fillRef idx="0">
+            <a:schemeClr val="accent1"/>
+          </a:fillRef>
+          <a:effectRef idx="0">
+            <a:schemeClr val="accent1"/>
+          </a:effectRef>
+          <a:fontRef idx="minor">
+            <a:schemeClr val="tx1"/>
+          </a:fontRef>
+        </p:style>
+      </p:cxnSp>
+      <p:sp>
+        <p:nvSpPr>
+          <p:cNvPr id="42" name="TextBox 41">
+            <a:extLst>
+              <a:ext uri="{FF2B5EF4-FFF2-40B4-BE49-F238E27FC236}">
+                <a16:creationId xmlns:a16="http://schemas.microsoft.com/office/drawing/2014/main" id="{49D516A1-71D5-40E4-A3B6-9471536C28DF}"/>
+              </a:ext>
+            </a:extLst>
+          </p:cNvPr>
+          <p:cNvSpPr txBox="1"/>
+          <p:nvPr/>
+        </p:nvSpPr>
+        <p:spPr>
+          <a:xfrm>
+            <a:off x="5522624" y="3550616"/>
+            <a:ext cx="871952" cy="646331"/>
+          </a:xfrm>
+          <a:prstGeom prst="rect">
+            <a:avLst/>
+          </a:prstGeom>
+          <a:noFill/>
+          <a:ln>
+            <a:solidFill>
+              <a:schemeClr val="tx1"/>
+            </a:solidFill>
+          </a:ln>
+        </p:spPr>
+        <p:txBody>
+          <a:bodyPr wrap="square" rtlCol="0">
+            <a:spAutoFit/>
+          </a:bodyPr>
+          <a:lstStyle/>
+          <a:p>
+            <a:r>
+              <a:rPr lang="en-US" dirty="0">
+                <a:latin typeface="LM Mono 10" panose="00000509000000000000" pitchFamily="49" charset="0"/>
+                <a:cs typeface="Times New Roman" panose="02020603050405020304" pitchFamily="18" charset="0"/>
+              </a:rPr>
+              <a:t>Filing date</a:t>
+            </a:r>
+          </a:p>
+        </p:txBody>
+      </p:sp>
+      <p:sp>
+        <p:nvSpPr>
+          <p:cNvPr id="43" name="TextBox 42">
+            <a:extLst>
+              <a:ext uri="{FF2B5EF4-FFF2-40B4-BE49-F238E27FC236}">
+                <a16:creationId xmlns:a16="http://schemas.microsoft.com/office/drawing/2014/main" id="{6D5DA343-ECA2-44DD-9FFC-7EF25EA30660}"/>
+              </a:ext>
+            </a:extLst>
+          </p:cNvPr>
+          <p:cNvSpPr txBox="1"/>
+          <p:nvPr/>
+        </p:nvSpPr>
+        <p:spPr>
+          <a:xfrm>
+            <a:off x="4311058" y="4384995"/>
+            <a:ext cx="2083515" cy="646331"/>
+          </a:xfrm>
+          <a:prstGeom prst="rect">
+            <a:avLst/>
+          </a:prstGeom>
+          <a:noFill/>
+        </p:spPr>
+        <p:txBody>
+          <a:bodyPr wrap="square" rtlCol="0">
+            <a:spAutoFit/>
+          </a:bodyPr>
+          <a:lstStyle/>
+          <a:p>
+            <a:r>
+              <a:rPr lang="en-US" dirty="0">
+                <a:latin typeface="LM Mono 10" panose="00000509000000000000" pitchFamily="49" charset="0"/>
+                <a:cs typeface="Times New Roman" panose="02020603050405020304" pitchFamily="18" charset="0"/>
+              </a:rPr>
+              <a:t>TLAG</a:t>
+            </a:r>
+          </a:p>
+          <a:p>
+            <a:r>
+              <a:rPr lang="en-US" dirty="0">
+                <a:latin typeface="LM Mono 10" panose="00000509000000000000" pitchFamily="49" charset="0"/>
+                <a:cs typeface="Times New Roman" panose="02020603050405020304" pitchFamily="18" charset="0"/>
+              </a:rPr>
+              <a:t>(self-reported)</a:t>
+            </a:r>
+          </a:p>
+        </p:txBody>
+      </p:sp>
+      <p:cxnSp>
+        <p:nvCxnSpPr>
+          <p:cNvPr id="45" name="Straight Arrow Connector 44">
+            <a:extLst>
+              <a:ext uri="{FF2B5EF4-FFF2-40B4-BE49-F238E27FC236}">
+                <a16:creationId xmlns:a16="http://schemas.microsoft.com/office/drawing/2014/main" id="{E328EFF9-AED6-4085-AE27-B27CC9555B97}"/>
+              </a:ext>
+            </a:extLst>
+          </p:cNvPr>
+          <p:cNvCxnSpPr>
+            <a:cxnSpLocks/>
+          </p:cNvCxnSpPr>
+          <p:nvPr/>
+        </p:nvCxnSpPr>
+        <p:spPr>
+          <a:xfrm flipH="1" flipV="1">
+            <a:off x="2999077" y="4571523"/>
+            <a:ext cx="1191183" cy="12118"/>
+          </a:xfrm>
+          <a:prstGeom prst="straightConnector1">
+            <a:avLst/>
+          </a:prstGeom>
+          <a:ln w="25400">
+            <a:solidFill>
+              <a:schemeClr val="tx1"/>
+            </a:solidFill>
+            <a:tailEnd type="triangle"/>
+          </a:ln>
+        </p:spPr>
+        <p:style>
+          <a:lnRef idx="1">
+            <a:schemeClr val="accent1"/>
+          </a:lnRef>
+          <a:fillRef idx="0">
+            <a:schemeClr val="accent1"/>
+          </a:fillRef>
+          <a:effectRef idx="0">
+            <a:schemeClr val="accent1"/>
+          </a:effectRef>
+          <a:fontRef idx="minor">
+            <a:schemeClr val="tx1"/>
+          </a:fontRef>
+        </p:style>
+      </p:cxnSp>
+      <p:cxnSp>
+        <p:nvCxnSpPr>
+          <p:cNvPr id="47" name="Straight Arrow Connector 46">
+            <a:extLst>
+              <a:ext uri="{FF2B5EF4-FFF2-40B4-BE49-F238E27FC236}">
+                <a16:creationId xmlns:a16="http://schemas.microsoft.com/office/drawing/2014/main" id="{20959039-7F70-4069-83B9-DE848A3BBA5D}"/>
+              </a:ext>
+            </a:extLst>
+          </p:cNvPr>
+          <p:cNvCxnSpPr>
+            <a:cxnSpLocks/>
+          </p:cNvCxnSpPr>
+          <p:nvPr/>
+        </p:nvCxnSpPr>
+        <p:spPr>
+          <a:xfrm>
+            <a:off x="5111122" y="4571523"/>
+            <a:ext cx="847478" cy="0"/>
+          </a:xfrm>
+          <a:prstGeom prst="straightConnector1">
+            <a:avLst/>
+          </a:prstGeom>
+          <a:ln w="25400">
+            <a:solidFill>
+              <a:schemeClr val="tx1"/>
+            </a:solidFill>
+            <a:tailEnd type="triangle"/>
+          </a:ln>
+        </p:spPr>
+        <p:style>
+          <a:lnRef idx="1">
+            <a:schemeClr val="accent1"/>
+          </a:lnRef>
+          <a:fillRef idx="0">
+            <a:schemeClr val="accent1"/>
+          </a:fillRef>
+          <a:effectRef idx="0">
+            <a:schemeClr val="accent1"/>
+          </a:effectRef>
+          <a:fontRef idx="minor">
+            <a:schemeClr val="tx1"/>
+          </a:fontRef>
+        </p:style>
+      </p:cxnSp>
+      <p:cxnSp>
+        <p:nvCxnSpPr>
+          <p:cNvPr id="58" name="Straight Arrow Connector 57">
+            <a:extLst>
+              <a:ext uri="{FF2B5EF4-FFF2-40B4-BE49-F238E27FC236}">
+                <a16:creationId xmlns:a16="http://schemas.microsoft.com/office/drawing/2014/main" id="{2C4C3246-33B5-4517-BEBC-686EFCDA7921}"/>
+              </a:ext>
+            </a:extLst>
+          </p:cNvPr>
+          <p:cNvCxnSpPr>
+            <a:cxnSpLocks/>
+          </p:cNvCxnSpPr>
+          <p:nvPr/>
+        </p:nvCxnSpPr>
+        <p:spPr>
+          <a:xfrm>
+            <a:off x="6454649" y="3876080"/>
+            <a:ext cx="968277" cy="1862"/>
+          </a:xfrm>
+          <a:prstGeom prst="straightConnector1">
+            <a:avLst/>
+          </a:prstGeom>
+          <a:ln w="25400">
+            <a:solidFill>
+              <a:schemeClr val="tx1"/>
+            </a:solidFill>
+            <a:tailEnd type="triangle"/>
+          </a:ln>
+        </p:spPr>
+        <p:style>
+          <a:lnRef idx="1">
+            <a:schemeClr val="accent1"/>
+          </a:lnRef>
+          <a:fillRef idx="0">
+            <a:schemeClr val="accent1"/>
+          </a:fillRef>
+          <a:effectRef idx="0">
+            <a:schemeClr val="accent1"/>
+          </a:effectRef>
+          <a:fontRef idx="minor">
+            <a:schemeClr val="tx1"/>
+          </a:fontRef>
+        </p:style>
+      </p:cxnSp>
+      <p:sp>
+        <p:nvSpPr>
+          <p:cNvPr id="59" name="TextBox 58">
+            <a:extLst>
+              <a:ext uri="{FF2B5EF4-FFF2-40B4-BE49-F238E27FC236}">
+                <a16:creationId xmlns:a16="http://schemas.microsoft.com/office/drawing/2014/main" id="{6C56C24D-395E-466F-9D73-11EDD58F9B2C}"/>
+              </a:ext>
+            </a:extLst>
+          </p:cNvPr>
+          <p:cNvSpPr txBox="1"/>
+          <p:nvPr/>
+        </p:nvSpPr>
+        <p:spPr>
+          <a:xfrm>
+            <a:off x="7482999" y="3092083"/>
+            <a:ext cx="4388054" cy="1200329"/>
+          </a:xfrm>
+          <a:prstGeom prst="rect">
+            <a:avLst/>
+          </a:prstGeom>
+          <a:noFill/>
+          <a:ln>
+            <a:solidFill>
+              <a:schemeClr val="tx1"/>
+            </a:solidFill>
+          </a:ln>
+        </p:spPr>
+        <p:txBody>
+          <a:bodyPr wrap="square" rtlCol="0">
+            <a:spAutoFit/>
+          </a:bodyPr>
+          <a:lstStyle/>
+          <a:p>
+            <a:r>
+              <a:rPr lang="en-US" sz="1200" dirty="0">
+                <a:highlight>
+                  <a:srgbClr val="FFFF00"/>
+                </a:highlight>
+                <a:latin typeface="LM Mono 10" panose="00000509000000000000" pitchFamily="49" charset="0"/>
+                <a:cs typeface="Times New Roman" panose="02020603050405020304" pitchFamily="18" charset="0"/>
+              </a:rPr>
+              <a:t>GN: </a:t>
+            </a:r>
+            <a:r>
+              <a:rPr lang="en-US" sz="1200" dirty="0">
+                <a:latin typeface="LM Mono 10" panose="00000509000000000000" pitchFamily="49" charset="0"/>
+                <a:cs typeface="Times New Roman" panose="02020603050405020304" pitchFamily="18" charset="0"/>
+              </a:rPr>
+              <a:t>Chang in daily return (DRET) on filing date (0.8) is </a:t>
+            </a:r>
+            <a:r>
+              <a:rPr lang="en-US" sz="1200" dirty="0">
+                <a:highlight>
+                  <a:srgbClr val="FFFF00"/>
+                </a:highlight>
+                <a:latin typeface="LM Mono 10" panose="00000509000000000000" pitchFamily="49" charset="0"/>
+                <a:cs typeface="Times New Roman" panose="02020603050405020304" pitchFamily="18" charset="0"/>
+              </a:rPr>
+              <a:t>greater</a:t>
+            </a:r>
+            <a:r>
+              <a:rPr lang="en-US" sz="1200" dirty="0">
+                <a:latin typeface="LM Mono 10" panose="00000509000000000000" pitchFamily="49" charset="0"/>
+                <a:cs typeface="Times New Roman" panose="02020603050405020304" pitchFamily="18" charset="0"/>
+              </a:rPr>
+              <a:t> than 3*average </a:t>
+            </a:r>
+            <a:r>
+              <a:rPr lang="en-US" sz="1200" dirty="0">
+                <a:highlight>
+                  <a:srgbClr val="FFFF00"/>
+                </a:highlight>
+                <a:latin typeface="LM Mono 10" panose="00000509000000000000" pitchFamily="49" charset="0"/>
+                <a:cs typeface="Times New Roman" panose="02020603050405020304" pitchFamily="18" charset="0"/>
+              </a:rPr>
+              <a:t>increase</a:t>
+            </a:r>
+            <a:r>
+              <a:rPr lang="en-US" sz="1200" dirty="0">
+                <a:latin typeface="LM Mono 10" panose="00000509000000000000" pitchFamily="49" charset="0"/>
+                <a:cs typeface="Times New Roman" panose="02020603050405020304" pitchFamily="18" charset="0"/>
+              </a:rPr>
+              <a:t> in daily returns (3*0.1) for the firm in the current calendar year</a:t>
+            </a:r>
+          </a:p>
+          <a:p>
+            <a:r>
+              <a:rPr lang="en-US" sz="1200" dirty="0">
+                <a:highlight>
+                  <a:srgbClr val="FFFF00"/>
+                </a:highlight>
+                <a:latin typeface="LM Mono 10" panose="00000509000000000000" pitchFamily="49" charset="0"/>
+                <a:cs typeface="Times New Roman" panose="02020603050405020304" pitchFamily="18" charset="0"/>
+              </a:rPr>
+              <a:t>BN: </a:t>
+            </a:r>
+            <a:r>
+              <a:rPr lang="en-US" sz="1200" dirty="0">
+                <a:latin typeface="LM Mono 10" panose="00000509000000000000" pitchFamily="49" charset="0"/>
+                <a:cs typeface="Times New Roman" panose="02020603050405020304" pitchFamily="18" charset="0"/>
+              </a:rPr>
+              <a:t>Chang in daily return (DRET) on filing date (-0.8) is </a:t>
+            </a:r>
+            <a:r>
+              <a:rPr lang="en-US" sz="1200" dirty="0">
+                <a:highlight>
+                  <a:srgbClr val="FFFF00"/>
+                </a:highlight>
+                <a:latin typeface="LM Mono 10" panose="00000509000000000000" pitchFamily="49" charset="0"/>
+                <a:cs typeface="Times New Roman" panose="02020603050405020304" pitchFamily="18" charset="0"/>
+              </a:rPr>
+              <a:t>smaller</a:t>
+            </a:r>
+            <a:r>
+              <a:rPr lang="en-US" sz="1200" dirty="0">
+                <a:latin typeface="LM Mono 10" panose="00000509000000000000" pitchFamily="49" charset="0"/>
+                <a:cs typeface="Times New Roman" panose="02020603050405020304" pitchFamily="18" charset="0"/>
+              </a:rPr>
+              <a:t> than 3*average </a:t>
+            </a:r>
+            <a:r>
+              <a:rPr lang="en-US" sz="1200" dirty="0">
+                <a:highlight>
+                  <a:srgbClr val="FFFF00"/>
+                </a:highlight>
+                <a:latin typeface="LM Mono 10" panose="00000509000000000000" pitchFamily="49" charset="0"/>
+                <a:cs typeface="Times New Roman" panose="02020603050405020304" pitchFamily="18" charset="0"/>
+              </a:rPr>
+              <a:t>decrease</a:t>
+            </a:r>
+            <a:r>
+              <a:rPr lang="en-US" sz="1200" dirty="0">
+                <a:latin typeface="LM Mono 10" panose="00000509000000000000" pitchFamily="49" charset="0"/>
+                <a:cs typeface="Times New Roman" panose="02020603050405020304" pitchFamily="18" charset="0"/>
+              </a:rPr>
+              <a:t> in daily returns (3*-0.1) or the firm in the current calendar year</a:t>
+            </a:r>
+          </a:p>
+        </p:txBody>
+      </p:sp>
+      <p:sp>
+        <p:nvSpPr>
+          <p:cNvPr id="60" name="TextBox 59">
+            <a:extLst>
+              <a:ext uri="{FF2B5EF4-FFF2-40B4-BE49-F238E27FC236}">
+                <a16:creationId xmlns:a16="http://schemas.microsoft.com/office/drawing/2014/main" id="{A6ECB45D-96AF-44D2-BCB1-B585B86381A7}"/>
+              </a:ext>
+            </a:extLst>
+          </p:cNvPr>
+          <p:cNvSpPr txBox="1"/>
+          <p:nvPr/>
+        </p:nvSpPr>
+        <p:spPr>
+          <a:xfrm>
+            <a:off x="198211" y="222414"/>
+            <a:ext cx="2704785" cy="369332"/>
+          </a:xfrm>
+          <a:prstGeom prst="rect">
+            <a:avLst/>
+          </a:prstGeom>
+          <a:noFill/>
+        </p:spPr>
+        <p:txBody>
+          <a:bodyPr wrap="square" rtlCol="0">
+            <a:spAutoFit/>
+          </a:bodyPr>
+          <a:lstStyle/>
+          <a:p>
+            <a:r>
+              <a:rPr lang="en-US" dirty="0">
+                <a:latin typeface="LM Mono 10" panose="00000509000000000000" pitchFamily="49" charset="0"/>
+                <a:cs typeface="Times New Roman" panose="02020603050405020304" pitchFamily="18" charset="0"/>
+              </a:rPr>
+              <a:t>TLAG with matching</a:t>
+            </a:r>
+          </a:p>
+        </p:txBody>
+      </p:sp>
+      <p:sp>
+        <p:nvSpPr>
+          <p:cNvPr id="61" name="TextBox 60">
+            <a:extLst>
+              <a:ext uri="{FF2B5EF4-FFF2-40B4-BE49-F238E27FC236}">
+                <a16:creationId xmlns:a16="http://schemas.microsoft.com/office/drawing/2014/main" id="{02F56DEE-A4E6-4183-AEA1-43C5182707C4}"/>
+              </a:ext>
+            </a:extLst>
+          </p:cNvPr>
+          <p:cNvSpPr txBox="1"/>
+          <p:nvPr/>
+        </p:nvSpPr>
+        <p:spPr>
+          <a:xfrm>
+            <a:off x="198212" y="2628606"/>
+            <a:ext cx="2704785" cy="369332"/>
+          </a:xfrm>
+          <a:prstGeom prst="rect">
+            <a:avLst/>
+          </a:prstGeom>
+          <a:noFill/>
+        </p:spPr>
+        <p:txBody>
+          <a:bodyPr wrap="square" rtlCol="0">
+            <a:spAutoFit/>
+          </a:bodyPr>
+          <a:lstStyle/>
+          <a:p>
+            <a:r>
+              <a:rPr lang="en-US" dirty="0">
+                <a:latin typeface="LM Mono 10" panose="00000509000000000000" pitchFamily="49" charset="0"/>
+                <a:cs typeface="Times New Roman" panose="02020603050405020304" pitchFamily="18" charset="0"/>
+              </a:rPr>
+              <a:t>TLAG without matching</a:t>
+            </a:r>
+          </a:p>
+        </p:txBody>
+      </p:sp>
     </p:spTree>
     <p:extLst>
       <p:ext uri="{BB962C8B-B14F-4D97-AF65-F5344CB8AC3E}">

</xml_diff>